<commit_message>
Agregado de slides con información del producto.
</commit_message>
<xml_diff>
--- a/docs/Presentacion.pptx
+++ b/docs/Presentacion.pptx
@@ -7,6 +7,10 @@
   <p:sldIdLst>
     <p:sldId id="256" r:id="rId2"/>
     <p:sldId id="257" r:id="rId3"/>
+    <p:sldId id="258" r:id="rId4"/>
+    <p:sldId id="260" r:id="rId5"/>
+    <p:sldId id="259" r:id="rId6"/>
+    <p:sldId id="261" r:id="rId7"/>
   </p:sldIdLst>
   <p:sldSz cx="9144000" cy="6858000" type="screen4x3"/>
   <p:notesSz cx="6858000" cy="9144000"/>
@@ -3130,7 +3134,14 @@
                 <a:latin typeface="Aharoni" pitchFamily="2" charset="-79"/>
                 <a:cs typeface="Aharoni" pitchFamily="2" charset="-79"/>
               </a:rPr>
-              <a:t>Seguridad para Todos</a:t>
+              <a:t>Seguridad </a:t>
+            </a:r>
+            <a:r>
+              <a:rPr lang="es-AR" dirty="0" smtClean="0">
+                <a:latin typeface="Aharoni" pitchFamily="2" charset="-79"/>
+                <a:cs typeface="Aharoni" pitchFamily="2" charset="-79"/>
+              </a:rPr>
+              <a:t>para Todos</a:t>
             </a:r>
             <a:endParaRPr lang="es-AR" dirty="0">
               <a:latin typeface="Aharoni" pitchFamily="2" charset="-79"/>
@@ -3170,18 +3181,7 @@
                   </a:schemeClr>
                 </a:solidFill>
               </a:rPr>
-              <a:t>75.45 - </a:t>
-            </a:r>
-            <a:r>
-              <a:rPr lang="es-AR" sz="2400" dirty="0" smtClean="0">
-                <a:solidFill>
-                  <a:schemeClr val="tx1">
-                    <a:lumMod val="65000"/>
-                    <a:lumOff val="35000"/>
-                  </a:schemeClr>
-                </a:solidFill>
-              </a:rPr>
-              <a:t>Taller de Desarrollo de Proyectos I</a:t>
+              <a:t>75.45 - Taller de Desarrollo de Proyectos I</a:t>
             </a:r>
             <a:endParaRPr lang="es-AR" sz="2400" dirty="0">
               <a:solidFill>
@@ -3328,18 +3328,7 @@
                   </a:schemeClr>
                 </a:solidFill>
               </a:rPr>
-              <a:t>75.45 - </a:t>
-            </a:r>
-            <a:r>
-              <a:rPr lang="es-AR" dirty="0" smtClean="0">
-                <a:solidFill>
-                  <a:schemeClr val="tx1">
-                    <a:lumMod val="65000"/>
-                    <a:lumOff val="35000"/>
-                  </a:schemeClr>
-                </a:solidFill>
-              </a:rPr>
-              <a:t>Taller de Desarrollo de Proyectos I</a:t>
+              <a:t>75.45 - Taller de Desarrollo de Proyectos I</a:t>
             </a:r>
             <a:endParaRPr lang="es-AR" dirty="0">
               <a:solidFill>
@@ -3392,7 +3381,7 @@
         </p:nvSpPr>
         <p:spPr>
           <a:xfrm>
-            <a:off x="2771800" y="764704"/>
+            <a:off x="2998230" y="836712"/>
             <a:ext cx="3229954" cy="792088"/>
           </a:xfrm>
           <a:prstGeom prst="rect">
@@ -3401,7 +3390,7 @@
         </p:spPr>
         <p:txBody>
           <a:bodyPr vert="horz" lIns="91440" tIns="45720" rIns="91440" bIns="45720" rtlCol="0" anchor="ctr">
-            <a:normAutofit fontScale="97500"/>
+            <a:noAutofit/>
           </a:bodyPr>
           <a:lstStyle>
             <a:lvl1pPr algn="ctr" defTabSz="914400" rtl="0" eaLnBrk="1" latinLnBrk="0" hangingPunct="1">
@@ -3421,16 +3410,135 @@
           </a:lstStyle>
           <a:p>
             <a:r>
-              <a:rPr lang="es-AR" sz="3600" dirty="0" smtClean="0">
-                <a:latin typeface="Aharoni" pitchFamily="2" charset="-79"/>
-                <a:cs typeface="Aharoni" pitchFamily="2" charset="-79"/>
+              <a:rPr lang="es-AR" sz="4800" b="1" dirty="0" smtClean="0">
+                <a:latin typeface="Trebuchet MS" pitchFamily="34" charset="0"/>
+                <a:cs typeface="Levenim MT" pitchFamily="2" charset="-79"/>
               </a:rPr>
               <a:t>Producto</a:t>
             </a:r>
-            <a:endParaRPr lang="es-AR" sz="3600" dirty="0">
-              <a:latin typeface="Aharoni" pitchFamily="2" charset="-79"/>
-              <a:cs typeface="Aharoni" pitchFamily="2" charset="-79"/>
+            <a:endParaRPr lang="es-AR" sz="4800" b="1" dirty="0">
+              <a:latin typeface="Trebuchet MS" pitchFamily="34" charset="0"/>
+              <a:cs typeface="Levenim MT" pitchFamily="2" charset="-79"/>
             </a:endParaRPr>
+          </a:p>
+        </p:txBody>
+      </p:sp>
+      <p:cxnSp>
+        <p:nvCxnSpPr>
+          <p:cNvPr id="5" name="Straight Connector 4"/>
+          <p:cNvCxnSpPr/>
+          <p:nvPr/>
+        </p:nvCxnSpPr>
+        <p:spPr>
+          <a:xfrm>
+            <a:off x="395536" y="692696"/>
+            <a:ext cx="8496944" cy="0"/>
+          </a:xfrm>
+          <a:prstGeom prst="line">
+            <a:avLst/>
+          </a:prstGeom>
+          <a:ln>
+            <a:solidFill>
+              <a:schemeClr val="bg1">
+                <a:lumMod val="65000"/>
+              </a:schemeClr>
+            </a:solidFill>
+          </a:ln>
+        </p:spPr>
+        <p:style>
+          <a:lnRef idx="1">
+            <a:schemeClr val="accent1"/>
+          </a:lnRef>
+          <a:fillRef idx="0">
+            <a:schemeClr val="accent1"/>
+          </a:fillRef>
+          <a:effectRef idx="0">
+            <a:schemeClr val="accent1"/>
+          </a:effectRef>
+          <a:fontRef idx="minor">
+            <a:schemeClr val="tx1"/>
+          </a:fontRef>
+        </p:style>
+      </p:cxnSp>
+      <p:sp>
+        <p:nvSpPr>
+          <p:cNvPr id="7" name="TextBox 6"/>
+          <p:cNvSpPr txBox="1"/>
+          <p:nvPr/>
+        </p:nvSpPr>
+        <p:spPr>
+          <a:xfrm>
+            <a:off x="467544" y="1772816"/>
+            <a:ext cx="8352928" cy="3970318"/>
+          </a:xfrm>
+          <a:prstGeom prst="rect">
+            <a:avLst/>
+          </a:prstGeom>
+          <a:noFill/>
+        </p:spPr>
+        <p:txBody>
+          <a:bodyPr wrap="square" rtlCol="0">
+            <a:spAutoFit/>
+          </a:bodyPr>
+          <a:lstStyle/>
+          <a:p>
+            <a:pPr marL="571500" indent="-571500">
+              <a:buFont typeface="Wingdings" pitchFamily="2" charset="2"/>
+              <a:buChar char="§"/>
+            </a:pPr>
+            <a:r>
+              <a:rPr lang="es-AR" sz="3600" dirty="0" smtClean="0"/>
+              <a:t>Servicio para mejorar la Calidad de Vida.</a:t>
+            </a:r>
+          </a:p>
+          <a:p>
+            <a:pPr marL="571500" indent="-571500">
+              <a:buFont typeface="Wingdings" pitchFamily="2" charset="2"/>
+              <a:buChar char="§"/>
+            </a:pPr>
+            <a:r>
+              <a:rPr lang="es-AR" sz="3600" dirty="0" smtClean="0"/>
+              <a:t>Funciona en Dispositivos </a:t>
+            </a:r>
+            <a:r>
+              <a:rPr lang="es-AR" sz="3600" dirty="0"/>
+              <a:t>M</a:t>
+            </a:r>
+            <a:r>
+              <a:rPr lang="es-AR" sz="3600" dirty="0" smtClean="0"/>
+              <a:t>óviles.</a:t>
+            </a:r>
+          </a:p>
+          <a:p>
+            <a:pPr marL="571500" indent="-571500">
+              <a:buFont typeface="Wingdings" pitchFamily="2" charset="2"/>
+              <a:buChar char="§"/>
+            </a:pPr>
+            <a:r>
+              <a:rPr lang="es-AR" sz="3600" dirty="0" smtClean="0"/>
+              <a:t>Comunicación con Centrales de Seguridad.</a:t>
+            </a:r>
+          </a:p>
+          <a:p>
+            <a:pPr marL="571500" indent="-571500">
+              <a:buFont typeface="Wingdings" pitchFamily="2" charset="2"/>
+              <a:buChar char="§"/>
+            </a:pPr>
+            <a:r>
+              <a:rPr lang="es-AR" sz="3600" dirty="0" smtClean="0"/>
+              <a:t>Acceso Masivo.</a:t>
+            </a:r>
+          </a:p>
+          <a:p>
+            <a:pPr marL="571500" indent="-571500">
+              <a:buFont typeface="Wingdings" pitchFamily="2" charset="2"/>
+              <a:buChar char="§"/>
+            </a:pPr>
+            <a:r>
+              <a:rPr lang="es-AR" sz="3600" dirty="0" smtClean="0"/>
+              <a:t>Planes para Familia y para Empresas u Organizaciones. </a:t>
+            </a:r>
+            <a:endParaRPr lang="es-AR" sz="3600" dirty="0"/>
           </a:p>
         </p:txBody>
       </p:sp>
@@ -3438,6 +3546,1142 @@
     <p:extLst>
       <p:ext uri="{BB962C8B-B14F-4D97-AF65-F5344CB8AC3E}">
         <p14:creationId xmlns:p14="http://schemas.microsoft.com/office/powerpoint/2010/main" val="2688607078"/>
+      </p:ext>
+    </p:extLst>
+  </p:cSld>
+  <p:clrMapOvr>
+    <a:masterClrMapping/>
+  </p:clrMapOvr>
+  <p:timing>
+    <p:tnLst>
+      <p:par>
+        <p:cTn id="1" dur="indefinite" restart="never" nodeType="tmRoot"/>
+      </p:par>
+    </p:tnLst>
+  </p:timing>
+</p:sld>
+</file>
+
+<file path=ppt/slides/slide3.xml><?xml version="1.0" encoding="utf-8"?>
+<p:sld xmlns:a="http://schemas.openxmlformats.org/drawingml/2006/main" xmlns:r="http://schemas.openxmlformats.org/officeDocument/2006/relationships" xmlns:p="http://schemas.openxmlformats.org/presentationml/2006/main">
+  <p:cSld>
+    <p:spTree>
+      <p:nvGrpSpPr>
+        <p:cNvPr id="1" name=""/>
+        <p:cNvGrpSpPr/>
+        <p:nvPr/>
+      </p:nvGrpSpPr>
+      <p:grpSpPr>
+        <a:xfrm>
+          <a:off x="0" y="0"/>
+          <a:ext cx="0" cy="0"/>
+          <a:chOff x="0" y="0"/>
+          <a:chExt cx="0" cy="0"/>
+        </a:xfrm>
+      </p:grpSpPr>
+      <p:sp>
+        <p:nvSpPr>
+          <p:cNvPr id="2" name="1 Título"/>
+          <p:cNvSpPr>
+            <a:spLocks noGrp="1"/>
+          </p:cNvSpPr>
+          <p:nvPr>
+            <p:ph type="ctrTitle"/>
+          </p:nvPr>
+        </p:nvSpPr>
+        <p:spPr>
+          <a:xfrm>
+            <a:off x="323528" y="260648"/>
+            <a:ext cx="2736304" cy="288032"/>
+          </a:xfrm>
+        </p:spPr>
+        <p:txBody>
+          <a:bodyPr>
+            <a:normAutofit fontScale="90000"/>
+          </a:bodyPr>
+          <a:lstStyle/>
+          <a:p>
+            <a:r>
+              <a:rPr lang="es-AR" sz="2000" dirty="0" smtClean="0">
+                <a:latin typeface="Aharoni" pitchFamily="2" charset="-79"/>
+                <a:cs typeface="Aharoni" pitchFamily="2" charset="-79"/>
+              </a:rPr>
+              <a:t>Seguridad para Todos</a:t>
+            </a:r>
+            <a:endParaRPr lang="es-AR" sz="2000" dirty="0">
+              <a:latin typeface="Aharoni" pitchFamily="2" charset="-79"/>
+              <a:cs typeface="Aharoni" pitchFamily="2" charset="-79"/>
+            </a:endParaRPr>
+          </a:p>
+        </p:txBody>
+      </p:sp>
+      <p:sp>
+        <p:nvSpPr>
+          <p:cNvPr id="3" name="2 Subtítulo"/>
+          <p:cNvSpPr>
+            <a:spLocks noGrp="1"/>
+          </p:cNvSpPr>
+          <p:nvPr>
+            <p:ph type="subTitle" idx="1"/>
+          </p:nvPr>
+        </p:nvSpPr>
+        <p:spPr>
+          <a:xfrm>
+            <a:off x="5148064" y="239876"/>
+            <a:ext cx="3960440" cy="380812"/>
+          </a:xfrm>
+        </p:spPr>
+        <p:txBody>
+          <a:bodyPr>
+            <a:normAutofit fontScale="47500" lnSpcReduction="20000"/>
+          </a:bodyPr>
+          <a:lstStyle/>
+          <a:p>
+            <a:r>
+              <a:rPr lang="es-AR" dirty="0" smtClean="0">
+                <a:solidFill>
+                  <a:schemeClr val="tx1">
+                    <a:lumMod val="65000"/>
+                    <a:lumOff val="35000"/>
+                  </a:schemeClr>
+                </a:solidFill>
+              </a:rPr>
+              <a:t>75.45 - Taller de Desarrollo de Proyectos I</a:t>
+            </a:r>
+            <a:endParaRPr lang="es-AR" dirty="0">
+              <a:solidFill>
+                <a:schemeClr val="tx1">
+                  <a:lumMod val="65000"/>
+                  <a:lumOff val="35000"/>
+                </a:schemeClr>
+              </a:solidFill>
+            </a:endParaRPr>
+          </a:p>
+        </p:txBody>
+      </p:sp>
+      <p:pic>
+        <p:nvPicPr>
+          <p:cNvPr id="6" name="Picture 5"/>
+          <p:cNvPicPr>
+            <a:picLocks noChangeAspect="1"/>
+          </p:cNvPicPr>
+          <p:nvPr/>
+        </p:nvPicPr>
+        <p:blipFill>
+          <a:blip r:embed="rId2" cstate="print">
+            <a:extLst>
+              <a:ext uri="{28A0092B-C50C-407E-A947-70E740481C1C}">
+                <a14:useLocalDpi xmlns:a14="http://schemas.microsoft.com/office/drawing/2010/main" val="0"/>
+              </a:ext>
+            </a:extLst>
+          </a:blip>
+          <a:stretch>
+            <a:fillRect/>
+          </a:stretch>
+        </p:blipFill>
+        <p:spPr>
+          <a:xfrm>
+            <a:off x="3203848" y="260648"/>
+            <a:ext cx="468052" cy="277364"/>
+          </a:xfrm>
+          <a:prstGeom prst="rect">
+            <a:avLst/>
+          </a:prstGeom>
+        </p:spPr>
+      </p:pic>
+      <p:sp>
+        <p:nvSpPr>
+          <p:cNvPr id="8" name="1 Título"/>
+          <p:cNvSpPr txBox="1">
+            <a:spLocks/>
+          </p:cNvSpPr>
+          <p:nvPr/>
+        </p:nvSpPr>
+        <p:spPr>
+          <a:xfrm>
+            <a:off x="1907704" y="836712"/>
+            <a:ext cx="5328592" cy="792088"/>
+          </a:xfrm>
+          <a:prstGeom prst="rect">
+            <a:avLst/>
+          </a:prstGeom>
+        </p:spPr>
+        <p:txBody>
+          <a:bodyPr vert="horz" lIns="91440" tIns="45720" rIns="91440" bIns="45720" rtlCol="0" anchor="ctr">
+            <a:noAutofit/>
+          </a:bodyPr>
+          <a:lstStyle>
+            <a:lvl1pPr algn="ctr" defTabSz="914400" rtl="0" eaLnBrk="1" latinLnBrk="0" hangingPunct="1">
+              <a:spcBef>
+                <a:spcPct val="0"/>
+              </a:spcBef>
+              <a:buNone/>
+              <a:defRPr sz="4400" kern="1200">
+                <a:solidFill>
+                  <a:schemeClr val="tx1"/>
+                </a:solidFill>
+                <a:latin typeface="+mj-lt"/>
+                <a:ea typeface="+mj-ea"/>
+                <a:cs typeface="+mj-cs"/>
+              </a:defRPr>
+            </a:lvl1pPr>
+          </a:lstStyle>
+          <a:p>
+            <a:r>
+              <a:rPr lang="es-AR" sz="4800" b="1" dirty="0" smtClean="0">
+                <a:latin typeface="Trebuchet MS" pitchFamily="34" charset="0"/>
+                <a:cs typeface="Levenim MT" pitchFamily="2" charset="-79"/>
+              </a:rPr>
+              <a:t>Producto Básico</a:t>
+            </a:r>
+            <a:endParaRPr lang="es-AR" sz="4800" b="1" dirty="0">
+              <a:latin typeface="Trebuchet MS" pitchFamily="34" charset="0"/>
+              <a:cs typeface="Levenim MT" pitchFamily="2" charset="-79"/>
+            </a:endParaRPr>
+          </a:p>
+        </p:txBody>
+      </p:sp>
+      <p:cxnSp>
+        <p:nvCxnSpPr>
+          <p:cNvPr id="5" name="Straight Connector 4"/>
+          <p:cNvCxnSpPr/>
+          <p:nvPr/>
+        </p:nvCxnSpPr>
+        <p:spPr>
+          <a:xfrm>
+            <a:off x="395536" y="692696"/>
+            <a:ext cx="8496944" cy="0"/>
+          </a:xfrm>
+          <a:prstGeom prst="line">
+            <a:avLst/>
+          </a:prstGeom>
+          <a:ln>
+            <a:solidFill>
+              <a:schemeClr val="bg1">
+                <a:lumMod val="65000"/>
+              </a:schemeClr>
+            </a:solidFill>
+          </a:ln>
+        </p:spPr>
+        <p:style>
+          <a:lnRef idx="1">
+            <a:schemeClr val="accent1"/>
+          </a:lnRef>
+          <a:fillRef idx="0">
+            <a:schemeClr val="accent1"/>
+          </a:fillRef>
+          <a:effectRef idx="0">
+            <a:schemeClr val="accent1"/>
+          </a:effectRef>
+          <a:fontRef idx="minor">
+            <a:schemeClr val="tx1"/>
+          </a:fontRef>
+        </p:style>
+      </p:cxnSp>
+      <p:sp>
+        <p:nvSpPr>
+          <p:cNvPr id="7" name="TextBox 6"/>
+          <p:cNvSpPr txBox="1"/>
+          <p:nvPr/>
+        </p:nvSpPr>
+        <p:spPr>
+          <a:xfrm>
+            <a:off x="467544" y="1772816"/>
+            <a:ext cx="4104456" cy="2862322"/>
+          </a:xfrm>
+          <a:prstGeom prst="rect">
+            <a:avLst/>
+          </a:prstGeom>
+          <a:noFill/>
+        </p:spPr>
+        <p:txBody>
+          <a:bodyPr wrap="square" rtlCol="0">
+            <a:spAutoFit/>
+          </a:bodyPr>
+          <a:lstStyle/>
+          <a:p>
+            <a:pPr marL="571500" indent="-571500">
+              <a:buFont typeface="Wingdings" pitchFamily="2" charset="2"/>
+              <a:buChar char="§"/>
+            </a:pPr>
+            <a:r>
+              <a:rPr lang="es-AR" sz="3600" dirty="0" smtClean="0"/>
+              <a:t>Gratuita.</a:t>
+            </a:r>
+          </a:p>
+          <a:p>
+            <a:pPr marL="571500" indent="-571500">
+              <a:buFont typeface="Wingdings" pitchFamily="2" charset="2"/>
+              <a:buChar char="§"/>
+            </a:pPr>
+            <a:r>
+              <a:rPr lang="es-AR" sz="3600" dirty="0" smtClean="0"/>
+              <a:t>Fácil Acceso.</a:t>
+            </a:r>
+          </a:p>
+          <a:p>
+            <a:pPr marL="571500" indent="-571500">
+              <a:buFont typeface="Wingdings" pitchFamily="2" charset="2"/>
+              <a:buChar char="§"/>
+            </a:pPr>
+            <a:r>
+              <a:rPr lang="es-AR" sz="3600" dirty="0" smtClean="0"/>
+              <a:t>Mal uso debe estar penado por Ley.</a:t>
+            </a:r>
+          </a:p>
+        </p:txBody>
+      </p:sp>
+    </p:spTree>
+    <p:extLst>
+      <p:ext uri="{BB962C8B-B14F-4D97-AF65-F5344CB8AC3E}">
+        <p14:creationId xmlns:p14="http://schemas.microsoft.com/office/powerpoint/2010/main" val="1216012736"/>
+      </p:ext>
+    </p:extLst>
+  </p:cSld>
+  <p:clrMapOvr>
+    <a:masterClrMapping/>
+  </p:clrMapOvr>
+  <p:timing>
+    <p:tnLst>
+      <p:par>
+        <p:cTn id="1" dur="indefinite" restart="never" nodeType="tmRoot"/>
+      </p:par>
+    </p:tnLst>
+  </p:timing>
+</p:sld>
+</file>
+
+<file path=ppt/slides/slide4.xml><?xml version="1.0" encoding="utf-8"?>
+<p:sld xmlns:a="http://schemas.openxmlformats.org/drawingml/2006/main" xmlns:r="http://schemas.openxmlformats.org/officeDocument/2006/relationships" xmlns:p="http://schemas.openxmlformats.org/presentationml/2006/main">
+  <p:cSld>
+    <p:spTree>
+      <p:nvGrpSpPr>
+        <p:cNvPr id="1" name=""/>
+        <p:cNvGrpSpPr/>
+        <p:nvPr/>
+      </p:nvGrpSpPr>
+      <p:grpSpPr>
+        <a:xfrm>
+          <a:off x="0" y="0"/>
+          <a:ext cx="0" cy="0"/>
+          <a:chOff x="0" y="0"/>
+          <a:chExt cx="0" cy="0"/>
+        </a:xfrm>
+      </p:grpSpPr>
+      <p:sp>
+        <p:nvSpPr>
+          <p:cNvPr id="2" name="1 Título"/>
+          <p:cNvSpPr>
+            <a:spLocks noGrp="1"/>
+          </p:cNvSpPr>
+          <p:nvPr>
+            <p:ph type="ctrTitle"/>
+          </p:nvPr>
+        </p:nvSpPr>
+        <p:spPr>
+          <a:xfrm>
+            <a:off x="323528" y="260648"/>
+            <a:ext cx="2736304" cy="288032"/>
+          </a:xfrm>
+        </p:spPr>
+        <p:txBody>
+          <a:bodyPr>
+            <a:normAutofit fontScale="90000"/>
+          </a:bodyPr>
+          <a:lstStyle/>
+          <a:p>
+            <a:r>
+              <a:rPr lang="es-AR" sz="2000" dirty="0" smtClean="0">
+                <a:latin typeface="Aharoni" pitchFamily="2" charset="-79"/>
+                <a:cs typeface="Aharoni" pitchFamily="2" charset="-79"/>
+              </a:rPr>
+              <a:t>Seguridad para Todos</a:t>
+            </a:r>
+            <a:endParaRPr lang="es-AR" sz="2000" dirty="0">
+              <a:latin typeface="Aharoni" pitchFamily="2" charset="-79"/>
+              <a:cs typeface="Aharoni" pitchFamily="2" charset="-79"/>
+            </a:endParaRPr>
+          </a:p>
+        </p:txBody>
+      </p:sp>
+      <p:sp>
+        <p:nvSpPr>
+          <p:cNvPr id="3" name="2 Subtítulo"/>
+          <p:cNvSpPr>
+            <a:spLocks noGrp="1"/>
+          </p:cNvSpPr>
+          <p:nvPr>
+            <p:ph type="subTitle" idx="1"/>
+          </p:nvPr>
+        </p:nvSpPr>
+        <p:spPr>
+          <a:xfrm>
+            <a:off x="5148064" y="239876"/>
+            <a:ext cx="3960440" cy="380812"/>
+          </a:xfrm>
+        </p:spPr>
+        <p:txBody>
+          <a:bodyPr>
+            <a:normAutofit fontScale="47500" lnSpcReduction="20000"/>
+          </a:bodyPr>
+          <a:lstStyle/>
+          <a:p>
+            <a:r>
+              <a:rPr lang="es-AR" dirty="0" smtClean="0">
+                <a:solidFill>
+                  <a:schemeClr val="tx1">
+                    <a:lumMod val="65000"/>
+                    <a:lumOff val="35000"/>
+                  </a:schemeClr>
+                </a:solidFill>
+              </a:rPr>
+              <a:t>75.45 - Taller de Desarrollo de Proyectos I</a:t>
+            </a:r>
+            <a:endParaRPr lang="es-AR" dirty="0">
+              <a:solidFill>
+                <a:schemeClr val="tx1">
+                  <a:lumMod val="65000"/>
+                  <a:lumOff val="35000"/>
+                </a:schemeClr>
+              </a:solidFill>
+            </a:endParaRPr>
+          </a:p>
+        </p:txBody>
+      </p:sp>
+      <p:pic>
+        <p:nvPicPr>
+          <p:cNvPr id="6" name="Picture 5"/>
+          <p:cNvPicPr>
+            <a:picLocks noChangeAspect="1"/>
+          </p:cNvPicPr>
+          <p:nvPr/>
+        </p:nvPicPr>
+        <p:blipFill>
+          <a:blip r:embed="rId2" cstate="print">
+            <a:extLst>
+              <a:ext uri="{28A0092B-C50C-407E-A947-70E740481C1C}">
+                <a14:useLocalDpi xmlns:a14="http://schemas.microsoft.com/office/drawing/2010/main" val="0"/>
+              </a:ext>
+            </a:extLst>
+          </a:blip>
+          <a:stretch>
+            <a:fillRect/>
+          </a:stretch>
+        </p:blipFill>
+        <p:spPr>
+          <a:xfrm>
+            <a:off x="3203848" y="260648"/>
+            <a:ext cx="468052" cy="277364"/>
+          </a:xfrm>
+          <a:prstGeom prst="rect">
+            <a:avLst/>
+          </a:prstGeom>
+        </p:spPr>
+      </p:pic>
+      <p:sp>
+        <p:nvSpPr>
+          <p:cNvPr id="8" name="1 Título"/>
+          <p:cNvSpPr txBox="1">
+            <a:spLocks/>
+          </p:cNvSpPr>
+          <p:nvPr/>
+        </p:nvSpPr>
+        <p:spPr>
+          <a:xfrm>
+            <a:off x="1043608" y="836712"/>
+            <a:ext cx="7272808" cy="792088"/>
+          </a:xfrm>
+          <a:prstGeom prst="rect">
+            <a:avLst/>
+          </a:prstGeom>
+        </p:spPr>
+        <p:txBody>
+          <a:bodyPr vert="horz" lIns="91440" tIns="45720" rIns="91440" bIns="45720" rtlCol="0" anchor="ctr">
+            <a:noAutofit/>
+          </a:bodyPr>
+          <a:lstStyle>
+            <a:lvl1pPr algn="ctr" defTabSz="914400" rtl="0" eaLnBrk="1" latinLnBrk="0" hangingPunct="1">
+              <a:spcBef>
+                <a:spcPct val="0"/>
+              </a:spcBef>
+              <a:buNone/>
+              <a:defRPr sz="4400" kern="1200">
+                <a:solidFill>
+                  <a:schemeClr val="tx1"/>
+                </a:solidFill>
+                <a:latin typeface="+mj-lt"/>
+                <a:ea typeface="+mj-ea"/>
+                <a:cs typeface="+mj-cs"/>
+              </a:defRPr>
+            </a:lvl1pPr>
+          </a:lstStyle>
+          <a:p>
+            <a:r>
+              <a:rPr lang="es-AR" sz="4800" b="1" dirty="0" smtClean="0">
+                <a:latin typeface="Trebuchet MS" pitchFamily="34" charset="0"/>
+                <a:cs typeface="Levenim MT" pitchFamily="2" charset="-79"/>
+              </a:rPr>
+              <a:t>Productos Adicionales</a:t>
+            </a:r>
+            <a:endParaRPr lang="es-AR" sz="4800" b="1" dirty="0">
+              <a:latin typeface="Trebuchet MS" pitchFamily="34" charset="0"/>
+              <a:cs typeface="Levenim MT" pitchFamily="2" charset="-79"/>
+            </a:endParaRPr>
+          </a:p>
+        </p:txBody>
+      </p:sp>
+      <p:cxnSp>
+        <p:nvCxnSpPr>
+          <p:cNvPr id="5" name="Straight Connector 4"/>
+          <p:cNvCxnSpPr/>
+          <p:nvPr/>
+        </p:nvCxnSpPr>
+        <p:spPr>
+          <a:xfrm>
+            <a:off x="395536" y="692696"/>
+            <a:ext cx="8496944" cy="0"/>
+          </a:xfrm>
+          <a:prstGeom prst="line">
+            <a:avLst/>
+          </a:prstGeom>
+          <a:ln>
+            <a:solidFill>
+              <a:schemeClr val="bg1">
+                <a:lumMod val="65000"/>
+              </a:schemeClr>
+            </a:solidFill>
+          </a:ln>
+        </p:spPr>
+        <p:style>
+          <a:lnRef idx="1">
+            <a:schemeClr val="accent1"/>
+          </a:lnRef>
+          <a:fillRef idx="0">
+            <a:schemeClr val="accent1"/>
+          </a:fillRef>
+          <a:effectRef idx="0">
+            <a:schemeClr val="accent1"/>
+          </a:effectRef>
+          <a:fontRef idx="minor">
+            <a:schemeClr val="tx1"/>
+          </a:fontRef>
+        </p:style>
+      </p:cxnSp>
+      <p:sp>
+        <p:nvSpPr>
+          <p:cNvPr id="7" name="TextBox 6"/>
+          <p:cNvSpPr txBox="1"/>
+          <p:nvPr/>
+        </p:nvSpPr>
+        <p:spPr>
+          <a:xfrm>
+            <a:off x="467544" y="1772816"/>
+            <a:ext cx="8280920" cy="5078313"/>
+          </a:xfrm>
+          <a:prstGeom prst="rect">
+            <a:avLst/>
+          </a:prstGeom>
+          <a:noFill/>
+        </p:spPr>
+        <p:txBody>
+          <a:bodyPr wrap="square" rtlCol="0">
+            <a:spAutoFit/>
+          </a:bodyPr>
+          <a:lstStyle/>
+          <a:p>
+            <a:pPr marL="571500" indent="-571500">
+              <a:buFont typeface="Wingdings" pitchFamily="2" charset="2"/>
+              <a:buChar char="§"/>
+            </a:pPr>
+            <a:r>
+              <a:rPr lang="es-AR" sz="3600" dirty="0" smtClean="0"/>
+              <a:t>Planes según necesidades:</a:t>
+            </a:r>
+          </a:p>
+          <a:p>
+            <a:pPr marL="1028700" lvl="1" indent="-571500">
+              <a:buFont typeface="Wingdings" pitchFamily="2" charset="2"/>
+              <a:buChar char="§"/>
+            </a:pPr>
+            <a:r>
+              <a:rPr lang="es-AR" sz="3600" dirty="0" smtClean="0"/>
+              <a:t>Familiar.</a:t>
+            </a:r>
+          </a:p>
+          <a:p>
+            <a:pPr marL="1028700" lvl="1" indent="-571500">
+              <a:buFont typeface="Wingdings" pitchFamily="2" charset="2"/>
+              <a:buChar char="§"/>
+            </a:pPr>
+            <a:r>
+              <a:rPr lang="es-AR" sz="3600" dirty="0" smtClean="0"/>
+              <a:t>Empresarial.</a:t>
+            </a:r>
+            <a:endParaRPr lang="es-AR" sz="3600" dirty="0"/>
+          </a:p>
+          <a:p>
+            <a:pPr marL="1028700" lvl="1" indent="-571500">
+              <a:buFont typeface="Wingdings" pitchFamily="2" charset="2"/>
+              <a:buChar char="§"/>
+            </a:pPr>
+            <a:r>
+              <a:rPr lang="es-AR" sz="3600" dirty="0" smtClean="0"/>
+              <a:t>Individual.</a:t>
+            </a:r>
+          </a:p>
+          <a:p>
+            <a:pPr marL="571500" indent="-571500">
+              <a:buFont typeface="Wingdings" pitchFamily="2" charset="2"/>
+              <a:buChar char="§"/>
+            </a:pPr>
+            <a:r>
+              <a:rPr lang="es-AR" sz="3600" dirty="0" smtClean="0"/>
+              <a:t>Esquema de </a:t>
+            </a:r>
+            <a:r>
+              <a:rPr lang="es-AR" sz="3600" dirty="0" err="1" smtClean="0"/>
+              <a:t>Checkpoints</a:t>
+            </a:r>
+            <a:r>
+              <a:rPr lang="es-AR" sz="3600" dirty="0" smtClean="0"/>
+              <a:t> (tiempo/lugar).</a:t>
+            </a:r>
+          </a:p>
+          <a:p>
+            <a:pPr marL="571500" indent="-571500">
+              <a:buFont typeface="Wingdings" pitchFamily="2" charset="2"/>
+              <a:buChar char="§"/>
+            </a:pPr>
+            <a:r>
+              <a:rPr lang="es-AR" sz="3600" dirty="0" smtClean="0"/>
+              <a:t>Monitoreo Periódico.</a:t>
+            </a:r>
+          </a:p>
+          <a:p>
+            <a:pPr marL="571500" indent="-571500">
+              <a:buFont typeface="Wingdings" pitchFamily="2" charset="2"/>
+              <a:buChar char="§"/>
+            </a:pPr>
+            <a:r>
+              <a:rPr lang="es-AR" sz="3600" dirty="0" smtClean="0"/>
+              <a:t>Alarmas de Zona Peligrosa.</a:t>
+            </a:r>
+          </a:p>
+          <a:p>
+            <a:pPr marL="571500" indent="-571500">
+              <a:buFont typeface="Wingdings" pitchFamily="2" charset="2"/>
+              <a:buChar char="§"/>
+            </a:pPr>
+            <a:endParaRPr lang="es-AR" sz="3600" dirty="0" smtClean="0"/>
+          </a:p>
+        </p:txBody>
+      </p:sp>
+    </p:spTree>
+    <p:extLst>
+      <p:ext uri="{BB962C8B-B14F-4D97-AF65-F5344CB8AC3E}">
+        <p14:creationId xmlns:p14="http://schemas.microsoft.com/office/powerpoint/2010/main" val="792409300"/>
+      </p:ext>
+    </p:extLst>
+  </p:cSld>
+  <p:clrMapOvr>
+    <a:masterClrMapping/>
+  </p:clrMapOvr>
+  <p:timing>
+    <p:tnLst>
+      <p:par>
+        <p:cTn id="1" dur="indefinite" restart="never" nodeType="tmRoot"/>
+      </p:par>
+    </p:tnLst>
+  </p:timing>
+</p:sld>
+</file>
+
+<file path=ppt/slides/slide5.xml><?xml version="1.0" encoding="utf-8"?>
+<p:sld xmlns:a="http://schemas.openxmlformats.org/drawingml/2006/main" xmlns:r="http://schemas.openxmlformats.org/officeDocument/2006/relationships" xmlns:p="http://schemas.openxmlformats.org/presentationml/2006/main">
+  <p:cSld>
+    <p:spTree>
+      <p:nvGrpSpPr>
+        <p:cNvPr id="1" name=""/>
+        <p:cNvGrpSpPr/>
+        <p:nvPr/>
+      </p:nvGrpSpPr>
+      <p:grpSpPr>
+        <a:xfrm>
+          <a:off x="0" y="0"/>
+          <a:ext cx="0" cy="0"/>
+          <a:chOff x="0" y="0"/>
+          <a:chExt cx="0" cy="0"/>
+        </a:xfrm>
+      </p:grpSpPr>
+      <p:sp>
+        <p:nvSpPr>
+          <p:cNvPr id="2" name="1 Título"/>
+          <p:cNvSpPr>
+            <a:spLocks noGrp="1"/>
+          </p:cNvSpPr>
+          <p:nvPr>
+            <p:ph type="ctrTitle"/>
+          </p:nvPr>
+        </p:nvSpPr>
+        <p:spPr>
+          <a:xfrm>
+            <a:off x="323528" y="260648"/>
+            <a:ext cx="2736304" cy="288032"/>
+          </a:xfrm>
+        </p:spPr>
+        <p:txBody>
+          <a:bodyPr>
+            <a:normAutofit fontScale="90000"/>
+          </a:bodyPr>
+          <a:lstStyle/>
+          <a:p>
+            <a:r>
+              <a:rPr lang="es-AR" sz="2000" dirty="0" smtClean="0">
+                <a:latin typeface="Aharoni" pitchFamily="2" charset="-79"/>
+                <a:cs typeface="Aharoni" pitchFamily="2" charset="-79"/>
+              </a:rPr>
+              <a:t>Seguridad para Todos</a:t>
+            </a:r>
+            <a:endParaRPr lang="es-AR" sz="2000" dirty="0">
+              <a:latin typeface="Aharoni" pitchFamily="2" charset="-79"/>
+              <a:cs typeface="Aharoni" pitchFamily="2" charset="-79"/>
+            </a:endParaRPr>
+          </a:p>
+        </p:txBody>
+      </p:sp>
+      <p:sp>
+        <p:nvSpPr>
+          <p:cNvPr id="3" name="2 Subtítulo"/>
+          <p:cNvSpPr>
+            <a:spLocks noGrp="1"/>
+          </p:cNvSpPr>
+          <p:nvPr>
+            <p:ph type="subTitle" idx="1"/>
+          </p:nvPr>
+        </p:nvSpPr>
+        <p:spPr>
+          <a:xfrm>
+            <a:off x="5148064" y="239876"/>
+            <a:ext cx="3960440" cy="380812"/>
+          </a:xfrm>
+        </p:spPr>
+        <p:txBody>
+          <a:bodyPr>
+            <a:normAutofit fontScale="47500" lnSpcReduction="20000"/>
+          </a:bodyPr>
+          <a:lstStyle/>
+          <a:p>
+            <a:r>
+              <a:rPr lang="es-AR" dirty="0" smtClean="0">
+                <a:solidFill>
+                  <a:schemeClr val="tx1">
+                    <a:lumMod val="65000"/>
+                    <a:lumOff val="35000"/>
+                  </a:schemeClr>
+                </a:solidFill>
+              </a:rPr>
+              <a:t>75.45 - Taller de Desarrollo de Proyectos I</a:t>
+            </a:r>
+            <a:endParaRPr lang="es-AR" dirty="0">
+              <a:solidFill>
+                <a:schemeClr val="tx1">
+                  <a:lumMod val="65000"/>
+                  <a:lumOff val="35000"/>
+                </a:schemeClr>
+              </a:solidFill>
+            </a:endParaRPr>
+          </a:p>
+        </p:txBody>
+      </p:sp>
+      <p:pic>
+        <p:nvPicPr>
+          <p:cNvPr id="6" name="Picture 5"/>
+          <p:cNvPicPr>
+            <a:picLocks noChangeAspect="1"/>
+          </p:cNvPicPr>
+          <p:nvPr/>
+        </p:nvPicPr>
+        <p:blipFill>
+          <a:blip r:embed="rId2" cstate="print">
+            <a:extLst>
+              <a:ext uri="{28A0092B-C50C-407E-A947-70E740481C1C}">
+                <a14:useLocalDpi xmlns:a14="http://schemas.microsoft.com/office/drawing/2010/main" val="0"/>
+              </a:ext>
+            </a:extLst>
+          </a:blip>
+          <a:stretch>
+            <a:fillRect/>
+          </a:stretch>
+        </p:blipFill>
+        <p:spPr>
+          <a:xfrm>
+            <a:off x="3203848" y="260648"/>
+            <a:ext cx="468052" cy="277364"/>
+          </a:xfrm>
+          <a:prstGeom prst="rect">
+            <a:avLst/>
+          </a:prstGeom>
+        </p:spPr>
+      </p:pic>
+      <p:sp>
+        <p:nvSpPr>
+          <p:cNvPr id="8" name="1 Título"/>
+          <p:cNvSpPr txBox="1">
+            <a:spLocks/>
+          </p:cNvSpPr>
+          <p:nvPr/>
+        </p:nvSpPr>
+        <p:spPr>
+          <a:xfrm>
+            <a:off x="1907704" y="836712"/>
+            <a:ext cx="5328592" cy="792088"/>
+          </a:xfrm>
+          <a:prstGeom prst="rect">
+            <a:avLst/>
+          </a:prstGeom>
+        </p:spPr>
+        <p:txBody>
+          <a:bodyPr vert="horz" lIns="91440" tIns="45720" rIns="91440" bIns="45720" rtlCol="0" anchor="ctr">
+            <a:noAutofit/>
+          </a:bodyPr>
+          <a:lstStyle>
+            <a:lvl1pPr algn="ctr" defTabSz="914400" rtl="0" eaLnBrk="1" latinLnBrk="0" hangingPunct="1">
+              <a:spcBef>
+                <a:spcPct val="0"/>
+              </a:spcBef>
+              <a:buNone/>
+              <a:defRPr sz="4400" kern="1200">
+                <a:solidFill>
+                  <a:schemeClr val="tx1"/>
+                </a:solidFill>
+                <a:latin typeface="+mj-lt"/>
+                <a:ea typeface="+mj-ea"/>
+                <a:cs typeface="+mj-cs"/>
+              </a:defRPr>
+            </a:lvl1pPr>
+          </a:lstStyle>
+          <a:p>
+            <a:r>
+              <a:rPr lang="es-AR" sz="4800" b="1" dirty="0" smtClean="0">
+                <a:latin typeface="Trebuchet MS" pitchFamily="34" charset="0"/>
+                <a:cs typeface="Levenim MT" pitchFamily="2" charset="-79"/>
+              </a:rPr>
+              <a:t>Arquitectura</a:t>
+            </a:r>
+            <a:endParaRPr lang="es-AR" sz="4800" b="1" dirty="0">
+              <a:latin typeface="Trebuchet MS" pitchFamily="34" charset="0"/>
+              <a:cs typeface="Levenim MT" pitchFamily="2" charset="-79"/>
+            </a:endParaRPr>
+          </a:p>
+        </p:txBody>
+      </p:sp>
+      <p:cxnSp>
+        <p:nvCxnSpPr>
+          <p:cNvPr id="5" name="Straight Connector 4"/>
+          <p:cNvCxnSpPr/>
+          <p:nvPr/>
+        </p:nvCxnSpPr>
+        <p:spPr>
+          <a:xfrm>
+            <a:off x="395536" y="692696"/>
+            <a:ext cx="8496944" cy="0"/>
+          </a:xfrm>
+          <a:prstGeom prst="line">
+            <a:avLst/>
+          </a:prstGeom>
+          <a:ln>
+            <a:solidFill>
+              <a:schemeClr val="bg1">
+                <a:lumMod val="65000"/>
+              </a:schemeClr>
+            </a:solidFill>
+          </a:ln>
+        </p:spPr>
+        <p:style>
+          <a:lnRef idx="1">
+            <a:schemeClr val="accent1"/>
+          </a:lnRef>
+          <a:fillRef idx="0">
+            <a:schemeClr val="accent1"/>
+          </a:fillRef>
+          <a:effectRef idx="0">
+            <a:schemeClr val="accent1"/>
+          </a:effectRef>
+          <a:fontRef idx="minor">
+            <a:schemeClr val="tx1"/>
+          </a:fontRef>
+        </p:style>
+      </p:cxnSp>
+      <p:pic>
+        <p:nvPicPr>
+          <p:cNvPr id="4" name="Picture 3"/>
+          <p:cNvPicPr>
+            <a:picLocks noChangeAspect="1"/>
+          </p:cNvPicPr>
+          <p:nvPr/>
+        </p:nvPicPr>
+        <p:blipFill>
+          <a:blip r:embed="rId3">
+            <a:extLst>
+              <a:ext uri="{28A0092B-C50C-407E-A947-70E740481C1C}">
+                <a14:useLocalDpi xmlns:a14="http://schemas.microsoft.com/office/drawing/2010/main" val="0"/>
+              </a:ext>
+            </a:extLst>
+          </a:blip>
+          <a:stretch>
+            <a:fillRect/>
+          </a:stretch>
+        </p:blipFill>
+        <p:spPr>
+          <a:xfrm>
+            <a:off x="395536" y="1772816"/>
+            <a:ext cx="8489025" cy="4392488"/>
+          </a:xfrm>
+          <a:prstGeom prst="rect">
+            <a:avLst/>
+          </a:prstGeom>
+        </p:spPr>
+      </p:pic>
+    </p:spTree>
+    <p:extLst>
+      <p:ext uri="{BB962C8B-B14F-4D97-AF65-F5344CB8AC3E}">
+        <p14:creationId xmlns:p14="http://schemas.microsoft.com/office/powerpoint/2010/main" val="253774415"/>
+      </p:ext>
+    </p:extLst>
+  </p:cSld>
+  <p:clrMapOvr>
+    <a:masterClrMapping/>
+  </p:clrMapOvr>
+  <p:timing>
+    <p:tnLst>
+      <p:par>
+        <p:cTn id="1" dur="indefinite" restart="never" nodeType="tmRoot"/>
+      </p:par>
+    </p:tnLst>
+  </p:timing>
+</p:sld>
+</file>
+
+<file path=ppt/slides/slide6.xml><?xml version="1.0" encoding="utf-8"?>
+<p:sld xmlns:a="http://schemas.openxmlformats.org/drawingml/2006/main" xmlns:r="http://schemas.openxmlformats.org/officeDocument/2006/relationships" xmlns:p="http://schemas.openxmlformats.org/presentationml/2006/main">
+  <p:cSld>
+    <p:spTree>
+      <p:nvGrpSpPr>
+        <p:cNvPr id="1" name=""/>
+        <p:cNvGrpSpPr/>
+        <p:nvPr/>
+      </p:nvGrpSpPr>
+      <p:grpSpPr>
+        <a:xfrm>
+          <a:off x="0" y="0"/>
+          <a:ext cx="0" cy="0"/>
+          <a:chOff x="0" y="0"/>
+          <a:chExt cx="0" cy="0"/>
+        </a:xfrm>
+      </p:grpSpPr>
+      <p:sp>
+        <p:nvSpPr>
+          <p:cNvPr id="2" name="1 Título"/>
+          <p:cNvSpPr>
+            <a:spLocks noGrp="1"/>
+          </p:cNvSpPr>
+          <p:nvPr>
+            <p:ph type="ctrTitle"/>
+          </p:nvPr>
+        </p:nvSpPr>
+        <p:spPr>
+          <a:xfrm>
+            <a:off x="323528" y="260648"/>
+            <a:ext cx="2736304" cy="288032"/>
+          </a:xfrm>
+        </p:spPr>
+        <p:txBody>
+          <a:bodyPr>
+            <a:normAutofit fontScale="90000"/>
+          </a:bodyPr>
+          <a:lstStyle/>
+          <a:p>
+            <a:r>
+              <a:rPr lang="es-AR" sz="2000" dirty="0" smtClean="0">
+                <a:latin typeface="Aharoni" pitchFamily="2" charset="-79"/>
+                <a:cs typeface="Aharoni" pitchFamily="2" charset="-79"/>
+              </a:rPr>
+              <a:t>Seguridad para Todos</a:t>
+            </a:r>
+            <a:endParaRPr lang="es-AR" sz="2000" dirty="0">
+              <a:latin typeface="Aharoni" pitchFamily="2" charset="-79"/>
+              <a:cs typeface="Aharoni" pitchFamily="2" charset="-79"/>
+            </a:endParaRPr>
+          </a:p>
+        </p:txBody>
+      </p:sp>
+      <p:sp>
+        <p:nvSpPr>
+          <p:cNvPr id="3" name="2 Subtítulo"/>
+          <p:cNvSpPr>
+            <a:spLocks noGrp="1"/>
+          </p:cNvSpPr>
+          <p:nvPr>
+            <p:ph type="subTitle" idx="1"/>
+          </p:nvPr>
+        </p:nvSpPr>
+        <p:spPr>
+          <a:xfrm>
+            <a:off x="5148064" y="239876"/>
+            <a:ext cx="3960440" cy="380812"/>
+          </a:xfrm>
+        </p:spPr>
+        <p:txBody>
+          <a:bodyPr>
+            <a:normAutofit fontScale="47500" lnSpcReduction="20000"/>
+          </a:bodyPr>
+          <a:lstStyle/>
+          <a:p>
+            <a:r>
+              <a:rPr lang="es-AR" dirty="0" smtClean="0">
+                <a:solidFill>
+                  <a:schemeClr val="tx1">
+                    <a:lumMod val="65000"/>
+                    <a:lumOff val="35000"/>
+                  </a:schemeClr>
+                </a:solidFill>
+              </a:rPr>
+              <a:t>75.45 - Taller de Desarrollo de Proyectos I</a:t>
+            </a:r>
+            <a:endParaRPr lang="es-AR" dirty="0">
+              <a:solidFill>
+                <a:schemeClr val="tx1">
+                  <a:lumMod val="65000"/>
+                  <a:lumOff val="35000"/>
+                </a:schemeClr>
+              </a:solidFill>
+            </a:endParaRPr>
+          </a:p>
+        </p:txBody>
+      </p:sp>
+      <p:pic>
+        <p:nvPicPr>
+          <p:cNvPr id="6" name="Picture 5"/>
+          <p:cNvPicPr>
+            <a:picLocks noChangeAspect="1"/>
+          </p:cNvPicPr>
+          <p:nvPr/>
+        </p:nvPicPr>
+        <p:blipFill>
+          <a:blip r:embed="rId2" cstate="print">
+            <a:extLst>
+              <a:ext uri="{28A0092B-C50C-407E-A947-70E740481C1C}">
+                <a14:useLocalDpi xmlns:a14="http://schemas.microsoft.com/office/drawing/2010/main" val="0"/>
+              </a:ext>
+            </a:extLst>
+          </a:blip>
+          <a:stretch>
+            <a:fillRect/>
+          </a:stretch>
+        </p:blipFill>
+        <p:spPr>
+          <a:xfrm>
+            <a:off x="3203848" y="260648"/>
+            <a:ext cx="468052" cy="277364"/>
+          </a:xfrm>
+          <a:prstGeom prst="rect">
+            <a:avLst/>
+          </a:prstGeom>
+        </p:spPr>
+      </p:pic>
+      <p:sp>
+        <p:nvSpPr>
+          <p:cNvPr id="8" name="1 Título"/>
+          <p:cNvSpPr txBox="1">
+            <a:spLocks/>
+          </p:cNvSpPr>
+          <p:nvPr/>
+        </p:nvSpPr>
+        <p:spPr>
+          <a:xfrm>
+            <a:off x="1619672" y="2780928"/>
+            <a:ext cx="5328592" cy="792088"/>
+          </a:xfrm>
+          <a:prstGeom prst="rect">
+            <a:avLst/>
+          </a:prstGeom>
+        </p:spPr>
+        <p:txBody>
+          <a:bodyPr vert="horz" lIns="91440" tIns="45720" rIns="91440" bIns="45720" rtlCol="0" anchor="ctr">
+            <a:noAutofit/>
+          </a:bodyPr>
+          <a:lstStyle>
+            <a:lvl1pPr algn="ctr" defTabSz="914400" rtl="0" eaLnBrk="1" latinLnBrk="0" hangingPunct="1">
+              <a:spcBef>
+                <a:spcPct val="0"/>
+              </a:spcBef>
+              <a:buNone/>
+              <a:defRPr sz="4400" kern="1200">
+                <a:solidFill>
+                  <a:schemeClr val="tx1"/>
+                </a:solidFill>
+                <a:latin typeface="+mj-lt"/>
+                <a:ea typeface="+mj-ea"/>
+                <a:cs typeface="+mj-cs"/>
+              </a:defRPr>
+            </a:lvl1pPr>
+          </a:lstStyle>
+          <a:p>
+            <a:r>
+              <a:rPr lang="es-AR" sz="4800" b="1" dirty="0" smtClean="0">
+                <a:latin typeface="Trebuchet MS" pitchFamily="34" charset="0"/>
+                <a:cs typeface="Levenim MT" pitchFamily="2" charset="-79"/>
+              </a:rPr>
+              <a:t>Gracias</a:t>
+            </a:r>
+            <a:endParaRPr lang="es-AR" sz="4800" b="1" dirty="0">
+              <a:latin typeface="Trebuchet MS" pitchFamily="34" charset="0"/>
+              <a:cs typeface="Levenim MT" pitchFamily="2" charset="-79"/>
+            </a:endParaRPr>
+          </a:p>
+        </p:txBody>
+      </p:sp>
+      <p:cxnSp>
+        <p:nvCxnSpPr>
+          <p:cNvPr id="5" name="Straight Connector 4"/>
+          <p:cNvCxnSpPr/>
+          <p:nvPr/>
+        </p:nvCxnSpPr>
+        <p:spPr>
+          <a:xfrm>
+            <a:off x="395536" y="692696"/>
+            <a:ext cx="8496944" cy="0"/>
+          </a:xfrm>
+          <a:prstGeom prst="line">
+            <a:avLst/>
+          </a:prstGeom>
+          <a:ln>
+            <a:solidFill>
+              <a:schemeClr val="bg1">
+                <a:lumMod val="65000"/>
+              </a:schemeClr>
+            </a:solidFill>
+          </a:ln>
+        </p:spPr>
+        <p:style>
+          <a:lnRef idx="1">
+            <a:schemeClr val="accent1"/>
+          </a:lnRef>
+          <a:fillRef idx="0">
+            <a:schemeClr val="accent1"/>
+          </a:fillRef>
+          <a:effectRef idx="0">
+            <a:schemeClr val="accent1"/>
+          </a:effectRef>
+          <a:fontRef idx="minor">
+            <a:schemeClr val="tx1"/>
+          </a:fontRef>
+        </p:style>
+      </p:cxnSp>
+    </p:spTree>
+    <p:extLst>
+      <p:ext uri="{BB962C8B-B14F-4D97-AF65-F5344CB8AC3E}">
+        <p14:creationId xmlns:p14="http://schemas.microsoft.com/office/powerpoint/2010/main" val="1235372326"/>
       </p:ext>
     </p:extLst>
   </p:cSld>

</xml_diff>

<commit_message>
Modificación de la presentación segun los lineamientos dados en clase.
</commit_message>
<xml_diff>
--- a/docs/Presentacion.pptx
+++ b/docs/Presentacion.pptx
@@ -5,12 +5,14 @@
     <p:sldMasterId id="2147483648" r:id="rId1"/>
   </p:sldMasterIdLst>
   <p:sldIdLst>
-    <p:sldId id="256" r:id="rId2"/>
-    <p:sldId id="257" r:id="rId3"/>
-    <p:sldId id="258" r:id="rId4"/>
-    <p:sldId id="260" r:id="rId5"/>
-    <p:sldId id="259" r:id="rId6"/>
-    <p:sldId id="261" r:id="rId7"/>
+    <p:sldId id="257" r:id="rId2"/>
+    <p:sldId id="256" r:id="rId3"/>
+    <p:sldId id="263" r:id="rId4"/>
+    <p:sldId id="264" r:id="rId5"/>
+    <p:sldId id="265" r:id="rId6"/>
+    <p:sldId id="262" r:id="rId7"/>
+    <p:sldId id="259" r:id="rId8"/>
+    <p:sldId id="261" r:id="rId9"/>
   </p:sldIdLst>
   <p:sldSz cx="9144000" cy="6858000" type="screen4x3"/>
   <p:notesSz cx="6858000" cy="9144000"/>
@@ -293,7 +295,7 @@
           <a:p>
             <a:fld id="{00D03AD9-B274-4317-8993-B21EFD32709D}" type="datetimeFigureOut">
               <a:rPr lang="es-AR" smtClean="0"/>
-              <a:t>18/04/2012</a:t>
+              <a:t>21/04/2012</a:t>
             </a:fld>
             <a:endParaRPr lang="es-AR"/>
           </a:p>
@@ -463,7 +465,7 @@
           <a:p>
             <a:fld id="{00D03AD9-B274-4317-8993-B21EFD32709D}" type="datetimeFigureOut">
               <a:rPr lang="es-AR" smtClean="0"/>
-              <a:t>18/04/2012</a:t>
+              <a:t>21/04/2012</a:t>
             </a:fld>
             <a:endParaRPr lang="es-AR"/>
           </a:p>
@@ -643,7 +645,7 @@
           <a:p>
             <a:fld id="{00D03AD9-B274-4317-8993-B21EFD32709D}" type="datetimeFigureOut">
               <a:rPr lang="es-AR" smtClean="0"/>
-              <a:t>18/04/2012</a:t>
+              <a:t>21/04/2012</a:t>
             </a:fld>
             <a:endParaRPr lang="es-AR"/>
           </a:p>
@@ -813,7 +815,7 @@
           <a:p>
             <a:fld id="{00D03AD9-B274-4317-8993-B21EFD32709D}" type="datetimeFigureOut">
               <a:rPr lang="es-AR" smtClean="0"/>
-              <a:t>18/04/2012</a:t>
+              <a:t>21/04/2012</a:t>
             </a:fld>
             <a:endParaRPr lang="es-AR"/>
           </a:p>
@@ -1059,7 +1061,7 @@
           <a:p>
             <a:fld id="{00D03AD9-B274-4317-8993-B21EFD32709D}" type="datetimeFigureOut">
               <a:rPr lang="es-AR" smtClean="0"/>
-              <a:t>18/04/2012</a:t>
+              <a:t>21/04/2012</a:t>
             </a:fld>
             <a:endParaRPr lang="es-AR"/>
           </a:p>
@@ -1347,7 +1349,7 @@
           <a:p>
             <a:fld id="{00D03AD9-B274-4317-8993-B21EFD32709D}" type="datetimeFigureOut">
               <a:rPr lang="es-AR" smtClean="0"/>
-              <a:t>18/04/2012</a:t>
+              <a:t>21/04/2012</a:t>
             </a:fld>
             <a:endParaRPr lang="es-AR"/>
           </a:p>
@@ -1769,7 +1771,7 @@
           <a:p>
             <a:fld id="{00D03AD9-B274-4317-8993-B21EFD32709D}" type="datetimeFigureOut">
               <a:rPr lang="es-AR" smtClean="0"/>
-              <a:t>18/04/2012</a:t>
+              <a:t>21/04/2012</a:t>
             </a:fld>
             <a:endParaRPr lang="es-AR"/>
           </a:p>
@@ -1887,7 +1889,7 @@
           <a:p>
             <a:fld id="{00D03AD9-B274-4317-8993-B21EFD32709D}" type="datetimeFigureOut">
               <a:rPr lang="es-AR" smtClean="0"/>
-              <a:t>18/04/2012</a:t>
+              <a:t>21/04/2012</a:t>
             </a:fld>
             <a:endParaRPr lang="es-AR"/>
           </a:p>
@@ -1982,7 +1984,7 @@
           <a:p>
             <a:fld id="{00D03AD9-B274-4317-8993-B21EFD32709D}" type="datetimeFigureOut">
               <a:rPr lang="es-AR" smtClean="0"/>
-              <a:t>18/04/2012</a:t>
+              <a:t>21/04/2012</a:t>
             </a:fld>
             <a:endParaRPr lang="es-AR"/>
           </a:p>
@@ -2259,7 +2261,7 @@
           <a:p>
             <a:fld id="{00D03AD9-B274-4317-8993-B21EFD32709D}" type="datetimeFigureOut">
               <a:rPr lang="es-AR" smtClean="0"/>
-              <a:t>18/04/2012</a:t>
+              <a:t>21/04/2012</a:t>
             </a:fld>
             <a:endParaRPr lang="es-AR"/>
           </a:p>
@@ -2512,7 +2514,7 @@
           <a:p>
             <a:fld id="{00D03AD9-B274-4317-8993-B21EFD32709D}" type="datetimeFigureOut">
               <a:rPr lang="es-AR" smtClean="0"/>
-              <a:t>18/04/2012</a:t>
+              <a:t>21/04/2012</a:t>
             </a:fld>
             <a:endParaRPr lang="es-AR"/>
           </a:p>
@@ -2734,7 +2736,7 @@
           <a:p>
             <a:fld id="{00D03AD9-B274-4317-8993-B21EFD32709D}" type="datetimeFigureOut">
               <a:rPr lang="es-AR" smtClean="0"/>
-              <a:t>18/04/2012</a:t>
+              <a:t>21/04/2012</a:t>
             </a:fld>
             <a:endParaRPr lang="es-AR"/>
           </a:p>
@@ -3121,29 +3123,24 @@
         </p:nvSpPr>
         <p:spPr>
           <a:xfrm>
-            <a:off x="720310" y="1022871"/>
-            <a:ext cx="7772400" cy="1470025"/>
-          </a:xfrm>
-        </p:spPr>
-        <p:txBody>
-          <a:bodyPr/>
-          <a:lstStyle/>
-          <a:p>
-            <a:r>
-              <a:rPr lang="es-AR" dirty="0" smtClean="0">
+            <a:off x="323528" y="260648"/>
+            <a:ext cx="2736304" cy="288032"/>
+          </a:xfrm>
+        </p:spPr>
+        <p:txBody>
+          <a:bodyPr>
+            <a:normAutofit fontScale="90000"/>
+          </a:bodyPr>
+          <a:lstStyle/>
+          <a:p>
+            <a:r>
+              <a:rPr lang="es-AR" sz="2000" dirty="0" smtClean="0">
                 <a:latin typeface="Aharoni" pitchFamily="2" charset="-79"/>
                 <a:cs typeface="Aharoni" pitchFamily="2" charset="-79"/>
               </a:rPr>
-              <a:t>Seguridad </a:t>
-            </a:r>
-            <a:r>
-              <a:rPr lang="es-AR" dirty="0" smtClean="0">
-                <a:latin typeface="Aharoni" pitchFamily="2" charset="-79"/>
-                <a:cs typeface="Aharoni" pitchFamily="2" charset="-79"/>
-              </a:rPr>
-              <a:t>para Todos</a:t>
-            </a:r>
-            <a:endParaRPr lang="es-AR" dirty="0">
+              <a:t>Seguridad para Todos</a:t>
+            </a:r>
+            <a:endParaRPr lang="es-AR" sz="2000" dirty="0">
               <a:latin typeface="Aharoni" pitchFamily="2" charset="-79"/>
               <a:cs typeface="Aharoni" pitchFamily="2" charset="-79"/>
             </a:endParaRPr>
@@ -3162,18 +3159,18 @@
         </p:nvSpPr>
         <p:spPr>
           <a:xfrm>
-            <a:off x="827584" y="548680"/>
-            <a:ext cx="7488832" cy="720080"/>
+            <a:off x="5148064" y="239876"/>
+            <a:ext cx="3960440" cy="380812"/>
           </a:xfrm>
         </p:spPr>
         <p:txBody>
           <a:bodyPr>
-            <a:normAutofit/>
+            <a:normAutofit fontScale="47500" lnSpcReduction="20000"/>
           </a:bodyPr>
           <a:lstStyle/>
           <a:p>
             <a:r>
-              <a:rPr lang="es-AR" sz="2400" dirty="0" smtClean="0">
+              <a:rPr lang="es-AR" dirty="0" smtClean="0">
                 <a:solidFill>
                   <a:schemeClr val="tx1">
                     <a:lumMod val="65000"/>
@@ -3183,7 +3180,7 @@
               </a:rPr>
               <a:t>75.45 - Taller de Desarrollo de Proyectos I</a:t>
             </a:r>
-            <a:endParaRPr lang="es-AR" sz="2400" dirty="0">
+            <a:endParaRPr lang="es-AR" dirty="0">
               <a:solidFill>
                 <a:schemeClr val="tx1">
                   <a:lumMod val="65000"/>
@@ -3196,14 +3193,14 @@
       </p:sp>
       <p:pic>
         <p:nvPicPr>
-          <p:cNvPr id="5" name="Picture 4"/>
+          <p:cNvPr id="6" name="Picture 5"/>
           <p:cNvPicPr>
             <a:picLocks noChangeAspect="1"/>
           </p:cNvPicPr>
           <p:nvPr/>
         </p:nvPicPr>
         <p:blipFill>
-          <a:blip r:embed="rId2">
+          <a:blip r:embed="rId2" cstate="print">
             <a:extLst>
               <a:ext uri="{28A0092B-C50C-407E-A947-70E740481C1C}">
                 <a14:useLocalDpi xmlns:a14="http://schemas.microsoft.com/office/drawing/2010/main" val="0"/>
@@ -3216,18 +3213,518 @@
         </p:blipFill>
         <p:spPr>
           <a:xfrm>
-            <a:off x="2486755" y="2492896"/>
-            <a:ext cx="4389501" cy="2601186"/>
+            <a:off x="3203848" y="260648"/>
+            <a:ext cx="468052" cy="277364"/>
           </a:xfrm>
           <a:prstGeom prst="rect">
             <a:avLst/>
           </a:prstGeom>
         </p:spPr>
       </p:pic>
+      <p:sp>
+        <p:nvSpPr>
+          <p:cNvPr id="8" name="1 Título"/>
+          <p:cNvSpPr txBox="1">
+            <a:spLocks/>
+          </p:cNvSpPr>
+          <p:nvPr/>
+        </p:nvSpPr>
+        <p:spPr>
+          <a:xfrm>
+            <a:off x="1702086" y="836712"/>
+            <a:ext cx="5822242" cy="792088"/>
+          </a:xfrm>
+          <a:prstGeom prst="rect">
+            <a:avLst/>
+          </a:prstGeom>
+        </p:spPr>
+        <p:txBody>
+          <a:bodyPr vert="horz" lIns="91440" tIns="45720" rIns="91440" bIns="45720" rtlCol="0" anchor="ctr">
+            <a:noAutofit/>
+          </a:bodyPr>
+          <a:lstStyle>
+            <a:lvl1pPr algn="ctr" defTabSz="914400" rtl="0" eaLnBrk="1" latinLnBrk="0" hangingPunct="1">
+              <a:spcBef>
+                <a:spcPct val="0"/>
+              </a:spcBef>
+              <a:buNone/>
+              <a:defRPr sz="4400" kern="1200">
+                <a:solidFill>
+                  <a:schemeClr val="tx1"/>
+                </a:solidFill>
+                <a:latin typeface="+mj-lt"/>
+                <a:ea typeface="+mj-ea"/>
+                <a:cs typeface="+mj-cs"/>
+              </a:defRPr>
+            </a:lvl1pPr>
+          </a:lstStyle>
+          <a:p>
+            <a:r>
+              <a:rPr lang="es-AR" sz="4800" b="1" dirty="0" smtClean="0">
+                <a:latin typeface="Trebuchet MS" pitchFamily="34" charset="0"/>
+                <a:cs typeface="Levenim MT" pitchFamily="2" charset="-79"/>
+              </a:rPr>
+              <a:t>¿Quiénes Somos?</a:t>
+            </a:r>
+            <a:endParaRPr lang="es-AR" sz="4800" b="1" dirty="0">
+              <a:latin typeface="Trebuchet MS" pitchFamily="34" charset="0"/>
+              <a:cs typeface="Levenim MT" pitchFamily="2" charset="-79"/>
+            </a:endParaRPr>
+          </a:p>
+        </p:txBody>
+      </p:sp>
+      <p:cxnSp>
+        <p:nvCxnSpPr>
+          <p:cNvPr id="5" name="Straight Connector 4"/>
+          <p:cNvCxnSpPr/>
+          <p:nvPr/>
+        </p:nvCxnSpPr>
+        <p:spPr>
+          <a:xfrm>
+            <a:off x="395536" y="692696"/>
+            <a:ext cx="8496944" cy="0"/>
+          </a:xfrm>
+          <a:prstGeom prst="line">
+            <a:avLst/>
+          </a:prstGeom>
+          <a:ln>
+            <a:solidFill>
+              <a:schemeClr val="bg1">
+                <a:lumMod val="65000"/>
+              </a:schemeClr>
+            </a:solidFill>
+          </a:ln>
+        </p:spPr>
+        <p:style>
+          <a:lnRef idx="1">
+            <a:schemeClr val="accent1"/>
+          </a:lnRef>
+          <a:fillRef idx="0">
+            <a:schemeClr val="accent1"/>
+          </a:fillRef>
+          <a:effectRef idx="0">
+            <a:schemeClr val="accent1"/>
+          </a:effectRef>
+          <a:fontRef idx="minor">
+            <a:schemeClr val="tx1"/>
+          </a:fontRef>
+        </p:style>
+      </p:cxnSp>
+      <p:sp>
+        <p:nvSpPr>
+          <p:cNvPr id="7" name="TextBox 6"/>
+          <p:cNvSpPr txBox="1"/>
+          <p:nvPr/>
+        </p:nvSpPr>
+        <p:spPr>
+          <a:xfrm>
+            <a:off x="467544" y="1772816"/>
+            <a:ext cx="2736304" cy="3416320"/>
+          </a:xfrm>
+          <a:prstGeom prst="rect">
+            <a:avLst/>
+          </a:prstGeom>
+          <a:noFill/>
+        </p:spPr>
+        <p:txBody>
+          <a:bodyPr wrap="square" rtlCol="0">
+            <a:spAutoFit/>
+          </a:bodyPr>
+          <a:lstStyle/>
+          <a:p>
+            <a:pPr marL="571500" indent="-571500">
+              <a:buFont typeface="Wingdings" pitchFamily="2" charset="2"/>
+              <a:buChar char="§"/>
+            </a:pPr>
+            <a:r>
+              <a:rPr lang="es-AR" sz="3600" dirty="0" smtClean="0"/>
+              <a:t>Agustín</a:t>
+            </a:r>
+          </a:p>
+          <a:p>
+            <a:pPr marL="571500" indent="-571500">
+              <a:buFont typeface="Wingdings" pitchFamily="2" charset="2"/>
+              <a:buChar char="§"/>
+            </a:pPr>
+            <a:r>
+              <a:rPr lang="es-AR" sz="3600" dirty="0"/>
+              <a:t>Axel</a:t>
+            </a:r>
+          </a:p>
+          <a:p>
+            <a:pPr marL="571500" indent="-571500">
+              <a:buFont typeface="Wingdings" pitchFamily="2" charset="2"/>
+              <a:buChar char="§"/>
+            </a:pPr>
+            <a:r>
+              <a:rPr lang="es-AR" sz="3600" dirty="0" smtClean="0"/>
+              <a:t>Ignacio</a:t>
+            </a:r>
+          </a:p>
+          <a:p>
+            <a:pPr marL="571500" indent="-571500">
+              <a:buFont typeface="Wingdings" pitchFamily="2" charset="2"/>
+              <a:buChar char="§"/>
+            </a:pPr>
+            <a:r>
+              <a:rPr lang="es-AR" sz="3600" dirty="0" smtClean="0"/>
+              <a:t>Juan</a:t>
+            </a:r>
+          </a:p>
+          <a:p>
+            <a:pPr marL="571500" indent="-571500">
+              <a:buFont typeface="Wingdings" pitchFamily="2" charset="2"/>
+              <a:buChar char="§"/>
+            </a:pPr>
+            <a:r>
+              <a:rPr lang="es-AR" sz="3600" dirty="0" smtClean="0"/>
+              <a:t>Juan</a:t>
+            </a:r>
+          </a:p>
+          <a:p>
+            <a:pPr marL="571500" indent="-571500">
+              <a:buFont typeface="Wingdings" pitchFamily="2" charset="2"/>
+              <a:buChar char="§"/>
+            </a:pPr>
+            <a:r>
+              <a:rPr lang="es-AR" sz="3600" dirty="0"/>
+              <a:t>Roy</a:t>
+            </a:r>
+            <a:endParaRPr lang="es-AR" sz="3600" dirty="0"/>
+          </a:p>
+        </p:txBody>
+      </p:sp>
+      <p:sp>
+        <p:nvSpPr>
+          <p:cNvPr id="4" name="Right Brace 3"/>
+          <p:cNvSpPr/>
+          <p:nvPr/>
+        </p:nvSpPr>
+        <p:spPr>
+          <a:xfrm>
+            <a:off x="2771800" y="1844824"/>
+            <a:ext cx="432048" cy="3344312"/>
+          </a:xfrm>
+          <a:prstGeom prst="rightBrace">
+            <a:avLst/>
+          </a:prstGeom>
+          <a:ln w="28575">
+            <a:solidFill>
+              <a:schemeClr val="tx1"/>
+            </a:solidFill>
+          </a:ln>
+        </p:spPr>
+        <p:style>
+          <a:lnRef idx="1">
+            <a:schemeClr val="accent1"/>
+          </a:lnRef>
+          <a:fillRef idx="0">
+            <a:schemeClr val="accent1"/>
+          </a:fillRef>
+          <a:effectRef idx="0">
+            <a:schemeClr val="accent1"/>
+          </a:effectRef>
+          <a:fontRef idx="minor">
+            <a:schemeClr val="tx1"/>
+          </a:fontRef>
+        </p:style>
+        <p:txBody>
+          <a:bodyPr rtlCol="0" anchor="ctr"/>
+          <a:lstStyle/>
+          <a:p>
+            <a:pPr algn="ctr"/>
+            <a:endParaRPr lang="es-AR"/>
+          </a:p>
+        </p:txBody>
+      </p:sp>
+      <p:sp>
+        <p:nvSpPr>
+          <p:cNvPr id="9" name="TextBox 8"/>
+          <p:cNvSpPr txBox="1"/>
+          <p:nvPr/>
+        </p:nvSpPr>
+        <p:spPr>
+          <a:xfrm>
+            <a:off x="4744368" y="3182661"/>
+            <a:ext cx="1239168" cy="646331"/>
+          </a:xfrm>
+          <a:prstGeom prst="rect">
+            <a:avLst/>
+          </a:prstGeom>
+          <a:noFill/>
+        </p:spPr>
+        <p:txBody>
+          <a:bodyPr wrap="square" rtlCol="0">
+            <a:spAutoFit/>
+          </a:bodyPr>
+          <a:lstStyle/>
+          <a:p>
+            <a:pPr algn="ctr"/>
+            <a:r>
+              <a:rPr lang="es-AR" sz="3600" dirty="0" smtClean="0"/>
+              <a:t>Ideas</a:t>
+            </a:r>
+            <a:endParaRPr lang="es-AR" sz="3600" dirty="0"/>
+          </a:p>
+        </p:txBody>
+      </p:sp>
+      <p:sp>
+        <p:nvSpPr>
+          <p:cNvPr id="10" name="Right Arrow 9"/>
+          <p:cNvSpPr/>
+          <p:nvPr/>
+        </p:nvSpPr>
+        <p:spPr>
+          <a:xfrm>
+            <a:off x="3563888" y="3344243"/>
+            <a:ext cx="1108472" cy="323166"/>
+          </a:xfrm>
+          <a:prstGeom prst="rightArrow">
+            <a:avLst/>
+          </a:prstGeom>
+        </p:spPr>
+        <p:style>
+          <a:lnRef idx="2">
+            <a:schemeClr val="accent1">
+              <a:shade val="50000"/>
+            </a:schemeClr>
+          </a:lnRef>
+          <a:fillRef idx="1">
+            <a:schemeClr val="accent1"/>
+          </a:fillRef>
+          <a:effectRef idx="0">
+            <a:schemeClr val="accent1"/>
+          </a:effectRef>
+          <a:fontRef idx="minor">
+            <a:schemeClr val="lt1"/>
+          </a:fontRef>
+        </p:style>
+        <p:txBody>
+          <a:bodyPr rtlCol="0" anchor="ctr"/>
+          <a:lstStyle/>
+          <a:p>
+            <a:pPr algn="ctr"/>
+            <a:endParaRPr lang="es-AR"/>
+          </a:p>
+        </p:txBody>
+      </p:sp>
+      <p:sp>
+        <p:nvSpPr>
+          <p:cNvPr id="11" name="Right Arrow 10"/>
+          <p:cNvSpPr/>
+          <p:nvPr/>
+        </p:nvSpPr>
+        <p:spPr>
+          <a:xfrm>
+            <a:off x="5983536" y="3344243"/>
+            <a:ext cx="964728" cy="323166"/>
+          </a:xfrm>
+          <a:prstGeom prst="rightArrow">
+            <a:avLst/>
+          </a:prstGeom>
+        </p:spPr>
+        <p:style>
+          <a:lnRef idx="2">
+            <a:schemeClr val="accent1">
+              <a:shade val="50000"/>
+            </a:schemeClr>
+          </a:lnRef>
+          <a:fillRef idx="1">
+            <a:schemeClr val="accent1"/>
+          </a:fillRef>
+          <a:effectRef idx="0">
+            <a:schemeClr val="accent1"/>
+          </a:effectRef>
+          <a:fontRef idx="minor">
+            <a:schemeClr val="lt1"/>
+          </a:fontRef>
+        </p:style>
+        <p:txBody>
+          <a:bodyPr rtlCol="0" anchor="ctr"/>
+          <a:lstStyle/>
+          <a:p>
+            <a:pPr algn="ctr"/>
+            <a:endParaRPr lang="es-AR"/>
+          </a:p>
+        </p:txBody>
+      </p:sp>
+      <p:sp>
+        <p:nvSpPr>
+          <p:cNvPr id="12" name="TextBox 11"/>
+          <p:cNvSpPr txBox="1"/>
+          <p:nvPr/>
+        </p:nvSpPr>
+        <p:spPr>
+          <a:xfrm>
+            <a:off x="6804248" y="3182661"/>
+            <a:ext cx="2232248" cy="646331"/>
+          </a:xfrm>
+          <a:prstGeom prst="rect">
+            <a:avLst/>
+          </a:prstGeom>
+          <a:noFill/>
+        </p:spPr>
+        <p:txBody>
+          <a:bodyPr wrap="square" rtlCol="0">
+            <a:spAutoFit/>
+          </a:bodyPr>
+          <a:lstStyle/>
+          <a:p>
+            <a:pPr algn="ctr"/>
+            <a:r>
+              <a:rPr lang="es-AR" sz="3600" dirty="0" smtClean="0"/>
+              <a:t>Proyecto</a:t>
+            </a:r>
+            <a:endParaRPr lang="es-AR" sz="3600" dirty="0"/>
+          </a:p>
+        </p:txBody>
+      </p:sp>
+      <p:sp>
+        <p:nvSpPr>
+          <p:cNvPr id="13" name="Right Arrow 12"/>
+          <p:cNvSpPr/>
+          <p:nvPr/>
+        </p:nvSpPr>
+        <p:spPr>
+          <a:xfrm rot="5400000">
+            <a:off x="6109671" y="2734205"/>
+            <a:ext cx="684076" cy="323166"/>
+          </a:xfrm>
+          <a:prstGeom prst="rightArrow">
+            <a:avLst/>
+          </a:prstGeom>
+        </p:spPr>
+        <p:style>
+          <a:lnRef idx="2">
+            <a:schemeClr val="accent1">
+              <a:shade val="50000"/>
+            </a:schemeClr>
+          </a:lnRef>
+          <a:fillRef idx="1">
+            <a:schemeClr val="accent1"/>
+          </a:fillRef>
+          <a:effectRef idx="0">
+            <a:schemeClr val="accent1"/>
+          </a:effectRef>
+          <a:fontRef idx="minor">
+            <a:schemeClr val="lt1"/>
+          </a:fontRef>
+        </p:style>
+        <p:txBody>
+          <a:bodyPr rtlCol="0" anchor="ctr"/>
+          <a:lstStyle/>
+          <a:p>
+            <a:pPr algn="ctr"/>
+            <a:endParaRPr lang="es-AR"/>
+          </a:p>
+        </p:txBody>
+      </p:sp>
+      <p:sp>
+        <p:nvSpPr>
+          <p:cNvPr id="14" name="TextBox 13"/>
+          <p:cNvSpPr txBox="1"/>
+          <p:nvPr/>
+        </p:nvSpPr>
+        <p:spPr>
+          <a:xfrm>
+            <a:off x="4149136" y="1844824"/>
+            <a:ext cx="4480380" cy="646331"/>
+          </a:xfrm>
+          <a:prstGeom prst="rect">
+            <a:avLst/>
+          </a:prstGeom>
+          <a:noFill/>
+        </p:spPr>
+        <p:txBody>
+          <a:bodyPr wrap="square" rtlCol="0">
+            <a:spAutoFit/>
+          </a:bodyPr>
+          <a:lstStyle/>
+          <a:p>
+            <a:pPr algn="ctr"/>
+            <a:r>
+              <a:rPr lang="es-AR" sz="3600" dirty="0" smtClean="0"/>
+              <a:t>Docentes</a:t>
+            </a:r>
+            <a:endParaRPr lang="es-AR" sz="3600" dirty="0"/>
+          </a:p>
+        </p:txBody>
+      </p:sp>
+      <p:sp>
+        <p:nvSpPr>
+          <p:cNvPr id="15" name="Right Arrow 14"/>
+          <p:cNvSpPr/>
+          <p:nvPr/>
+        </p:nvSpPr>
+        <p:spPr>
+          <a:xfrm rot="16200000">
+            <a:off x="3852355" y="3933491"/>
+            <a:ext cx="684076" cy="323166"/>
+          </a:xfrm>
+          <a:prstGeom prst="rightArrow">
+            <a:avLst/>
+          </a:prstGeom>
+        </p:spPr>
+        <p:style>
+          <a:lnRef idx="2">
+            <a:schemeClr val="accent1">
+              <a:shade val="50000"/>
+            </a:schemeClr>
+          </a:lnRef>
+          <a:fillRef idx="1">
+            <a:schemeClr val="accent1"/>
+          </a:fillRef>
+          <a:effectRef idx="0">
+            <a:schemeClr val="accent1"/>
+          </a:effectRef>
+          <a:fontRef idx="minor">
+            <a:schemeClr val="lt1"/>
+          </a:fontRef>
+        </p:style>
+        <p:txBody>
+          <a:bodyPr rtlCol="0" anchor="ctr"/>
+          <a:lstStyle/>
+          <a:p>
+            <a:pPr algn="ctr"/>
+            <a:endParaRPr lang="es-AR"/>
+          </a:p>
+        </p:txBody>
+      </p:sp>
+      <p:sp>
+        <p:nvSpPr>
+          <p:cNvPr id="16" name="TextBox 15"/>
+          <p:cNvSpPr txBox="1"/>
+          <p:nvPr/>
+        </p:nvSpPr>
+        <p:spPr>
+          <a:xfrm>
+            <a:off x="2771800" y="4437112"/>
+            <a:ext cx="2877428" cy="646331"/>
+          </a:xfrm>
+          <a:prstGeom prst="rect">
+            <a:avLst/>
+          </a:prstGeom>
+          <a:noFill/>
+        </p:spPr>
+        <p:txBody>
+          <a:bodyPr wrap="square" rtlCol="0">
+            <a:spAutoFit/>
+          </a:bodyPr>
+          <a:lstStyle/>
+          <a:p>
+            <a:pPr algn="ctr"/>
+            <a:r>
+              <a:rPr lang="es-AR" sz="3600" dirty="0" smtClean="0"/>
+              <a:t>Fruta</a:t>
+            </a:r>
+            <a:endParaRPr lang="es-AR" sz="3600" dirty="0"/>
+          </a:p>
+        </p:txBody>
+      </p:sp>
     </p:spTree>
     <p:extLst>
       <p:ext uri="{BB962C8B-B14F-4D97-AF65-F5344CB8AC3E}">
-        <p14:creationId xmlns:p14="http://schemas.microsoft.com/office/powerpoint/2010/main" val="1289667085"/>
+        <p14:creationId xmlns:p14="http://schemas.microsoft.com/office/powerpoint/2010/main" val="2688607078"/>
       </p:ext>
     </p:extLst>
   </p:cSld>
@@ -3273,24 +3770,22 @@
         </p:nvSpPr>
         <p:spPr>
           <a:xfrm>
-            <a:off x="323528" y="260648"/>
-            <a:ext cx="2736304" cy="288032"/>
-          </a:xfrm>
-        </p:spPr>
-        <p:txBody>
-          <a:bodyPr>
-            <a:normAutofit fontScale="90000"/>
-          </a:bodyPr>
-          <a:lstStyle/>
-          <a:p>
-            <a:r>
-              <a:rPr lang="es-AR" sz="2000" dirty="0" smtClean="0">
+            <a:off x="720310" y="1022871"/>
+            <a:ext cx="7772400" cy="1470025"/>
+          </a:xfrm>
+        </p:spPr>
+        <p:txBody>
+          <a:bodyPr/>
+          <a:lstStyle/>
+          <a:p>
+            <a:r>
+              <a:rPr lang="es-AR" dirty="0" smtClean="0">
                 <a:latin typeface="Aharoni" pitchFamily="2" charset="-79"/>
                 <a:cs typeface="Aharoni" pitchFamily="2" charset="-79"/>
               </a:rPr>
               <a:t>Seguridad para Todos</a:t>
             </a:r>
-            <a:endParaRPr lang="es-AR" sz="2000" dirty="0">
+            <a:endParaRPr lang="es-AR" dirty="0">
               <a:latin typeface="Aharoni" pitchFamily="2" charset="-79"/>
               <a:cs typeface="Aharoni" pitchFamily="2" charset="-79"/>
             </a:endParaRPr>
@@ -3309,18 +3804,18 @@
         </p:nvSpPr>
         <p:spPr>
           <a:xfrm>
-            <a:off x="5148064" y="239876"/>
-            <a:ext cx="3960440" cy="380812"/>
+            <a:off x="827584" y="548680"/>
+            <a:ext cx="7488832" cy="720080"/>
           </a:xfrm>
         </p:spPr>
         <p:txBody>
           <a:bodyPr>
-            <a:normAutofit fontScale="47500" lnSpcReduction="20000"/>
+            <a:normAutofit/>
           </a:bodyPr>
           <a:lstStyle/>
           <a:p>
             <a:r>
-              <a:rPr lang="es-AR" dirty="0" smtClean="0">
+              <a:rPr lang="es-AR" sz="2400" dirty="0" smtClean="0">
                 <a:solidFill>
                   <a:schemeClr val="tx1">
                     <a:lumMod val="65000"/>
@@ -3330,7 +3825,7 @@
               </a:rPr>
               <a:t>75.45 - Taller de Desarrollo de Proyectos I</a:t>
             </a:r>
-            <a:endParaRPr lang="es-AR" dirty="0">
+            <a:endParaRPr lang="es-AR" sz="2400" dirty="0">
               <a:solidFill>
                 <a:schemeClr val="tx1">
                   <a:lumMod val="65000"/>
@@ -3343,14 +3838,14 @@
       </p:sp>
       <p:pic>
         <p:nvPicPr>
-          <p:cNvPr id="6" name="Picture 5"/>
+          <p:cNvPr id="4" name="Picture 3"/>
           <p:cNvPicPr>
             <a:picLocks noChangeAspect="1"/>
           </p:cNvPicPr>
           <p:nvPr/>
         </p:nvPicPr>
         <p:blipFill>
-          <a:blip r:embed="rId2" cstate="print">
+          <a:blip r:embed="rId2">
             <a:extLst>
               <a:ext uri="{28A0092B-C50C-407E-A947-70E740481C1C}">
                 <a14:useLocalDpi xmlns:a14="http://schemas.microsoft.com/office/drawing/2010/main" val="0"/>
@@ -3363,189 +3858,18 @@
         </p:blipFill>
         <p:spPr>
           <a:xfrm>
-            <a:off x="3203848" y="260648"/>
-            <a:ext cx="468052" cy="277364"/>
+            <a:off x="2699792" y="2483998"/>
+            <a:ext cx="4186283" cy="2601186"/>
           </a:xfrm>
           <a:prstGeom prst="rect">
             <a:avLst/>
           </a:prstGeom>
         </p:spPr>
       </p:pic>
-      <p:sp>
-        <p:nvSpPr>
-          <p:cNvPr id="8" name="1 Título"/>
-          <p:cNvSpPr txBox="1">
-            <a:spLocks/>
-          </p:cNvSpPr>
-          <p:nvPr/>
-        </p:nvSpPr>
-        <p:spPr>
-          <a:xfrm>
-            <a:off x="2998230" y="836712"/>
-            <a:ext cx="3229954" cy="792088"/>
-          </a:xfrm>
-          <a:prstGeom prst="rect">
-            <a:avLst/>
-          </a:prstGeom>
-        </p:spPr>
-        <p:txBody>
-          <a:bodyPr vert="horz" lIns="91440" tIns="45720" rIns="91440" bIns="45720" rtlCol="0" anchor="ctr">
-            <a:noAutofit/>
-          </a:bodyPr>
-          <a:lstStyle>
-            <a:lvl1pPr algn="ctr" defTabSz="914400" rtl="0" eaLnBrk="1" latinLnBrk="0" hangingPunct="1">
-              <a:spcBef>
-                <a:spcPct val="0"/>
-              </a:spcBef>
-              <a:buNone/>
-              <a:defRPr sz="4400" kern="1200">
-                <a:solidFill>
-                  <a:schemeClr val="tx1"/>
-                </a:solidFill>
-                <a:latin typeface="+mj-lt"/>
-                <a:ea typeface="+mj-ea"/>
-                <a:cs typeface="+mj-cs"/>
-              </a:defRPr>
-            </a:lvl1pPr>
-          </a:lstStyle>
-          <a:p>
-            <a:r>
-              <a:rPr lang="es-AR" sz="4800" b="1" dirty="0" smtClean="0">
-                <a:latin typeface="Trebuchet MS" pitchFamily="34" charset="0"/>
-                <a:cs typeface="Levenim MT" pitchFamily="2" charset="-79"/>
-              </a:rPr>
-              <a:t>Producto</a:t>
-            </a:r>
-            <a:endParaRPr lang="es-AR" sz="4800" b="1" dirty="0">
-              <a:latin typeface="Trebuchet MS" pitchFamily="34" charset="0"/>
-              <a:cs typeface="Levenim MT" pitchFamily="2" charset="-79"/>
-            </a:endParaRPr>
-          </a:p>
-        </p:txBody>
-      </p:sp>
-      <p:cxnSp>
-        <p:nvCxnSpPr>
-          <p:cNvPr id="5" name="Straight Connector 4"/>
-          <p:cNvCxnSpPr/>
-          <p:nvPr/>
-        </p:nvCxnSpPr>
-        <p:spPr>
-          <a:xfrm>
-            <a:off x="395536" y="692696"/>
-            <a:ext cx="8496944" cy="0"/>
-          </a:xfrm>
-          <a:prstGeom prst="line">
-            <a:avLst/>
-          </a:prstGeom>
-          <a:ln>
-            <a:solidFill>
-              <a:schemeClr val="bg1">
-                <a:lumMod val="65000"/>
-              </a:schemeClr>
-            </a:solidFill>
-          </a:ln>
-        </p:spPr>
-        <p:style>
-          <a:lnRef idx="1">
-            <a:schemeClr val="accent1"/>
-          </a:lnRef>
-          <a:fillRef idx="0">
-            <a:schemeClr val="accent1"/>
-          </a:fillRef>
-          <a:effectRef idx="0">
-            <a:schemeClr val="accent1"/>
-          </a:effectRef>
-          <a:fontRef idx="minor">
-            <a:schemeClr val="tx1"/>
-          </a:fontRef>
-        </p:style>
-      </p:cxnSp>
-      <p:sp>
-        <p:nvSpPr>
-          <p:cNvPr id="7" name="TextBox 6"/>
-          <p:cNvSpPr txBox="1"/>
-          <p:nvPr/>
-        </p:nvSpPr>
-        <p:spPr>
-          <a:xfrm>
-            <a:off x="467544" y="1772816"/>
-            <a:ext cx="8352928" cy="3970318"/>
-          </a:xfrm>
-          <a:prstGeom prst="rect">
-            <a:avLst/>
-          </a:prstGeom>
-          <a:noFill/>
-        </p:spPr>
-        <p:txBody>
-          <a:bodyPr wrap="square" rtlCol="0">
-            <a:spAutoFit/>
-          </a:bodyPr>
-          <a:lstStyle/>
-          <a:p>
-            <a:pPr marL="571500" indent="-571500">
-              <a:buFont typeface="Wingdings" pitchFamily="2" charset="2"/>
-              <a:buChar char="§"/>
-            </a:pPr>
-            <a:r>
-              <a:rPr lang="es-AR" sz="3600" dirty="0" smtClean="0"/>
-              <a:t>Servicio para mejorar la Calidad de Vida.</a:t>
-            </a:r>
-          </a:p>
-          <a:p>
-            <a:pPr marL="571500" indent="-571500">
-              <a:buFont typeface="Wingdings" pitchFamily="2" charset="2"/>
-              <a:buChar char="§"/>
-            </a:pPr>
-            <a:r>
-              <a:rPr lang="es-AR" sz="3600" dirty="0" smtClean="0"/>
-              <a:t>Funciona en Dispositivos </a:t>
-            </a:r>
-            <a:r>
-              <a:rPr lang="es-AR" sz="3600" dirty="0"/>
-              <a:t>M</a:t>
-            </a:r>
-            <a:r>
-              <a:rPr lang="es-AR" sz="3600" dirty="0" smtClean="0"/>
-              <a:t>óviles.</a:t>
-            </a:r>
-          </a:p>
-          <a:p>
-            <a:pPr marL="571500" indent="-571500">
-              <a:buFont typeface="Wingdings" pitchFamily="2" charset="2"/>
-              <a:buChar char="§"/>
-            </a:pPr>
-            <a:r>
-              <a:rPr lang="es-AR" sz="3600" dirty="0" smtClean="0"/>
-              <a:t>Comunicación con Centrales de Seguridad.</a:t>
-            </a:r>
-          </a:p>
-          <a:p>
-            <a:pPr marL="571500" indent="-571500">
-              <a:buFont typeface="Wingdings" pitchFamily="2" charset="2"/>
-              <a:buChar char="§"/>
-            </a:pPr>
-            <a:r>
-              <a:rPr lang="es-AR" sz="3600" dirty="0" smtClean="0"/>
-              <a:t>Acceso Masivo.</a:t>
-            </a:r>
-          </a:p>
-          <a:p>
-            <a:pPr marL="571500" indent="-571500">
-              <a:buFont typeface="Wingdings" pitchFamily="2" charset="2"/>
-              <a:buChar char="§"/>
-            </a:pPr>
-            <a:r>
-              <a:rPr lang="es-AR" sz="3600" dirty="0" smtClean="0"/>
-              <a:t>Planes para Familia y para Empresas u Organizaciones. </a:t>
-            </a:r>
-            <a:endParaRPr lang="es-AR" sz="3600" dirty="0"/>
-          </a:p>
-        </p:txBody>
-      </p:sp>
     </p:spTree>
     <p:extLst>
       <p:ext uri="{BB962C8B-B14F-4D97-AF65-F5344CB8AC3E}">
-        <p14:creationId xmlns:p14="http://schemas.microsoft.com/office/powerpoint/2010/main" val="2688607078"/>
+        <p14:creationId xmlns:p14="http://schemas.microsoft.com/office/powerpoint/2010/main" val="1289667085"/>
       </p:ext>
     </p:extLst>
   </p:cSld>
@@ -3699,8 +4023,8 @@
         </p:nvSpPr>
         <p:spPr>
           <a:xfrm>
-            <a:off x="1907704" y="836712"/>
-            <a:ext cx="5328592" cy="792088"/>
+            <a:off x="1054014" y="836712"/>
+            <a:ext cx="7118386" cy="792088"/>
           </a:xfrm>
           <a:prstGeom prst="rect">
             <a:avLst/>
@@ -3732,7 +4056,14 @@
                 <a:latin typeface="Trebuchet MS" pitchFamily="34" charset="0"/>
                 <a:cs typeface="Levenim MT" pitchFamily="2" charset="-79"/>
               </a:rPr>
-              <a:t>Producto Básico</a:t>
+              <a:t>Objetiv</a:t>
+            </a:r>
+            <a:r>
+              <a:rPr lang="es-AR" sz="4800" b="1" dirty="0">
+                <a:latin typeface="Trebuchet MS" pitchFamily="34" charset="0"/>
+                <a:cs typeface="Levenim MT" pitchFamily="2" charset="-79"/>
+              </a:rPr>
+              <a:t>o</a:t>
             </a:r>
             <a:endParaRPr lang="es-AR" sz="4800" b="1" dirty="0">
               <a:latin typeface="Trebuchet MS" pitchFamily="34" charset="0"/>
@@ -3787,7 +4118,7 @@
         <p:spPr>
           <a:xfrm>
             <a:off x="467544" y="1772816"/>
-            <a:ext cx="4104456" cy="2862322"/>
+            <a:ext cx="8352928" cy="3416320"/>
           </a:xfrm>
           <a:prstGeom prst="rect">
             <a:avLst/>
@@ -3806,8 +4137,17 @@
             </a:pPr>
             <a:r>
               <a:rPr lang="es-AR" sz="3600" dirty="0" smtClean="0"/>
-              <a:t>Gratuita.</a:t>
-            </a:r>
+              <a:t>Mejorar </a:t>
+            </a:r>
+            <a:r>
+              <a:rPr lang="es-AR" sz="3600" dirty="0"/>
+              <a:t>la Calidad de Vida</a:t>
+            </a:r>
+            <a:r>
+              <a:rPr lang="es-AR" sz="3600" dirty="0" smtClean="0"/>
+              <a:t>.</a:t>
+            </a:r>
+            <a:endParaRPr lang="es-AR" sz="3600" dirty="0" smtClean="0"/>
           </a:p>
           <a:p>
             <a:pPr marL="571500" indent="-571500">
@@ -3816,7 +4156,11 @@
             </a:pPr>
             <a:r>
               <a:rPr lang="es-AR" sz="3600" dirty="0" smtClean="0"/>
-              <a:t>Fácil Acceso.</a:t>
+              <a:t>Incrementar la Seguridad</a:t>
+            </a:r>
+            <a:r>
+              <a:rPr lang="es-AR" sz="3600" dirty="0" smtClean="0"/>
+              <a:t>.</a:t>
             </a:r>
           </a:p>
           <a:p>
@@ -3826,15 +4170,46 @@
             </a:pPr>
             <a:r>
               <a:rPr lang="es-AR" sz="3600" dirty="0" smtClean="0"/>
-              <a:t>Mal uso debe estar penado por Ley.</a:t>
-            </a:r>
+              <a:t>Reducir la Criminalidad.</a:t>
+            </a:r>
+          </a:p>
+          <a:p>
+            <a:pPr marL="571500" indent="-571500">
+              <a:buFont typeface="Wingdings" pitchFamily="2" charset="2"/>
+              <a:buChar char="§"/>
+            </a:pPr>
+            <a:r>
+              <a:rPr lang="es-AR" sz="3600" dirty="0" smtClean="0"/>
+              <a:t>Herramienta de Localización.</a:t>
+            </a:r>
+          </a:p>
+          <a:p>
+            <a:pPr marL="571500" indent="-571500">
+              <a:buFont typeface="Wingdings" pitchFamily="2" charset="2"/>
+              <a:buChar char="§"/>
+            </a:pPr>
+            <a:r>
+              <a:rPr lang="es-AR" sz="3600" dirty="0" smtClean="0"/>
+              <a:t>Mal </a:t>
+            </a:r>
+            <a:r>
+              <a:rPr lang="es-AR" sz="3600" dirty="0"/>
+              <a:t>uso debe estar penado por Ley.</a:t>
+            </a:r>
+          </a:p>
+          <a:p>
+            <a:pPr marL="571500" indent="-571500">
+              <a:buFont typeface="Wingdings" pitchFamily="2" charset="2"/>
+              <a:buChar char="§"/>
+            </a:pPr>
+            <a:endParaRPr lang="es-AR" sz="3600" dirty="0" smtClean="0"/>
           </a:p>
         </p:txBody>
       </p:sp>
     </p:spTree>
     <p:extLst>
       <p:ext uri="{BB962C8B-B14F-4D97-AF65-F5344CB8AC3E}">
-        <p14:creationId xmlns:p14="http://schemas.microsoft.com/office/powerpoint/2010/main" val="1216012736"/>
+        <p14:creationId xmlns:p14="http://schemas.microsoft.com/office/powerpoint/2010/main" val="1212818162"/>
       </p:ext>
     </p:extLst>
   </p:cSld>
@@ -3988,8 +4363,8 @@
         </p:nvSpPr>
         <p:spPr>
           <a:xfrm>
-            <a:off x="1043608" y="836712"/>
-            <a:ext cx="7272808" cy="792088"/>
+            <a:off x="1054014" y="836712"/>
+            <a:ext cx="7118386" cy="792088"/>
           </a:xfrm>
           <a:prstGeom prst="rect">
             <a:avLst/>
@@ -4021,7 +4396,7 @@
                 <a:latin typeface="Trebuchet MS" pitchFamily="34" charset="0"/>
                 <a:cs typeface="Levenim MT" pitchFamily="2" charset="-79"/>
               </a:rPr>
-              <a:t>Productos Adicionales</a:t>
+              <a:t>Presupuesto</a:t>
             </a:r>
             <a:endParaRPr lang="es-AR" sz="4800" b="1" dirty="0">
               <a:latin typeface="Trebuchet MS" pitchFamily="34" charset="0"/>
@@ -4076,7 +4451,7 @@
         <p:spPr>
           <a:xfrm>
             <a:off x="467544" y="1772816"/>
-            <a:ext cx="8280920" cy="5078313"/>
+            <a:ext cx="8352928" cy="646331"/>
           </a:xfrm>
           <a:prstGeom prst="rect">
             <a:avLst/>
@@ -4089,89 +4464,10 @@
           </a:bodyPr>
           <a:lstStyle/>
           <a:p>
-            <a:pPr marL="571500" indent="-571500">
-              <a:buFont typeface="Wingdings" pitchFamily="2" charset="2"/>
-              <a:buChar char="§"/>
-            </a:pPr>
             <a:r>
               <a:rPr lang="es-AR" sz="3600" dirty="0" smtClean="0"/>
-              <a:t>Planes según necesidades:</a:t>
-            </a:r>
-          </a:p>
-          <a:p>
-            <a:pPr marL="1028700" lvl="1" indent="-571500">
-              <a:buFont typeface="Wingdings" pitchFamily="2" charset="2"/>
-              <a:buChar char="§"/>
-            </a:pPr>
-            <a:r>
-              <a:rPr lang="es-AR" sz="3600" dirty="0" smtClean="0"/>
-              <a:t>Familiar.</a:t>
-            </a:r>
-          </a:p>
-          <a:p>
-            <a:pPr marL="1028700" lvl="1" indent="-571500">
-              <a:buFont typeface="Wingdings" pitchFamily="2" charset="2"/>
-              <a:buChar char="§"/>
-            </a:pPr>
-            <a:r>
-              <a:rPr lang="es-AR" sz="3600" dirty="0" smtClean="0"/>
-              <a:t>Empresarial.</a:t>
-            </a:r>
-            <a:endParaRPr lang="es-AR" sz="3600" dirty="0"/>
-          </a:p>
-          <a:p>
-            <a:pPr marL="1028700" lvl="1" indent="-571500">
-              <a:buFont typeface="Wingdings" pitchFamily="2" charset="2"/>
-              <a:buChar char="§"/>
-            </a:pPr>
-            <a:r>
-              <a:rPr lang="es-AR" sz="3600" dirty="0" smtClean="0"/>
-              <a:t>Individual.</a:t>
-            </a:r>
-          </a:p>
-          <a:p>
-            <a:pPr marL="571500" indent="-571500">
-              <a:buFont typeface="Wingdings" pitchFamily="2" charset="2"/>
-              <a:buChar char="§"/>
-            </a:pPr>
-            <a:r>
-              <a:rPr lang="es-AR" sz="3600" dirty="0" smtClean="0"/>
-              <a:t>Esquema de </a:t>
-            </a:r>
-            <a:r>
-              <a:rPr lang="es-AR" sz="3600" dirty="0" err="1" smtClean="0"/>
-              <a:t>Checkpoints</a:t>
-            </a:r>
-            <a:r>
-              <a:rPr lang="es-AR" sz="3600" dirty="0" smtClean="0"/>
-              <a:t> (tiempo/lugar).</a:t>
-            </a:r>
-          </a:p>
-          <a:p>
-            <a:pPr marL="571500" indent="-571500">
-              <a:buFont typeface="Wingdings" pitchFamily="2" charset="2"/>
-              <a:buChar char="§"/>
-            </a:pPr>
-            <a:r>
-              <a:rPr lang="es-AR" sz="3600" dirty="0" smtClean="0"/>
-              <a:t>Monitoreo Periódico.</a:t>
-            </a:r>
-          </a:p>
-          <a:p>
-            <a:pPr marL="571500" indent="-571500">
-              <a:buFont typeface="Wingdings" pitchFamily="2" charset="2"/>
-              <a:buChar char="§"/>
-            </a:pPr>
-            <a:r>
-              <a:rPr lang="es-AR" sz="3600" dirty="0" smtClean="0"/>
-              <a:t>Alarmas de Zona Peligrosa.</a:t>
-            </a:r>
-          </a:p>
-          <a:p>
-            <a:pPr marL="571500" indent="-571500">
-              <a:buFont typeface="Wingdings" pitchFamily="2" charset="2"/>
-              <a:buChar char="§"/>
-            </a:pPr>
+              <a:t>????</a:t>
+            </a:r>
             <a:endParaRPr lang="es-AR" sz="3600" dirty="0" smtClean="0"/>
           </a:p>
         </p:txBody>
@@ -4179,7 +4475,7 @@
     </p:spTree>
     <p:extLst>
       <p:ext uri="{BB962C8B-B14F-4D97-AF65-F5344CB8AC3E}">
-        <p14:creationId xmlns:p14="http://schemas.microsoft.com/office/powerpoint/2010/main" val="792409300"/>
+        <p14:creationId xmlns:p14="http://schemas.microsoft.com/office/powerpoint/2010/main" val="3410899011"/>
       </p:ext>
     </p:extLst>
   </p:cSld>
@@ -4197,6 +4493,758 @@
 </file>
 
 <file path=ppt/slides/slide5.xml><?xml version="1.0" encoding="utf-8"?>
+<p:sld xmlns:a="http://schemas.openxmlformats.org/drawingml/2006/main" xmlns:r="http://schemas.openxmlformats.org/officeDocument/2006/relationships" xmlns:p="http://schemas.openxmlformats.org/presentationml/2006/main">
+  <p:cSld>
+    <p:spTree>
+      <p:nvGrpSpPr>
+        <p:cNvPr id="1" name=""/>
+        <p:cNvGrpSpPr/>
+        <p:nvPr/>
+      </p:nvGrpSpPr>
+      <p:grpSpPr>
+        <a:xfrm>
+          <a:off x="0" y="0"/>
+          <a:ext cx="0" cy="0"/>
+          <a:chOff x="0" y="0"/>
+          <a:chExt cx="0" cy="0"/>
+        </a:xfrm>
+      </p:grpSpPr>
+      <p:sp>
+        <p:nvSpPr>
+          <p:cNvPr id="2" name="1 Título"/>
+          <p:cNvSpPr>
+            <a:spLocks noGrp="1"/>
+          </p:cNvSpPr>
+          <p:nvPr>
+            <p:ph type="ctrTitle"/>
+          </p:nvPr>
+        </p:nvSpPr>
+        <p:spPr>
+          <a:xfrm>
+            <a:off x="323528" y="260648"/>
+            <a:ext cx="2736304" cy="288032"/>
+          </a:xfrm>
+        </p:spPr>
+        <p:txBody>
+          <a:bodyPr>
+            <a:normAutofit fontScale="90000"/>
+          </a:bodyPr>
+          <a:lstStyle/>
+          <a:p>
+            <a:r>
+              <a:rPr lang="es-AR" sz="2000" dirty="0" smtClean="0">
+                <a:latin typeface="Aharoni" pitchFamily="2" charset="-79"/>
+                <a:cs typeface="Aharoni" pitchFamily="2" charset="-79"/>
+              </a:rPr>
+              <a:t>Seguridad para Todos</a:t>
+            </a:r>
+            <a:endParaRPr lang="es-AR" sz="2000" dirty="0">
+              <a:latin typeface="Aharoni" pitchFamily="2" charset="-79"/>
+              <a:cs typeface="Aharoni" pitchFamily="2" charset="-79"/>
+            </a:endParaRPr>
+          </a:p>
+        </p:txBody>
+      </p:sp>
+      <p:sp>
+        <p:nvSpPr>
+          <p:cNvPr id="3" name="2 Subtítulo"/>
+          <p:cNvSpPr>
+            <a:spLocks noGrp="1"/>
+          </p:cNvSpPr>
+          <p:nvPr>
+            <p:ph type="subTitle" idx="1"/>
+          </p:nvPr>
+        </p:nvSpPr>
+        <p:spPr>
+          <a:xfrm>
+            <a:off x="5148064" y="239876"/>
+            <a:ext cx="3960440" cy="380812"/>
+          </a:xfrm>
+        </p:spPr>
+        <p:txBody>
+          <a:bodyPr>
+            <a:normAutofit fontScale="47500" lnSpcReduction="20000"/>
+          </a:bodyPr>
+          <a:lstStyle/>
+          <a:p>
+            <a:r>
+              <a:rPr lang="es-AR" dirty="0" smtClean="0">
+                <a:solidFill>
+                  <a:schemeClr val="tx1">
+                    <a:lumMod val="65000"/>
+                    <a:lumOff val="35000"/>
+                  </a:schemeClr>
+                </a:solidFill>
+              </a:rPr>
+              <a:t>75.45 - Taller de Desarrollo de Proyectos I</a:t>
+            </a:r>
+            <a:endParaRPr lang="es-AR" dirty="0">
+              <a:solidFill>
+                <a:schemeClr val="tx1">
+                  <a:lumMod val="65000"/>
+                  <a:lumOff val="35000"/>
+                </a:schemeClr>
+              </a:solidFill>
+            </a:endParaRPr>
+          </a:p>
+        </p:txBody>
+      </p:sp>
+      <p:pic>
+        <p:nvPicPr>
+          <p:cNvPr id="6" name="Picture 5"/>
+          <p:cNvPicPr>
+            <a:picLocks noChangeAspect="1"/>
+          </p:cNvPicPr>
+          <p:nvPr/>
+        </p:nvPicPr>
+        <p:blipFill>
+          <a:blip r:embed="rId2" cstate="print">
+            <a:extLst>
+              <a:ext uri="{28A0092B-C50C-407E-A947-70E740481C1C}">
+                <a14:useLocalDpi xmlns:a14="http://schemas.microsoft.com/office/drawing/2010/main" val="0"/>
+              </a:ext>
+            </a:extLst>
+          </a:blip>
+          <a:stretch>
+            <a:fillRect/>
+          </a:stretch>
+        </p:blipFill>
+        <p:spPr>
+          <a:xfrm>
+            <a:off x="3203848" y="260648"/>
+            <a:ext cx="468052" cy="277364"/>
+          </a:xfrm>
+          <a:prstGeom prst="rect">
+            <a:avLst/>
+          </a:prstGeom>
+        </p:spPr>
+      </p:pic>
+      <p:sp>
+        <p:nvSpPr>
+          <p:cNvPr id="8" name="1 Título"/>
+          <p:cNvSpPr txBox="1">
+            <a:spLocks/>
+          </p:cNvSpPr>
+          <p:nvPr/>
+        </p:nvSpPr>
+        <p:spPr>
+          <a:xfrm>
+            <a:off x="1054014" y="836712"/>
+            <a:ext cx="7118386" cy="792088"/>
+          </a:xfrm>
+          <a:prstGeom prst="rect">
+            <a:avLst/>
+          </a:prstGeom>
+        </p:spPr>
+        <p:txBody>
+          <a:bodyPr vert="horz" lIns="91440" tIns="45720" rIns="91440" bIns="45720" rtlCol="0" anchor="ctr">
+            <a:noAutofit/>
+          </a:bodyPr>
+          <a:lstStyle>
+            <a:lvl1pPr algn="ctr" defTabSz="914400" rtl="0" eaLnBrk="1" latinLnBrk="0" hangingPunct="1">
+              <a:spcBef>
+                <a:spcPct val="0"/>
+              </a:spcBef>
+              <a:buNone/>
+              <a:defRPr sz="4400" kern="1200">
+                <a:solidFill>
+                  <a:schemeClr val="tx1"/>
+                </a:solidFill>
+                <a:latin typeface="+mj-lt"/>
+                <a:ea typeface="+mj-ea"/>
+                <a:cs typeface="+mj-cs"/>
+              </a:defRPr>
+            </a:lvl1pPr>
+          </a:lstStyle>
+          <a:p>
+            <a:r>
+              <a:rPr lang="es-AR" sz="4800" b="1" dirty="0" smtClean="0">
+                <a:latin typeface="Trebuchet MS" pitchFamily="34" charset="0"/>
+                <a:cs typeface="Levenim MT" pitchFamily="2" charset="-79"/>
+              </a:rPr>
+              <a:t>Tipos de Clientes</a:t>
+            </a:r>
+            <a:endParaRPr lang="es-AR" sz="4800" b="1" dirty="0">
+              <a:latin typeface="Trebuchet MS" pitchFamily="34" charset="0"/>
+              <a:cs typeface="Levenim MT" pitchFamily="2" charset="-79"/>
+            </a:endParaRPr>
+          </a:p>
+        </p:txBody>
+      </p:sp>
+      <p:cxnSp>
+        <p:nvCxnSpPr>
+          <p:cNvPr id="5" name="Straight Connector 4"/>
+          <p:cNvCxnSpPr/>
+          <p:nvPr/>
+        </p:nvCxnSpPr>
+        <p:spPr>
+          <a:xfrm>
+            <a:off x="395536" y="692696"/>
+            <a:ext cx="8496944" cy="0"/>
+          </a:xfrm>
+          <a:prstGeom prst="line">
+            <a:avLst/>
+          </a:prstGeom>
+          <a:ln>
+            <a:solidFill>
+              <a:schemeClr val="bg1">
+                <a:lumMod val="65000"/>
+              </a:schemeClr>
+            </a:solidFill>
+          </a:ln>
+        </p:spPr>
+        <p:style>
+          <a:lnRef idx="1">
+            <a:schemeClr val="accent1"/>
+          </a:lnRef>
+          <a:fillRef idx="0">
+            <a:schemeClr val="accent1"/>
+          </a:fillRef>
+          <a:effectRef idx="0">
+            <a:schemeClr val="accent1"/>
+          </a:effectRef>
+          <a:fontRef idx="minor">
+            <a:schemeClr val="tx1"/>
+          </a:fontRef>
+        </p:style>
+      </p:cxnSp>
+      <p:sp>
+        <p:nvSpPr>
+          <p:cNvPr id="7" name="TextBox 6"/>
+          <p:cNvSpPr txBox="1"/>
+          <p:nvPr/>
+        </p:nvSpPr>
+        <p:spPr>
+          <a:xfrm>
+            <a:off x="467544" y="1772816"/>
+            <a:ext cx="8352928" cy="9510296"/>
+          </a:xfrm>
+          <a:prstGeom prst="rect">
+            <a:avLst/>
+          </a:prstGeom>
+          <a:noFill/>
+        </p:spPr>
+        <p:txBody>
+          <a:bodyPr wrap="square" rtlCol="0">
+            <a:spAutoFit/>
+          </a:bodyPr>
+          <a:lstStyle/>
+          <a:p>
+            <a:pPr marL="571500" indent="-571500">
+              <a:buFont typeface="Wingdings" pitchFamily="2" charset="2"/>
+              <a:buChar char="§"/>
+            </a:pPr>
+            <a:r>
+              <a:rPr lang="es-AR" sz="3600" dirty="0" smtClean="0"/>
+              <a:t>Acceso Masivo: Ciudadano</a:t>
+            </a:r>
+          </a:p>
+          <a:p>
+            <a:pPr marL="1028700" lvl="1" indent="-571500">
+              <a:buFont typeface="Wingdings" pitchFamily="2" charset="2"/>
+              <a:buChar char="§"/>
+            </a:pPr>
+            <a:r>
+              <a:rPr lang="es-AR" sz="3600" dirty="0" smtClean="0"/>
+              <a:t>Gratuito.</a:t>
+            </a:r>
+          </a:p>
+          <a:p>
+            <a:pPr marL="1028700" lvl="1" indent="-571500">
+              <a:buFont typeface="Wingdings" pitchFamily="2" charset="2"/>
+              <a:buChar char="§"/>
+            </a:pPr>
+            <a:r>
+              <a:rPr lang="es-AR" sz="3600" dirty="0"/>
+              <a:t>Fácil Acceso</a:t>
+            </a:r>
+            <a:r>
+              <a:rPr lang="es-AR" sz="3600" dirty="0" smtClean="0"/>
+              <a:t>.</a:t>
+            </a:r>
+          </a:p>
+          <a:p>
+            <a:pPr marL="571500" indent="-571500">
+              <a:buFont typeface="Wingdings" pitchFamily="2" charset="2"/>
+              <a:buChar char="§"/>
+            </a:pPr>
+            <a:r>
+              <a:rPr lang="es-AR" sz="3600" dirty="0"/>
+              <a:t>Planes según necesidades</a:t>
+            </a:r>
+            <a:r>
+              <a:rPr lang="es-AR" sz="3600" dirty="0" smtClean="0"/>
+              <a:t>: Empresas o Familias</a:t>
+            </a:r>
+          </a:p>
+          <a:p>
+            <a:pPr marL="1028700" lvl="1" indent="-571500">
+              <a:buFont typeface="Wingdings" pitchFamily="2" charset="2"/>
+              <a:buChar char="§"/>
+            </a:pPr>
+            <a:r>
+              <a:rPr lang="es-AR" sz="3600" dirty="0"/>
+              <a:t>Monitoreo Periódico</a:t>
+            </a:r>
+            <a:r>
+              <a:rPr lang="es-AR" sz="3600" dirty="0" smtClean="0"/>
+              <a:t>.</a:t>
+            </a:r>
+          </a:p>
+          <a:p>
+            <a:pPr marL="1028700" lvl="1" indent="-571500">
+              <a:buFont typeface="Wingdings" pitchFamily="2" charset="2"/>
+              <a:buChar char="§"/>
+            </a:pPr>
+            <a:r>
+              <a:rPr lang="es-AR" sz="3600" dirty="0"/>
+              <a:t>Alarmas de Zona Peligrosa</a:t>
+            </a:r>
+            <a:r>
+              <a:rPr lang="es-AR" sz="3600" dirty="0" smtClean="0"/>
+              <a:t>.</a:t>
+            </a:r>
+          </a:p>
+          <a:p>
+            <a:pPr marL="1028700" lvl="1" indent="-571500">
+              <a:buFont typeface="Wingdings" pitchFamily="2" charset="2"/>
+              <a:buChar char="§"/>
+            </a:pPr>
+            <a:r>
+              <a:rPr lang="es-AR" sz="3600" dirty="0"/>
+              <a:t>Esquema de </a:t>
+            </a:r>
+            <a:r>
+              <a:rPr lang="es-AR" sz="3600" dirty="0" err="1" smtClean="0"/>
+              <a:t>Check-points</a:t>
+            </a:r>
+            <a:r>
+              <a:rPr lang="es-AR" sz="3600" dirty="0" smtClean="0"/>
+              <a:t>.</a:t>
+            </a:r>
+            <a:endParaRPr lang="es-AR" sz="3600" dirty="0"/>
+          </a:p>
+          <a:p>
+            <a:pPr marL="1028700" lvl="1" indent="-571500">
+              <a:buFont typeface="Wingdings" pitchFamily="2" charset="2"/>
+              <a:buChar char="§"/>
+            </a:pPr>
+            <a:endParaRPr lang="es-AR" sz="3600" dirty="0"/>
+          </a:p>
+          <a:p>
+            <a:pPr marL="1028700" lvl="1" indent="-571500">
+              <a:buFont typeface="Wingdings" pitchFamily="2" charset="2"/>
+              <a:buChar char="§"/>
+            </a:pPr>
+            <a:endParaRPr lang="es-AR" sz="3600" dirty="0"/>
+          </a:p>
+          <a:p>
+            <a:pPr marL="1028700" lvl="1" indent="-571500">
+              <a:buFont typeface="Wingdings" pitchFamily="2" charset="2"/>
+              <a:buChar char="§"/>
+            </a:pPr>
+            <a:endParaRPr lang="es-AR" sz="3600" dirty="0" smtClean="0"/>
+          </a:p>
+          <a:p>
+            <a:pPr marL="1028700" lvl="1" indent="-571500">
+              <a:buFont typeface="Wingdings" pitchFamily="2" charset="2"/>
+              <a:buChar char="§"/>
+            </a:pPr>
+            <a:endParaRPr lang="es-AR" sz="3600" dirty="0"/>
+          </a:p>
+          <a:p>
+            <a:pPr marL="1028700" lvl="1" indent="-571500">
+              <a:buFont typeface="Wingdings" pitchFamily="2" charset="2"/>
+              <a:buChar char="§"/>
+            </a:pPr>
+            <a:endParaRPr lang="es-AR" sz="3600" dirty="0"/>
+          </a:p>
+          <a:p>
+            <a:pPr marL="1028700" lvl="1" indent="-571500">
+              <a:buFont typeface="Wingdings" pitchFamily="2" charset="2"/>
+              <a:buChar char="§"/>
+            </a:pPr>
+            <a:endParaRPr lang="es-AR" sz="3600" dirty="0" smtClean="0"/>
+          </a:p>
+          <a:p>
+            <a:pPr marL="1028700" lvl="1" indent="-571500">
+              <a:buFont typeface="Wingdings" pitchFamily="2" charset="2"/>
+              <a:buChar char="§"/>
+            </a:pPr>
+            <a:endParaRPr lang="es-AR" sz="3600" dirty="0"/>
+          </a:p>
+          <a:p>
+            <a:pPr marL="571500" indent="-571500">
+              <a:buFont typeface="Wingdings" pitchFamily="2" charset="2"/>
+              <a:buChar char="§"/>
+            </a:pPr>
+            <a:endParaRPr lang="es-AR" sz="3600" dirty="0"/>
+          </a:p>
+          <a:p>
+            <a:pPr marL="571500" indent="-571500">
+              <a:buFont typeface="Wingdings" pitchFamily="2" charset="2"/>
+              <a:buChar char="§"/>
+            </a:pPr>
+            <a:endParaRPr lang="es-AR" sz="3600" dirty="0"/>
+          </a:p>
+        </p:txBody>
+      </p:sp>
+    </p:spTree>
+    <p:extLst>
+      <p:ext uri="{BB962C8B-B14F-4D97-AF65-F5344CB8AC3E}">
+        <p14:creationId xmlns:p14="http://schemas.microsoft.com/office/powerpoint/2010/main" val="72379645"/>
+      </p:ext>
+    </p:extLst>
+  </p:cSld>
+  <p:clrMapOvr>
+    <a:masterClrMapping/>
+  </p:clrMapOvr>
+  <p:timing>
+    <p:tnLst>
+      <p:par>
+        <p:cTn id="1" dur="indefinite" restart="never" nodeType="tmRoot"/>
+      </p:par>
+    </p:tnLst>
+  </p:timing>
+</p:sld>
+</file>
+
+<file path=ppt/slides/slide6.xml><?xml version="1.0" encoding="utf-8"?>
+<p:sld xmlns:a="http://schemas.openxmlformats.org/drawingml/2006/main" xmlns:r="http://schemas.openxmlformats.org/officeDocument/2006/relationships" xmlns:p="http://schemas.openxmlformats.org/presentationml/2006/main">
+  <p:cSld>
+    <p:spTree>
+      <p:nvGrpSpPr>
+        <p:cNvPr id="1" name=""/>
+        <p:cNvGrpSpPr/>
+        <p:nvPr/>
+      </p:nvGrpSpPr>
+      <p:grpSpPr>
+        <a:xfrm>
+          <a:off x="0" y="0"/>
+          <a:ext cx="0" cy="0"/>
+          <a:chOff x="0" y="0"/>
+          <a:chExt cx="0" cy="0"/>
+        </a:xfrm>
+      </p:grpSpPr>
+      <p:sp>
+        <p:nvSpPr>
+          <p:cNvPr id="2" name="1 Título"/>
+          <p:cNvSpPr>
+            <a:spLocks noGrp="1"/>
+          </p:cNvSpPr>
+          <p:nvPr>
+            <p:ph type="ctrTitle"/>
+          </p:nvPr>
+        </p:nvSpPr>
+        <p:spPr>
+          <a:xfrm>
+            <a:off x="323528" y="260648"/>
+            <a:ext cx="2736304" cy="288032"/>
+          </a:xfrm>
+        </p:spPr>
+        <p:txBody>
+          <a:bodyPr>
+            <a:normAutofit fontScale="90000"/>
+          </a:bodyPr>
+          <a:lstStyle/>
+          <a:p>
+            <a:r>
+              <a:rPr lang="es-AR" sz="2000" dirty="0" smtClean="0">
+                <a:latin typeface="Aharoni" pitchFamily="2" charset="-79"/>
+                <a:cs typeface="Aharoni" pitchFamily="2" charset="-79"/>
+              </a:rPr>
+              <a:t>Seguridad para Todos</a:t>
+            </a:r>
+            <a:endParaRPr lang="es-AR" sz="2000" dirty="0">
+              <a:latin typeface="Aharoni" pitchFamily="2" charset="-79"/>
+              <a:cs typeface="Aharoni" pitchFamily="2" charset="-79"/>
+            </a:endParaRPr>
+          </a:p>
+        </p:txBody>
+      </p:sp>
+      <p:sp>
+        <p:nvSpPr>
+          <p:cNvPr id="3" name="2 Subtítulo"/>
+          <p:cNvSpPr>
+            <a:spLocks noGrp="1"/>
+          </p:cNvSpPr>
+          <p:nvPr>
+            <p:ph type="subTitle" idx="1"/>
+          </p:nvPr>
+        </p:nvSpPr>
+        <p:spPr>
+          <a:xfrm>
+            <a:off x="5148064" y="239876"/>
+            <a:ext cx="3960440" cy="380812"/>
+          </a:xfrm>
+        </p:spPr>
+        <p:txBody>
+          <a:bodyPr>
+            <a:normAutofit fontScale="47500" lnSpcReduction="20000"/>
+          </a:bodyPr>
+          <a:lstStyle/>
+          <a:p>
+            <a:r>
+              <a:rPr lang="es-AR" dirty="0" smtClean="0">
+                <a:solidFill>
+                  <a:schemeClr val="tx1">
+                    <a:lumMod val="65000"/>
+                    <a:lumOff val="35000"/>
+                  </a:schemeClr>
+                </a:solidFill>
+              </a:rPr>
+              <a:t>75.45 - Taller de Desarrollo de Proyectos I</a:t>
+            </a:r>
+            <a:endParaRPr lang="es-AR" dirty="0">
+              <a:solidFill>
+                <a:schemeClr val="tx1">
+                  <a:lumMod val="65000"/>
+                  <a:lumOff val="35000"/>
+                </a:schemeClr>
+              </a:solidFill>
+            </a:endParaRPr>
+          </a:p>
+        </p:txBody>
+      </p:sp>
+      <p:pic>
+        <p:nvPicPr>
+          <p:cNvPr id="6" name="Picture 5"/>
+          <p:cNvPicPr>
+            <a:picLocks noChangeAspect="1"/>
+          </p:cNvPicPr>
+          <p:nvPr/>
+        </p:nvPicPr>
+        <p:blipFill>
+          <a:blip r:embed="rId2" cstate="print">
+            <a:extLst>
+              <a:ext uri="{28A0092B-C50C-407E-A947-70E740481C1C}">
+                <a14:useLocalDpi xmlns:a14="http://schemas.microsoft.com/office/drawing/2010/main" val="0"/>
+              </a:ext>
+            </a:extLst>
+          </a:blip>
+          <a:stretch>
+            <a:fillRect/>
+          </a:stretch>
+        </p:blipFill>
+        <p:spPr>
+          <a:xfrm>
+            <a:off x="3203848" y="260648"/>
+            <a:ext cx="468052" cy="277364"/>
+          </a:xfrm>
+          <a:prstGeom prst="rect">
+            <a:avLst/>
+          </a:prstGeom>
+        </p:spPr>
+      </p:pic>
+      <p:sp>
+        <p:nvSpPr>
+          <p:cNvPr id="8" name="1 Título"/>
+          <p:cNvSpPr txBox="1">
+            <a:spLocks/>
+          </p:cNvSpPr>
+          <p:nvPr/>
+        </p:nvSpPr>
+        <p:spPr>
+          <a:xfrm>
+            <a:off x="2206142" y="836712"/>
+            <a:ext cx="4814130" cy="792088"/>
+          </a:xfrm>
+          <a:prstGeom prst="rect">
+            <a:avLst/>
+          </a:prstGeom>
+        </p:spPr>
+        <p:txBody>
+          <a:bodyPr vert="horz" lIns="91440" tIns="45720" rIns="91440" bIns="45720" rtlCol="0" anchor="ctr">
+            <a:noAutofit/>
+          </a:bodyPr>
+          <a:lstStyle>
+            <a:lvl1pPr algn="ctr" defTabSz="914400" rtl="0" eaLnBrk="1" latinLnBrk="0" hangingPunct="1">
+              <a:spcBef>
+                <a:spcPct val="0"/>
+              </a:spcBef>
+              <a:buNone/>
+              <a:defRPr sz="4400" kern="1200">
+                <a:solidFill>
+                  <a:schemeClr val="tx1"/>
+                </a:solidFill>
+                <a:latin typeface="+mj-lt"/>
+                <a:ea typeface="+mj-ea"/>
+                <a:cs typeface="+mj-cs"/>
+              </a:defRPr>
+            </a:lvl1pPr>
+          </a:lstStyle>
+          <a:p>
+            <a:r>
+              <a:rPr lang="es-AR" sz="4800" b="1" dirty="0" smtClean="0">
+                <a:latin typeface="Trebuchet MS" pitchFamily="34" charset="0"/>
+                <a:cs typeface="Levenim MT" pitchFamily="2" charset="-79"/>
+              </a:rPr>
+              <a:t>Aplicaciones</a:t>
+            </a:r>
+            <a:endParaRPr lang="es-AR" sz="4800" b="1" dirty="0">
+              <a:latin typeface="Trebuchet MS" pitchFamily="34" charset="0"/>
+              <a:cs typeface="Levenim MT" pitchFamily="2" charset="-79"/>
+            </a:endParaRPr>
+          </a:p>
+        </p:txBody>
+      </p:sp>
+      <p:cxnSp>
+        <p:nvCxnSpPr>
+          <p:cNvPr id="5" name="Straight Connector 4"/>
+          <p:cNvCxnSpPr/>
+          <p:nvPr/>
+        </p:nvCxnSpPr>
+        <p:spPr>
+          <a:xfrm>
+            <a:off x="395536" y="692696"/>
+            <a:ext cx="8496944" cy="0"/>
+          </a:xfrm>
+          <a:prstGeom prst="line">
+            <a:avLst/>
+          </a:prstGeom>
+          <a:ln>
+            <a:solidFill>
+              <a:schemeClr val="bg1">
+                <a:lumMod val="65000"/>
+              </a:schemeClr>
+            </a:solidFill>
+          </a:ln>
+        </p:spPr>
+        <p:style>
+          <a:lnRef idx="1">
+            <a:schemeClr val="accent1"/>
+          </a:lnRef>
+          <a:fillRef idx="0">
+            <a:schemeClr val="accent1"/>
+          </a:fillRef>
+          <a:effectRef idx="0">
+            <a:schemeClr val="accent1"/>
+          </a:effectRef>
+          <a:fontRef idx="minor">
+            <a:schemeClr val="tx1"/>
+          </a:fontRef>
+        </p:style>
+      </p:cxnSp>
+      <p:sp>
+        <p:nvSpPr>
+          <p:cNvPr id="7" name="TextBox 6"/>
+          <p:cNvSpPr txBox="1"/>
+          <p:nvPr/>
+        </p:nvSpPr>
+        <p:spPr>
+          <a:xfrm>
+            <a:off x="467544" y="1772816"/>
+            <a:ext cx="8352928" cy="3970318"/>
+          </a:xfrm>
+          <a:prstGeom prst="rect">
+            <a:avLst/>
+          </a:prstGeom>
+          <a:noFill/>
+        </p:spPr>
+        <p:txBody>
+          <a:bodyPr wrap="square" rtlCol="0">
+            <a:spAutoFit/>
+          </a:bodyPr>
+          <a:lstStyle/>
+          <a:p>
+            <a:pPr marL="571500" indent="-571500">
+              <a:buFont typeface="Wingdings" pitchFamily="2" charset="2"/>
+              <a:buChar char="§"/>
+            </a:pPr>
+            <a:r>
+              <a:rPr lang="es-AR" sz="3600" dirty="0"/>
+              <a:t>Dispositivos </a:t>
+            </a:r>
+            <a:r>
+              <a:rPr lang="es-AR" sz="3600" dirty="0" smtClean="0"/>
+              <a:t>Móviles:</a:t>
+            </a:r>
+          </a:p>
+          <a:p>
+            <a:pPr marL="1028700" lvl="1" indent="-571500">
+              <a:buFont typeface="Wingdings" pitchFamily="2" charset="2"/>
+              <a:buChar char="§"/>
+            </a:pPr>
+            <a:r>
+              <a:rPr lang="es-AR" sz="3600" dirty="0" err="1" smtClean="0"/>
+              <a:t>Android</a:t>
+            </a:r>
+            <a:endParaRPr lang="es-AR" sz="3600" dirty="0" smtClean="0"/>
+          </a:p>
+          <a:p>
+            <a:pPr marL="1028700" lvl="1" indent="-571500">
+              <a:buFont typeface="Wingdings" pitchFamily="2" charset="2"/>
+              <a:buChar char="§"/>
+            </a:pPr>
+            <a:r>
+              <a:rPr lang="es-AR" sz="3600" dirty="0" smtClean="0"/>
+              <a:t>iPhone</a:t>
+            </a:r>
+          </a:p>
+          <a:p>
+            <a:pPr marL="1028700" lvl="1" indent="-571500">
+              <a:buFont typeface="Wingdings" pitchFamily="2" charset="2"/>
+              <a:buChar char="§"/>
+            </a:pPr>
+            <a:r>
+              <a:rPr lang="es-AR" sz="3600" dirty="0" smtClean="0"/>
+              <a:t>BlackBerry?</a:t>
+            </a:r>
+          </a:p>
+          <a:p>
+            <a:pPr marL="571500" indent="-571500">
+              <a:buFont typeface="Wingdings" pitchFamily="2" charset="2"/>
+              <a:buChar char="§"/>
+            </a:pPr>
+            <a:r>
+              <a:rPr lang="es-AR" sz="3600" dirty="0" smtClean="0"/>
+              <a:t>Sitio Web:</a:t>
+            </a:r>
+          </a:p>
+          <a:p>
+            <a:pPr marL="1028700" lvl="1" indent="-571500">
+              <a:buFont typeface="Wingdings" pitchFamily="2" charset="2"/>
+              <a:buChar char="§"/>
+            </a:pPr>
+            <a:r>
+              <a:rPr lang="es-AR" sz="3600" dirty="0" smtClean="0"/>
+              <a:t>Terminal para Centrales de Seguridad.</a:t>
+            </a:r>
+          </a:p>
+          <a:p>
+            <a:pPr marL="1028700" lvl="1" indent="-571500">
+              <a:buFont typeface="Wingdings" pitchFamily="2" charset="2"/>
+              <a:buChar char="§"/>
+            </a:pPr>
+            <a:r>
+              <a:rPr lang="es-AR" sz="3600" dirty="0" smtClean="0"/>
+              <a:t>Información y Servicio al Cliente.</a:t>
+            </a:r>
+            <a:endParaRPr lang="es-AR" sz="3600" dirty="0"/>
+          </a:p>
+        </p:txBody>
+      </p:sp>
+    </p:spTree>
+    <p:extLst>
+      <p:ext uri="{BB962C8B-B14F-4D97-AF65-F5344CB8AC3E}">
+        <p14:creationId xmlns:p14="http://schemas.microsoft.com/office/powerpoint/2010/main" val="2296755584"/>
+      </p:ext>
+    </p:extLst>
+  </p:cSld>
+  <p:clrMapOvr>
+    <a:masterClrMapping/>
+  </p:clrMapOvr>
+  <p:timing>
+    <p:tnLst>
+      <p:par>
+        <p:cTn id="1" dur="indefinite" restart="never" nodeType="tmRoot"/>
+      </p:par>
+    </p:tnLst>
+  </p:timing>
+</p:sld>
+</file>
+
+<file path=ppt/slides/slide7.xml><?xml version="1.0" encoding="utf-8"?>
 <p:sld xmlns:a="http://schemas.openxmlformats.org/drawingml/2006/main" xmlns:r="http://schemas.openxmlformats.org/officeDocument/2006/relationships" xmlns:p="http://schemas.openxmlformats.org/presentationml/2006/main">
   <p:cSld>
     <p:spTree>
@@ -4462,7 +5510,7 @@
 </p:sld>
 </file>
 
-<file path=ppt/slides/slide6.xml><?xml version="1.0" encoding="utf-8"?>
+<file path=ppt/slides/slide8.xml><?xml version="1.0" encoding="utf-8"?>
 <p:sld xmlns:a="http://schemas.openxmlformats.org/drawingml/2006/main" xmlns:r="http://schemas.openxmlformats.org/officeDocument/2006/relationships" xmlns:p="http://schemas.openxmlformats.org/presentationml/2006/main">
   <p:cSld>
     <p:spTree>

</xml_diff>

<commit_message>
Eliminación copias del archivo de presentacion.
</commit_message>
<xml_diff>
--- a/docs/Presentacion.pptx
+++ b/docs/Presentacion.pptx
@@ -4,15 +4,17 @@
   <p:sldMasterIdLst>
     <p:sldMasterId id="2147483648" r:id="rId1"/>
   </p:sldMasterIdLst>
+  <p:notesMasterIdLst>
+    <p:notesMasterId r:id="rId9"/>
+  </p:notesMasterIdLst>
   <p:sldIdLst>
-    <p:sldId id="257" r:id="rId2"/>
-    <p:sldId id="256" r:id="rId3"/>
+    <p:sldId id="256" r:id="rId2"/>
+    <p:sldId id="257" r:id="rId3"/>
     <p:sldId id="263" r:id="rId4"/>
-    <p:sldId id="264" r:id="rId5"/>
-    <p:sldId id="265" r:id="rId6"/>
+    <p:sldId id="265" r:id="rId5"/>
+    <p:sldId id="264" r:id="rId6"/>
     <p:sldId id="262" r:id="rId7"/>
-    <p:sldId id="259" r:id="rId8"/>
-    <p:sldId id="261" r:id="rId9"/>
+    <p:sldId id="261" r:id="rId8"/>
   </p:sldIdLst>
   <p:sldSz cx="9144000" cy="6858000" type="screen4x3"/>
   <p:notesSz cx="6858000" cy="9144000"/>
@@ -114,6 +116,979 @@
 </p:presentation>
 </file>
 
+<file path=ppt/charts/chart1.xml><?xml version="1.0" encoding="utf-8"?>
+<c:chartSpace xmlns:c="http://schemas.openxmlformats.org/drawingml/2006/chart" xmlns:a="http://schemas.openxmlformats.org/drawingml/2006/main" xmlns:r="http://schemas.openxmlformats.org/officeDocument/2006/relationships">
+  <c:date1904 val="1"/>
+  <c:lang val="es-AR"/>
+  <c:chart>
+    <c:plotArea>
+      <c:layout/>
+      <c:scatterChart>
+        <c:scatterStyle val="smoothMarker"/>
+        <c:ser>
+          <c:idx val="0"/>
+          <c:order val="0"/>
+          <c:tx>
+            <c:strRef>
+              <c:f>Hoja1!$B$1</c:f>
+              <c:strCache>
+                <c:ptCount val="1"/>
+                <c:pt idx="0">
+                  <c:v>Cant. Vendidas</c:v>
+                </c:pt>
+              </c:strCache>
+            </c:strRef>
+          </c:tx>
+          <c:xVal>
+            <c:numRef>
+              <c:f>Hoja1!$A$2:$A$19</c:f>
+              <c:numCache>
+                <c:formatCode>General</c:formatCode>
+                <c:ptCount val="18"/>
+                <c:pt idx="0">
+                  <c:v>1</c:v>
+                </c:pt>
+                <c:pt idx="1">
+                  <c:v>2</c:v>
+                </c:pt>
+                <c:pt idx="2">
+                  <c:v>3</c:v>
+                </c:pt>
+                <c:pt idx="3">
+                  <c:v>4</c:v>
+                </c:pt>
+                <c:pt idx="4">
+                  <c:v>5</c:v>
+                </c:pt>
+                <c:pt idx="5">
+                  <c:v>6</c:v>
+                </c:pt>
+                <c:pt idx="6">
+                  <c:v>7</c:v>
+                </c:pt>
+                <c:pt idx="7">
+                  <c:v>8</c:v>
+                </c:pt>
+                <c:pt idx="8">
+                  <c:v>9</c:v>
+                </c:pt>
+                <c:pt idx="9">
+                  <c:v>10</c:v>
+                </c:pt>
+                <c:pt idx="10">
+                  <c:v>11</c:v>
+                </c:pt>
+                <c:pt idx="11">
+                  <c:v>12</c:v>
+                </c:pt>
+                <c:pt idx="12">
+                  <c:v>13</c:v>
+                </c:pt>
+                <c:pt idx="13">
+                  <c:v>14</c:v>
+                </c:pt>
+                <c:pt idx="14">
+                  <c:v>15</c:v>
+                </c:pt>
+                <c:pt idx="15">
+                  <c:v>16</c:v>
+                </c:pt>
+                <c:pt idx="16">
+                  <c:v>17</c:v>
+                </c:pt>
+                <c:pt idx="17">
+                  <c:v>18</c:v>
+                </c:pt>
+              </c:numCache>
+            </c:numRef>
+          </c:xVal>
+          <c:yVal>
+            <c:numRef>
+              <c:f>Hoja1!$B$2:$B$19</c:f>
+              <c:numCache>
+                <c:formatCode>General</c:formatCode>
+                <c:ptCount val="18"/>
+                <c:pt idx="0">
+                  <c:v>0</c:v>
+                </c:pt>
+                <c:pt idx="1">
+                  <c:v>1000</c:v>
+                </c:pt>
+                <c:pt idx="2">
+                  <c:v>2000</c:v>
+                </c:pt>
+                <c:pt idx="3">
+                  <c:v>4000</c:v>
+                </c:pt>
+                <c:pt idx="4">
+                  <c:v>5000</c:v>
+                </c:pt>
+                <c:pt idx="5">
+                  <c:v>7000</c:v>
+                </c:pt>
+                <c:pt idx="6">
+                  <c:v>7000</c:v>
+                </c:pt>
+                <c:pt idx="7">
+                  <c:v>8000</c:v>
+                </c:pt>
+                <c:pt idx="8">
+                  <c:v>8000</c:v>
+                </c:pt>
+                <c:pt idx="9">
+                  <c:v>7000</c:v>
+                </c:pt>
+                <c:pt idx="10">
+                  <c:v>7000</c:v>
+                </c:pt>
+                <c:pt idx="11">
+                  <c:v>6000</c:v>
+                </c:pt>
+                <c:pt idx="12">
+                  <c:v>5000</c:v>
+                </c:pt>
+                <c:pt idx="13">
+                  <c:v>5000</c:v>
+                </c:pt>
+                <c:pt idx="14">
+                  <c:v>5000</c:v>
+                </c:pt>
+                <c:pt idx="15">
+                  <c:v>4000</c:v>
+                </c:pt>
+                <c:pt idx="16">
+                  <c:v>4000</c:v>
+                </c:pt>
+                <c:pt idx="17">
+                  <c:v>4000</c:v>
+                </c:pt>
+              </c:numCache>
+            </c:numRef>
+          </c:yVal>
+          <c:smooth val="1"/>
+        </c:ser>
+        <c:ser>
+          <c:idx val="1"/>
+          <c:order val="1"/>
+          <c:tx>
+            <c:strRef>
+              <c:f>Hoja1!$C$1</c:f>
+              <c:strCache>
+                <c:ptCount val="1"/>
+                <c:pt idx="0">
+                  <c:v>Ingreso</c:v>
+                </c:pt>
+              </c:strCache>
+            </c:strRef>
+          </c:tx>
+          <c:xVal>
+            <c:numRef>
+              <c:f>Hoja1!$A$2:$A$19</c:f>
+              <c:numCache>
+                <c:formatCode>General</c:formatCode>
+                <c:ptCount val="18"/>
+                <c:pt idx="0">
+                  <c:v>1</c:v>
+                </c:pt>
+                <c:pt idx="1">
+                  <c:v>2</c:v>
+                </c:pt>
+                <c:pt idx="2">
+                  <c:v>3</c:v>
+                </c:pt>
+                <c:pt idx="3">
+                  <c:v>4</c:v>
+                </c:pt>
+                <c:pt idx="4">
+                  <c:v>5</c:v>
+                </c:pt>
+                <c:pt idx="5">
+                  <c:v>6</c:v>
+                </c:pt>
+                <c:pt idx="6">
+                  <c:v>7</c:v>
+                </c:pt>
+                <c:pt idx="7">
+                  <c:v>8</c:v>
+                </c:pt>
+                <c:pt idx="8">
+                  <c:v>9</c:v>
+                </c:pt>
+                <c:pt idx="9">
+                  <c:v>10</c:v>
+                </c:pt>
+                <c:pt idx="10">
+                  <c:v>11</c:v>
+                </c:pt>
+                <c:pt idx="11">
+                  <c:v>12</c:v>
+                </c:pt>
+                <c:pt idx="12">
+                  <c:v>13</c:v>
+                </c:pt>
+                <c:pt idx="13">
+                  <c:v>14</c:v>
+                </c:pt>
+                <c:pt idx="14">
+                  <c:v>15</c:v>
+                </c:pt>
+                <c:pt idx="15">
+                  <c:v>16</c:v>
+                </c:pt>
+                <c:pt idx="16">
+                  <c:v>17</c:v>
+                </c:pt>
+                <c:pt idx="17">
+                  <c:v>18</c:v>
+                </c:pt>
+              </c:numCache>
+            </c:numRef>
+          </c:xVal>
+          <c:yVal>
+            <c:numRef>
+              <c:f>Hoja1!$C$2:$C$19</c:f>
+              <c:numCache>
+                <c:formatCode>General</c:formatCode>
+                <c:ptCount val="18"/>
+                <c:pt idx="0">
+                  <c:v>0</c:v>
+                </c:pt>
+                <c:pt idx="1">
+                  <c:v>5000</c:v>
+                </c:pt>
+                <c:pt idx="2">
+                  <c:v>10000</c:v>
+                </c:pt>
+                <c:pt idx="3">
+                  <c:v>20000</c:v>
+                </c:pt>
+                <c:pt idx="4">
+                  <c:v>25000</c:v>
+                </c:pt>
+                <c:pt idx="5">
+                  <c:v>35000</c:v>
+                </c:pt>
+                <c:pt idx="6">
+                  <c:v>35000</c:v>
+                </c:pt>
+                <c:pt idx="7">
+                  <c:v>40000</c:v>
+                </c:pt>
+                <c:pt idx="8">
+                  <c:v>40000</c:v>
+                </c:pt>
+                <c:pt idx="9">
+                  <c:v>35000</c:v>
+                </c:pt>
+                <c:pt idx="10">
+                  <c:v>35000</c:v>
+                </c:pt>
+                <c:pt idx="11">
+                  <c:v>30000</c:v>
+                </c:pt>
+                <c:pt idx="12">
+                  <c:v>25000</c:v>
+                </c:pt>
+                <c:pt idx="13">
+                  <c:v>25000</c:v>
+                </c:pt>
+                <c:pt idx="14">
+                  <c:v>25000</c:v>
+                </c:pt>
+                <c:pt idx="15">
+                  <c:v>20000</c:v>
+                </c:pt>
+                <c:pt idx="16">
+                  <c:v>20000</c:v>
+                </c:pt>
+                <c:pt idx="17">
+                  <c:v>20000</c:v>
+                </c:pt>
+              </c:numCache>
+            </c:numRef>
+          </c:yVal>
+          <c:smooth val="1"/>
+        </c:ser>
+        <c:ser>
+          <c:idx val="2"/>
+          <c:order val="2"/>
+          <c:tx>
+            <c:strRef>
+              <c:f>Hoja1!$D$1</c:f>
+              <c:strCache>
+                <c:ptCount val="1"/>
+                <c:pt idx="0">
+                  <c:v>Costos</c:v>
+                </c:pt>
+              </c:strCache>
+            </c:strRef>
+          </c:tx>
+          <c:xVal>
+            <c:numRef>
+              <c:f>Hoja1!$A$2:$A$19</c:f>
+              <c:numCache>
+                <c:formatCode>General</c:formatCode>
+                <c:ptCount val="18"/>
+                <c:pt idx="0">
+                  <c:v>1</c:v>
+                </c:pt>
+                <c:pt idx="1">
+                  <c:v>2</c:v>
+                </c:pt>
+                <c:pt idx="2">
+                  <c:v>3</c:v>
+                </c:pt>
+                <c:pt idx="3">
+                  <c:v>4</c:v>
+                </c:pt>
+                <c:pt idx="4">
+                  <c:v>5</c:v>
+                </c:pt>
+                <c:pt idx="5">
+                  <c:v>6</c:v>
+                </c:pt>
+                <c:pt idx="6">
+                  <c:v>7</c:v>
+                </c:pt>
+                <c:pt idx="7">
+                  <c:v>8</c:v>
+                </c:pt>
+                <c:pt idx="8">
+                  <c:v>9</c:v>
+                </c:pt>
+                <c:pt idx="9">
+                  <c:v>10</c:v>
+                </c:pt>
+                <c:pt idx="10">
+                  <c:v>11</c:v>
+                </c:pt>
+                <c:pt idx="11">
+                  <c:v>12</c:v>
+                </c:pt>
+                <c:pt idx="12">
+                  <c:v>13</c:v>
+                </c:pt>
+                <c:pt idx="13">
+                  <c:v>14</c:v>
+                </c:pt>
+                <c:pt idx="14">
+                  <c:v>15</c:v>
+                </c:pt>
+                <c:pt idx="15">
+                  <c:v>16</c:v>
+                </c:pt>
+                <c:pt idx="16">
+                  <c:v>17</c:v>
+                </c:pt>
+                <c:pt idx="17">
+                  <c:v>18</c:v>
+                </c:pt>
+              </c:numCache>
+            </c:numRef>
+          </c:xVal>
+          <c:yVal>
+            <c:numRef>
+              <c:f>Hoja1!$D$2:$D$19</c:f>
+              <c:numCache>
+                <c:formatCode>General</c:formatCode>
+                <c:ptCount val="18"/>
+                <c:pt idx="0">
+                  <c:v>26000</c:v>
+                </c:pt>
+                <c:pt idx="1">
+                  <c:v>18143.16</c:v>
+                </c:pt>
+                <c:pt idx="2">
+                  <c:v>18143.16</c:v>
+                </c:pt>
+                <c:pt idx="3">
+                  <c:v>18143.16</c:v>
+                </c:pt>
+                <c:pt idx="4">
+                  <c:v>18143.16</c:v>
+                </c:pt>
+                <c:pt idx="5">
+                  <c:v>18143.16</c:v>
+                </c:pt>
+                <c:pt idx="6">
+                  <c:v>18143.16</c:v>
+                </c:pt>
+                <c:pt idx="7">
+                  <c:v>18143.16</c:v>
+                </c:pt>
+                <c:pt idx="8">
+                  <c:v>18143.16</c:v>
+                </c:pt>
+                <c:pt idx="9">
+                  <c:v>18143.16</c:v>
+                </c:pt>
+                <c:pt idx="10">
+                  <c:v>18143.16</c:v>
+                </c:pt>
+                <c:pt idx="11">
+                  <c:v>18143.16</c:v>
+                </c:pt>
+                <c:pt idx="12">
+                  <c:v>18143.16</c:v>
+                </c:pt>
+                <c:pt idx="13">
+                  <c:v>18143.16</c:v>
+                </c:pt>
+                <c:pt idx="14">
+                  <c:v>18143.16</c:v>
+                </c:pt>
+                <c:pt idx="15">
+                  <c:v>18143.16</c:v>
+                </c:pt>
+                <c:pt idx="16">
+                  <c:v>18143.16</c:v>
+                </c:pt>
+                <c:pt idx="17">
+                  <c:v>18143.16</c:v>
+                </c:pt>
+              </c:numCache>
+            </c:numRef>
+          </c:yVal>
+          <c:smooth val="1"/>
+        </c:ser>
+        <c:axId val="64046592"/>
+        <c:axId val="65957248"/>
+      </c:scatterChart>
+      <c:valAx>
+        <c:axId val="64046592"/>
+        <c:scaling>
+          <c:orientation val="minMax"/>
+        </c:scaling>
+        <c:axPos val="b"/>
+        <c:majorGridlines/>
+        <c:title>
+          <c:tx>
+            <c:rich>
+              <a:bodyPr/>
+              <a:lstStyle/>
+              <a:p>
+                <a:pPr>
+                  <a:defRPr sz="1400"/>
+                </a:pPr>
+                <a:r>
+                  <a:rPr lang="es-AR" sz="1400"/>
+                  <a:t>Bimestres</a:t>
+                </a:r>
+              </a:p>
+            </c:rich>
+          </c:tx>
+          <c:layout/>
+        </c:title>
+        <c:numFmt formatCode="General" sourceLinked="1"/>
+        <c:tickLblPos val="nextTo"/>
+        <c:txPr>
+          <a:bodyPr/>
+          <a:lstStyle/>
+          <a:p>
+            <a:pPr>
+              <a:defRPr sz="1400"/>
+            </a:pPr>
+            <a:endParaRPr lang="es-AR"/>
+          </a:p>
+        </c:txPr>
+        <c:crossAx val="65957248"/>
+        <c:crosses val="autoZero"/>
+        <c:crossBetween val="midCat"/>
+        <c:majorUnit val="1"/>
+      </c:valAx>
+      <c:valAx>
+        <c:axId val="65957248"/>
+        <c:scaling>
+          <c:orientation val="minMax"/>
+        </c:scaling>
+        <c:axPos val="l"/>
+        <c:majorGridlines/>
+        <c:title>
+          <c:tx>
+            <c:rich>
+              <a:bodyPr rot="-5400000" vert="horz"/>
+              <a:lstStyle/>
+              <a:p>
+                <a:pPr>
+                  <a:defRPr sz="1400"/>
+                </a:pPr>
+                <a:r>
+                  <a:rPr lang="es-AR" sz="1400"/>
+                  <a:t>Monto (ARS)</a:t>
+                </a:r>
+              </a:p>
+            </c:rich>
+          </c:tx>
+          <c:layout/>
+        </c:title>
+        <c:numFmt formatCode="General" sourceLinked="1"/>
+        <c:tickLblPos val="nextTo"/>
+        <c:txPr>
+          <a:bodyPr/>
+          <a:lstStyle/>
+          <a:p>
+            <a:pPr>
+              <a:defRPr sz="1400"/>
+            </a:pPr>
+            <a:endParaRPr lang="es-AR"/>
+          </a:p>
+        </c:txPr>
+        <c:crossAx val="64046592"/>
+        <c:crosses val="autoZero"/>
+        <c:crossBetween val="midCat"/>
+      </c:valAx>
+    </c:plotArea>
+    <c:legend>
+      <c:legendPos val="r"/>
+      <c:layout/>
+      <c:txPr>
+        <a:bodyPr/>
+        <a:lstStyle/>
+        <a:p>
+          <a:pPr>
+            <a:defRPr sz="1400"/>
+          </a:pPr>
+          <a:endParaRPr lang="es-AR"/>
+        </a:p>
+      </c:txPr>
+    </c:legend>
+    <c:plotVisOnly val="1"/>
+  </c:chart>
+  <c:externalData r:id="rId1"/>
+</c:chartSpace>
+</file>
+
+<file path=ppt/notesMasters/notesMaster1.xml><?xml version="1.0" encoding="utf-8"?>
+<p:notesMaster xmlns:a="http://schemas.openxmlformats.org/drawingml/2006/main" xmlns:r="http://schemas.openxmlformats.org/officeDocument/2006/relationships" xmlns:p="http://schemas.openxmlformats.org/presentationml/2006/main">
+  <p:cSld>
+    <p:bg>
+      <p:bgRef idx="1001">
+        <a:schemeClr val="bg1"/>
+      </p:bgRef>
+    </p:bg>
+    <p:spTree>
+      <p:nvGrpSpPr>
+        <p:cNvPr id="1" name=""/>
+        <p:cNvGrpSpPr/>
+        <p:nvPr/>
+      </p:nvGrpSpPr>
+      <p:grpSpPr>
+        <a:xfrm>
+          <a:off x="0" y="0"/>
+          <a:ext cx="0" cy="0"/>
+          <a:chOff x="0" y="0"/>
+          <a:chExt cx="0" cy="0"/>
+        </a:xfrm>
+      </p:grpSpPr>
+      <p:sp>
+        <p:nvSpPr>
+          <p:cNvPr id="2" name="1 Marcador de encabezado"/>
+          <p:cNvSpPr>
+            <a:spLocks noGrp="1"/>
+          </p:cNvSpPr>
+          <p:nvPr>
+            <p:ph type="hdr" sz="quarter"/>
+          </p:nvPr>
+        </p:nvSpPr>
+        <p:spPr>
+          <a:xfrm>
+            <a:off x="0" y="0"/>
+            <a:ext cx="2971800" cy="457200"/>
+          </a:xfrm>
+          <a:prstGeom prst="rect">
+            <a:avLst/>
+          </a:prstGeom>
+        </p:spPr>
+        <p:txBody>
+          <a:bodyPr vert="horz" lIns="91440" tIns="45720" rIns="91440" bIns="45720" rtlCol="0"/>
+          <a:lstStyle>
+            <a:lvl1pPr algn="l">
+              <a:defRPr sz="1200"/>
+            </a:lvl1pPr>
+          </a:lstStyle>
+          <a:p>
+            <a:endParaRPr lang="es-AR"/>
+          </a:p>
+        </p:txBody>
+      </p:sp>
+      <p:sp>
+        <p:nvSpPr>
+          <p:cNvPr id="3" name="2 Marcador de fecha"/>
+          <p:cNvSpPr>
+            <a:spLocks noGrp="1"/>
+          </p:cNvSpPr>
+          <p:nvPr>
+            <p:ph type="dt" idx="1"/>
+          </p:nvPr>
+        </p:nvSpPr>
+        <p:spPr>
+          <a:xfrm>
+            <a:off x="3884613" y="0"/>
+            <a:ext cx="2971800" cy="457200"/>
+          </a:xfrm>
+          <a:prstGeom prst="rect">
+            <a:avLst/>
+          </a:prstGeom>
+        </p:spPr>
+        <p:txBody>
+          <a:bodyPr vert="horz" lIns="91440" tIns="45720" rIns="91440" bIns="45720" rtlCol="0"/>
+          <a:lstStyle>
+            <a:lvl1pPr algn="r">
+              <a:defRPr sz="1200"/>
+            </a:lvl1pPr>
+          </a:lstStyle>
+          <a:p>
+            <a:fld id="{0BDB093D-7EE5-483A-9D7B-A1A2E1CBECD6}" type="datetimeFigureOut">
+              <a:rPr lang="es-AR" smtClean="0"/>
+              <a:pPr/>
+              <a:t>26/04/2012</a:t>
+            </a:fld>
+            <a:endParaRPr lang="es-AR"/>
+          </a:p>
+        </p:txBody>
+      </p:sp>
+      <p:sp>
+        <p:nvSpPr>
+          <p:cNvPr id="4" name="3 Marcador de imagen de diapositiva"/>
+          <p:cNvSpPr>
+            <a:spLocks noGrp="1" noRot="1" noChangeAspect="1"/>
+          </p:cNvSpPr>
+          <p:nvPr>
+            <p:ph type="sldImg" idx="2"/>
+          </p:nvPr>
+        </p:nvSpPr>
+        <p:spPr>
+          <a:xfrm>
+            <a:off x="1143000" y="685800"/>
+            <a:ext cx="4572000" cy="3429000"/>
+          </a:xfrm>
+          <a:prstGeom prst="rect">
+            <a:avLst/>
+          </a:prstGeom>
+          <a:noFill/>
+          <a:ln w="12700">
+            <a:solidFill>
+              <a:prstClr val="black"/>
+            </a:solidFill>
+          </a:ln>
+        </p:spPr>
+        <p:txBody>
+          <a:bodyPr vert="horz" lIns="91440" tIns="45720" rIns="91440" bIns="45720" rtlCol="0" anchor="ctr"/>
+          <a:lstStyle/>
+          <a:p>
+            <a:endParaRPr lang="es-AR"/>
+          </a:p>
+        </p:txBody>
+      </p:sp>
+      <p:sp>
+        <p:nvSpPr>
+          <p:cNvPr id="5" name="4 Marcador de notas"/>
+          <p:cNvSpPr>
+            <a:spLocks noGrp="1"/>
+          </p:cNvSpPr>
+          <p:nvPr>
+            <p:ph type="body" sz="quarter" idx="3"/>
+          </p:nvPr>
+        </p:nvSpPr>
+        <p:spPr>
+          <a:xfrm>
+            <a:off x="685800" y="4343400"/>
+            <a:ext cx="5486400" cy="4114800"/>
+          </a:xfrm>
+          <a:prstGeom prst="rect">
+            <a:avLst/>
+          </a:prstGeom>
+        </p:spPr>
+        <p:txBody>
+          <a:bodyPr vert="horz" lIns="91440" tIns="45720" rIns="91440" bIns="45720" rtlCol="0">
+            <a:normAutofit/>
+          </a:bodyPr>
+          <a:lstStyle/>
+          <a:p>
+            <a:pPr lvl="0"/>
+            <a:r>
+              <a:rPr lang="es-ES" smtClean="0"/>
+              <a:t>Haga clic para modificar el estilo de texto del patrón</a:t>
+            </a:r>
+          </a:p>
+          <a:p>
+            <a:pPr lvl="1"/>
+            <a:r>
+              <a:rPr lang="es-ES" smtClean="0"/>
+              <a:t>Segundo nivel</a:t>
+            </a:r>
+          </a:p>
+          <a:p>
+            <a:pPr lvl="2"/>
+            <a:r>
+              <a:rPr lang="es-ES" smtClean="0"/>
+              <a:t>Tercer nivel</a:t>
+            </a:r>
+          </a:p>
+          <a:p>
+            <a:pPr lvl="3"/>
+            <a:r>
+              <a:rPr lang="es-ES" smtClean="0"/>
+              <a:t>Cuarto nivel</a:t>
+            </a:r>
+          </a:p>
+          <a:p>
+            <a:pPr lvl="4"/>
+            <a:r>
+              <a:rPr lang="es-ES" smtClean="0"/>
+              <a:t>Quinto nivel</a:t>
+            </a:r>
+            <a:endParaRPr lang="es-AR"/>
+          </a:p>
+        </p:txBody>
+      </p:sp>
+      <p:sp>
+        <p:nvSpPr>
+          <p:cNvPr id="6" name="5 Marcador de pie de página"/>
+          <p:cNvSpPr>
+            <a:spLocks noGrp="1"/>
+          </p:cNvSpPr>
+          <p:nvPr>
+            <p:ph type="ftr" sz="quarter" idx="4"/>
+          </p:nvPr>
+        </p:nvSpPr>
+        <p:spPr>
+          <a:xfrm>
+            <a:off x="0" y="8685213"/>
+            <a:ext cx="2971800" cy="457200"/>
+          </a:xfrm>
+          <a:prstGeom prst="rect">
+            <a:avLst/>
+          </a:prstGeom>
+        </p:spPr>
+        <p:txBody>
+          <a:bodyPr vert="horz" lIns="91440" tIns="45720" rIns="91440" bIns="45720" rtlCol="0" anchor="b"/>
+          <a:lstStyle>
+            <a:lvl1pPr algn="l">
+              <a:defRPr sz="1200"/>
+            </a:lvl1pPr>
+          </a:lstStyle>
+          <a:p>
+            <a:endParaRPr lang="es-AR"/>
+          </a:p>
+        </p:txBody>
+      </p:sp>
+      <p:sp>
+        <p:nvSpPr>
+          <p:cNvPr id="7" name="6 Marcador de número de diapositiva"/>
+          <p:cNvSpPr>
+            <a:spLocks noGrp="1"/>
+          </p:cNvSpPr>
+          <p:nvPr>
+            <p:ph type="sldNum" sz="quarter" idx="5"/>
+          </p:nvPr>
+        </p:nvSpPr>
+        <p:spPr>
+          <a:xfrm>
+            <a:off x="3884613" y="8685213"/>
+            <a:ext cx="2971800" cy="457200"/>
+          </a:xfrm>
+          <a:prstGeom prst="rect">
+            <a:avLst/>
+          </a:prstGeom>
+        </p:spPr>
+        <p:txBody>
+          <a:bodyPr vert="horz" lIns="91440" tIns="45720" rIns="91440" bIns="45720" rtlCol="0" anchor="b"/>
+          <a:lstStyle>
+            <a:lvl1pPr algn="r">
+              <a:defRPr sz="1200"/>
+            </a:lvl1pPr>
+          </a:lstStyle>
+          <a:p>
+            <a:fld id="{827EE000-08BA-42E9-8051-6989914F4AEC}" type="slidenum">
+              <a:rPr lang="es-AR" smtClean="0"/>
+              <a:pPr/>
+              <a:t>‹Nº›</a:t>
+            </a:fld>
+            <a:endParaRPr lang="es-AR"/>
+          </a:p>
+        </p:txBody>
+      </p:sp>
+    </p:spTree>
+  </p:cSld>
+  <p:clrMap bg1="lt1" tx1="dk1" bg2="lt2" tx2="dk2" accent1="accent1" accent2="accent2" accent3="accent3" accent4="accent4" accent5="accent5" accent6="accent6" hlink="hlink" folHlink="folHlink"/>
+  <p:notesStyle>
+    <a:lvl1pPr marL="0" algn="l" defTabSz="914400" rtl="0" eaLnBrk="1" latinLnBrk="0" hangingPunct="1">
+      <a:defRPr sz="1200" kern="1200">
+        <a:solidFill>
+          <a:schemeClr val="tx1"/>
+        </a:solidFill>
+        <a:latin typeface="+mn-lt"/>
+        <a:ea typeface="+mn-ea"/>
+        <a:cs typeface="+mn-cs"/>
+      </a:defRPr>
+    </a:lvl1pPr>
+    <a:lvl2pPr marL="457200" algn="l" defTabSz="914400" rtl="0" eaLnBrk="1" latinLnBrk="0" hangingPunct="1">
+      <a:defRPr sz="1200" kern="1200">
+        <a:solidFill>
+          <a:schemeClr val="tx1"/>
+        </a:solidFill>
+        <a:latin typeface="+mn-lt"/>
+        <a:ea typeface="+mn-ea"/>
+        <a:cs typeface="+mn-cs"/>
+      </a:defRPr>
+    </a:lvl2pPr>
+    <a:lvl3pPr marL="914400" algn="l" defTabSz="914400" rtl="0" eaLnBrk="1" latinLnBrk="0" hangingPunct="1">
+      <a:defRPr sz="1200" kern="1200">
+        <a:solidFill>
+          <a:schemeClr val="tx1"/>
+        </a:solidFill>
+        <a:latin typeface="+mn-lt"/>
+        <a:ea typeface="+mn-ea"/>
+        <a:cs typeface="+mn-cs"/>
+      </a:defRPr>
+    </a:lvl3pPr>
+    <a:lvl4pPr marL="1371600" algn="l" defTabSz="914400" rtl="0" eaLnBrk="1" latinLnBrk="0" hangingPunct="1">
+      <a:defRPr sz="1200" kern="1200">
+        <a:solidFill>
+          <a:schemeClr val="tx1"/>
+        </a:solidFill>
+        <a:latin typeface="+mn-lt"/>
+        <a:ea typeface="+mn-ea"/>
+        <a:cs typeface="+mn-cs"/>
+      </a:defRPr>
+    </a:lvl4pPr>
+    <a:lvl5pPr marL="1828800" algn="l" defTabSz="914400" rtl="0" eaLnBrk="1" latinLnBrk="0" hangingPunct="1">
+      <a:defRPr sz="1200" kern="1200">
+        <a:solidFill>
+          <a:schemeClr val="tx1"/>
+        </a:solidFill>
+        <a:latin typeface="+mn-lt"/>
+        <a:ea typeface="+mn-ea"/>
+        <a:cs typeface="+mn-cs"/>
+      </a:defRPr>
+    </a:lvl5pPr>
+    <a:lvl6pPr marL="2286000" algn="l" defTabSz="914400" rtl="0" eaLnBrk="1" latinLnBrk="0" hangingPunct="1">
+      <a:defRPr sz="1200" kern="1200">
+        <a:solidFill>
+          <a:schemeClr val="tx1"/>
+        </a:solidFill>
+        <a:latin typeface="+mn-lt"/>
+        <a:ea typeface="+mn-ea"/>
+        <a:cs typeface="+mn-cs"/>
+      </a:defRPr>
+    </a:lvl6pPr>
+    <a:lvl7pPr marL="2743200" algn="l" defTabSz="914400" rtl="0" eaLnBrk="1" latinLnBrk="0" hangingPunct="1">
+      <a:defRPr sz="1200" kern="1200">
+        <a:solidFill>
+          <a:schemeClr val="tx1"/>
+        </a:solidFill>
+        <a:latin typeface="+mn-lt"/>
+        <a:ea typeface="+mn-ea"/>
+        <a:cs typeface="+mn-cs"/>
+      </a:defRPr>
+    </a:lvl7pPr>
+    <a:lvl8pPr marL="3200400" algn="l" defTabSz="914400" rtl="0" eaLnBrk="1" latinLnBrk="0" hangingPunct="1">
+      <a:defRPr sz="1200" kern="1200">
+        <a:solidFill>
+          <a:schemeClr val="tx1"/>
+        </a:solidFill>
+        <a:latin typeface="+mn-lt"/>
+        <a:ea typeface="+mn-ea"/>
+        <a:cs typeface="+mn-cs"/>
+      </a:defRPr>
+    </a:lvl8pPr>
+    <a:lvl9pPr marL="3657600" algn="l" defTabSz="914400" rtl="0" eaLnBrk="1" latinLnBrk="0" hangingPunct="1">
+      <a:defRPr sz="1200" kern="1200">
+        <a:solidFill>
+          <a:schemeClr val="tx1"/>
+        </a:solidFill>
+        <a:latin typeface="+mn-lt"/>
+        <a:ea typeface="+mn-ea"/>
+        <a:cs typeface="+mn-cs"/>
+      </a:defRPr>
+    </a:lvl9pPr>
+  </p:notesStyle>
+</p:notesMaster>
+</file>
+
+<file path=ppt/notesSlides/notesSlide1.xml><?xml version="1.0" encoding="utf-8"?>
+<p:notes xmlns:a="http://schemas.openxmlformats.org/drawingml/2006/main" xmlns:r="http://schemas.openxmlformats.org/officeDocument/2006/relationships" xmlns:p="http://schemas.openxmlformats.org/presentationml/2006/main">
+  <p:cSld>
+    <p:spTree>
+      <p:nvGrpSpPr>
+        <p:cNvPr id="1" name=""/>
+        <p:cNvGrpSpPr/>
+        <p:nvPr/>
+      </p:nvGrpSpPr>
+      <p:grpSpPr>
+        <a:xfrm>
+          <a:off x="0" y="0"/>
+          <a:ext cx="0" cy="0"/>
+          <a:chOff x="0" y="0"/>
+          <a:chExt cx="0" cy="0"/>
+        </a:xfrm>
+      </p:grpSpPr>
+      <p:sp>
+        <p:nvSpPr>
+          <p:cNvPr id="2" name="1 Marcador de imagen de diapositiva"/>
+          <p:cNvSpPr>
+            <a:spLocks noGrp="1" noRot="1" noChangeAspect="1"/>
+          </p:cNvSpPr>
+          <p:nvPr>
+            <p:ph type="sldImg"/>
+          </p:nvPr>
+        </p:nvSpPr>
+        <p:spPr/>
+      </p:sp>
+      <p:sp>
+        <p:nvSpPr>
+          <p:cNvPr id="3" name="2 Marcador de notas"/>
+          <p:cNvSpPr>
+            <a:spLocks noGrp="1"/>
+          </p:cNvSpPr>
+          <p:nvPr>
+            <p:ph type="body" idx="1"/>
+          </p:nvPr>
+        </p:nvSpPr>
+        <p:spPr/>
+        <p:txBody>
+          <a:bodyPr>
+            <a:normAutofit/>
+          </a:bodyPr>
+          <a:lstStyle/>
+          <a:p>
+            <a:endParaRPr lang="es-AR" dirty="0"/>
+          </a:p>
+        </p:txBody>
+      </p:sp>
+      <p:sp>
+        <p:nvSpPr>
+          <p:cNvPr id="4" name="3 Marcador de número de diapositiva"/>
+          <p:cNvSpPr>
+            <a:spLocks noGrp="1"/>
+          </p:cNvSpPr>
+          <p:nvPr>
+            <p:ph type="sldNum" sz="quarter" idx="10"/>
+          </p:nvPr>
+        </p:nvSpPr>
+        <p:spPr/>
+        <p:txBody>
+          <a:bodyPr/>
+          <a:lstStyle/>
+          <a:p>
+            <a:fld id="{827EE000-08BA-42E9-8051-6989914F4AEC}" type="slidenum">
+              <a:rPr lang="es-AR" smtClean="0"/>
+              <a:pPr/>
+              <a:t>1</a:t>
+            </a:fld>
+            <a:endParaRPr lang="es-AR"/>
+          </a:p>
+        </p:txBody>
+      </p:sp>
+    </p:spTree>
+  </p:cSld>
+  <p:clrMapOvr>
+    <a:masterClrMapping/>
+  </p:clrMapOvr>
+</p:notes>
+</file>
+
 <file path=ppt/slideLayouts/slideLayout1.xml><?xml version="1.0" encoding="utf-8"?>
 <p:sldLayout xmlns:a="http://schemas.openxmlformats.org/drawingml/2006/main" xmlns:r="http://schemas.openxmlformats.org/officeDocument/2006/relationships" xmlns:p="http://schemas.openxmlformats.org/presentationml/2006/main" type="title" preserve="1">
   <p:cSld name="Diapositiva de título">
@@ -295,7 +1270,8 @@
           <a:p>
             <a:fld id="{00D03AD9-B274-4317-8993-B21EFD32709D}" type="datetimeFigureOut">
               <a:rPr lang="es-AR" smtClean="0"/>
-              <a:t>21/04/2012</a:t>
+              <a:pPr/>
+              <a:t>26/04/2012</a:t>
             </a:fld>
             <a:endParaRPr lang="es-AR"/>
           </a:p>
@@ -337,7 +1313,8 @@
           <a:p>
             <a:fld id="{3F2D9CC0-97DE-46BA-A91E-5E70B2C519B4}" type="slidenum">
               <a:rPr lang="es-AR" smtClean="0"/>
-              <a:t>‹#›</a:t>
+              <a:pPr/>
+              <a:t>‹Nº›</a:t>
             </a:fld>
             <a:endParaRPr lang="es-AR"/>
           </a:p>
@@ -346,7 +1323,7 @@
     </p:spTree>
     <p:extLst>
       <p:ext uri="{BB962C8B-B14F-4D97-AF65-F5344CB8AC3E}">
-        <p14:creationId xmlns:p14="http://schemas.microsoft.com/office/powerpoint/2010/main" val="4216029542"/>
+        <p14:creationId xmlns:p14="http://schemas.microsoft.com/office/powerpoint/2010/main" xmlns="" val="4216029542"/>
       </p:ext>
     </p:extLst>
   </p:cSld>
@@ -465,7 +1442,8 @@
           <a:p>
             <a:fld id="{00D03AD9-B274-4317-8993-B21EFD32709D}" type="datetimeFigureOut">
               <a:rPr lang="es-AR" smtClean="0"/>
-              <a:t>21/04/2012</a:t>
+              <a:pPr/>
+              <a:t>26/04/2012</a:t>
             </a:fld>
             <a:endParaRPr lang="es-AR"/>
           </a:p>
@@ -507,7 +1485,8 @@
           <a:p>
             <a:fld id="{3F2D9CC0-97DE-46BA-A91E-5E70B2C519B4}" type="slidenum">
               <a:rPr lang="es-AR" smtClean="0"/>
-              <a:t>‹#›</a:t>
+              <a:pPr/>
+              <a:t>‹Nº›</a:t>
             </a:fld>
             <a:endParaRPr lang="es-AR"/>
           </a:p>
@@ -516,7 +1495,7 @@
     </p:spTree>
     <p:extLst>
       <p:ext uri="{BB962C8B-B14F-4D97-AF65-F5344CB8AC3E}">
-        <p14:creationId xmlns:p14="http://schemas.microsoft.com/office/powerpoint/2010/main" val="1477062740"/>
+        <p14:creationId xmlns:p14="http://schemas.microsoft.com/office/powerpoint/2010/main" xmlns="" val="1477062740"/>
       </p:ext>
     </p:extLst>
   </p:cSld>
@@ -645,7 +1624,8 @@
           <a:p>
             <a:fld id="{00D03AD9-B274-4317-8993-B21EFD32709D}" type="datetimeFigureOut">
               <a:rPr lang="es-AR" smtClean="0"/>
-              <a:t>21/04/2012</a:t>
+              <a:pPr/>
+              <a:t>26/04/2012</a:t>
             </a:fld>
             <a:endParaRPr lang="es-AR"/>
           </a:p>
@@ -687,7 +1667,8 @@
           <a:p>
             <a:fld id="{3F2D9CC0-97DE-46BA-A91E-5E70B2C519B4}" type="slidenum">
               <a:rPr lang="es-AR" smtClean="0"/>
-              <a:t>‹#›</a:t>
+              <a:pPr/>
+              <a:t>‹Nº›</a:t>
             </a:fld>
             <a:endParaRPr lang="es-AR"/>
           </a:p>
@@ -696,7 +1677,7 @@
     </p:spTree>
     <p:extLst>
       <p:ext uri="{BB962C8B-B14F-4D97-AF65-F5344CB8AC3E}">
-        <p14:creationId xmlns:p14="http://schemas.microsoft.com/office/powerpoint/2010/main" val="223054616"/>
+        <p14:creationId xmlns:p14="http://schemas.microsoft.com/office/powerpoint/2010/main" xmlns="" val="223054616"/>
       </p:ext>
     </p:extLst>
   </p:cSld>
@@ -815,7 +1796,8 @@
           <a:p>
             <a:fld id="{00D03AD9-B274-4317-8993-B21EFD32709D}" type="datetimeFigureOut">
               <a:rPr lang="es-AR" smtClean="0"/>
-              <a:t>21/04/2012</a:t>
+              <a:pPr/>
+              <a:t>26/04/2012</a:t>
             </a:fld>
             <a:endParaRPr lang="es-AR"/>
           </a:p>
@@ -857,7 +1839,8 @@
           <a:p>
             <a:fld id="{3F2D9CC0-97DE-46BA-A91E-5E70B2C519B4}" type="slidenum">
               <a:rPr lang="es-AR" smtClean="0"/>
-              <a:t>‹#›</a:t>
+              <a:pPr/>
+              <a:t>‹Nº›</a:t>
             </a:fld>
             <a:endParaRPr lang="es-AR"/>
           </a:p>
@@ -866,7 +1849,7 @@
     </p:spTree>
     <p:extLst>
       <p:ext uri="{BB962C8B-B14F-4D97-AF65-F5344CB8AC3E}">
-        <p14:creationId xmlns:p14="http://schemas.microsoft.com/office/powerpoint/2010/main" val="1914491051"/>
+        <p14:creationId xmlns:p14="http://schemas.microsoft.com/office/powerpoint/2010/main" xmlns="" val="1914491051"/>
       </p:ext>
     </p:extLst>
   </p:cSld>
@@ -1061,7 +2044,8 @@
           <a:p>
             <a:fld id="{00D03AD9-B274-4317-8993-B21EFD32709D}" type="datetimeFigureOut">
               <a:rPr lang="es-AR" smtClean="0"/>
-              <a:t>21/04/2012</a:t>
+              <a:pPr/>
+              <a:t>26/04/2012</a:t>
             </a:fld>
             <a:endParaRPr lang="es-AR"/>
           </a:p>
@@ -1103,7 +2087,8 @@
           <a:p>
             <a:fld id="{3F2D9CC0-97DE-46BA-A91E-5E70B2C519B4}" type="slidenum">
               <a:rPr lang="es-AR" smtClean="0"/>
-              <a:t>‹#›</a:t>
+              <a:pPr/>
+              <a:t>‹Nº›</a:t>
             </a:fld>
             <a:endParaRPr lang="es-AR"/>
           </a:p>
@@ -1112,7 +2097,7 @@
     </p:spTree>
     <p:extLst>
       <p:ext uri="{BB962C8B-B14F-4D97-AF65-F5344CB8AC3E}">
-        <p14:creationId xmlns:p14="http://schemas.microsoft.com/office/powerpoint/2010/main" val="3655691279"/>
+        <p14:creationId xmlns:p14="http://schemas.microsoft.com/office/powerpoint/2010/main" xmlns="" val="3655691279"/>
       </p:ext>
     </p:extLst>
   </p:cSld>
@@ -1349,7 +2334,8 @@
           <a:p>
             <a:fld id="{00D03AD9-B274-4317-8993-B21EFD32709D}" type="datetimeFigureOut">
               <a:rPr lang="es-AR" smtClean="0"/>
-              <a:t>21/04/2012</a:t>
+              <a:pPr/>
+              <a:t>26/04/2012</a:t>
             </a:fld>
             <a:endParaRPr lang="es-AR"/>
           </a:p>
@@ -1391,7 +2377,8 @@
           <a:p>
             <a:fld id="{3F2D9CC0-97DE-46BA-A91E-5E70B2C519B4}" type="slidenum">
               <a:rPr lang="es-AR" smtClean="0"/>
-              <a:t>‹#›</a:t>
+              <a:pPr/>
+              <a:t>‹Nº›</a:t>
             </a:fld>
             <a:endParaRPr lang="es-AR"/>
           </a:p>
@@ -1400,7 +2387,7 @@
     </p:spTree>
     <p:extLst>
       <p:ext uri="{BB962C8B-B14F-4D97-AF65-F5344CB8AC3E}">
-        <p14:creationId xmlns:p14="http://schemas.microsoft.com/office/powerpoint/2010/main" val="3243285389"/>
+        <p14:creationId xmlns:p14="http://schemas.microsoft.com/office/powerpoint/2010/main" xmlns="" val="3243285389"/>
       </p:ext>
     </p:extLst>
   </p:cSld>
@@ -1771,7 +2758,8 @@
           <a:p>
             <a:fld id="{00D03AD9-B274-4317-8993-B21EFD32709D}" type="datetimeFigureOut">
               <a:rPr lang="es-AR" smtClean="0"/>
-              <a:t>21/04/2012</a:t>
+              <a:pPr/>
+              <a:t>26/04/2012</a:t>
             </a:fld>
             <a:endParaRPr lang="es-AR"/>
           </a:p>
@@ -1813,7 +2801,8 @@
           <a:p>
             <a:fld id="{3F2D9CC0-97DE-46BA-A91E-5E70B2C519B4}" type="slidenum">
               <a:rPr lang="es-AR" smtClean="0"/>
-              <a:t>‹#›</a:t>
+              <a:pPr/>
+              <a:t>‹Nº›</a:t>
             </a:fld>
             <a:endParaRPr lang="es-AR"/>
           </a:p>
@@ -1822,7 +2811,7 @@
     </p:spTree>
     <p:extLst>
       <p:ext uri="{BB962C8B-B14F-4D97-AF65-F5344CB8AC3E}">
-        <p14:creationId xmlns:p14="http://schemas.microsoft.com/office/powerpoint/2010/main" val="2636274983"/>
+        <p14:creationId xmlns:p14="http://schemas.microsoft.com/office/powerpoint/2010/main" xmlns="" val="2636274983"/>
       </p:ext>
     </p:extLst>
   </p:cSld>
@@ -1889,7 +2878,8 @@
           <a:p>
             <a:fld id="{00D03AD9-B274-4317-8993-B21EFD32709D}" type="datetimeFigureOut">
               <a:rPr lang="es-AR" smtClean="0"/>
-              <a:t>21/04/2012</a:t>
+              <a:pPr/>
+              <a:t>26/04/2012</a:t>
             </a:fld>
             <a:endParaRPr lang="es-AR"/>
           </a:p>
@@ -1931,7 +2921,8 @@
           <a:p>
             <a:fld id="{3F2D9CC0-97DE-46BA-A91E-5E70B2C519B4}" type="slidenum">
               <a:rPr lang="es-AR" smtClean="0"/>
-              <a:t>‹#›</a:t>
+              <a:pPr/>
+              <a:t>‹Nº›</a:t>
             </a:fld>
             <a:endParaRPr lang="es-AR"/>
           </a:p>
@@ -1940,7 +2931,7 @@
     </p:spTree>
     <p:extLst>
       <p:ext uri="{BB962C8B-B14F-4D97-AF65-F5344CB8AC3E}">
-        <p14:creationId xmlns:p14="http://schemas.microsoft.com/office/powerpoint/2010/main" val="3269143888"/>
+        <p14:creationId xmlns:p14="http://schemas.microsoft.com/office/powerpoint/2010/main" xmlns="" val="3269143888"/>
       </p:ext>
     </p:extLst>
   </p:cSld>
@@ -1984,7 +2975,8 @@
           <a:p>
             <a:fld id="{00D03AD9-B274-4317-8993-B21EFD32709D}" type="datetimeFigureOut">
               <a:rPr lang="es-AR" smtClean="0"/>
-              <a:t>21/04/2012</a:t>
+              <a:pPr/>
+              <a:t>26/04/2012</a:t>
             </a:fld>
             <a:endParaRPr lang="es-AR"/>
           </a:p>
@@ -2026,7 +3018,8 @@
           <a:p>
             <a:fld id="{3F2D9CC0-97DE-46BA-A91E-5E70B2C519B4}" type="slidenum">
               <a:rPr lang="es-AR" smtClean="0"/>
-              <a:t>‹#›</a:t>
+              <a:pPr/>
+              <a:t>‹Nº›</a:t>
             </a:fld>
             <a:endParaRPr lang="es-AR"/>
           </a:p>
@@ -2035,7 +3028,7 @@
     </p:spTree>
     <p:extLst>
       <p:ext uri="{BB962C8B-B14F-4D97-AF65-F5344CB8AC3E}">
-        <p14:creationId xmlns:p14="http://schemas.microsoft.com/office/powerpoint/2010/main" val="1678523345"/>
+        <p14:creationId xmlns:p14="http://schemas.microsoft.com/office/powerpoint/2010/main" xmlns="" val="1678523345"/>
       </p:ext>
     </p:extLst>
   </p:cSld>
@@ -2261,7 +3254,8 @@
           <a:p>
             <a:fld id="{00D03AD9-B274-4317-8993-B21EFD32709D}" type="datetimeFigureOut">
               <a:rPr lang="es-AR" smtClean="0"/>
-              <a:t>21/04/2012</a:t>
+              <a:pPr/>
+              <a:t>26/04/2012</a:t>
             </a:fld>
             <a:endParaRPr lang="es-AR"/>
           </a:p>
@@ -2303,7 +3297,8 @@
           <a:p>
             <a:fld id="{3F2D9CC0-97DE-46BA-A91E-5E70B2C519B4}" type="slidenum">
               <a:rPr lang="es-AR" smtClean="0"/>
-              <a:t>‹#›</a:t>
+              <a:pPr/>
+              <a:t>‹Nº›</a:t>
             </a:fld>
             <a:endParaRPr lang="es-AR"/>
           </a:p>
@@ -2312,7 +3307,7 @@
     </p:spTree>
     <p:extLst>
       <p:ext uri="{BB962C8B-B14F-4D97-AF65-F5344CB8AC3E}">
-        <p14:creationId xmlns:p14="http://schemas.microsoft.com/office/powerpoint/2010/main" val="3056079155"/>
+        <p14:creationId xmlns:p14="http://schemas.microsoft.com/office/powerpoint/2010/main" xmlns="" val="3056079155"/>
       </p:ext>
     </p:extLst>
   </p:cSld>
@@ -2514,7 +3509,8 @@
           <a:p>
             <a:fld id="{00D03AD9-B274-4317-8993-B21EFD32709D}" type="datetimeFigureOut">
               <a:rPr lang="es-AR" smtClean="0"/>
-              <a:t>21/04/2012</a:t>
+              <a:pPr/>
+              <a:t>26/04/2012</a:t>
             </a:fld>
             <a:endParaRPr lang="es-AR"/>
           </a:p>
@@ -2556,7 +3552,8 @@
           <a:p>
             <a:fld id="{3F2D9CC0-97DE-46BA-A91E-5E70B2C519B4}" type="slidenum">
               <a:rPr lang="es-AR" smtClean="0"/>
-              <a:t>‹#›</a:t>
+              <a:pPr/>
+              <a:t>‹Nº›</a:t>
             </a:fld>
             <a:endParaRPr lang="es-AR"/>
           </a:p>
@@ -2565,7 +3562,7 @@
     </p:spTree>
     <p:extLst>
       <p:ext uri="{BB962C8B-B14F-4D97-AF65-F5344CB8AC3E}">
-        <p14:creationId xmlns:p14="http://schemas.microsoft.com/office/powerpoint/2010/main" val="2796445100"/>
+        <p14:creationId xmlns:p14="http://schemas.microsoft.com/office/powerpoint/2010/main" xmlns="" val="2796445100"/>
       </p:ext>
     </p:extLst>
   </p:cSld>
@@ -2581,7 +3578,7 @@
     <p:bg>
       <p:bgPr>
         <a:blipFill dpi="0" rotWithShape="1">
-          <a:blip r:embed="rId13">
+          <a:blip r:embed="rId13" cstate="print">
             <a:lum/>
           </a:blip>
           <a:srcRect/>
@@ -2736,7 +3733,8 @@
           <a:p>
             <a:fld id="{00D03AD9-B274-4317-8993-B21EFD32709D}" type="datetimeFigureOut">
               <a:rPr lang="es-AR" smtClean="0"/>
-              <a:t>21/04/2012</a:t>
+              <a:pPr/>
+              <a:t>26/04/2012</a:t>
             </a:fld>
             <a:endParaRPr lang="es-AR"/>
           </a:p>
@@ -2814,7 +3812,8 @@
           <a:p>
             <a:fld id="{3F2D9CC0-97DE-46BA-A91E-5E70B2C519B4}" type="slidenum">
               <a:rPr lang="es-AR" smtClean="0"/>
-              <a:t>‹#›</a:t>
+              <a:pPr/>
+              <a:t>‹Nº›</a:t>
             </a:fld>
             <a:endParaRPr lang="es-AR"/>
           </a:p>
@@ -2823,7 +3822,7 @@
     </p:spTree>
     <p:extLst>
       <p:ext uri="{BB962C8B-B14F-4D97-AF65-F5344CB8AC3E}">
-        <p14:creationId xmlns:p14="http://schemas.microsoft.com/office/powerpoint/2010/main" val="2985976193"/>
+        <p14:creationId xmlns:p14="http://schemas.microsoft.com/office/powerpoint/2010/main" xmlns="" val="2985976193"/>
       </p:ext>
     </p:extLst>
   </p:cSld>
@@ -3123,24 +4122,22 @@
         </p:nvSpPr>
         <p:spPr>
           <a:xfrm>
-            <a:off x="323528" y="260648"/>
-            <a:ext cx="2736304" cy="288032"/>
-          </a:xfrm>
-        </p:spPr>
-        <p:txBody>
-          <a:bodyPr>
-            <a:normAutofit fontScale="90000"/>
-          </a:bodyPr>
-          <a:lstStyle/>
-          <a:p>
-            <a:r>
-              <a:rPr lang="es-AR" sz="2000" dirty="0" smtClean="0">
+            <a:off x="611560" y="908720"/>
+            <a:ext cx="7846640" cy="936104"/>
+          </a:xfrm>
+        </p:spPr>
+        <p:txBody>
+          <a:bodyPr/>
+          <a:lstStyle/>
+          <a:p>
+            <a:r>
+              <a:rPr lang="es-AR" dirty="0" smtClean="0">
                 <a:latin typeface="Aharoni" pitchFamily="2" charset="-79"/>
                 <a:cs typeface="Aharoni" pitchFamily="2" charset="-79"/>
               </a:rPr>
               <a:t>Seguridad para Todos</a:t>
             </a:r>
-            <a:endParaRPr lang="es-AR" sz="2000" dirty="0">
+            <a:endParaRPr lang="es-AR" dirty="0">
               <a:latin typeface="Aharoni" pitchFamily="2" charset="-79"/>
               <a:cs typeface="Aharoni" pitchFamily="2" charset="-79"/>
             </a:endParaRPr>
@@ -3159,18 +4156,18 @@
         </p:nvSpPr>
         <p:spPr>
           <a:xfrm>
-            <a:off x="5148064" y="239876"/>
-            <a:ext cx="3960440" cy="380812"/>
+            <a:off x="899592" y="404664"/>
+            <a:ext cx="7416824" cy="504056"/>
           </a:xfrm>
         </p:spPr>
         <p:txBody>
           <a:bodyPr>
-            <a:normAutofit fontScale="47500" lnSpcReduction="20000"/>
+            <a:normAutofit/>
           </a:bodyPr>
           <a:lstStyle/>
           <a:p>
             <a:r>
-              <a:rPr lang="es-AR" dirty="0" smtClean="0">
+              <a:rPr lang="es-AR" sz="2400" dirty="0" smtClean="0">
                 <a:solidFill>
                   <a:schemeClr val="tx1">
                     <a:lumMod val="65000"/>
@@ -3180,7 +4177,7 @@
               </a:rPr>
               <a:t>75.45 - Taller de Desarrollo de Proyectos I</a:t>
             </a:r>
-            <a:endParaRPr lang="es-AR" dirty="0">
+            <a:endParaRPr lang="es-AR" sz="2400" dirty="0">
               <a:solidFill>
                 <a:schemeClr val="tx1">
                   <a:lumMod val="65000"/>
@@ -3193,17 +4190,17 @@
       </p:sp>
       <p:pic>
         <p:nvPicPr>
-          <p:cNvPr id="6" name="Picture 5"/>
+          <p:cNvPr id="4" name="Picture 3"/>
           <p:cNvPicPr>
             <a:picLocks noChangeAspect="1"/>
           </p:cNvPicPr>
           <p:nvPr/>
         </p:nvPicPr>
         <p:blipFill>
-          <a:blip r:embed="rId2" cstate="print">
+          <a:blip r:embed="rId3" cstate="print">
             <a:extLst>
               <a:ext uri="{28A0092B-C50C-407E-A947-70E740481C1C}">
-                <a14:useLocalDpi xmlns:a14="http://schemas.microsoft.com/office/drawing/2010/main" val="0"/>
+                <a14:useLocalDpi xmlns:a14="http://schemas.microsoft.com/office/drawing/2010/main" xmlns="" val="0"/>
               </a:ext>
             </a:extLst>
           </a:blip>
@@ -3213,8 +4210,8 @@
         </p:blipFill>
         <p:spPr>
           <a:xfrm>
-            <a:off x="3203848" y="260648"/>
-            <a:ext cx="468052" cy="277364"/>
+            <a:off x="2555776" y="1916832"/>
+            <a:ext cx="4186283" cy="2601186"/>
           </a:xfrm>
           <a:prstGeom prst="rect">
             <a:avLst/>
@@ -3223,7 +4220,7 @@
       </p:pic>
       <p:sp>
         <p:nvSpPr>
-          <p:cNvPr id="8" name="1 Título"/>
+          <p:cNvPr id="5" name="2 Subtítulo"/>
           <p:cNvSpPr txBox="1">
             <a:spLocks/>
           </p:cNvSpPr>
@@ -3231,500 +4228,160 @@
         </p:nvSpPr>
         <p:spPr>
           <a:xfrm>
-            <a:off x="1702086" y="836712"/>
-            <a:ext cx="5822242" cy="792088"/>
+            <a:off x="827584" y="5877272"/>
+            <a:ext cx="7488832" cy="504056"/>
           </a:xfrm>
           <a:prstGeom prst="rect">
             <a:avLst/>
           </a:prstGeom>
         </p:spPr>
         <p:txBody>
+          <a:bodyPr vert="horz" lIns="91440" tIns="45720" rIns="91440" bIns="45720" rtlCol="0">
+            <a:normAutofit/>
+          </a:bodyPr>
+          <a:lstStyle/>
+          <a:p>
+            <a:pPr marL="0" marR="0" lvl="0" indent="0" algn="ctr" defTabSz="914400" rtl="0" eaLnBrk="1" fontAlgn="auto" latinLnBrk="0" hangingPunct="1">
+              <a:lnSpc>
+                <a:spcPct val="100000"/>
+              </a:lnSpc>
+              <a:spcBef>
+                <a:spcPct val="20000"/>
+              </a:spcBef>
+              <a:spcAft>
+                <a:spcPts val="0"/>
+              </a:spcAft>
+              <a:buClrTx/>
+              <a:buSzTx/>
+              <a:buFont typeface="Arial" pitchFamily="34" charset="0"/>
+              <a:buNone/>
+              <a:tabLst/>
+              <a:defRPr/>
+            </a:pPr>
+            <a:r>
+              <a:rPr kumimoji="0" lang="es-AR" sz="2400" i="0" u="none" strike="noStrike" kern="1200" cap="none" spc="0" normalizeH="0" baseline="0" noProof="0" dirty="0" smtClean="0">
+                <a:ln>
+                  <a:noFill/>
+                </a:ln>
+                <a:effectLst/>
+                <a:uLnTx/>
+                <a:uFillTx/>
+                <a:latin typeface="+mn-lt"/>
+                <a:ea typeface="+mn-ea"/>
+                <a:cs typeface="+mn-cs"/>
+              </a:rPr>
+              <a:t>Grupo N° 5 – 1° cuatrimestre</a:t>
+            </a:r>
+            <a:r>
+              <a:rPr kumimoji="0" lang="es-AR" sz="2400" i="0" u="none" strike="noStrike" kern="1200" cap="none" spc="0" normalizeH="0" noProof="0" dirty="0" smtClean="0">
+                <a:ln>
+                  <a:noFill/>
+                </a:ln>
+                <a:effectLst/>
+                <a:uLnTx/>
+                <a:uFillTx/>
+                <a:latin typeface="+mn-lt"/>
+                <a:ea typeface="+mn-ea"/>
+                <a:cs typeface="+mn-cs"/>
+              </a:rPr>
+              <a:t> 2012</a:t>
+            </a:r>
+            <a:endParaRPr kumimoji="0" lang="es-AR" sz="2400" i="0" u="none" strike="noStrike" kern="1200" cap="none" spc="0" normalizeH="0" baseline="0" noProof="0" dirty="0">
+              <a:ln>
+                <a:noFill/>
+              </a:ln>
+              <a:effectLst/>
+              <a:uLnTx/>
+              <a:uFillTx/>
+              <a:latin typeface="+mn-lt"/>
+              <a:ea typeface="+mn-ea"/>
+              <a:cs typeface="+mn-cs"/>
+            </a:endParaRPr>
+          </a:p>
+        </p:txBody>
+      </p:sp>
+      <p:sp>
+        <p:nvSpPr>
+          <p:cNvPr id="6" name="1 Título"/>
+          <p:cNvSpPr txBox="1">
+            <a:spLocks/>
+          </p:cNvSpPr>
+          <p:nvPr/>
+        </p:nvSpPr>
+        <p:spPr>
+          <a:xfrm>
+            <a:off x="763960" y="4437112"/>
+            <a:ext cx="7846640" cy="936104"/>
+          </a:xfrm>
+          <a:prstGeom prst="rect">
+            <a:avLst/>
+          </a:prstGeom>
+        </p:spPr>
+        <p:txBody>
           <a:bodyPr vert="horz" lIns="91440" tIns="45720" rIns="91440" bIns="45720" rtlCol="0" anchor="ctr">
-            <a:noAutofit/>
+            <a:normAutofit/>
           </a:bodyPr>
-          <a:lstStyle>
-            <a:lvl1pPr algn="ctr" defTabSz="914400" rtl="0" eaLnBrk="1" latinLnBrk="0" hangingPunct="1">
+          <a:lstStyle/>
+          <a:p>
+            <a:pPr lvl="0" algn="ctr">
               <a:spcBef>
                 <a:spcPct val="0"/>
               </a:spcBef>
-              <a:buNone/>
-              <a:defRPr sz="4400" kern="1200">
+            </a:pPr>
+            <a:r>
+              <a:rPr lang="es-AR" sz="4400" dirty="0" err="1" smtClean="0">
                 <a:solidFill>
-                  <a:schemeClr val="tx1"/>
+                  <a:srgbClr val="C00000"/>
                 </a:solidFill>
-                <a:latin typeface="+mj-lt"/>
+                <a:latin typeface="Aharoni" pitchFamily="2" charset="-79"/>
                 <a:ea typeface="+mj-ea"/>
-                <a:cs typeface="+mj-cs"/>
-              </a:defRPr>
-            </a:lvl1pPr>
-          </a:lstStyle>
-          <a:p>
-            <a:r>
-              <a:rPr lang="es-AR" sz="4800" b="1" dirty="0" smtClean="0">
-                <a:latin typeface="Trebuchet MS" pitchFamily="34" charset="0"/>
-                <a:cs typeface="Levenim MT" pitchFamily="2" charset="-79"/>
+                <a:cs typeface="Aharoni" pitchFamily="2" charset="-79"/>
               </a:rPr>
-              <a:t>¿Quiénes Somos?</a:t>
-            </a:r>
-            <a:endParaRPr lang="es-AR" sz="4800" b="1" dirty="0">
-              <a:latin typeface="Trebuchet MS" pitchFamily="34" charset="0"/>
-              <a:cs typeface="Levenim MT" pitchFamily="2" charset="-79"/>
+              <a:t>Panic</a:t>
+            </a:r>
+            <a:r>
+              <a:rPr lang="es-AR" sz="4400" dirty="0" smtClean="0">
+                <a:solidFill>
+                  <a:srgbClr val="C00000"/>
+                </a:solidFill>
+                <a:latin typeface="Aharoni" pitchFamily="2" charset="-79"/>
+                <a:ea typeface="+mj-ea"/>
+                <a:cs typeface="Aharoni" pitchFamily="2" charset="-79"/>
+              </a:rPr>
+              <a:t> Dial </a:t>
+            </a:r>
+            <a:r>
+              <a:rPr lang="es-AR" sz="4400" dirty="0" err="1" smtClean="0">
+                <a:solidFill>
+                  <a:srgbClr val="C00000"/>
+                </a:solidFill>
+                <a:latin typeface="Aharoni" pitchFamily="2" charset="-79"/>
+                <a:ea typeface="+mj-ea"/>
+                <a:cs typeface="Aharoni" pitchFamily="2" charset="-79"/>
+              </a:rPr>
+              <a:t>Button</a:t>
+            </a:r>
+            <a:endParaRPr kumimoji="0" lang="es-AR" sz="4400" b="0" i="0" u="none" strike="noStrike" kern="1200" cap="none" spc="0" normalizeH="0" baseline="0" noProof="0" dirty="0">
+              <a:ln>
+                <a:noFill/>
+              </a:ln>
+              <a:solidFill>
+                <a:srgbClr val="C00000"/>
+              </a:solidFill>
+              <a:effectLst/>
+              <a:uLnTx/>
+              <a:uFillTx/>
+              <a:latin typeface="Aharoni" pitchFamily="2" charset="-79"/>
+              <a:ea typeface="+mj-ea"/>
+              <a:cs typeface="Aharoni" pitchFamily="2" charset="-79"/>
             </a:endParaRPr>
-          </a:p>
-        </p:txBody>
-      </p:sp>
-      <p:cxnSp>
-        <p:nvCxnSpPr>
-          <p:cNvPr id="5" name="Straight Connector 4"/>
-          <p:cNvCxnSpPr/>
-          <p:nvPr/>
-        </p:nvCxnSpPr>
-        <p:spPr>
-          <a:xfrm>
-            <a:off x="395536" y="692696"/>
-            <a:ext cx="8496944" cy="0"/>
-          </a:xfrm>
-          <a:prstGeom prst="line">
-            <a:avLst/>
-          </a:prstGeom>
-          <a:ln>
-            <a:solidFill>
-              <a:schemeClr val="bg1">
-                <a:lumMod val="65000"/>
-              </a:schemeClr>
-            </a:solidFill>
-          </a:ln>
-        </p:spPr>
-        <p:style>
-          <a:lnRef idx="1">
-            <a:schemeClr val="accent1"/>
-          </a:lnRef>
-          <a:fillRef idx="0">
-            <a:schemeClr val="accent1"/>
-          </a:fillRef>
-          <a:effectRef idx="0">
-            <a:schemeClr val="accent1"/>
-          </a:effectRef>
-          <a:fontRef idx="minor">
-            <a:schemeClr val="tx1"/>
-          </a:fontRef>
-        </p:style>
-      </p:cxnSp>
-      <p:sp>
-        <p:nvSpPr>
-          <p:cNvPr id="7" name="TextBox 6"/>
-          <p:cNvSpPr txBox="1"/>
-          <p:nvPr/>
-        </p:nvSpPr>
-        <p:spPr>
-          <a:xfrm>
-            <a:off x="467544" y="1772816"/>
-            <a:ext cx="2736304" cy="3416320"/>
-          </a:xfrm>
-          <a:prstGeom prst="rect">
-            <a:avLst/>
-          </a:prstGeom>
-          <a:noFill/>
-        </p:spPr>
-        <p:txBody>
-          <a:bodyPr wrap="square" rtlCol="0">
-            <a:spAutoFit/>
-          </a:bodyPr>
-          <a:lstStyle/>
-          <a:p>
-            <a:pPr marL="571500" indent="-571500">
-              <a:buFont typeface="Wingdings" pitchFamily="2" charset="2"/>
-              <a:buChar char="§"/>
-            </a:pPr>
-            <a:r>
-              <a:rPr lang="es-AR" sz="3600" dirty="0" smtClean="0"/>
-              <a:t>Agustín</a:t>
-            </a:r>
-          </a:p>
-          <a:p>
-            <a:pPr marL="571500" indent="-571500">
-              <a:buFont typeface="Wingdings" pitchFamily="2" charset="2"/>
-              <a:buChar char="§"/>
-            </a:pPr>
-            <a:r>
-              <a:rPr lang="es-AR" sz="3600" dirty="0"/>
-              <a:t>Axel</a:t>
-            </a:r>
-          </a:p>
-          <a:p>
-            <a:pPr marL="571500" indent="-571500">
-              <a:buFont typeface="Wingdings" pitchFamily="2" charset="2"/>
-              <a:buChar char="§"/>
-            </a:pPr>
-            <a:r>
-              <a:rPr lang="es-AR" sz="3600" dirty="0" smtClean="0"/>
-              <a:t>Ignacio</a:t>
-            </a:r>
-          </a:p>
-          <a:p>
-            <a:pPr marL="571500" indent="-571500">
-              <a:buFont typeface="Wingdings" pitchFamily="2" charset="2"/>
-              <a:buChar char="§"/>
-            </a:pPr>
-            <a:r>
-              <a:rPr lang="es-AR" sz="3600" dirty="0" smtClean="0"/>
-              <a:t>Juan</a:t>
-            </a:r>
-          </a:p>
-          <a:p>
-            <a:pPr marL="571500" indent="-571500">
-              <a:buFont typeface="Wingdings" pitchFamily="2" charset="2"/>
-              <a:buChar char="§"/>
-            </a:pPr>
-            <a:r>
-              <a:rPr lang="es-AR" sz="3600" dirty="0" smtClean="0"/>
-              <a:t>Juan</a:t>
-            </a:r>
-          </a:p>
-          <a:p>
-            <a:pPr marL="571500" indent="-571500">
-              <a:buFont typeface="Wingdings" pitchFamily="2" charset="2"/>
-              <a:buChar char="§"/>
-            </a:pPr>
-            <a:r>
-              <a:rPr lang="es-AR" sz="3600" dirty="0"/>
-              <a:t>Roy</a:t>
-            </a:r>
-            <a:endParaRPr lang="es-AR" sz="3600" dirty="0"/>
-          </a:p>
-        </p:txBody>
-      </p:sp>
-      <p:sp>
-        <p:nvSpPr>
-          <p:cNvPr id="4" name="Right Brace 3"/>
-          <p:cNvSpPr/>
-          <p:nvPr/>
-        </p:nvSpPr>
-        <p:spPr>
-          <a:xfrm>
-            <a:off x="2771800" y="1844824"/>
-            <a:ext cx="432048" cy="3344312"/>
-          </a:xfrm>
-          <a:prstGeom prst="rightBrace">
-            <a:avLst/>
-          </a:prstGeom>
-          <a:ln w="28575">
-            <a:solidFill>
-              <a:schemeClr val="tx1"/>
-            </a:solidFill>
-          </a:ln>
-        </p:spPr>
-        <p:style>
-          <a:lnRef idx="1">
-            <a:schemeClr val="accent1"/>
-          </a:lnRef>
-          <a:fillRef idx="0">
-            <a:schemeClr val="accent1"/>
-          </a:fillRef>
-          <a:effectRef idx="0">
-            <a:schemeClr val="accent1"/>
-          </a:effectRef>
-          <a:fontRef idx="minor">
-            <a:schemeClr val="tx1"/>
-          </a:fontRef>
-        </p:style>
-        <p:txBody>
-          <a:bodyPr rtlCol="0" anchor="ctr"/>
-          <a:lstStyle/>
-          <a:p>
-            <a:pPr algn="ctr"/>
-            <a:endParaRPr lang="es-AR"/>
-          </a:p>
-        </p:txBody>
-      </p:sp>
-      <p:sp>
-        <p:nvSpPr>
-          <p:cNvPr id="9" name="TextBox 8"/>
-          <p:cNvSpPr txBox="1"/>
-          <p:nvPr/>
-        </p:nvSpPr>
-        <p:spPr>
-          <a:xfrm>
-            <a:off x="4744368" y="3182661"/>
-            <a:ext cx="1239168" cy="646331"/>
-          </a:xfrm>
-          <a:prstGeom prst="rect">
-            <a:avLst/>
-          </a:prstGeom>
-          <a:noFill/>
-        </p:spPr>
-        <p:txBody>
-          <a:bodyPr wrap="square" rtlCol="0">
-            <a:spAutoFit/>
-          </a:bodyPr>
-          <a:lstStyle/>
-          <a:p>
-            <a:pPr algn="ctr"/>
-            <a:r>
-              <a:rPr lang="es-AR" sz="3600" dirty="0" smtClean="0"/>
-              <a:t>Ideas</a:t>
-            </a:r>
-            <a:endParaRPr lang="es-AR" sz="3600" dirty="0"/>
-          </a:p>
-        </p:txBody>
-      </p:sp>
-      <p:sp>
-        <p:nvSpPr>
-          <p:cNvPr id="10" name="Right Arrow 9"/>
-          <p:cNvSpPr/>
-          <p:nvPr/>
-        </p:nvSpPr>
-        <p:spPr>
-          <a:xfrm>
-            <a:off x="3563888" y="3344243"/>
-            <a:ext cx="1108472" cy="323166"/>
-          </a:xfrm>
-          <a:prstGeom prst="rightArrow">
-            <a:avLst/>
-          </a:prstGeom>
-        </p:spPr>
-        <p:style>
-          <a:lnRef idx="2">
-            <a:schemeClr val="accent1">
-              <a:shade val="50000"/>
-            </a:schemeClr>
-          </a:lnRef>
-          <a:fillRef idx="1">
-            <a:schemeClr val="accent1"/>
-          </a:fillRef>
-          <a:effectRef idx="0">
-            <a:schemeClr val="accent1"/>
-          </a:effectRef>
-          <a:fontRef idx="minor">
-            <a:schemeClr val="lt1"/>
-          </a:fontRef>
-        </p:style>
-        <p:txBody>
-          <a:bodyPr rtlCol="0" anchor="ctr"/>
-          <a:lstStyle/>
-          <a:p>
-            <a:pPr algn="ctr"/>
-            <a:endParaRPr lang="es-AR"/>
-          </a:p>
-        </p:txBody>
-      </p:sp>
-      <p:sp>
-        <p:nvSpPr>
-          <p:cNvPr id="11" name="Right Arrow 10"/>
-          <p:cNvSpPr/>
-          <p:nvPr/>
-        </p:nvSpPr>
-        <p:spPr>
-          <a:xfrm>
-            <a:off x="5983536" y="3344243"/>
-            <a:ext cx="964728" cy="323166"/>
-          </a:xfrm>
-          <a:prstGeom prst="rightArrow">
-            <a:avLst/>
-          </a:prstGeom>
-        </p:spPr>
-        <p:style>
-          <a:lnRef idx="2">
-            <a:schemeClr val="accent1">
-              <a:shade val="50000"/>
-            </a:schemeClr>
-          </a:lnRef>
-          <a:fillRef idx="1">
-            <a:schemeClr val="accent1"/>
-          </a:fillRef>
-          <a:effectRef idx="0">
-            <a:schemeClr val="accent1"/>
-          </a:effectRef>
-          <a:fontRef idx="minor">
-            <a:schemeClr val="lt1"/>
-          </a:fontRef>
-        </p:style>
-        <p:txBody>
-          <a:bodyPr rtlCol="0" anchor="ctr"/>
-          <a:lstStyle/>
-          <a:p>
-            <a:pPr algn="ctr"/>
-            <a:endParaRPr lang="es-AR"/>
-          </a:p>
-        </p:txBody>
-      </p:sp>
-      <p:sp>
-        <p:nvSpPr>
-          <p:cNvPr id="12" name="TextBox 11"/>
-          <p:cNvSpPr txBox="1"/>
-          <p:nvPr/>
-        </p:nvSpPr>
-        <p:spPr>
-          <a:xfrm>
-            <a:off x="6804248" y="3182661"/>
-            <a:ext cx="2232248" cy="646331"/>
-          </a:xfrm>
-          <a:prstGeom prst="rect">
-            <a:avLst/>
-          </a:prstGeom>
-          <a:noFill/>
-        </p:spPr>
-        <p:txBody>
-          <a:bodyPr wrap="square" rtlCol="0">
-            <a:spAutoFit/>
-          </a:bodyPr>
-          <a:lstStyle/>
-          <a:p>
-            <a:pPr algn="ctr"/>
-            <a:r>
-              <a:rPr lang="es-AR" sz="3600" dirty="0" smtClean="0"/>
-              <a:t>Proyecto</a:t>
-            </a:r>
-            <a:endParaRPr lang="es-AR" sz="3600" dirty="0"/>
-          </a:p>
-        </p:txBody>
-      </p:sp>
-      <p:sp>
-        <p:nvSpPr>
-          <p:cNvPr id="13" name="Right Arrow 12"/>
-          <p:cNvSpPr/>
-          <p:nvPr/>
-        </p:nvSpPr>
-        <p:spPr>
-          <a:xfrm rot="5400000">
-            <a:off x="6109671" y="2734205"/>
-            <a:ext cx="684076" cy="323166"/>
-          </a:xfrm>
-          <a:prstGeom prst="rightArrow">
-            <a:avLst/>
-          </a:prstGeom>
-        </p:spPr>
-        <p:style>
-          <a:lnRef idx="2">
-            <a:schemeClr val="accent1">
-              <a:shade val="50000"/>
-            </a:schemeClr>
-          </a:lnRef>
-          <a:fillRef idx="1">
-            <a:schemeClr val="accent1"/>
-          </a:fillRef>
-          <a:effectRef idx="0">
-            <a:schemeClr val="accent1"/>
-          </a:effectRef>
-          <a:fontRef idx="minor">
-            <a:schemeClr val="lt1"/>
-          </a:fontRef>
-        </p:style>
-        <p:txBody>
-          <a:bodyPr rtlCol="0" anchor="ctr"/>
-          <a:lstStyle/>
-          <a:p>
-            <a:pPr algn="ctr"/>
-            <a:endParaRPr lang="es-AR"/>
-          </a:p>
-        </p:txBody>
-      </p:sp>
-      <p:sp>
-        <p:nvSpPr>
-          <p:cNvPr id="14" name="TextBox 13"/>
-          <p:cNvSpPr txBox="1"/>
-          <p:nvPr/>
-        </p:nvSpPr>
-        <p:spPr>
-          <a:xfrm>
-            <a:off x="4149136" y="1844824"/>
-            <a:ext cx="4480380" cy="646331"/>
-          </a:xfrm>
-          <a:prstGeom prst="rect">
-            <a:avLst/>
-          </a:prstGeom>
-          <a:noFill/>
-        </p:spPr>
-        <p:txBody>
-          <a:bodyPr wrap="square" rtlCol="0">
-            <a:spAutoFit/>
-          </a:bodyPr>
-          <a:lstStyle/>
-          <a:p>
-            <a:pPr algn="ctr"/>
-            <a:r>
-              <a:rPr lang="es-AR" sz="3600" dirty="0" smtClean="0"/>
-              <a:t>Docentes</a:t>
-            </a:r>
-            <a:endParaRPr lang="es-AR" sz="3600" dirty="0"/>
-          </a:p>
-        </p:txBody>
-      </p:sp>
-      <p:sp>
-        <p:nvSpPr>
-          <p:cNvPr id="15" name="Right Arrow 14"/>
-          <p:cNvSpPr/>
-          <p:nvPr/>
-        </p:nvSpPr>
-        <p:spPr>
-          <a:xfrm rot="16200000">
-            <a:off x="3852355" y="3933491"/>
-            <a:ext cx="684076" cy="323166"/>
-          </a:xfrm>
-          <a:prstGeom prst="rightArrow">
-            <a:avLst/>
-          </a:prstGeom>
-        </p:spPr>
-        <p:style>
-          <a:lnRef idx="2">
-            <a:schemeClr val="accent1">
-              <a:shade val="50000"/>
-            </a:schemeClr>
-          </a:lnRef>
-          <a:fillRef idx="1">
-            <a:schemeClr val="accent1"/>
-          </a:fillRef>
-          <a:effectRef idx="0">
-            <a:schemeClr val="accent1"/>
-          </a:effectRef>
-          <a:fontRef idx="minor">
-            <a:schemeClr val="lt1"/>
-          </a:fontRef>
-        </p:style>
-        <p:txBody>
-          <a:bodyPr rtlCol="0" anchor="ctr"/>
-          <a:lstStyle/>
-          <a:p>
-            <a:pPr algn="ctr"/>
-            <a:endParaRPr lang="es-AR"/>
-          </a:p>
-        </p:txBody>
-      </p:sp>
-      <p:sp>
-        <p:nvSpPr>
-          <p:cNvPr id="16" name="TextBox 15"/>
-          <p:cNvSpPr txBox="1"/>
-          <p:nvPr/>
-        </p:nvSpPr>
-        <p:spPr>
-          <a:xfrm>
-            <a:off x="2771800" y="4437112"/>
-            <a:ext cx="2877428" cy="646331"/>
-          </a:xfrm>
-          <a:prstGeom prst="rect">
-            <a:avLst/>
-          </a:prstGeom>
-          <a:noFill/>
-        </p:spPr>
-        <p:txBody>
-          <a:bodyPr wrap="square" rtlCol="0">
-            <a:spAutoFit/>
-          </a:bodyPr>
-          <a:lstStyle/>
-          <a:p>
-            <a:pPr algn="ctr"/>
-            <a:r>
-              <a:rPr lang="es-AR" sz="3600" dirty="0" smtClean="0"/>
-              <a:t>Fruta</a:t>
-            </a:r>
-            <a:endParaRPr lang="es-AR" sz="3600" dirty="0"/>
           </a:p>
         </p:txBody>
       </p:sp>
     </p:spTree>
     <p:extLst>
       <p:ext uri="{BB962C8B-B14F-4D97-AF65-F5344CB8AC3E}">
-        <p14:creationId xmlns:p14="http://schemas.microsoft.com/office/powerpoint/2010/main" val="2688607078"/>
+        <p14:creationId xmlns:p14="http://schemas.microsoft.com/office/powerpoint/2010/main" xmlns="" val="1289667085"/>
       </p:ext>
     </p:extLst>
   </p:cSld>
@@ -3770,22 +4427,24 @@
         </p:nvSpPr>
         <p:spPr>
           <a:xfrm>
-            <a:off x="720310" y="1022871"/>
-            <a:ext cx="7772400" cy="1470025"/>
-          </a:xfrm>
-        </p:spPr>
-        <p:txBody>
-          <a:bodyPr/>
-          <a:lstStyle/>
-          <a:p>
-            <a:r>
-              <a:rPr lang="es-AR" dirty="0" smtClean="0">
+            <a:off x="323528" y="260648"/>
+            <a:ext cx="2736304" cy="288032"/>
+          </a:xfrm>
+        </p:spPr>
+        <p:txBody>
+          <a:bodyPr>
+            <a:normAutofit fontScale="90000"/>
+          </a:bodyPr>
+          <a:lstStyle/>
+          <a:p>
+            <a:r>
+              <a:rPr lang="es-AR" sz="2000" dirty="0" smtClean="0">
                 <a:latin typeface="Aharoni" pitchFamily="2" charset="-79"/>
                 <a:cs typeface="Aharoni" pitchFamily="2" charset="-79"/>
               </a:rPr>
               <a:t>Seguridad para Todos</a:t>
             </a:r>
-            <a:endParaRPr lang="es-AR" dirty="0">
+            <a:endParaRPr lang="es-AR" sz="2000" dirty="0">
               <a:latin typeface="Aharoni" pitchFamily="2" charset="-79"/>
               <a:cs typeface="Aharoni" pitchFamily="2" charset="-79"/>
             </a:endParaRPr>
@@ -3804,18 +4463,18 @@
         </p:nvSpPr>
         <p:spPr>
           <a:xfrm>
-            <a:off x="827584" y="548680"/>
-            <a:ext cx="7488832" cy="720080"/>
+            <a:off x="5148064" y="239876"/>
+            <a:ext cx="3960440" cy="380812"/>
           </a:xfrm>
         </p:spPr>
         <p:txBody>
           <a:bodyPr>
-            <a:normAutofit/>
+            <a:normAutofit fontScale="47500" lnSpcReduction="20000"/>
           </a:bodyPr>
           <a:lstStyle/>
           <a:p>
             <a:r>
-              <a:rPr lang="es-AR" sz="2400" dirty="0" smtClean="0">
+              <a:rPr lang="es-AR" dirty="0" smtClean="0">
                 <a:solidFill>
                   <a:schemeClr val="tx1">
                     <a:lumMod val="65000"/>
@@ -3825,7 +4484,7 @@
               </a:rPr>
               <a:t>75.45 - Taller de Desarrollo de Proyectos I</a:t>
             </a:r>
-            <a:endParaRPr lang="es-AR" sz="2400" dirty="0">
+            <a:endParaRPr lang="es-AR" dirty="0">
               <a:solidFill>
                 <a:schemeClr val="tx1">
                   <a:lumMod val="65000"/>
@@ -3838,17 +4497,17 @@
       </p:sp>
       <p:pic>
         <p:nvPicPr>
-          <p:cNvPr id="4" name="Picture 3"/>
+          <p:cNvPr id="6" name="Picture 5"/>
           <p:cNvPicPr>
             <a:picLocks noChangeAspect="1"/>
           </p:cNvPicPr>
           <p:nvPr/>
         </p:nvPicPr>
         <p:blipFill>
-          <a:blip r:embed="rId2">
+          <a:blip r:embed="rId2" cstate="print">
             <a:extLst>
               <a:ext uri="{28A0092B-C50C-407E-A947-70E740481C1C}">
-                <a14:useLocalDpi xmlns:a14="http://schemas.microsoft.com/office/drawing/2010/main" val="0"/>
+                <a14:useLocalDpi xmlns:a14="http://schemas.microsoft.com/office/drawing/2010/main" xmlns="" val="0"/>
               </a:ext>
             </a:extLst>
           </a:blip>
@@ -3858,18 +4517,138 @@
         </p:blipFill>
         <p:spPr>
           <a:xfrm>
-            <a:off x="2699792" y="2483998"/>
-            <a:ext cx="4186283" cy="2601186"/>
+            <a:off x="3203848" y="260648"/>
+            <a:ext cx="468052" cy="277364"/>
           </a:xfrm>
           <a:prstGeom prst="rect">
             <a:avLst/>
           </a:prstGeom>
         </p:spPr>
       </p:pic>
+      <p:sp>
+        <p:nvSpPr>
+          <p:cNvPr id="8" name="1 Título"/>
+          <p:cNvSpPr txBox="1">
+            <a:spLocks/>
+          </p:cNvSpPr>
+          <p:nvPr/>
+        </p:nvSpPr>
+        <p:spPr>
+          <a:xfrm>
+            <a:off x="1660879" y="836712"/>
+            <a:ext cx="5822242" cy="792088"/>
+          </a:xfrm>
+          <a:prstGeom prst="rect">
+            <a:avLst/>
+          </a:prstGeom>
+        </p:spPr>
+        <p:txBody>
+          <a:bodyPr vert="horz" lIns="91440" tIns="45720" rIns="91440" bIns="45720" rtlCol="0" anchor="ctr">
+            <a:noAutofit/>
+          </a:bodyPr>
+          <a:lstStyle>
+            <a:lvl1pPr algn="ctr" defTabSz="914400" rtl="0" eaLnBrk="1" latinLnBrk="0" hangingPunct="1">
+              <a:spcBef>
+                <a:spcPct val="0"/>
+              </a:spcBef>
+              <a:buNone/>
+              <a:defRPr sz="4400" kern="1200">
+                <a:solidFill>
+                  <a:schemeClr val="tx1"/>
+                </a:solidFill>
+                <a:latin typeface="+mj-lt"/>
+                <a:ea typeface="+mj-ea"/>
+                <a:cs typeface="+mj-cs"/>
+              </a:defRPr>
+            </a:lvl1pPr>
+          </a:lstStyle>
+          <a:p>
+            <a:r>
+              <a:rPr lang="es-AR" sz="4800" b="1" dirty="0" smtClean="0">
+                <a:latin typeface="Trebuchet MS" pitchFamily="34" charset="0"/>
+                <a:cs typeface="Levenim MT" pitchFamily="2" charset="-79"/>
+              </a:rPr>
+              <a:t>¿Quiénes Somos?</a:t>
+            </a:r>
+            <a:endParaRPr lang="es-AR" sz="4800" b="1" dirty="0">
+              <a:latin typeface="Trebuchet MS" pitchFamily="34" charset="0"/>
+              <a:cs typeface="Levenim MT" pitchFamily="2" charset="-79"/>
+            </a:endParaRPr>
+          </a:p>
+        </p:txBody>
+      </p:sp>
+      <p:cxnSp>
+        <p:nvCxnSpPr>
+          <p:cNvPr id="5" name="Straight Connector 4"/>
+          <p:cNvCxnSpPr/>
+          <p:nvPr/>
+        </p:nvCxnSpPr>
+        <p:spPr>
+          <a:xfrm>
+            <a:off x="395536" y="692696"/>
+            <a:ext cx="8496944" cy="0"/>
+          </a:xfrm>
+          <a:prstGeom prst="line">
+            <a:avLst/>
+          </a:prstGeom>
+          <a:ln>
+            <a:solidFill>
+              <a:schemeClr val="bg1">
+                <a:lumMod val="65000"/>
+              </a:schemeClr>
+            </a:solidFill>
+          </a:ln>
+        </p:spPr>
+        <p:style>
+          <a:lnRef idx="1">
+            <a:schemeClr val="accent1"/>
+          </a:lnRef>
+          <a:fillRef idx="0">
+            <a:schemeClr val="accent1"/>
+          </a:fillRef>
+          <a:effectRef idx="0">
+            <a:schemeClr val="accent1"/>
+          </a:effectRef>
+          <a:fontRef idx="minor">
+            <a:schemeClr val="tx1"/>
+          </a:fontRef>
+        </p:style>
+      </p:cxnSp>
+      <p:sp>
+        <p:nvSpPr>
+          <p:cNvPr id="20" name="19 CuadroTexto"/>
+          <p:cNvSpPr txBox="1"/>
+          <p:nvPr/>
+        </p:nvSpPr>
+        <p:spPr>
+          <a:xfrm>
+            <a:off x="373397" y="2204864"/>
+            <a:ext cx="8397205" cy="3416320"/>
+          </a:xfrm>
+          <a:prstGeom prst="rect">
+            <a:avLst/>
+          </a:prstGeom>
+          <a:noFill/>
+        </p:spPr>
+        <p:txBody>
+          <a:bodyPr wrap="square" rtlCol="0">
+            <a:spAutoFit/>
+          </a:bodyPr>
+          <a:lstStyle/>
+          <a:p>
+            <a:pPr algn="just"/>
+            <a:r>
+              <a:rPr lang="es-AR" sz="3600" dirty="0" smtClean="0"/>
+              <a:t>Somos una organización joven que nos proponemos ofrecer un método alternativo, superior y más eficiente a los servicios ya existentes de emergencias, que garantice prevenir y actuar rápidamente ante eventuales situaciones de inseguridad.</a:t>
+            </a:r>
+            <a:endParaRPr lang="es-AR" sz="3600" dirty="0"/>
+          </a:p>
+        </p:txBody>
+      </p:sp>
     </p:spTree>
     <p:extLst>
       <p:ext uri="{BB962C8B-B14F-4D97-AF65-F5344CB8AC3E}">
-        <p14:creationId xmlns:p14="http://schemas.microsoft.com/office/powerpoint/2010/main" val="1289667085"/>
+        <p14:creationId xmlns:p14="http://schemas.microsoft.com/office/powerpoint/2010/main" xmlns="" val="2688607078"/>
       </p:ext>
     </p:extLst>
   </p:cSld>
@@ -3995,7 +4774,7 @@
           <a:blip r:embed="rId2" cstate="print">
             <a:extLst>
               <a:ext uri="{28A0092B-C50C-407E-A947-70E740481C1C}">
-                <a14:useLocalDpi xmlns:a14="http://schemas.microsoft.com/office/drawing/2010/main" val="0"/>
+                <a14:useLocalDpi xmlns:a14="http://schemas.microsoft.com/office/drawing/2010/main" xmlns="" val="0"/>
               </a:ext>
             </a:extLst>
           </a:blip>
@@ -4023,7 +4802,7 @@
         </p:nvSpPr>
         <p:spPr>
           <a:xfrm>
-            <a:off x="1054014" y="836712"/>
+            <a:off x="1012807" y="836712"/>
             <a:ext cx="7118386" cy="792088"/>
           </a:xfrm>
           <a:prstGeom prst="rect">
@@ -4056,14 +4835,7 @@
                 <a:latin typeface="Trebuchet MS" pitchFamily="34" charset="0"/>
                 <a:cs typeface="Levenim MT" pitchFamily="2" charset="-79"/>
               </a:rPr>
-              <a:t>Objetiv</a:t>
-            </a:r>
-            <a:r>
-              <a:rPr lang="es-AR" sz="4800" b="1" dirty="0">
-                <a:latin typeface="Trebuchet MS" pitchFamily="34" charset="0"/>
-                <a:cs typeface="Levenim MT" pitchFamily="2" charset="-79"/>
-              </a:rPr>
-              <a:t>o</a:t>
+              <a:t>Nuestros Objetivos</a:t>
             </a:r>
             <a:endParaRPr lang="es-AR" sz="4800" b="1" dirty="0">
               <a:latin typeface="Trebuchet MS" pitchFamily="34" charset="0"/>
@@ -4117,8 +4889,8 @@
         </p:nvSpPr>
         <p:spPr>
           <a:xfrm>
-            <a:off x="467544" y="1772816"/>
-            <a:ext cx="8352928" cy="3416320"/>
+            <a:off x="395536" y="2276872"/>
+            <a:ext cx="8352928" cy="2862322"/>
           </a:xfrm>
           <a:prstGeom prst="rect">
             <a:avLst/>
@@ -4137,17 +4909,8 @@
             </a:pPr>
             <a:r>
               <a:rPr lang="es-AR" sz="3600" dirty="0" smtClean="0"/>
-              <a:t>Mejorar </a:t>
-            </a:r>
-            <a:r>
-              <a:rPr lang="es-AR" sz="3600" dirty="0"/>
-              <a:t>la Calidad de Vida</a:t>
-            </a:r>
-            <a:r>
-              <a:rPr lang="es-AR" sz="3600" dirty="0" smtClean="0"/>
-              <a:t>.</a:t>
-            </a:r>
-            <a:endParaRPr lang="es-AR" sz="3600" dirty="0" smtClean="0"/>
+              <a:t>Herramienta de localización rápida y efectiva.</a:t>
+            </a:r>
           </a:p>
           <a:p>
             <a:pPr marL="571500" indent="-571500">
@@ -4156,11 +4919,7 @@
             </a:pPr>
             <a:r>
               <a:rPr lang="es-AR" sz="3600" dirty="0" smtClean="0"/>
-              <a:t>Incrementar la Seguridad</a:t>
-            </a:r>
-            <a:r>
-              <a:rPr lang="es-AR" sz="3600" dirty="0" smtClean="0"/>
-              <a:t>.</a:t>
+              <a:t>Sincronizada con agentes de seguridad.</a:t>
             </a:r>
           </a:p>
           <a:p>
@@ -4170,7 +4929,23 @@
             </a:pPr>
             <a:r>
               <a:rPr lang="es-AR" sz="3600" dirty="0" smtClean="0"/>
-              <a:t>Reducir la Criminalidad.</a:t>
+              <a:t>Mejorar </a:t>
+            </a:r>
+            <a:r>
+              <a:rPr lang="es-AR" sz="3600" dirty="0"/>
+              <a:t>la </a:t>
+            </a:r>
+            <a:r>
+              <a:rPr lang="es-AR" sz="3600" dirty="0" smtClean="0"/>
+              <a:t>calidad </a:t>
+            </a:r>
+            <a:r>
+              <a:rPr lang="es-AR" sz="3600" dirty="0"/>
+              <a:t>de </a:t>
+            </a:r>
+            <a:r>
+              <a:rPr lang="es-AR" sz="3600" dirty="0" smtClean="0"/>
+              <a:t>vida.</a:t>
             </a:r>
           </a:p>
           <a:p>
@@ -4180,36 +4955,15 @@
             </a:pPr>
             <a:r>
               <a:rPr lang="es-AR" sz="3600" dirty="0" smtClean="0"/>
-              <a:t>Herramienta de Localización.</a:t>
-            </a:r>
-          </a:p>
-          <a:p>
-            <a:pPr marL="571500" indent="-571500">
-              <a:buFont typeface="Wingdings" pitchFamily="2" charset="2"/>
-              <a:buChar char="§"/>
-            </a:pPr>
-            <a:r>
-              <a:rPr lang="es-AR" sz="3600" dirty="0" smtClean="0"/>
-              <a:t>Mal </a:t>
-            </a:r>
-            <a:r>
-              <a:rPr lang="es-AR" sz="3600" dirty="0"/>
-              <a:t>uso debe estar penado por Ley.</a:t>
-            </a:r>
-          </a:p>
-          <a:p>
-            <a:pPr marL="571500" indent="-571500">
-              <a:buFont typeface="Wingdings" pitchFamily="2" charset="2"/>
-              <a:buChar char="§"/>
-            </a:pPr>
-            <a:endParaRPr lang="es-AR" sz="3600" dirty="0" smtClean="0"/>
+              <a:t>Reducir la criminalidad.</a:t>
+            </a:r>
           </a:p>
         </p:txBody>
       </p:sp>
     </p:spTree>
     <p:extLst>
       <p:ext uri="{BB962C8B-B14F-4D97-AF65-F5344CB8AC3E}">
-        <p14:creationId xmlns:p14="http://schemas.microsoft.com/office/powerpoint/2010/main" val="1212818162"/>
+        <p14:creationId xmlns:p14="http://schemas.microsoft.com/office/powerpoint/2010/main" xmlns="" val="1212818162"/>
       </p:ext>
     </p:extLst>
   </p:cSld>
@@ -4335,7 +5089,7 @@
           <a:blip r:embed="rId2" cstate="print">
             <a:extLst>
               <a:ext uri="{28A0092B-C50C-407E-A947-70E740481C1C}">
-                <a14:useLocalDpi xmlns:a14="http://schemas.microsoft.com/office/drawing/2010/main" val="0"/>
+                <a14:useLocalDpi xmlns:a14="http://schemas.microsoft.com/office/drawing/2010/main" xmlns="" val="0"/>
               </a:ext>
             </a:extLst>
           </a:blip>
@@ -4363,7 +5117,7 @@
         </p:nvSpPr>
         <p:spPr>
           <a:xfrm>
-            <a:off x="1054014" y="836712"/>
+            <a:off x="1012807" y="836712"/>
             <a:ext cx="7118386" cy="792088"/>
           </a:xfrm>
           <a:prstGeom prst="rect">
@@ -4396,7 +5150,7 @@
                 <a:latin typeface="Trebuchet MS" pitchFamily="34" charset="0"/>
                 <a:cs typeface="Levenim MT" pitchFamily="2" charset="-79"/>
               </a:rPr>
-              <a:t>Presupuesto</a:t>
+              <a:t>Tipos de Clientes</a:t>
             </a:r>
             <a:endParaRPr lang="es-AR" sz="4800" b="1" dirty="0">
               <a:latin typeface="Trebuchet MS" pitchFamily="34" charset="0"/>
@@ -4450,8 +5204,8 @@
         </p:nvSpPr>
         <p:spPr>
           <a:xfrm>
-            <a:off x="467544" y="1772816"/>
-            <a:ext cx="8352928" cy="646331"/>
+            <a:off x="395536" y="1772816"/>
+            <a:ext cx="8352928" cy="5078313"/>
           </a:xfrm>
           <a:prstGeom prst="rect">
             <a:avLst/>
@@ -4464,18 +5218,112 @@
           </a:bodyPr>
           <a:lstStyle/>
           <a:p>
+            <a:pPr marL="571500" indent="-571500">
+              <a:buFont typeface="Wingdings" pitchFamily="2" charset="2"/>
+              <a:buChar char="§"/>
+            </a:pPr>
             <a:r>
               <a:rPr lang="es-AR" sz="3600" dirty="0" smtClean="0"/>
-              <a:t>????</a:t>
-            </a:r>
-            <a:endParaRPr lang="es-AR" sz="3600" dirty="0" smtClean="0"/>
+              <a:t>Acceso masivo: Ciudadano</a:t>
+            </a:r>
+          </a:p>
+          <a:p>
+            <a:pPr marL="1028700" lvl="1" indent="-571500">
+              <a:buFont typeface="Wingdings" pitchFamily="2" charset="2"/>
+              <a:buChar char="§"/>
+            </a:pPr>
+            <a:r>
+              <a:rPr lang="es-AR" sz="3600" dirty="0" smtClean="0"/>
+              <a:t>Gratuito.</a:t>
+            </a:r>
+          </a:p>
+          <a:p>
+            <a:pPr marL="1028700" lvl="1" indent="-571500">
+              <a:buFont typeface="Wingdings" pitchFamily="2" charset="2"/>
+              <a:buChar char="§"/>
+            </a:pPr>
+            <a:r>
+              <a:rPr lang="es-AR" sz="3600" dirty="0"/>
+              <a:t>Fácil </a:t>
+            </a:r>
+            <a:r>
+              <a:rPr lang="es-AR" sz="3600" dirty="0" smtClean="0"/>
+              <a:t>acceso.</a:t>
+            </a:r>
+          </a:p>
+          <a:p>
+            <a:pPr marL="571500" indent="-571500">
+              <a:buFont typeface="Wingdings" pitchFamily="2" charset="2"/>
+              <a:buChar char="§"/>
+            </a:pPr>
+            <a:r>
+              <a:rPr lang="es-AR" sz="3600" dirty="0"/>
+              <a:t>Planes según necesidades</a:t>
+            </a:r>
+            <a:r>
+              <a:rPr lang="es-AR" sz="3600" dirty="0" smtClean="0"/>
+              <a:t>: Empresarial o Familiar</a:t>
+            </a:r>
+          </a:p>
+          <a:p>
+            <a:pPr marL="1028700" lvl="1" indent="-571500">
+              <a:buFont typeface="Wingdings" pitchFamily="2" charset="2"/>
+              <a:buChar char="§"/>
+            </a:pPr>
+            <a:r>
+              <a:rPr lang="es-AR" sz="3600" dirty="0" smtClean="0"/>
+              <a:t>5 $ARS (90.000 usuarios en 36 meses)</a:t>
+            </a:r>
+          </a:p>
+          <a:p>
+            <a:pPr marL="1028700" lvl="1" indent="-571500">
+              <a:buFont typeface="Wingdings" pitchFamily="2" charset="2"/>
+              <a:buChar char="§"/>
+            </a:pPr>
+            <a:r>
+              <a:rPr lang="es-AR" sz="3600" dirty="0" smtClean="0"/>
+              <a:t>Monitoreo periódico.</a:t>
+            </a:r>
+          </a:p>
+          <a:p>
+            <a:pPr marL="1028700" lvl="1" indent="-571500">
+              <a:buFont typeface="Wingdings" pitchFamily="2" charset="2"/>
+              <a:buChar char="§"/>
+            </a:pPr>
+            <a:r>
+              <a:rPr lang="es-AR" sz="3600" dirty="0"/>
+              <a:t>Alarmas de </a:t>
+            </a:r>
+            <a:r>
+              <a:rPr lang="es-AR" sz="3600" dirty="0" smtClean="0"/>
+              <a:t>zona peligrosa.</a:t>
+            </a:r>
+          </a:p>
+          <a:p>
+            <a:pPr marL="1028700" lvl="1" indent="-571500">
+              <a:buFont typeface="Wingdings" pitchFamily="2" charset="2"/>
+              <a:buChar char="§"/>
+            </a:pPr>
+            <a:r>
+              <a:rPr lang="es-AR" sz="3600" dirty="0"/>
+              <a:t>Esquema de </a:t>
+            </a:r>
+            <a:r>
+              <a:rPr lang="es-AR" sz="3600" dirty="0" err="1" smtClean="0"/>
+              <a:t>check-points</a:t>
+            </a:r>
+            <a:r>
+              <a:rPr lang="es-AR" sz="3600" dirty="0" smtClean="0"/>
+              <a:t>.</a:t>
+            </a:r>
+            <a:endParaRPr lang="es-AR" sz="3600" dirty="0"/>
           </a:p>
         </p:txBody>
       </p:sp>
     </p:spTree>
     <p:extLst>
       <p:ext uri="{BB962C8B-B14F-4D97-AF65-F5344CB8AC3E}">
-        <p14:creationId xmlns:p14="http://schemas.microsoft.com/office/powerpoint/2010/main" val="3410899011"/>
+        <p14:creationId xmlns:p14="http://schemas.microsoft.com/office/powerpoint/2010/main" xmlns="" val="72379645"/>
       </p:ext>
     </p:extLst>
   </p:cSld>
@@ -4601,7 +5449,7 @@
           <a:blip r:embed="rId2" cstate="print">
             <a:extLst>
               <a:ext uri="{28A0092B-C50C-407E-A947-70E740481C1C}">
-                <a14:useLocalDpi xmlns:a14="http://schemas.microsoft.com/office/drawing/2010/main" val="0"/>
+                <a14:useLocalDpi xmlns:a14="http://schemas.microsoft.com/office/drawing/2010/main" xmlns="" val="0"/>
               </a:ext>
             </a:extLst>
           </a:blip>
@@ -4629,7 +5477,7 @@
         </p:nvSpPr>
         <p:spPr>
           <a:xfrm>
-            <a:off x="1054014" y="836712"/>
+            <a:off x="1012807" y="836712"/>
             <a:ext cx="7118386" cy="792088"/>
           </a:xfrm>
           <a:prstGeom prst="rect">
@@ -4658,13 +5506,10 @@
           </a:lstStyle>
           <a:p>
             <a:r>
-              <a:rPr lang="es-AR" sz="4800" b="1" dirty="0" smtClean="0">
-                <a:latin typeface="Trebuchet MS" pitchFamily="34" charset="0"/>
-                <a:cs typeface="Levenim MT" pitchFamily="2" charset="-79"/>
-              </a:rPr>
-              <a:t>Tipos de Clientes</a:t>
-            </a:r>
-            <a:endParaRPr lang="es-AR" sz="4800" b="1" dirty="0">
+              <a:rPr lang="es-AR" sz="3800" b="1" dirty="0" smtClean="0"/>
+              <a:t>Flujo de caja estimado</a:t>
+            </a:r>
+            <a:endParaRPr lang="es-AR" sz="3800" b="1" dirty="0">
               <a:latin typeface="Trebuchet MS" pitchFamily="34" charset="0"/>
               <a:cs typeface="Levenim MT" pitchFamily="2" charset="-79"/>
             </a:endParaRPr>
@@ -4708,191 +5553,28 @@
           </a:fontRef>
         </p:style>
       </p:cxnSp>
-      <p:sp>
-        <p:nvSpPr>
-          <p:cNvPr id="7" name="TextBox 6"/>
-          <p:cNvSpPr txBox="1"/>
+      <p:graphicFrame>
+        <p:nvGraphicFramePr>
+          <p:cNvPr id="9" name="1 Gráfico"/>
+          <p:cNvGraphicFramePr>
+            <a:graphicFrameLocks noGrp="1"/>
+          </p:cNvGraphicFramePr>
           <p:nvPr/>
-        </p:nvSpPr>
-        <p:spPr>
-          <a:xfrm>
-            <a:off x="467544" y="1772816"/>
-            <a:ext cx="8352928" cy="9510296"/>
-          </a:xfrm>
-          <a:prstGeom prst="rect">
-            <a:avLst/>
-          </a:prstGeom>
-          <a:noFill/>
-        </p:spPr>
-        <p:txBody>
-          <a:bodyPr wrap="square" rtlCol="0">
-            <a:spAutoFit/>
-          </a:bodyPr>
-          <a:lstStyle/>
-          <a:p>
-            <a:pPr marL="571500" indent="-571500">
-              <a:buFont typeface="Wingdings" pitchFamily="2" charset="2"/>
-              <a:buChar char="§"/>
-            </a:pPr>
-            <a:r>
-              <a:rPr lang="es-AR" sz="3600" dirty="0" smtClean="0"/>
-              <a:t>Acceso Masivo: Ciudadano</a:t>
-            </a:r>
-          </a:p>
-          <a:p>
-            <a:pPr marL="1028700" lvl="1" indent="-571500">
-              <a:buFont typeface="Wingdings" pitchFamily="2" charset="2"/>
-              <a:buChar char="§"/>
-            </a:pPr>
-            <a:r>
-              <a:rPr lang="es-AR" sz="3600" dirty="0" smtClean="0"/>
-              <a:t>Gratuito.</a:t>
-            </a:r>
-          </a:p>
-          <a:p>
-            <a:pPr marL="1028700" lvl="1" indent="-571500">
-              <a:buFont typeface="Wingdings" pitchFamily="2" charset="2"/>
-              <a:buChar char="§"/>
-            </a:pPr>
-            <a:r>
-              <a:rPr lang="es-AR" sz="3600" dirty="0"/>
-              <a:t>Fácil Acceso</a:t>
-            </a:r>
-            <a:r>
-              <a:rPr lang="es-AR" sz="3600" dirty="0" smtClean="0"/>
-              <a:t>.</a:t>
-            </a:r>
-          </a:p>
-          <a:p>
-            <a:pPr marL="571500" indent="-571500">
-              <a:buFont typeface="Wingdings" pitchFamily="2" charset="2"/>
-              <a:buChar char="§"/>
-            </a:pPr>
-            <a:r>
-              <a:rPr lang="es-AR" sz="3600" dirty="0"/>
-              <a:t>Planes según necesidades</a:t>
-            </a:r>
-            <a:r>
-              <a:rPr lang="es-AR" sz="3600" dirty="0" smtClean="0"/>
-              <a:t>: Empresas o Familias</a:t>
-            </a:r>
-          </a:p>
-          <a:p>
-            <a:pPr marL="1028700" lvl="1" indent="-571500">
-              <a:buFont typeface="Wingdings" pitchFamily="2" charset="2"/>
-              <a:buChar char="§"/>
-            </a:pPr>
-            <a:r>
-              <a:rPr lang="es-AR" sz="3600" dirty="0"/>
-              <a:t>Monitoreo Periódico</a:t>
-            </a:r>
-            <a:r>
-              <a:rPr lang="es-AR" sz="3600" dirty="0" smtClean="0"/>
-              <a:t>.</a:t>
-            </a:r>
-          </a:p>
-          <a:p>
-            <a:pPr marL="1028700" lvl="1" indent="-571500">
-              <a:buFont typeface="Wingdings" pitchFamily="2" charset="2"/>
-              <a:buChar char="§"/>
-            </a:pPr>
-            <a:r>
-              <a:rPr lang="es-AR" sz="3600" dirty="0"/>
-              <a:t>Alarmas de Zona Peligrosa</a:t>
-            </a:r>
-            <a:r>
-              <a:rPr lang="es-AR" sz="3600" dirty="0" smtClean="0"/>
-              <a:t>.</a:t>
-            </a:r>
-          </a:p>
-          <a:p>
-            <a:pPr marL="1028700" lvl="1" indent="-571500">
-              <a:buFont typeface="Wingdings" pitchFamily="2" charset="2"/>
-              <a:buChar char="§"/>
-            </a:pPr>
-            <a:r>
-              <a:rPr lang="es-AR" sz="3600" dirty="0"/>
-              <a:t>Esquema de </a:t>
-            </a:r>
-            <a:r>
-              <a:rPr lang="es-AR" sz="3600" dirty="0" err="1" smtClean="0"/>
-              <a:t>Check-points</a:t>
-            </a:r>
-            <a:r>
-              <a:rPr lang="es-AR" sz="3600" dirty="0" smtClean="0"/>
-              <a:t>.</a:t>
-            </a:r>
-            <a:endParaRPr lang="es-AR" sz="3600" dirty="0"/>
-          </a:p>
-          <a:p>
-            <a:pPr marL="1028700" lvl="1" indent="-571500">
-              <a:buFont typeface="Wingdings" pitchFamily="2" charset="2"/>
-              <a:buChar char="§"/>
-            </a:pPr>
-            <a:endParaRPr lang="es-AR" sz="3600" dirty="0"/>
-          </a:p>
-          <a:p>
-            <a:pPr marL="1028700" lvl="1" indent="-571500">
-              <a:buFont typeface="Wingdings" pitchFamily="2" charset="2"/>
-              <a:buChar char="§"/>
-            </a:pPr>
-            <a:endParaRPr lang="es-AR" sz="3600" dirty="0"/>
-          </a:p>
-          <a:p>
-            <a:pPr marL="1028700" lvl="1" indent="-571500">
-              <a:buFont typeface="Wingdings" pitchFamily="2" charset="2"/>
-              <a:buChar char="§"/>
-            </a:pPr>
-            <a:endParaRPr lang="es-AR" sz="3600" dirty="0" smtClean="0"/>
-          </a:p>
-          <a:p>
-            <a:pPr marL="1028700" lvl="1" indent="-571500">
-              <a:buFont typeface="Wingdings" pitchFamily="2" charset="2"/>
-              <a:buChar char="§"/>
-            </a:pPr>
-            <a:endParaRPr lang="es-AR" sz="3600" dirty="0"/>
-          </a:p>
-          <a:p>
-            <a:pPr marL="1028700" lvl="1" indent="-571500">
-              <a:buFont typeface="Wingdings" pitchFamily="2" charset="2"/>
-              <a:buChar char="§"/>
-            </a:pPr>
-            <a:endParaRPr lang="es-AR" sz="3600" dirty="0"/>
-          </a:p>
-          <a:p>
-            <a:pPr marL="1028700" lvl="1" indent="-571500">
-              <a:buFont typeface="Wingdings" pitchFamily="2" charset="2"/>
-              <a:buChar char="§"/>
-            </a:pPr>
-            <a:endParaRPr lang="es-AR" sz="3600" dirty="0" smtClean="0"/>
-          </a:p>
-          <a:p>
-            <a:pPr marL="1028700" lvl="1" indent="-571500">
-              <a:buFont typeface="Wingdings" pitchFamily="2" charset="2"/>
-              <a:buChar char="§"/>
-            </a:pPr>
-            <a:endParaRPr lang="es-AR" sz="3600" dirty="0"/>
-          </a:p>
-          <a:p>
-            <a:pPr marL="571500" indent="-571500">
-              <a:buFont typeface="Wingdings" pitchFamily="2" charset="2"/>
-              <a:buChar char="§"/>
-            </a:pPr>
-            <a:endParaRPr lang="es-AR" sz="3600" dirty="0"/>
-          </a:p>
-          <a:p>
-            <a:pPr marL="571500" indent="-571500">
-              <a:buFont typeface="Wingdings" pitchFamily="2" charset="2"/>
-              <a:buChar char="§"/>
-            </a:pPr>
-            <a:endParaRPr lang="es-AR" sz="3600" dirty="0"/>
-          </a:p>
-        </p:txBody>
-      </p:sp>
+        </p:nvGraphicFramePr>
+        <p:xfrm>
+          <a:off x="0" y="1772816"/>
+          <a:ext cx="9144000" cy="4693492"/>
+        </p:xfrm>
+        <a:graphic>
+          <a:graphicData uri="http://schemas.openxmlformats.org/drawingml/2006/chart">
+            <c:chart xmlns:c="http://schemas.openxmlformats.org/drawingml/2006/chart" xmlns:r="http://schemas.openxmlformats.org/officeDocument/2006/relationships" r:id="rId3"/>
+          </a:graphicData>
+        </a:graphic>
+      </p:graphicFrame>
     </p:spTree>
     <p:extLst>
       <p:ext uri="{BB962C8B-B14F-4D97-AF65-F5344CB8AC3E}">
-        <p14:creationId xmlns:p14="http://schemas.microsoft.com/office/powerpoint/2010/main" val="72379645"/>
+        <p14:creationId xmlns:p14="http://schemas.microsoft.com/office/powerpoint/2010/main" xmlns="" val="3410899011"/>
       </p:ext>
     </p:extLst>
   </p:cSld>
@@ -5018,7 +5700,7 @@
           <a:blip r:embed="rId2" cstate="print">
             <a:extLst>
               <a:ext uri="{28A0092B-C50C-407E-A947-70E740481C1C}">
-                <a14:useLocalDpi xmlns:a14="http://schemas.microsoft.com/office/drawing/2010/main" val="0"/>
+                <a14:useLocalDpi xmlns:a14="http://schemas.microsoft.com/office/drawing/2010/main" xmlns="" val="0"/>
               </a:ext>
             </a:extLst>
           </a:blip>
@@ -5046,7 +5728,7 @@
         </p:nvSpPr>
         <p:spPr>
           <a:xfrm>
-            <a:off x="2206142" y="836712"/>
+            <a:off x="2164935" y="836712"/>
             <a:ext cx="4814130" cy="792088"/>
           </a:xfrm>
           <a:prstGeom prst="rect">
@@ -5187,9 +5869,10 @@
               <a:buChar char="§"/>
             </a:pPr>
             <a:r>
-              <a:rPr lang="es-AR" sz="3600" dirty="0" smtClean="0"/>
-              <a:t>BlackBerry?</a:t>
-            </a:r>
+              <a:rPr lang="es-AR" sz="3600" dirty="0" err="1" smtClean="0"/>
+              <a:t>BlackBerry</a:t>
+            </a:r>
+            <a:endParaRPr lang="es-AR" sz="3600" dirty="0" smtClean="0"/>
           </a:p>
           <a:p>
             <a:pPr marL="571500" indent="-571500">
@@ -5227,7 +5910,7 @@
     </p:spTree>
     <p:extLst>
       <p:ext uri="{BB962C8B-B14F-4D97-AF65-F5344CB8AC3E}">
-        <p14:creationId xmlns:p14="http://schemas.microsoft.com/office/powerpoint/2010/main" val="2296755584"/>
+        <p14:creationId xmlns:p14="http://schemas.microsoft.com/office/powerpoint/2010/main" xmlns="" val="2296755584"/>
       </p:ext>
     </p:extLst>
   </p:cSld>
@@ -5353,7 +6036,7 @@
           <a:blip r:embed="rId2" cstate="print">
             <a:extLst>
               <a:ext uri="{28A0092B-C50C-407E-A947-70E740481C1C}">
-                <a14:useLocalDpi xmlns:a14="http://schemas.microsoft.com/office/drawing/2010/main" val="0"/>
+                <a14:useLocalDpi xmlns:a14="http://schemas.microsoft.com/office/drawing/2010/main" xmlns="" val="0"/>
               </a:ext>
             </a:extLst>
           </a:blip>
@@ -5381,7 +6064,7 @@
         </p:nvSpPr>
         <p:spPr>
           <a:xfrm>
-            <a:off x="1907704" y="836712"/>
+            <a:off x="1907704" y="4149080"/>
             <a:ext cx="5328592" cy="792088"/>
           </a:xfrm>
           <a:prstGeom prst="rect">
@@ -5414,7 +6097,7 @@
                 <a:latin typeface="Trebuchet MS" pitchFamily="34" charset="0"/>
                 <a:cs typeface="Levenim MT" pitchFamily="2" charset="-79"/>
               </a:rPr>
-              <a:t>Arquitectura</a:t>
+              <a:t>¿Preguntas?</a:t>
             </a:r>
             <a:endParaRPr lang="es-AR" sz="4800" b="1" dirty="0">
               <a:latin typeface="Trebuchet MS" pitchFamily="34" charset="0"/>
@@ -5460,186 +6143,9 @@
           </a:fontRef>
         </p:style>
       </p:cxnSp>
-      <p:pic>
-        <p:nvPicPr>
-          <p:cNvPr id="4" name="Picture 3"/>
-          <p:cNvPicPr>
-            <a:picLocks noChangeAspect="1"/>
-          </p:cNvPicPr>
-          <p:nvPr/>
-        </p:nvPicPr>
-        <p:blipFill>
-          <a:blip r:embed="rId3">
-            <a:extLst>
-              <a:ext uri="{28A0092B-C50C-407E-A947-70E740481C1C}">
-                <a14:useLocalDpi xmlns:a14="http://schemas.microsoft.com/office/drawing/2010/main" val="0"/>
-              </a:ext>
-            </a:extLst>
-          </a:blip>
-          <a:stretch>
-            <a:fillRect/>
-          </a:stretch>
-        </p:blipFill>
-        <p:spPr>
-          <a:xfrm>
-            <a:off x="395536" y="1772816"/>
-            <a:ext cx="8489025" cy="4392488"/>
-          </a:xfrm>
-          <a:prstGeom prst="rect">
-            <a:avLst/>
-          </a:prstGeom>
-        </p:spPr>
-      </p:pic>
-    </p:spTree>
-    <p:extLst>
-      <p:ext uri="{BB962C8B-B14F-4D97-AF65-F5344CB8AC3E}">
-        <p14:creationId xmlns:p14="http://schemas.microsoft.com/office/powerpoint/2010/main" val="253774415"/>
-      </p:ext>
-    </p:extLst>
-  </p:cSld>
-  <p:clrMapOvr>
-    <a:masterClrMapping/>
-  </p:clrMapOvr>
-  <p:timing>
-    <p:tnLst>
-      <p:par>
-        <p:cTn id="1" dur="indefinite" restart="never" nodeType="tmRoot"/>
-      </p:par>
-    </p:tnLst>
-  </p:timing>
-</p:sld>
-</file>
-
-<file path=ppt/slides/slide8.xml><?xml version="1.0" encoding="utf-8"?>
-<p:sld xmlns:a="http://schemas.openxmlformats.org/drawingml/2006/main" xmlns:r="http://schemas.openxmlformats.org/officeDocument/2006/relationships" xmlns:p="http://schemas.openxmlformats.org/presentationml/2006/main">
-  <p:cSld>
-    <p:spTree>
-      <p:nvGrpSpPr>
-        <p:cNvPr id="1" name=""/>
-        <p:cNvGrpSpPr/>
-        <p:nvPr/>
-      </p:nvGrpSpPr>
-      <p:grpSpPr>
-        <a:xfrm>
-          <a:off x="0" y="0"/>
-          <a:ext cx="0" cy="0"/>
-          <a:chOff x="0" y="0"/>
-          <a:chExt cx="0" cy="0"/>
-        </a:xfrm>
-      </p:grpSpPr>
-      <p:sp>
-        <p:nvSpPr>
-          <p:cNvPr id="2" name="1 Título"/>
-          <p:cNvSpPr>
-            <a:spLocks noGrp="1"/>
-          </p:cNvSpPr>
-          <p:nvPr>
-            <p:ph type="ctrTitle"/>
-          </p:nvPr>
-        </p:nvSpPr>
-        <p:spPr>
-          <a:xfrm>
-            <a:off x="323528" y="260648"/>
-            <a:ext cx="2736304" cy="288032"/>
-          </a:xfrm>
-        </p:spPr>
-        <p:txBody>
-          <a:bodyPr>
-            <a:normAutofit fontScale="90000"/>
-          </a:bodyPr>
-          <a:lstStyle/>
-          <a:p>
-            <a:r>
-              <a:rPr lang="es-AR" sz="2000" dirty="0" smtClean="0">
-                <a:latin typeface="Aharoni" pitchFamily="2" charset="-79"/>
-                <a:cs typeface="Aharoni" pitchFamily="2" charset="-79"/>
-              </a:rPr>
-              <a:t>Seguridad para Todos</a:t>
-            </a:r>
-            <a:endParaRPr lang="es-AR" sz="2000" dirty="0">
-              <a:latin typeface="Aharoni" pitchFamily="2" charset="-79"/>
-              <a:cs typeface="Aharoni" pitchFamily="2" charset="-79"/>
-            </a:endParaRPr>
-          </a:p>
-        </p:txBody>
-      </p:sp>
-      <p:sp>
-        <p:nvSpPr>
-          <p:cNvPr id="3" name="2 Subtítulo"/>
-          <p:cNvSpPr>
-            <a:spLocks noGrp="1"/>
-          </p:cNvSpPr>
-          <p:nvPr>
-            <p:ph type="subTitle" idx="1"/>
-          </p:nvPr>
-        </p:nvSpPr>
-        <p:spPr>
-          <a:xfrm>
-            <a:off x="5148064" y="239876"/>
-            <a:ext cx="3960440" cy="380812"/>
-          </a:xfrm>
-        </p:spPr>
-        <p:txBody>
-          <a:bodyPr>
-            <a:normAutofit fontScale="47500" lnSpcReduction="20000"/>
-          </a:bodyPr>
-          <a:lstStyle/>
-          <a:p>
-            <a:r>
-              <a:rPr lang="es-AR" dirty="0" smtClean="0">
-                <a:solidFill>
-                  <a:schemeClr val="tx1">
-                    <a:lumMod val="65000"/>
-                    <a:lumOff val="35000"/>
-                  </a:schemeClr>
-                </a:solidFill>
-              </a:rPr>
-              <a:t>75.45 - Taller de Desarrollo de Proyectos I</a:t>
-            </a:r>
-            <a:endParaRPr lang="es-AR" dirty="0">
-              <a:solidFill>
-                <a:schemeClr val="tx1">
-                  <a:lumMod val="65000"/>
-                  <a:lumOff val="35000"/>
-                </a:schemeClr>
-              </a:solidFill>
-            </a:endParaRPr>
-          </a:p>
-        </p:txBody>
-      </p:sp>
-      <p:pic>
-        <p:nvPicPr>
-          <p:cNvPr id="6" name="Picture 5"/>
-          <p:cNvPicPr>
-            <a:picLocks noChangeAspect="1"/>
-          </p:cNvPicPr>
-          <p:nvPr/>
-        </p:nvPicPr>
-        <p:blipFill>
-          <a:blip r:embed="rId2" cstate="print">
-            <a:extLst>
-              <a:ext uri="{28A0092B-C50C-407E-A947-70E740481C1C}">
-                <a14:useLocalDpi xmlns:a14="http://schemas.microsoft.com/office/drawing/2010/main" val="0"/>
-              </a:ext>
-            </a:extLst>
-          </a:blip>
-          <a:stretch>
-            <a:fillRect/>
-          </a:stretch>
-        </p:blipFill>
-        <p:spPr>
-          <a:xfrm>
-            <a:off x="3203848" y="260648"/>
-            <a:ext cx="468052" cy="277364"/>
-          </a:xfrm>
-          <a:prstGeom prst="rect">
-            <a:avLst/>
-          </a:prstGeom>
-        </p:spPr>
-      </p:pic>
-      <p:sp>
-        <p:nvSpPr>
-          <p:cNvPr id="8" name="1 Título"/>
+      <p:sp>
+        <p:nvSpPr>
+          <p:cNvPr id="7" name="1 Título"/>
           <p:cNvSpPr txBox="1">
             <a:spLocks/>
           </p:cNvSpPr>
@@ -5647,7 +6153,7 @@
         </p:nvSpPr>
         <p:spPr>
           <a:xfrm>
-            <a:off x="1619672" y="2780928"/>
+            <a:off x="2060104" y="1340768"/>
             <a:ext cx="5328592" cy="792088"/>
           </a:xfrm>
           <a:prstGeom prst="rect">
@@ -5680,7 +6186,7 @@
                 <a:latin typeface="Trebuchet MS" pitchFamily="34" charset="0"/>
                 <a:cs typeface="Levenim MT" pitchFamily="2" charset="-79"/>
               </a:rPr>
-              <a:t>Gracias</a:t>
+              <a:t>Muchas gracias</a:t>
             </a:r>
             <a:endParaRPr lang="es-AR" sz="4800" b="1" dirty="0">
               <a:latin typeface="Trebuchet MS" pitchFamily="34" charset="0"/>
@@ -5689,47 +6195,10 @@
           </a:p>
         </p:txBody>
       </p:sp>
-      <p:cxnSp>
-        <p:nvCxnSpPr>
-          <p:cNvPr id="5" name="Straight Connector 4"/>
-          <p:cNvCxnSpPr/>
-          <p:nvPr/>
-        </p:nvCxnSpPr>
-        <p:spPr>
-          <a:xfrm>
-            <a:off x="395536" y="692696"/>
-            <a:ext cx="8496944" cy="0"/>
-          </a:xfrm>
-          <a:prstGeom prst="line">
-            <a:avLst/>
-          </a:prstGeom>
-          <a:ln>
-            <a:solidFill>
-              <a:schemeClr val="bg1">
-                <a:lumMod val="65000"/>
-              </a:schemeClr>
-            </a:solidFill>
-          </a:ln>
-        </p:spPr>
-        <p:style>
-          <a:lnRef idx="1">
-            <a:schemeClr val="accent1"/>
-          </a:lnRef>
-          <a:fillRef idx="0">
-            <a:schemeClr val="accent1"/>
-          </a:fillRef>
-          <a:effectRef idx="0">
-            <a:schemeClr val="accent1"/>
-          </a:effectRef>
-          <a:fontRef idx="minor">
-            <a:schemeClr val="tx1"/>
-          </a:fontRef>
-        </p:style>
-      </p:cxnSp>
     </p:spTree>
     <p:extLst>
       <p:ext uri="{BB962C8B-B14F-4D97-AF65-F5344CB8AC3E}">
-        <p14:creationId xmlns:p14="http://schemas.microsoft.com/office/powerpoint/2010/main" val="1235372326"/>
+        <p14:creationId xmlns:p14="http://schemas.microsoft.com/office/powerpoint/2010/main" xmlns="" val="1235372326"/>
       </p:ext>
     </p:extLst>
   </p:cSld>
@@ -6029,4 +6498,287 @@
   <a:objectDefaults/>
   <a:extraClrSchemeLst/>
 </a:theme>
+</file>
+
+<file path=ppt/theme/theme2.xml><?xml version="1.0" encoding="utf-8"?>
+<a:theme xmlns:a="http://schemas.openxmlformats.org/drawingml/2006/main" name="Tema de Office">
+  <a:themeElements>
+    <a:clrScheme name="Office">
+      <a:dk1>
+        <a:sysClr val="windowText" lastClr="000000"/>
+      </a:dk1>
+      <a:lt1>
+        <a:sysClr val="window" lastClr="FFFFFF"/>
+      </a:lt1>
+      <a:dk2>
+        <a:srgbClr val="1F497D"/>
+      </a:dk2>
+      <a:lt2>
+        <a:srgbClr val="EEECE1"/>
+      </a:lt2>
+      <a:accent1>
+        <a:srgbClr val="4F81BD"/>
+      </a:accent1>
+      <a:accent2>
+        <a:srgbClr val="C0504D"/>
+      </a:accent2>
+      <a:accent3>
+        <a:srgbClr val="9BBB59"/>
+      </a:accent3>
+      <a:accent4>
+        <a:srgbClr val="8064A2"/>
+      </a:accent4>
+      <a:accent5>
+        <a:srgbClr val="4BACC6"/>
+      </a:accent5>
+      <a:accent6>
+        <a:srgbClr val="F79646"/>
+      </a:accent6>
+      <a:hlink>
+        <a:srgbClr val="0000FF"/>
+      </a:hlink>
+      <a:folHlink>
+        <a:srgbClr val="800080"/>
+      </a:folHlink>
+    </a:clrScheme>
+    <a:fontScheme name="Office">
+      <a:majorFont>
+        <a:latin typeface="Calibri"/>
+        <a:ea typeface=""/>
+        <a:cs typeface=""/>
+        <a:font script="Jpan" typeface="ＭＳ Ｐゴシック"/>
+        <a:font script="Hang" typeface="맑은 고딕"/>
+        <a:font script="Hans" typeface="宋体"/>
+        <a:font script="Hant" typeface="新細明體"/>
+        <a:font script="Arab" typeface="Times New Roman"/>
+        <a:font script="Hebr" typeface="Times New Roman"/>
+        <a:font script="Thai" typeface="Angsana New"/>
+        <a:font script="Ethi" typeface="Nyala"/>
+        <a:font script="Beng" typeface="Vrinda"/>
+        <a:font script="Gujr" typeface="Shruti"/>
+        <a:font script="Khmr" typeface="MoolBoran"/>
+        <a:font script="Knda" typeface="Tunga"/>
+        <a:font script="Guru" typeface="Raavi"/>
+        <a:font script="Cans" typeface="Euphemia"/>
+        <a:font script="Cher" typeface="Plantagenet Cherokee"/>
+        <a:font script="Yiii" typeface="Microsoft Yi Baiti"/>
+        <a:font script="Tibt" typeface="Microsoft Himalaya"/>
+        <a:font script="Thaa" typeface="MV Boli"/>
+        <a:font script="Deva" typeface="Mangal"/>
+        <a:font script="Telu" typeface="Gautami"/>
+        <a:font script="Taml" typeface="Latha"/>
+        <a:font script="Syrc" typeface="Estrangelo Edessa"/>
+        <a:font script="Orya" typeface="Kalinga"/>
+        <a:font script="Mlym" typeface="Kartika"/>
+        <a:font script="Laoo" typeface="DokChampa"/>
+        <a:font script="Sinh" typeface="Iskoola Pota"/>
+        <a:font script="Mong" typeface="Mongolian Baiti"/>
+        <a:font script="Viet" typeface="Times New Roman"/>
+        <a:font script="Uigh" typeface="Microsoft Uighur"/>
+      </a:majorFont>
+      <a:minorFont>
+        <a:latin typeface="Calibri"/>
+        <a:ea typeface=""/>
+        <a:cs typeface=""/>
+        <a:font script="Jpan" typeface="ＭＳ Ｐゴシック"/>
+        <a:font script="Hang" typeface="맑은 고딕"/>
+        <a:font script="Hans" typeface="宋体"/>
+        <a:font script="Hant" typeface="新細明體"/>
+        <a:font script="Arab" typeface="Arial"/>
+        <a:font script="Hebr" typeface="Arial"/>
+        <a:font script="Thai" typeface="Cordia New"/>
+        <a:font script="Ethi" typeface="Nyala"/>
+        <a:font script="Beng" typeface="Vrinda"/>
+        <a:font script="Gujr" typeface="Shruti"/>
+        <a:font script="Khmr" typeface="DaunPenh"/>
+        <a:font script="Knda" typeface="Tunga"/>
+        <a:font script="Guru" typeface="Raavi"/>
+        <a:font script="Cans" typeface="Euphemia"/>
+        <a:font script="Cher" typeface="Plantagenet Cherokee"/>
+        <a:font script="Yiii" typeface="Microsoft Yi Baiti"/>
+        <a:font script="Tibt" typeface="Microsoft Himalaya"/>
+        <a:font script="Thaa" typeface="MV Boli"/>
+        <a:font script="Deva" typeface="Mangal"/>
+        <a:font script="Telu" typeface="Gautami"/>
+        <a:font script="Taml" typeface="Latha"/>
+        <a:font script="Syrc" typeface="Estrangelo Edessa"/>
+        <a:font script="Orya" typeface="Kalinga"/>
+        <a:font script="Mlym" typeface="Kartika"/>
+        <a:font script="Laoo" typeface="DokChampa"/>
+        <a:font script="Sinh" typeface="Iskoola Pota"/>
+        <a:font script="Mong" typeface="Mongolian Baiti"/>
+        <a:font script="Viet" typeface="Arial"/>
+        <a:font script="Uigh" typeface="Microsoft Uighur"/>
+      </a:minorFont>
+    </a:fontScheme>
+    <a:fmtScheme name="Office">
+      <a:fillStyleLst>
+        <a:solidFill>
+          <a:schemeClr val="phClr"/>
+        </a:solidFill>
+        <a:gradFill rotWithShape="1">
+          <a:gsLst>
+            <a:gs pos="0">
+              <a:schemeClr val="phClr">
+                <a:tint val="50000"/>
+                <a:satMod val="300000"/>
+              </a:schemeClr>
+            </a:gs>
+            <a:gs pos="35000">
+              <a:schemeClr val="phClr">
+                <a:tint val="37000"/>
+                <a:satMod val="300000"/>
+              </a:schemeClr>
+            </a:gs>
+            <a:gs pos="100000">
+              <a:schemeClr val="phClr">
+                <a:tint val="15000"/>
+                <a:satMod val="350000"/>
+              </a:schemeClr>
+            </a:gs>
+          </a:gsLst>
+          <a:lin ang="16200000" scaled="1"/>
+        </a:gradFill>
+        <a:gradFill rotWithShape="1">
+          <a:gsLst>
+            <a:gs pos="0">
+              <a:schemeClr val="phClr">
+                <a:shade val="51000"/>
+                <a:satMod val="130000"/>
+              </a:schemeClr>
+            </a:gs>
+            <a:gs pos="80000">
+              <a:schemeClr val="phClr">
+                <a:shade val="93000"/>
+                <a:satMod val="130000"/>
+              </a:schemeClr>
+            </a:gs>
+            <a:gs pos="100000">
+              <a:schemeClr val="phClr">
+                <a:shade val="94000"/>
+                <a:satMod val="135000"/>
+              </a:schemeClr>
+            </a:gs>
+          </a:gsLst>
+          <a:lin ang="16200000" scaled="0"/>
+        </a:gradFill>
+      </a:fillStyleLst>
+      <a:lnStyleLst>
+        <a:ln w="9525" cap="flat" cmpd="sng" algn="ctr">
+          <a:solidFill>
+            <a:schemeClr val="phClr">
+              <a:shade val="95000"/>
+              <a:satMod val="105000"/>
+            </a:schemeClr>
+          </a:solidFill>
+          <a:prstDash val="solid"/>
+        </a:ln>
+        <a:ln w="25400" cap="flat" cmpd="sng" algn="ctr">
+          <a:solidFill>
+            <a:schemeClr val="phClr"/>
+          </a:solidFill>
+          <a:prstDash val="solid"/>
+        </a:ln>
+        <a:ln w="38100" cap="flat" cmpd="sng" algn="ctr">
+          <a:solidFill>
+            <a:schemeClr val="phClr"/>
+          </a:solidFill>
+          <a:prstDash val="solid"/>
+        </a:ln>
+      </a:lnStyleLst>
+      <a:effectStyleLst>
+        <a:effectStyle>
+          <a:effectLst>
+            <a:outerShdw blurRad="40000" dist="20000" dir="5400000" rotWithShape="0">
+              <a:srgbClr val="000000">
+                <a:alpha val="38000"/>
+              </a:srgbClr>
+            </a:outerShdw>
+          </a:effectLst>
+        </a:effectStyle>
+        <a:effectStyle>
+          <a:effectLst>
+            <a:outerShdw blurRad="40000" dist="23000" dir="5400000" rotWithShape="0">
+              <a:srgbClr val="000000">
+                <a:alpha val="35000"/>
+              </a:srgbClr>
+            </a:outerShdw>
+          </a:effectLst>
+        </a:effectStyle>
+        <a:effectStyle>
+          <a:effectLst>
+            <a:outerShdw blurRad="40000" dist="23000" dir="5400000" rotWithShape="0">
+              <a:srgbClr val="000000">
+                <a:alpha val="35000"/>
+              </a:srgbClr>
+            </a:outerShdw>
+          </a:effectLst>
+          <a:scene3d>
+            <a:camera prst="orthographicFront">
+              <a:rot lat="0" lon="0" rev="0"/>
+            </a:camera>
+            <a:lightRig rig="threePt" dir="t">
+              <a:rot lat="0" lon="0" rev="1200000"/>
+            </a:lightRig>
+          </a:scene3d>
+          <a:sp3d>
+            <a:bevelT w="63500" h="25400"/>
+          </a:sp3d>
+        </a:effectStyle>
+      </a:effectStyleLst>
+      <a:bgFillStyleLst>
+        <a:solidFill>
+          <a:schemeClr val="phClr"/>
+        </a:solidFill>
+        <a:gradFill rotWithShape="1">
+          <a:gsLst>
+            <a:gs pos="0">
+              <a:schemeClr val="phClr">
+                <a:tint val="40000"/>
+                <a:satMod val="350000"/>
+              </a:schemeClr>
+            </a:gs>
+            <a:gs pos="40000">
+              <a:schemeClr val="phClr">
+                <a:tint val="45000"/>
+                <a:shade val="99000"/>
+                <a:satMod val="350000"/>
+              </a:schemeClr>
+            </a:gs>
+            <a:gs pos="100000">
+              <a:schemeClr val="phClr">
+                <a:shade val="20000"/>
+                <a:satMod val="255000"/>
+              </a:schemeClr>
+            </a:gs>
+          </a:gsLst>
+          <a:path path="circle">
+            <a:fillToRect l="50000" t="-80000" r="50000" b="180000"/>
+          </a:path>
+        </a:gradFill>
+        <a:gradFill rotWithShape="1">
+          <a:gsLst>
+            <a:gs pos="0">
+              <a:schemeClr val="phClr">
+                <a:tint val="80000"/>
+                <a:satMod val="300000"/>
+              </a:schemeClr>
+            </a:gs>
+            <a:gs pos="100000">
+              <a:schemeClr val="phClr">
+                <a:shade val="30000"/>
+                <a:satMod val="200000"/>
+              </a:schemeClr>
+            </a:gs>
+          </a:gsLst>
+          <a:path path="circle">
+            <a:fillToRect l="50000" t="50000" r="50000" b="50000"/>
+          </a:path>
+        </a:gradFill>
+      </a:bgFillStyleLst>
+    </a:fmtScheme>
+  </a:themeElements>
+  <a:objectDefaults/>
+  <a:extraClrSchemeLst/>
+</a:theme>
 </file>
</xml_diff>

<commit_message>
Agregado de logos de smartphones. Modificación de algunos estilos.
</commit_message>
<xml_diff>
--- a/docs/Presentacion.pptx
+++ b/docs/Presentacion.pptx
@@ -118,13 +118,24 @@
 
 <file path=ppt/charts/chart1.xml><?xml version="1.0" encoding="utf-8"?>
 <c:chartSpace xmlns:c="http://schemas.openxmlformats.org/drawingml/2006/chart" xmlns:a="http://schemas.openxmlformats.org/drawingml/2006/main" xmlns:r="http://schemas.openxmlformats.org/officeDocument/2006/relationships">
-  <c:date1904 val="1"/>
+  <c:date1904 val="0"/>
   <c:lang val="es-AR"/>
+  <c:roundedCorners val="0"/>
+  <mc:AlternateContent xmlns:mc="http://schemas.openxmlformats.org/markup-compatibility/2006">
+    <mc:Choice xmlns:c14="http://schemas.microsoft.com/office/drawing/2007/8/2/chart" Requires="c14">
+      <c14:style val="102"/>
+    </mc:Choice>
+    <mc:Fallback>
+      <c:style val="2"/>
+    </mc:Fallback>
+  </mc:AlternateContent>
   <c:chart>
+    <c:autoTitleDeleted val="0"/>
     <c:plotArea>
       <c:layout/>
       <c:scatterChart>
         <c:scatterStyle val="smoothMarker"/>
+        <c:varyColors val="0"/>
         <c:ser>
           <c:idx val="0"/>
           <c:order val="0"/>
@@ -551,14 +562,23 @@
           </c:yVal>
           <c:smooth val="1"/>
         </c:ser>
-        <c:axId val="64046592"/>
-        <c:axId val="65957248"/>
+        <c:dLbls>
+          <c:showLegendKey val="0"/>
+          <c:showVal val="0"/>
+          <c:showCatName val="0"/>
+          <c:showSerName val="0"/>
+          <c:showPercent val="0"/>
+          <c:showBubbleSize val="0"/>
+        </c:dLbls>
+        <c:axId val="68576768"/>
+        <c:axId val="68578688"/>
       </c:scatterChart>
       <c:valAx>
-        <c:axId val="64046592"/>
+        <c:axId val="68576768"/>
         <c:scaling>
           <c:orientation val="minMax"/>
         </c:scaling>
+        <c:delete val="0"/>
         <c:axPos val="b"/>
         <c:majorGridlines/>
         <c:title>
@@ -578,8 +598,11 @@
             </c:rich>
           </c:tx>
           <c:layout/>
+          <c:overlay val="0"/>
         </c:title>
         <c:numFmt formatCode="General" sourceLinked="1"/>
+        <c:majorTickMark val="out"/>
+        <c:minorTickMark val="none"/>
         <c:tickLblPos val="nextTo"/>
         <c:txPr>
           <a:bodyPr/>
@@ -591,16 +614,17 @@
             <a:endParaRPr lang="es-AR"/>
           </a:p>
         </c:txPr>
-        <c:crossAx val="65957248"/>
+        <c:crossAx val="68578688"/>
         <c:crosses val="autoZero"/>
         <c:crossBetween val="midCat"/>
         <c:majorUnit val="1"/>
       </c:valAx>
       <c:valAx>
-        <c:axId val="65957248"/>
+        <c:axId val="68578688"/>
         <c:scaling>
           <c:orientation val="minMax"/>
         </c:scaling>
+        <c:delete val="0"/>
         <c:axPos val="l"/>
         <c:majorGridlines/>
         <c:title>
@@ -620,8 +644,11 @@
             </c:rich>
           </c:tx>
           <c:layout/>
+          <c:overlay val="0"/>
         </c:title>
         <c:numFmt formatCode="General" sourceLinked="1"/>
+        <c:majorTickMark val="out"/>
+        <c:minorTickMark val="none"/>
         <c:tickLblPos val="nextTo"/>
         <c:txPr>
           <a:bodyPr/>
@@ -633,14 +660,22 @@
             <a:endParaRPr lang="es-AR"/>
           </a:p>
         </c:txPr>
-        <c:crossAx val="64046592"/>
+        <c:crossAx val="68576768"/>
         <c:crosses val="autoZero"/>
         <c:crossBetween val="midCat"/>
       </c:valAx>
+      <c:spPr>
+        <a:solidFill>
+          <a:schemeClr val="bg1">
+            <a:alpha val="40000"/>
+          </a:schemeClr>
+        </a:solidFill>
+      </c:spPr>
     </c:plotArea>
     <c:legend>
       <c:legendPos val="r"/>
       <c:layout/>
+      <c:overlay val="0"/>
       <c:txPr>
         <a:bodyPr/>
         <a:lstStyle/>
@@ -653,8 +688,12 @@
       </c:txPr>
     </c:legend>
     <c:plotVisOnly val="1"/>
+    <c:dispBlanksAs val="gap"/>
+    <c:showDLblsOverMax val="0"/>
   </c:chart>
-  <c:externalData r:id="rId1"/>
+  <c:externalData r:id="rId1">
+    <c:autoUpdate val="0"/>
+  </c:externalData>
 </c:chartSpace>
 </file>
 
@@ -903,13 +942,18 @@
             <a:fld id="{827EE000-08BA-42E9-8051-6989914F4AEC}" type="slidenum">
               <a:rPr lang="es-AR" smtClean="0"/>
               <a:pPr/>
-              <a:t>‹Nº›</a:t>
+              <a:t>‹#›</a:t>
             </a:fld>
             <a:endParaRPr lang="es-AR"/>
           </a:p>
         </p:txBody>
       </p:sp>
     </p:spTree>
+    <p:extLst>
+      <p:ext uri="{BB962C8B-B14F-4D97-AF65-F5344CB8AC3E}">
+        <p14:creationId xmlns:p14="http://schemas.microsoft.com/office/powerpoint/2010/main" val="807489831"/>
+      </p:ext>
+    </p:extLst>
   </p:cSld>
   <p:clrMap bg1="lt1" tx1="dk1" bg2="lt2" tx2="dk2" accent1="accent1" accent2="accent2" accent3="accent3" accent4="accent4" accent5="accent5" accent6="accent6" hlink="hlink" folHlink="folHlink"/>
   <p:notesStyle>
@@ -1314,7 +1358,7 @@
             <a:fld id="{3F2D9CC0-97DE-46BA-A91E-5E70B2C519B4}" type="slidenum">
               <a:rPr lang="es-AR" smtClean="0"/>
               <a:pPr/>
-              <a:t>‹Nº›</a:t>
+              <a:t>‹#›</a:t>
             </a:fld>
             <a:endParaRPr lang="es-AR"/>
           </a:p>
@@ -1323,7 +1367,7 @@
     </p:spTree>
     <p:extLst>
       <p:ext uri="{BB962C8B-B14F-4D97-AF65-F5344CB8AC3E}">
-        <p14:creationId xmlns:p14="http://schemas.microsoft.com/office/powerpoint/2010/main" xmlns="" val="4216029542"/>
+        <p14:creationId xmlns:p14="http://schemas.microsoft.com/office/powerpoint/2010/main" val="4216029542"/>
       </p:ext>
     </p:extLst>
   </p:cSld>
@@ -1486,7 +1530,7 @@
             <a:fld id="{3F2D9CC0-97DE-46BA-A91E-5E70B2C519B4}" type="slidenum">
               <a:rPr lang="es-AR" smtClean="0"/>
               <a:pPr/>
-              <a:t>‹Nº›</a:t>
+              <a:t>‹#›</a:t>
             </a:fld>
             <a:endParaRPr lang="es-AR"/>
           </a:p>
@@ -1495,7 +1539,7 @@
     </p:spTree>
     <p:extLst>
       <p:ext uri="{BB962C8B-B14F-4D97-AF65-F5344CB8AC3E}">
-        <p14:creationId xmlns:p14="http://schemas.microsoft.com/office/powerpoint/2010/main" xmlns="" val="1477062740"/>
+        <p14:creationId xmlns:p14="http://schemas.microsoft.com/office/powerpoint/2010/main" val="1477062740"/>
       </p:ext>
     </p:extLst>
   </p:cSld>
@@ -1668,7 +1712,7 @@
             <a:fld id="{3F2D9CC0-97DE-46BA-A91E-5E70B2C519B4}" type="slidenum">
               <a:rPr lang="es-AR" smtClean="0"/>
               <a:pPr/>
-              <a:t>‹Nº›</a:t>
+              <a:t>‹#›</a:t>
             </a:fld>
             <a:endParaRPr lang="es-AR"/>
           </a:p>
@@ -1677,7 +1721,7 @@
     </p:spTree>
     <p:extLst>
       <p:ext uri="{BB962C8B-B14F-4D97-AF65-F5344CB8AC3E}">
-        <p14:creationId xmlns:p14="http://schemas.microsoft.com/office/powerpoint/2010/main" xmlns="" val="223054616"/>
+        <p14:creationId xmlns:p14="http://schemas.microsoft.com/office/powerpoint/2010/main" val="223054616"/>
       </p:ext>
     </p:extLst>
   </p:cSld>
@@ -1840,7 +1884,7 @@
             <a:fld id="{3F2D9CC0-97DE-46BA-A91E-5E70B2C519B4}" type="slidenum">
               <a:rPr lang="es-AR" smtClean="0"/>
               <a:pPr/>
-              <a:t>‹Nº›</a:t>
+              <a:t>‹#›</a:t>
             </a:fld>
             <a:endParaRPr lang="es-AR"/>
           </a:p>
@@ -1849,7 +1893,7 @@
     </p:spTree>
     <p:extLst>
       <p:ext uri="{BB962C8B-B14F-4D97-AF65-F5344CB8AC3E}">
-        <p14:creationId xmlns:p14="http://schemas.microsoft.com/office/powerpoint/2010/main" xmlns="" val="1914491051"/>
+        <p14:creationId xmlns:p14="http://schemas.microsoft.com/office/powerpoint/2010/main" val="1914491051"/>
       </p:ext>
     </p:extLst>
   </p:cSld>
@@ -2088,7 +2132,7 @@
             <a:fld id="{3F2D9CC0-97DE-46BA-A91E-5E70B2C519B4}" type="slidenum">
               <a:rPr lang="es-AR" smtClean="0"/>
               <a:pPr/>
-              <a:t>‹Nº›</a:t>
+              <a:t>‹#›</a:t>
             </a:fld>
             <a:endParaRPr lang="es-AR"/>
           </a:p>
@@ -2097,7 +2141,7 @@
     </p:spTree>
     <p:extLst>
       <p:ext uri="{BB962C8B-B14F-4D97-AF65-F5344CB8AC3E}">
-        <p14:creationId xmlns:p14="http://schemas.microsoft.com/office/powerpoint/2010/main" xmlns="" val="3655691279"/>
+        <p14:creationId xmlns:p14="http://schemas.microsoft.com/office/powerpoint/2010/main" val="3655691279"/>
       </p:ext>
     </p:extLst>
   </p:cSld>
@@ -2378,7 +2422,7 @@
             <a:fld id="{3F2D9CC0-97DE-46BA-A91E-5E70B2C519B4}" type="slidenum">
               <a:rPr lang="es-AR" smtClean="0"/>
               <a:pPr/>
-              <a:t>‹Nº›</a:t>
+              <a:t>‹#›</a:t>
             </a:fld>
             <a:endParaRPr lang="es-AR"/>
           </a:p>
@@ -2387,7 +2431,7 @@
     </p:spTree>
     <p:extLst>
       <p:ext uri="{BB962C8B-B14F-4D97-AF65-F5344CB8AC3E}">
-        <p14:creationId xmlns:p14="http://schemas.microsoft.com/office/powerpoint/2010/main" xmlns="" val="3243285389"/>
+        <p14:creationId xmlns:p14="http://schemas.microsoft.com/office/powerpoint/2010/main" val="3243285389"/>
       </p:ext>
     </p:extLst>
   </p:cSld>
@@ -2802,7 +2846,7 @@
             <a:fld id="{3F2D9CC0-97DE-46BA-A91E-5E70B2C519B4}" type="slidenum">
               <a:rPr lang="es-AR" smtClean="0"/>
               <a:pPr/>
-              <a:t>‹Nº›</a:t>
+              <a:t>‹#›</a:t>
             </a:fld>
             <a:endParaRPr lang="es-AR"/>
           </a:p>
@@ -2811,7 +2855,7 @@
     </p:spTree>
     <p:extLst>
       <p:ext uri="{BB962C8B-B14F-4D97-AF65-F5344CB8AC3E}">
-        <p14:creationId xmlns:p14="http://schemas.microsoft.com/office/powerpoint/2010/main" xmlns="" val="2636274983"/>
+        <p14:creationId xmlns:p14="http://schemas.microsoft.com/office/powerpoint/2010/main" val="2636274983"/>
       </p:ext>
     </p:extLst>
   </p:cSld>
@@ -2922,7 +2966,7 @@
             <a:fld id="{3F2D9CC0-97DE-46BA-A91E-5E70B2C519B4}" type="slidenum">
               <a:rPr lang="es-AR" smtClean="0"/>
               <a:pPr/>
-              <a:t>‹Nº›</a:t>
+              <a:t>‹#›</a:t>
             </a:fld>
             <a:endParaRPr lang="es-AR"/>
           </a:p>
@@ -2931,7 +2975,7 @@
     </p:spTree>
     <p:extLst>
       <p:ext uri="{BB962C8B-B14F-4D97-AF65-F5344CB8AC3E}">
-        <p14:creationId xmlns:p14="http://schemas.microsoft.com/office/powerpoint/2010/main" xmlns="" val="3269143888"/>
+        <p14:creationId xmlns:p14="http://schemas.microsoft.com/office/powerpoint/2010/main" val="3269143888"/>
       </p:ext>
     </p:extLst>
   </p:cSld>
@@ -3019,7 +3063,7 @@
             <a:fld id="{3F2D9CC0-97DE-46BA-A91E-5E70B2C519B4}" type="slidenum">
               <a:rPr lang="es-AR" smtClean="0"/>
               <a:pPr/>
-              <a:t>‹Nº›</a:t>
+              <a:t>‹#›</a:t>
             </a:fld>
             <a:endParaRPr lang="es-AR"/>
           </a:p>
@@ -3028,7 +3072,7 @@
     </p:spTree>
     <p:extLst>
       <p:ext uri="{BB962C8B-B14F-4D97-AF65-F5344CB8AC3E}">
-        <p14:creationId xmlns:p14="http://schemas.microsoft.com/office/powerpoint/2010/main" xmlns="" val="1678523345"/>
+        <p14:creationId xmlns:p14="http://schemas.microsoft.com/office/powerpoint/2010/main" val="1678523345"/>
       </p:ext>
     </p:extLst>
   </p:cSld>
@@ -3298,7 +3342,7 @@
             <a:fld id="{3F2D9CC0-97DE-46BA-A91E-5E70B2C519B4}" type="slidenum">
               <a:rPr lang="es-AR" smtClean="0"/>
               <a:pPr/>
-              <a:t>‹Nº›</a:t>
+              <a:t>‹#›</a:t>
             </a:fld>
             <a:endParaRPr lang="es-AR"/>
           </a:p>
@@ -3307,7 +3351,7 @@
     </p:spTree>
     <p:extLst>
       <p:ext uri="{BB962C8B-B14F-4D97-AF65-F5344CB8AC3E}">
-        <p14:creationId xmlns:p14="http://schemas.microsoft.com/office/powerpoint/2010/main" xmlns="" val="3056079155"/>
+        <p14:creationId xmlns:p14="http://schemas.microsoft.com/office/powerpoint/2010/main" val="3056079155"/>
       </p:ext>
     </p:extLst>
   </p:cSld>
@@ -3553,7 +3597,7 @@
             <a:fld id="{3F2D9CC0-97DE-46BA-A91E-5E70B2C519B4}" type="slidenum">
               <a:rPr lang="es-AR" smtClean="0"/>
               <a:pPr/>
-              <a:t>‹Nº›</a:t>
+              <a:t>‹#›</a:t>
             </a:fld>
             <a:endParaRPr lang="es-AR"/>
           </a:p>
@@ -3562,7 +3606,7 @@
     </p:spTree>
     <p:extLst>
       <p:ext uri="{BB962C8B-B14F-4D97-AF65-F5344CB8AC3E}">
-        <p14:creationId xmlns:p14="http://schemas.microsoft.com/office/powerpoint/2010/main" xmlns="" val="2796445100"/>
+        <p14:creationId xmlns:p14="http://schemas.microsoft.com/office/powerpoint/2010/main" val="2796445100"/>
       </p:ext>
     </p:extLst>
   </p:cSld>
@@ -3813,7 +3857,7 @@
             <a:fld id="{3F2D9CC0-97DE-46BA-A91E-5E70B2C519B4}" type="slidenum">
               <a:rPr lang="es-AR" smtClean="0"/>
               <a:pPr/>
-              <a:t>‹Nº›</a:t>
+              <a:t>‹#›</a:t>
             </a:fld>
             <a:endParaRPr lang="es-AR"/>
           </a:p>
@@ -3822,7 +3866,7 @@
     </p:spTree>
     <p:extLst>
       <p:ext uri="{BB962C8B-B14F-4D97-AF65-F5344CB8AC3E}">
-        <p14:creationId xmlns:p14="http://schemas.microsoft.com/office/powerpoint/2010/main" xmlns="" val="2985976193"/>
+        <p14:creationId xmlns:p14="http://schemas.microsoft.com/office/powerpoint/2010/main" val="2985976193"/>
       </p:ext>
     </p:extLst>
   </p:cSld>
@@ -4200,7 +4244,7 @@
           <a:blip r:embed="rId3" cstate="print">
             <a:extLst>
               <a:ext uri="{28A0092B-C50C-407E-A947-70E740481C1C}">
-                <a14:useLocalDpi xmlns:a14="http://schemas.microsoft.com/office/drawing/2010/main" xmlns="" val="0"/>
+                <a14:useLocalDpi xmlns:a14="http://schemas.microsoft.com/office/drawing/2010/main" val="0"/>
               </a:ext>
             </a:extLst>
           </a:blip>
@@ -4241,7 +4285,7 @@
           </a:bodyPr>
           <a:lstStyle/>
           <a:p>
-            <a:pPr marL="0" marR="0" lvl="0" indent="0" algn="ctr" defTabSz="914400" rtl="0" eaLnBrk="1" fontAlgn="auto" latinLnBrk="0" hangingPunct="1">
+            <a:pPr marR="0" lvl="0" algn="ctr" fontAlgn="auto">
               <a:lnSpc>
                 <a:spcPct val="100000"/>
               </a:lnSpc>
@@ -4253,49 +4297,49 @@
               </a:spcAft>
               <a:buClrTx/>
               <a:buSzTx/>
-              <a:buFont typeface="Arial" pitchFamily="34" charset="0"/>
-              <a:buNone/>
               <a:tabLst/>
               <a:defRPr/>
             </a:pPr>
             <a:r>
-              <a:rPr kumimoji="0" lang="es-AR" sz="2400" i="0" u="none" strike="noStrike" kern="1200" cap="none" spc="0" normalizeH="0" baseline="0" noProof="0" dirty="0" smtClean="0">
-                <a:ln>
-                  <a:noFill/>
-                </a:ln>
-                <a:effectLst/>
-                <a:uLnTx/>
-                <a:uFillTx/>
-                <a:latin typeface="+mn-lt"/>
-                <a:ea typeface="+mn-ea"/>
-                <a:cs typeface="+mn-cs"/>
+              <a:rPr lang="es-AR" sz="2400" dirty="0">
+                <a:solidFill>
+                  <a:schemeClr val="tx1">
+                    <a:lumMod val="65000"/>
+                    <a:lumOff val="35000"/>
+                  </a:schemeClr>
+                </a:solidFill>
               </a:rPr>
-              <a:t>Grupo N° 5 – 1° cuatrimestre</a:t>
-            </a:r>
-            <a:r>
-              <a:rPr kumimoji="0" lang="es-AR" sz="2400" i="0" u="none" strike="noStrike" kern="1200" cap="none" spc="0" normalizeH="0" noProof="0" dirty="0" smtClean="0">
-                <a:ln>
-                  <a:noFill/>
-                </a:ln>
-                <a:effectLst/>
-                <a:uLnTx/>
-                <a:uFillTx/>
-                <a:latin typeface="+mn-lt"/>
-                <a:ea typeface="+mn-ea"/>
-                <a:cs typeface="+mn-cs"/>
+              <a:t>G</a:t>
+            </a:r>
+            <a:r>
+              <a:rPr lang="es-AR" sz="2400" dirty="0">
+                <a:solidFill>
+                  <a:schemeClr val="tx1">
+                    <a:lumMod val="65000"/>
+                    <a:lumOff val="35000"/>
+                  </a:schemeClr>
+                </a:solidFill>
               </a:rPr>
-              <a:t> 2012</a:t>
-            </a:r>
-            <a:endParaRPr kumimoji="0" lang="es-AR" sz="2400" i="0" u="none" strike="noStrike" kern="1200" cap="none" spc="0" normalizeH="0" baseline="0" noProof="0" dirty="0">
-              <a:ln>
-                <a:noFill/>
-              </a:ln>
-              <a:effectLst/>
-              <a:uLnTx/>
-              <a:uFillTx/>
-              <a:latin typeface="+mn-lt"/>
-              <a:ea typeface="+mn-ea"/>
-              <a:cs typeface="+mn-cs"/>
+              <a:t>r</a:t>
+            </a:r>
+            <a:r>
+              <a:rPr lang="es-AR" sz="2400" dirty="0">
+                <a:solidFill>
+                  <a:schemeClr val="tx1">
+                    <a:lumMod val="65000"/>
+                    <a:lumOff val="35000"/>
+                  </a:schemeClr>
+                </a:solidFill>
+              </a:rPr>
+              <a:t>upo 5 – 1er cuatrimestre 2012</a:t>
+            </a:r>
+            <a:endParaRPr lang="es-AR" sz="2400" dirty="0">
+              <a:solidFill>
+                <a:schemeClr val="tx1">
+                  <a:lumMod val="65000"/>
+                  <a:lumOff val="35000"/>
+                </a:schemeClr>
+              </a:solidFill>
             </a:endParaRPr>
           </a:p>
         </p:txBody>
@@ -4348,7 +4392,18 @@
                 <a:ea typeface="+mj-ea"/>
                 <a:cs typeface="Aharoni" pitchFamily="2" charset="-79"/>
               </a:rPr>
-              <a:t> Dial </a:t>
+              <a:t> </a:t>
+            </a:r>
+            <a:r>
+              <a:rPr lang="es-AR" sz="4400" dirty="0" smtClean="0">
+                <a:solidFill>
+                  <a:srgbClr val="C00000"/>
+                </a:solidFill>
+                <a:latin typeface="Aharoni" pitchFamily="2" charset="-79"/>
+                <a:ea typeface="+mj-ea"/>
+                <a:cs typeface="Aharoni" pitchFamily="2" charset="-79"/>
+              </a:rPr>
+              <a:t>Dial </a:t>
             </a:r>
             <a:r>
               <a:rPr lang="es-AR" sz="4400" dirty="0" err="1" smtClean="0">
@@ -4381,7 +4436,7 @@
     </p:spTree>
     <p:extLst>
       <p:ext uri="{BB962C8B-B14F-4D97-AF65-F5344CB8AC3E}">
-        <p14:creationId xmlns:p14="http://schemas.microsoft.com/office/powerpoint/2010/main" xmlns="" val="1289667085"/>
+        <p14:creationId xmlns:p14="http://schemas.microsoft.com/office/powerpoint/2010/main" val="1289667085"/>
       </p:ext>
     </p:extLst>
   </p:cSld>
@@ -4507,7 +4562,7 @@
           <a:blip r:embed="rId2" cstate="print">
             <a:extLst>
               <a:ext uri="{28A0092B-C50C-407E-A947-70E740481C1C}">
-                <a14:useLocalDpi xmlns:a14="http://schemas.microsoft.com/office/drawing/2010/main" xmlns="" val="0"/>
+                <a14:useLocalDpi xmlns:a14="http://schemas.microsoft.com/office/drawing/2010/main" val="0"/>
               </a:ext>
             </a:extLst>
           </a:blip>
@@ -4622,7 +4677,7 @@
         </p:nvSpPr>
         <p:spPr>
           <a:xfrm>
-            <a:off x="373397" y="2204864"/>
+            <a:off x="373397" y="1988840"/>
             <a:ext cx="8397205" cy="3416320"/>
           </a:xfrm>
           <a:prstGeom prst="rect">
@@ -4639,7 +4694,63 @@
             <a:pPr algn="just"/>
             <a:r>
               <a:rPr lang="es-AR" sz="3600" dirty="0" smtClean="0"/>
-              <a:t>Somos una organización joven que nos proponemos ofrecer un método alternativo, superior y más eficiente a los servicios ya existentes de emergencias, que garantice prevenir y actuar rápidamente ante eventuales situaciones de inseguridad.</a:t>
+              <a:t>Somos una organización joven que </a:t>
+            </a:r>
+            <a:r>
+              <a:rPr lang="es-AR" sz="3600" dirty="0" smtClean="0"/>
+              <a:t>se propone </a:t>
+            </a:r>
+            <a:r>
+              <a:rPr lang="es-AR" sz="3600" dirty="0" smtClean="0"/>
+              <a:t>ofrecer un </a:t>
+            </a:r>
+            <a:r>
+              <a:rPr lang="es-AR" sz="3600" b="1" dirty="0" smtClean="0"/>
+              <a:t>método</a:t>
+            </a:r>
+            <a:r>
+              <a:rPr lang="es-AR" sz="3600" dirty="0" smtClean="0"/>
+              <a:t> </a:t>
+            </a:r>
+            <a:r>
+              <a:rPr lang="es-AR" sz="3600" b="1" dirty="0" smtClean="0"/>
+              <a:t>alternativo</a:t>
+            </a:r>
+            <a:r>
+              <a:rPr lang="es-AR" sz="3600" dirty="0" smtClean="0"/>
+              <a:t>, </a:t>
+            </a:r>
+            <a:r>
+              <a:rPr lang="es-AR" sz="3600" b="1" dirty="0" smtClean="0"/>
+              <a:t>superior</a:t>
+            </a:r>
+            <a:r>
+              <a:rPr lang="es-AR" sz="3600" dirty="0" smtClean="0"/>
+              <a:t> y más </a:t>
+            </a:r>
+            <a:r>
+              <a:rPr lang="es-AR" sz="3600" b="1" dirty="0" smtClean="0"/>
+              <a:t>eficiente</a:t>
+            </a:r>
+            <a:r>
+              <a:rPr lang="es-AR" sz="3600" dirty="0" smtClean="0"/>
+              <a:t> a los servicios ya existentes de emergencias, que garantice </a:t>
+            </a:r>
+            <a:r>
+              <a:rPr lang="es-AR" sz="3600" b="1" dirty="0" smtClean="0"/>
+              <a:t>prevenir</a:t>
+            </a:r>
+            <a:r>
+              <a:rPr lang="es-AR" sz="3600" dirty="0" smtClean="0"/>
+              <a:t> y actuar rápidamente ante eventuales </a:t>
+            </a:r>
+            <a:r>
+              <a:rPr lang="es-AR" sz="3600" b="1" dirty="0" smtClean="0"/>
+              <a:t>situaciones de inseguridad</a:t>
+            </a:r>
+            <a:r>
+              <a:rPr lang="es-AR" sz="3600" dirty="0" smtClean="0"/>
+              <a:t>.</a:t>
             </a:r>
             <a:endParaRPr lang="es-AR" sz="3600" dirty="0"/>
           </a:p>
@@ -4648,7 +4759,7 @@
     </p:spTree>
     <p:extLst>
       <p:ext uri="{BB962C8B-B14F-4D97-AF65-F5344CB8AC3E}">
-        <p14:creationId xmlns:p14="http://schemas.microsoft.com/office/powerpoint/2010/main" xmlns="" val="2688607078"/>
+        <p14:creationId xmlns:p14="http://schemas.microsoft.com/office/powerpoint/2010/main" val="2688607078"/>
       </p:ext>
     </p:extLst>
   </p:cSld>
@@ -4774,7 +4885,7 @@
           <a:blip r:embed="rId2" cstate="print">
             <a:extLst>
               <a:ext uri="{28A0092B-C50C-407E-A947-70E740481C1C}">
-                <a14:useLocalDpi xmlns:a14="http://schemas.microsoft.com/office/drawing/2010/main" xmlns="" val="0"/>
+                <a14:useLocalDpi xmlns:a14="http://schemas.microsoft.com/office/drawing/2010/main" val="0"/>
               </a:ext>
             </a:extLst>
           </a:blip>
@@ -4889,7 +5000,7 @@
         </p:nvSpPr>
         <p:spPr>
           <a:xfrm>
-            <a:off x="395536" y="2276872"/>
+            <a:off x="395536" y="1790814"/>
             <a:ext cx="8352928" cy="2862322"/>
           </a:xfrm>
           <a:prstGeom prst="rect">
@@ -4908,8 +5019,32 @@
               <a:buChar char="§"/>
             </a:pPr>
             <a:r>
+              <a:rPr lang="es-AR" sz="3600" b="1" dirty="0" smtClean="0"/>
+              <a:t>Herramienta de </a:t>
+            </a:r>
+            <a:r>
+              <a:rPr lang="es-AR" sz="3600" b="1" dirty="0" smtClean="0"/>
+              <a:t>Localización </a:t>
+            </a:r>
+            <a:r>
+              <a:rPr lang="es-AR" sz="3600" dirty="0"/>
+              <a:t>R</a:t>
+            </a:r>
+            <a:r>
               <a:rPr lang="es-AR" sz="3600" dirty="0" smtClean="0"/>
-              <a:t>Herramienta de localización rápida y efectiva.</a:t>
+              <a:t>ápida </a:t>
+            </a:r>
+            <a:r>
+              <a:rPr lang="es-AR" sz="3600" dirty="0" smtClean="0"/>
+              <a:t>y </a:t>
+            </a:r>
+            <a:r>
+              <a:rPr lang="es-AR" sz="3600" dirty="0" smtClean="0"/>
+              <a:t>Efectiva</a:t>
+            </a:r>
+            <a:r>
+              <a:rPr lang="es-AR" sz="3600" dirty="0" smtClean="0"/>
+              <a:t>.</a:t>
             </a:r>
           </a:p>
           <a:p>
@@ -4919,7 +5054,23 @@
             </a:pPr>
             <a:r>
               <a:rPr lang="es-AR" sz="3600" dirty="0" smtClean="0"/>
-              <a:t>Sincronizada con agentes de seguridad.</a:t>
+              <a:t>Sincronizada con </a:t>
+            </a:r>
+            <a:r>
+              <a:rPr lang="es-AR" sz="3600" b="1" dirty="0" smtClean="0"/>
+              <a:t>Agentes </a:t>
+            </a:r>
+            <a:r>
+              <a:rPr lang="es-AR" sz="3600" b="1" dirty="0" smtClean="0"/>
+              <a:t>de </a:t>
+            </a:r>
+            <a:r>
+              <a:rPr lang="es-AR" sz="3600" b="1" dirty="0" smtClean="0"/>
+              <a:t>Seguridad</a:t>
+            </a:r>
+            <a:r>
+              <a:rPr lang="es-AR" sz="3600" dirty="0" smtClean="0"/>
+              <a:t>.</a:t>
             </a:r>
           </a:p>
           <a:p>
@@ -4936,16 +5087,20 @@
               <a:t>la </a:t>
             </a:r>
             <a:r>
+              <a:rPr lang="es-AR" sz="3600" b="1" dirty="0" smtClean="0"/>
+              <a:t>Calidad </a:t>
+            </a:r>
+            <a:r>
+              <a:rPr lang="es-AR" sz="3600" b="1" dirty="0"/>
+              <a:t>de </a:t>
+            </a:r>
+            <a:r>
+              <a:rPr lang="es-AR" sz="3600" b="1" dirty="0" smtClean="0"/>
+              <a:t>Vida</a:t>
+            </a:r>
+            <a:r>
               <a:rPr lang="es-AR" sz="3600" dirty="0" smtClean="0"/>
-              <a:t>calidad </a:t>
-            </a:r>
-            <a:r>
-              <a:rPr lang="es-AR" sz="3600" dirty="0"/>
-              <a:t>de </a:t>
-            </a:r>
-            <a:r>
-              <a:rPr lang="es-AR" sz="3600" dirty="0" smtClean="0"/>
-              <a:t>vida.</a:t>
+              <a:t>.</a:t>
             </a:r>
           </a:p>
           <a:p>
@@ -4954,8 +5109,20 @@
               <a:buChar char="§"/>
             </a:pPr>
             <a:r>
+              <a:rPr lang="es-AR" sz="3600" b="1" dirty="0" smtClean="0"/>
+              <a:t>Reducir</a:t>
+            </a:r>
+            <a:r>
               <a:rPr lang="es-AR" sz="3600" dirty="0" smtClean="0"/>
-              <a:t>Reducir la criminalidad.</a:t>
+              <a:t> la </a:t>
+            </a:r>
+            <a:r>
+              <a:rPr lang="es-AR" sz="3600" dirty="0" smtClean="0"/>
+              <a:t>Criminalidad</a:t>
+            </a:r>
+            <a:r>
+              <a:rPr lang="es-AR" sz="3600" dirty="0" smtClean="0"/>
+              <a:t>.</a:t>
             </a:r>
           </a:p>
         </p:txBody>
@@ -4963,7 +5130,7 @@
     </p:spTree>
     <p:extLst>
       <p:ext uri="{BB962C8B-B14F-4D97-AF65-F5344CB8AC3E}">
-        <p14:creationId xmlns:p14="http://schemas.microsoft.com/office/powerpoint/2010/main" xmlns="" val="1212818162"/>
+        <p14:creationId xmlns:p14="http://schemas.microsoft.com/office/powerpoint/2010/main" val="1212818162"/>
       </p:ext>
     </p:extLst>
   </p:cSld>
@@ -5089,7 +5256,7 @@
           <a:blip r:embed="rId2" cstate="print">
             <a:extLst>
               <a:ext uri="{28A0092B-C50C-407E-A947-70E740481C1C}">
-                <a14:useLocalDpi xmlns:a14="http://schemas.microsoft.com/office/drawing/2010/main" xmlns="" val="0"/>
+                <a14:useLocalDpi xmlns:a14="http://schemas.microsoft.com/office/drawing/2010/main" val="0"/>
               </a:ext>
             </a:extLst>
           </a:blip>
@@ -5204,7 +5371,7 @@
         </p:nvSpPr>
         <p:spPr>
           <a:xfrm>
-            <a:off x="395536" y="1772816"/>
+            <a:off x="395536" y="1700808"/>
             <a:ext cx="8352928" cy="5078313"/>
           </a:xfrm>
           <a:prstGeom prst="rect">
@@ -5218,13 +5385,21 @@
           </a:bodyPr>
           <a:lstStyle/>
           <a:p>
-            <a:pPr marL="571500" indent="-571500">
-              <a:buFont typeface="Wingdings" pitchFamily="2" charset="2"/>
-              <a:buChar char="§"/>
-            </a:pPr>
+            <a:r>
+              <a:rPr lang="es-AR" sz="3600" b="1" dirty="0" smtClean="0"/>
+              <a:t>Acceso </a:t>
+            </a:r>
+            <a:r>
+              <a:rPr lang="es-AR" sz="3600" b="1" dirty="0" smtClean="0"/>
+              <a:t>Masivo</a:t>
+            </a:r>
+            <a:r>
+              <a:rPr lang="es-AR" sz="3600" b="1" dirty="0" smtClean="0"/>
+              <a:t>:</a:t>
+            </a:r>
             <a:r>
               <a:rPr lang="es-AR" sz="3600" dirty="0" smtClean="0"/>
-              <a:t>Acceso masivo: Ciudadano</a:t>
+              <a:t> Ciudadano</a:t>
             </a:r>
           </a:p>
           <a:p>
@@ -5248,21 +5423,29 @@
             </a:r>
             <a:r>
               <a:rPr lang="es-AR" sz="3600" dirty="0" smtClean="0"/>
-              <a:t>acceso.</a:t>
-            </a:r>
-          </a:p>
-          <a:p>
-            <a:pPr marL="571500" indent="-571500">
-              <a:buFont typeface="Wingdings" pitchFamily="2" charset="2"/>
-              <a:buChar char="§"/>
-            </a:pPr>
-            <a:r>
-              <a:rPr lang="es-AR" sz="3600" dirty="0"/>
-              <a:t>Planes según necesidades</a:t>
+              <a:t>Acceso</a:t>
             </a:r>
             <a:r>
               <a:rPr lang="es-AR" sz="3600" dirty="0" smtClean="0"/>
-              <a:t>: Empresarial o Familiar</a:t>
+              <a:t>.</a:t>
+            </a:r>
+          </a:p>
+          <a:p>
+            <a:r>
+              <a:rPr lang="es-AR" sz="3600" b="1" dirty="0"/>
+              <a:t>Planes según </a:t>
+            </a:r>
+            <a:r>
+              <a:rPr lang="es-AR" sz="3600" b="1" dirty="0" smtClean="0"/>
+              <a:t>Necesidad Específicas:</a:t>
+            </a:r>
+            <a:r>
+              <a:rPr lang="es-AR" sz="3600" dirty="0" smtClean="0"/>
+              <a:t> </a:t>
+            </a:r>
+            <a:r>
+              <a:rPr lang="es-AR" sz="3600" dirty="0" smtClean="0"/>
+              <a:t>Empresarial o Familiar</a:t>
             </a:r>
           </a:p>
           <a:p>
@@ -5282,7 +5465,15 @@
             </a:pPr>
             <a:r>
               <a:rPr lang="es-AR" sz="3600" dirty="0" smtClean="0"/>
-              <a:t>Monitoreo periódico.</a:t>
+              <a:t>Monitoreo </a:t>
+            </a:r>
+            <a:r>
+              <a:rPr lang="es-AR" sz="3600" dirty="0" smtClean="0"/>
+              <a:t>Periódico</a:t>
+            </a:r>
+            <a:r>
+              <a:rPr lang="es-AR" sz="3600" dirty="0" smtClean="0"/>
+              <a:t>.</a:t>
             </a:r>
           </a:p>
           <a:p>
@@ -5296,7 +5487,19 @@
             </a:r>
             <a:r>
               <a:rPr lang="es-AR" sz="3600" dirty="0" smtClean="0"/>
-              <a:t>zona peligrosa.</a:t>
+              <a:t>Zona </a:t>
+            </a:r>
+            <a:r>
+              <a:rPr lang="es-AR" sz="3600" dirty="0"/>
+              <a:t>P</a:t>
+            </a:r>
+            <a:r>
+              <a:rPr lang="es-AR" sz="3600" dirty="0" smtClean="0"/>
+              <a:t>eligrosa</a:t>
+            </a:r>
+            <a:r>
+              <a:rPr lang="es-AR" sz="3600" dirty="0" smtClean="0"/>
+              <a:t>.</a:t>
             </a:r>
           </a:p>
           <a:p>
@@ -5310,7 +5513,11 @@
             </a:r>
             <a:r>
               <a:rPr lang="es-AR" sz="3600" dirty="0" err="1" smtClean="0"/>
-              <a:t>check-points</a:t>
+              <a:t>C</a:t>
+            </a:r>
+            <a:r>
+              <a:rPr lang="es-AR" sz="3600" dirty="0" err="1" smtClean="0"/>
+              <a:t>heck-Points</a:t>
             </a:r>
             <a:r>
               <a:rPr lang="es-AR" sz="3600" dirty="0" smtClean="0"/>
@@ -5323,7 +5530,7 @@
     </p:spTree>
     <p:extLst>
       <p:ext uri="{BB962C8B-B14F-4D97-AF65-F5344CB8AC3E}">
-        <p14:creationId xmlns:p14="http://schemas.microsoft.com/office/powerpoint/2010/main" xmlns="" val="72379645"/>
+        <p14:creationId xmlns:p14="http://schemas.microsoft.com/office/powerpoint/2010/main" val="72379645"/>
       </p:ext>
     </p:extLst>
   </p:cSld>
@@ -5449,7 +5656,7 @@
           <a:blip r:embed="rId2" cstate="print">
             <a:extLst>
               <a:ext uri="{28A0092B-C50C-407E-A947-70E740481C1C}">
-                <a14:useLocalDpi xmlns:a14="http://schemas.microsoft.com/office/drawing/2010/main" xmlns="" val="0"/>
+                <a14:useLocalDpi xmlns:a14="http://schemas.microsoft.com/office/drawing/2010/main" val="0"/>
               </a:ext>
             </a:extLst>
           </a:blip>
@@ -5507,7 +5714,19 @@
           <a:p>
             <a:r>
               <a:rPr lang="es-AR" sz="3800" b="1" dirty="0" smtClean="0"/>
-              <a:t>Flujo de caja estimado</a:t>
+              <a:t>Flujo de </a:t>
+            </a:r>
+            <a:r>
+              <a:rPr lang="es-AR" sz="3800" b="1" dirty="0" smtClean="0"/>
+              <a:t>Caja </a:t>
+            </a:r>
+            <a:r>
+              <a:rPr lang="es-AR" sz="3800" b="1" dirty="0"/>
+              <a:t>E</a:t>
+            </a:r>
+            <a:r>
+              <a:rPr lang="es-AR" sz="3800" b="1" dirty="0" smtClean="0"/>
+              <a:t>stimado</a:t>
             </a:r>
             <a:endParaRPr lang="es-AR" sz="3800" b="1" dirty="0">
               <a:latin typeface="Trebuchet MS" pitchFamily="34" charset="0"/>
@@ -5559,7 +5778,13 @@
           <p:cNvGraphicFramePr>
             <a:graphicFrameLocks noGrp="1"/>
           </p:cNvGraphicFramePr>
-          <p:nvPr/>
+          <p:nvPr>
+            <p:extLst>
+              <p:ext uri="{D42A27DB-BD31-4B8C-83A1-F6EECF244321}">
+                <p14:modId xmlns:p14="http://schemas.microsoft.com/office/powerpoint/2010/main" val="4161227453"/>
+              </p:ext>
+            </p:extLst>
+          </p:nvPr>
         </p:nvGraphicFramePr>
         <p:xfrm>
           <a:off x="0" y="1772816"/>
@@ -5574,7 +5799,7 @@
     </p:spTree>
     <p:extLst>
       <p:ext uri="{BB962C8B-B14F-4D97-AF65-F5344CB8AC3E}">
-        <p14:creationId xmlns:p14="http://schemas.microsoft.com/office/powerpoint/2010/main" xmlns="" val="3410899011"/>
+        <p14:creationId xmlns:p14="http://schemas.microsoft.com/office/powerpoint/2010/main" val="3410899011"/>
       </p:ext>
     </p:extLst>
   </p:cSld>
@@ -5700,7 +5925,7 @@
           <a:blip r:embed="rId2" cstate="print">
             <a:extLst>
               <a:ext uri="{28A0092B-C50C-407E-A947-70E740481C1C}">
-                <a14:useLocalDpi xmlns:a14="http://schemas.microsoft.com/office/drawing/2010/main" xmlns="" val="0"/>
+                <a14:useLocalDpi xmlns:a14="http://schemas.microsoft.com/office/drawing/2010/main" val="0"/>
               </a:ext>
             </a:extLst>
           </a:blip>
@@ -5816,7 +6041,7 @@
         <p:spPr>
           <a:xfrm>
             <a:off x="467544" y="1772816"/>
-            <a:ext cx="8352928" cy="3970318"/>
+            <a:ext cx="8352928" cy="4524315"/>
           </a:xfrm>
           <a:prstGeom prst="rect">
             <a:avLst/>
@@ -5829,18 +6054,50 @@
           </a:bodyPr>
           <a:lstStyle/>
           <a:p>
+            <a:r>
+              <a:rPr lang="es-AR" sz="3600" b="1" dirty="0"/>
+              <a:t>Dispositivos </a:t>
+            </a:r>
+            <a:r>
+              <a:rPr lang="es-AR" sz="3600" b="1" dirty="0" smtClean="0"/>
+              <a:t>Móviles</a:t>
+            </a:r>
+            <a:endParaRPr lang="es-AR" sz="3600" b="1" dirty="0" smtClean="0"/>
+          </a:p>
+          <a:p>
             <a:pPr marL="571500" indent="-571500">
               <a:buFont typeface="Wingdings" pitchFamily="2" charset="2"/>
               <a:buChar char="§"/>
             </a:pPr>
-            <a:r>
-              <a:rPr lang="es-AR" sz="3600" dirty="0"/>
-              <a:t>Dispositivos </a:t>
-            </a:r>
-            <a:r>
-              <a:rPr lang="es-AR" sz="3600" dirty="0" smtClean="0"/>
-              <a:t>Móviles:</a:t>
-            </a:r>
+            <a:endParaRPr lang="es-AR" sz="3600" dirty="0" smtClean="0"/>
+          </a:p>
+          <a:p>
+            <a:pPr marL="571500" indent="-571500">
+              <a:buFont typeface="Wingdings" pitchFamily="2" charset="2"/>
+              <a:buChar char="§"/>
+            </a:pPr>
+            <a:endParaRPr lang="es-AR" sz="3600" dirty="0"/>
+          </a:p>
+          <a:p>
+            <a:pPr marL="571500" indent="-571500">
+              <a:buFont typeface="Wingdings" pitchFamily="2" charset="2"/>
+              <a:buChar char="§"/>
+            </a:pPr>
+            <a:endParaRPr lang="es-AR" sz="3600" dirty="0" smtClean="0"/>
+          </a:p>
+          <a:p>
+            <a:pPr marL="571500" indent="-571500">
+              <a:buFont typeface="Wingdings" pitchFamily="2" charset="2"/>
+              <a:buChar char="§"/>
+            </a:pPr>
+            <a:endParaRPr lang="es-AR" sz="3600" dirty="0" smtClean="0"/>
+          </a:p>
+          <a:p>
+            <a:r>
+              <a:rPr lang="es-AR" sz="3600" b="1" dirty="0" smtClean="0"/>
+              <a:t>Sitio Web</a:t>
+            </a:r>
+            <a:endParaRPr lang="es-AR" sz="3600" b="1" dirty="0" smtClean="0"/>
           </a:p>
           <a:p>
             <a:pPr marL="1028700" lvl="1" indent="-571500">
@@ -5848,10 +6105,9 @@
               <a:buChar char="§"/>
             </a:pPr>
             <a:r>
-              <a:rPr lang="es-AR" sz="3600" dirty="0" err="1" smtClean="0"/>
-              <a:t>Android</a:t>
-            </a:r>
-            <a:endParaRPr lang="es-AR" sz="3600" dirty="0" smtClean="0"/>
+              <a:rPr lang="es-AR" sz="3600" dirty="0" smtClean="0"/>
+              <a:t>Terminal para Centrales de Seguridad.</a:t>
+            </a:r>
           </a:p>
           <a:p>
             <a:pPr marL="1028700" lvl="1" indent="-571500">
@@ -5860,57 +6116,196 @@
             </a:pPr>
             <a:r>
               <a:rPr lang="es-AR" sz="3600" dirty="0" smtClean="0"/>
+              <a:t>Información y Servicio al Cliente.</a:t>
+            </a:r>
+            <a:endParaRPr lang="es-AR" sz="3600" dirty="0"/>
+          </a:p>
+        </p:txBody>
+      </p:sp>
+      <p:pic>
+        <p:nvPicPr>
+          <p:cNvPr id="14" name="Picture 13"/>
+          <p:cNvPicPr>
+            <a:picLocks noChangeAspect="1"/>
+          </p:cNvPicPr>
+          <p:nvPr/>
+        </p:nvPicPr>
+        <p:blipFill>
+          <a:blip r:embed="rId3">
+            <a:extLst>
+              <a:ext uri="{28A0092B-C50C-407E-A947-70E740481C1C}">
+                <a14:useLocalDpi xmlns:a14="http://schemas.microsoft.com/office/drawing/2010/main" val="0"/>
+              </a:ext>
+            </a:extLst>
+          </a:blip>
+          <a:stretch>
+            <a:fillRect/>
+          </a:stretch>
+        </p:blipFill>
+        <p:spPr>
+          <a:xfrm>
+            <a:off x="1783701" y="2810213"/>
+            <a:ext cx="762468" cy="956550"/>
+          </a:xfrm>
+          <a:prstGeom prst="rect">
+            <a:avLst/>
+          </a:prstGeom>
+        </p:spPr>
+      </p:pic>
+      <p:sp>
+        <p:nvSpPr>
+          <p:cNvPr id="15" name="TextBox 14"/>
+          <p:cNvSpPr txBox="1"/>
+          <p:nvPr/>
+        </p:nvSpPr>
+        <p:spPr>
+          <a:xfrm>
+            <a:off x="1588871" y="3883114"/>
+            <a:ext cx="1440160" cy="553998"/>
+          </a:xfrm>
+          <a:prstGeom prst="rect">
+            <a:avLst/>
+          </a:prstGeom>
+          <a:noFill/>
+        </p:spPr>
+        <p:txBody>
+          <a:bodyPr wrap="square" rtlCol="0">
+            <a:spAutoFit/>
+          </a:bodyPr>
+          <a:lstStyle/>
+          <a:p>
+            <a:r>
+              <a:rPr lang="es-AR" sz="3000" b="1" dirty="0" smtClean="0"/>
               <a:t>iPhone</a:t>
             </a:r>
-          </a:p>
-          <a:p>
-            <a:pPr marL="1028700" lvl="1" indent="-571500">
-              <a:buFont typeface="Wingdings" pitchFamily="2" charset="2"/>
-              <a:buChar char="§"/>
-            </a:pPr>
-            <a:r>
-              <a:rPr lang="es-AR" sz="3600" dirty="0" err="1" smtClean="0"/>
+            <a:endParaRPr lang="es-AR" sz="3000" b="1" dirty="0"/>
+          </a:p>
+        </p:txBody>
+      </p:sp>
+      <p:sp>
+        <p:nvSpPr>
+          <p:cNvPr id="16" name="TextBox 15"/>
+          <p:cNvSpPr txBox="1"/>
+          <p:nvPr/>
+        </p:nvSpPr>
+        <p:spPr>
+          <a:xfrm>
+            <a:off x="3923928" y="3883114"/>
+            <a:ext cx="1647266" cy="553998"/>
+          </a:xfrm>
+          <a:prstGeom prst="rect">
+            <a:avLst/>
+          </a:prstGeom>
+          <a:noFill/>
+        </p:spPr>
+        <p:txBody>
+          <a:bodyPr wrap="square" rtlCol="0">
+            <a:spAutoFit/>
+          </a:bodyPr>
+          <a:lstStyle/>
+          <a:p>
+            <a:r>
+              <a:rPr lang="es-AR" sz="3000" b="1" dirty="0" err="1" smtClean="0"/>
+              <a:t>Android</a:t>
+            </a:r>
+            <a:endParaRPr lang="es-AR" sz="3000" b="1" dirty="0"/>
+          </a:p>
+        </p:txBody>
+      </p:sp>
+      <p:pic>
+        <p:nvPicPr>
+          <p:cNvPr id="18" name="Picture 17"/>
+          <p:cNvPicPr>
+            <a:picLocks noChangeAspect="1"/>
+          </p:cNvPicPr>
+          <p:nvPr/>
+        </p:nvPicPr>
+        <p:blipFill>
+          <a:blip r:embed="rId4">
+            <a:extLst>
+              <a:ext uri="{28A0092B-C50C-407E-A947-70E740481C1C}">
+                <a14:useLocalDpi xmlns:a14="http://schemas.microsoft.com/office/drawing/2010/main" val="0"/>
+              </a:ext>
+            </a:extLst>
+          </a:blip>
+          <a:stretch>
+            <a:fillRect/>
+          </a:stretch>
+        </p:blipFill>
+        <p:spPr>
+          <a:xfrm>
+            <a:off x="4022386" y="2468395"/>
+            <a:ext cx="1282976" cy="1482058"/>
+          </a:xfrm>
+          <a:prstGeom prst="rect">
+            <a:avLst/>
+          </a:prstGeom>
+        </p:spPr>
+      </p:pic>
+      <p:sp>
+        <p:nvSpPr>
+          <p:cNvPr id="19" name="TextBox 18"/>
+          <p:cNvSpPr txBox="1"/>
+          <p:nvPr/>
+        </p:nvSpPr>
+        <p:spPr>
+          <a:xfrm>
+            <a:off x="6368727" y="3883114"/>
+            <a:ext cx="2019697" cy="553998"/>
+          </a:xfrm>
+          <a:prstGeom prst="rect">
+            <a:avLst/>
+          </a:prstGeom>
+          <a:noFill/>
+        </p:spPr>
+        <p:txBody>
+          <a:bodyPr wrap="square" rtlCol="0">
+            <a:spAutoFit/>
+          </a:bodyPr>
+          <a:lstStyle/>
+          <a:p>
+            <a:r>
+              <a:rPr lang="es-AR" sz="3000" b="1" dirty="0" smtClean="0"/>
               <a:t>BlackBerry</a:t>
             </a:r>
-            <a:endParaRPr lang="es-AR" sz="3600" dirty="0" smtClean="0"/>
-          </a:p>
-          <a:p>
-            <a:pPr marL="571500" indent="-571500">
-              <a:buFont typeface="Wingdings" pitchFamily="2" charset="2"/>
-              <a:buChar char="§"/>
-            </a:pPr>
-            <a:r>
-              <a:rPr lang="es-AR" sz="3600" dirty="0" smtClean="0"/>
-              <a:t>Sitio Web:</a:t>
-            </a:r>
-          </a:p>
-          <a:p>
-            <a:pPr marL="1028700" lvl="1" indent="-571500">
-              <a:buFont typeface="Wingdings" pitchFamily="2" charset="2"/>
-              <a:buChar char="§"/>
-            </a:pPr>
-            <a:r>
-              <a:rPr lang="es-AR" sz="3600" dirty="0" smtClean="0"/>
-              <a:t>Terminal para Centrales de Seguridad.</a:t>
-            </a:r>
-          </a:p>
-          <a:p>
-            <a:pPr marL="1028700" lvl="1" indent="-571500">
-              <a:buFont typeface="Wingdings" pitchFamily="2" charset="2"/>
-              <a:buChar char="§"/>
-            </a:pPr>
-            <a:r>
-              <a:rPr lang="es-AR" sz="3600" dirty="0" smtClean="0"/>
-              <a:t>Información y Servicio al Cliente.</a:t>
-            </a:r>
-            <a:endParaRPr lang="es-AR" sz="3600" dirty="0"/>
-          </a:p>
-        </p:txBody>
-      </p:sp>
+            <a:endParaRPr lang="es-AR" sz="3000" b="1" dirty="0"/>
+          </a:p>
+        </p:txBody>
+      </p:sp>
+      <p:pic>
+        <p:nvPicPr>
+          <p:cNvPr id="20" name="Picture 19"/>
+          <p:cNvPicPr>
+            <a:picLocks noChangeAspect="1"/>
+          </p:cNvPicPr>
+          <p:nvPr/>
+        </p:nvPicPr>
+        <p:blipFill>
+          <a:blip r:embed="rId5" cstate="print">
+            <a:extLst>
+              <a:ext uri="{28A0092B-C50C-407E-A947-70E740481C1C}">
+                <a14:useLocalDpi xmlns:a14="http://schemas.microsoft.com/office/drawing/2010/main" val="0"/>
+              </a:ext>
+            </a:extLst>
+          </a:blip>
+          <a:stretch>
+            <a:fillRect/>
+          </a:stretch>
+        </p:blipFill>
+        <p:spPr>
+          <a:xfrm>
+            <a:off x="6740971" y="2807417"/>
+            <a:ext cx="1008112" cy="1008112"/>
+          </a:xfrm>
+          <a:prstGeom prst="rect">
+            <a:avLst/>
+          </a:prstGeom>
+        </p:spPr>
+      </p:pic>
     </p:spTree>
     <p:extLst>
       <p:ext uri="{BB962C8B-B14F-4D97-AF65-F5344CB8AC3E}">
-        <p14:creationId xmlns:p14="http://schemas.microsoft.com/office/powerpoint/2010/main" xmlns="" val="2296755584"/>
+        <p14:creationId xmlns:p14="http://schemas.microsoft.com/office/powerpoint/2010/main" val="2296755584"/>
       </p:ext>
     </p:extLst>
   </p:cSld>
@@ -6036,7 +6431,7 @@
           <a:blip r:embed="rId2" cstate="print">
             <a:extLst>
               <a:ext uri="{28A0092B-C50C-407E-A947-70E740481C1C}">
-                <a14:useLocalDpi xmlns:a14="http://schemas.microsoft.com/office/drawing/2010/main" xmlns="" val="0"/>
+                <a14:useLocalDpi xmlns:a14="http://schemas.microsoft.com/office/drawing/2010/main" val="0"/>
               </a:ext>
             </a:extLst>
           </a:blip>
@@ -6198,7 +6593,7 @@
     </p:spTree>
     <p:extLst>
       <p:ext uri="{BB962C8B-B14F-4D97-AF65-F5344CB8AC3E}">
-        <p14:creationId xmlns:p14="http://schemas.microsoft.com/office/powerpoint/2010/main" xmlns="" val="1235372326"/>
+        <p14:creationId xmlns:p14="http://schemas.microsoft.com/office/powerpoint/2010/main" val="1235372326"/>
       </p:ext>
     </p:extLst>
   </p:cSld>

</xml_diff>

<commit_message>
Agregado de menu (sin funcionalidad). Actualización de presentacion.
</commit_message>
<xml_diff>
--- a/docs/Presentacion.pptx
+++ b/docs/Presentacion.pptx
@@ -570,11 +570,11 @@
           <c:showPercent val="0"/>
           <c:showBubbleSize val="0"/>
         </c:dLbls>
-        <c:axId val="78796288"/>
-        <c:axId val="78798208"/>
+        <c:axId val="70211072"/>
+        <c:axId val="70212992"/>
       </c:scatterChart>
       <c:valAx>
-        <c:axId val="78796288"/>
+        <c:axId val="70211072"/>
         <c:scaling>
           <c:orientation val="minMax"/>
         </c:scaling>
@@ -614,13 +614,13 @@
             <a:endParaRPr lang="es-AR"/>
           </a:p>
         </c:txPr>
-        <c:crossAx val="78798208"/>
+        <c:crossAx val="70212992"/>
         <c:crosses val="autoZero"/>
         <c:crossBetween val="midCat"/>
         <c:majorUnit val="1"/>
       </c:valAx>
       <c:valAx>
-        <c:axId val="78798208"/>
+        <c:axId val="70212992"/>
         <c:scaling>
           <c:orientation val="minMax"/>
         </c:scaling>
@@ -660,7 +660,7 @@
             <a:endParaRPr lang="es-AR"/>
           </a:p>
         </c:txPr>
-        <c:crossAx val="78796288"/>
+        <c:crossAx val="70211072"/>
         <c:crosses val="autoZero"/>
         <c:crossBetween val="midCat"/>
       </c:valAx>
@@ -4166,7 +4166,7 @@
         </p:nvSpPr>
         <p:spPr>
           <a:xfrm>
-            <a:off x="611560" y="908720"/>
+            <a:off x="687760" y="908720"/>
             <a:ext cx="7846640" cy="936104"/>
           </a:xfrm>
         </p:spPr>
@@ -4200,7 +4200,7 @@
         </p:nvSpPr>
         <p:spPr>
           <a:xfrm>
-            <a:off x="899592" y="404664"/>
+            <a:off x="902668" y="404664"/>
             <a:ext cx="7416824" cy="504056"/>
           </a:xfrm>
         </p:spPr>
@@ -4254,7 +4254,7 @@
         </p:blipFill>
         <p:spPr>
           <a:xfrm>
-            <a:off x="2555776" y="1916832"/>
+            <a:off x="2833989" y="1916832"/>
             <a:ext cx="4186283" cy="2601186"/>
           </a:xfrm>
           <a:prstGeom prst="rect">
@@ -4272,7 +4272,7 @@
         </p:nvSpPr>
         <p:spPr>
           <a:xfrm>
-            <a:off x="827584" y="5877272"/>
+            <a:off x="866664" y="5877272"/>
             <a:ext cx="7488832" cy="504056"/>
           </a:xfrm>
           <a:prstGeom prst="rect">
@@ -4324,7 +4324,7 @@
         </p:nvSpPr>
         <p:spPr>
           <a:xfrm>
-            <a:off x="763960" y="4437112"/>
+            <a:off x="687760" y="4437112"/>
             <a:ext cx="7846640" cy="936104"/>
           </a:xfrm>
           <a:prstGeom prst="rect">
@@ -5348,11 +5348,7 @@
             </a:r>
             <a:r>
               <a:rPr lang="es-AR" sz="3600" dirty="0" smtClean="0"/>
-              <a:t> </a:t>
-            </a:r>
-            <a:r>
-              <a:rPr lang="es-AR" sz="3600" dirty="0" smtClean="0"/>
-              <a:t>Empresarial o Familiar</a:t>
+              <a:t> Empresarial o Familiar</a:t>
             </a:r>
           </a:p>
           <a:p>

</xml_diff>

<commit_message>
Agregado de casos de uso al informe. Agregado de imagenes de las presentación.
</commit_message>
<xml_diff>
--- a/docs/Presentacion.pptx
+++ b/docs/Presentacion.pptx
@@ -570,11 +570,11 @@
           <c:showPercent val="0"/>
           <c:showBubbleSize val="0"/>
         </c:dLbls>
-        <c:axId val="70211072"/>
-        <c:axId val="70212992"/>
+        <c:axId val="65363328"/>
+        <c:axId val="68515328"/>
       </c:scatterChart>
       <c:valAx>
-        <c:axId val="70211072"/>
+        <c:axId val="65363328"/>
         <c:scaling>
           <c:orientation val="minMax"/>
         </c:scaling>
@@ -614,13 +614,13 @@
             <a:endParaRPr lang="es-AR"/>
           </a:p>
         </c:txPr>
-        <c:crossAx val="70212992"/>
+        <c:crossAx val="68515328"/>
         <c:crosses val="autoZero"/>
         <c:crossBetween val="midCat"/>
         <c:majorUnit val="1"/>
       </c:valAx>
       <c:valAx>
-        <c:axId val="70212992"/>
+        <c:axId val="68515328"/>
         <c:scaling>
           <c:orientation val="minMax"/>
         </c:scaling>
@@ -660,7 +660,7 @@
             <a:endParaRPr lang="es-AR"/>
           </a:p>
         </c:txPr>
-        <c:crossAx val="70211072"/>
+        <c:crossAx val="65363328"/>
         <c:crosses val="autoZero"/>
         <c:crossBetween val="midCat"/>
       </c:valAx>
@@ -780,7 +780,7 @@
             <a:fld id="{0BDB093D-7EE5-483A-9D7B-A1A2E1CBECD6}" type="datetimeFigureOut">
               <a:rPr lang="es-AR" smtClean="0"/>
               <a:pPr/>
-              <a:t>26/04/2012</a:t>
+              <a:t>17/05/2012</a:t>
             </a:fld>
             <a:endParaRPr lang="es-AR"/>
           </a:p>
@@ -942,7 +942,7 @@
             <a:fld id="{827EE000-08BA-42E9-8051-6989914F4AEC}" type="slidenum">
               <a:rPr lang="es-AR" smtClean="0"/>
               <a:pPr/>
-              <a:t>‹#›</a:t>
+              <a:t>‹Nº›</a:t>
             </a:fld>
             <a:endParaRPr lang="es-AR"/>
           </a:p>
@@ -1315,7 +1315,7 @@
             <a:fld id="{00D03AD9-B274-4317-8993-B21EFD32709D}" type="datetimeFigureOut">
               <a:rPr lang="es-AR" smtClean="0"/>
               <a:pPr/>
-              <a:t>26/04/2012</a:t>
+              <a:t>17/05/2012</a:t>
             </a:fld>
             <a:endParaRPr lang="es-AR"/>
           </a:p>
@@ -1358,7 +1358,7 @@
             <a:fld id="{3F2D9CC0-97DE-46BA-A91E-5E70B2C519B4}" type="slidenum">
               <a:rPr lang="es-AR" smtClean="0"/>
               <a:pPr/>
-              <a:t>‹#›</a:t>
+              <a:t>‹Nº›</a:t>
             </a:fld>
             <a:endParaRPr lang="es-AR"/>
           </a:p>
@@ -1487,7 +1487,7 @@
             <a:fld id="{00D03AD9-B274-4317-8993-B21EFD32709D}" type="datetimeFigureOut">
               <a:rPr lang="es-AR" smtClean="0"/>
               <a:pPr/>
-              <a:t>26/04/2012</a:t>
+              <a:t>17/05/2012</a:t>
             </a:fld>
             <a:endParaRPr lang="es-AR"/>
           </a:p>
@@ -1530,7 +1530,7 @@
             <a:fld id="{3F2D9CC0-97DE-46BA-A91E-5E70B2C519B4}" type="slidenum">
               <a:rPr lang="es-AR" smtClean="0"/>
               <a:pPr/>
-              <a:t>‹#›</a:t>
+              <a:t>‹Nº›</a:t>
             </a:fld>
             <a:endParaRPr lang="es-AR"/>
           </a:p>
@@ -1669,7 +1669,7 @@
             <a:fld id="{00D03AD9-B274-4317-8993-B21EFD32709D}" type="datetimeFigureOut">
               <a:rPr lang="es-AR" smtClean="0"/>
               <a:pPr/>
-              <a:t>26/04/2012</a:t>
+              <a:t>17/05/2012</a:t>
             </a:fld>
             <a:endParaRPr lang="es-AR"/>
           </a:p>
@@ -1712,7 +1712,7 @@
             <a:fld id="{3F2D9CC0-97DE-46BA-A91E-5E70B2C519B4}" type="slidenum">
               <a:rPr lang="es-AR" smtClean="0"/>
               <a:pPr/>
-              <a:t>‹#›</a:t>
+              <a:t>‹Nº›</a:t>
             </a:fld>
             <a:endParaRPr lang="es-AR"/>
           </a:p>
@@ -1841,7 +1841,7 @@
             <a:fld id="{00D03AD9-B274-4317-8993-B21EFD32709D}" type="datetimeFigureOut">
               <a:rPr lang="es-AR" smtClean="0"/>
               <a:pPr/>
-              <a:t>26/04/2012</a:t>
+              <a:t>17/05/2012</a:t>
             </a:fld>
             <a:endParaRPr lang="es-AR"/>
           </a:p>
@@ -1884,7 +1884,7 @@
             <a:fld id="{3F2D9CC0-97DE-46BA-A91E-5E70B2C519B4}" type="slidenum">
               <a:rPr lang="es-AR" smtClean="0"/>
               <a:pPr/>
-              <a:t>‹#›</a:t>
+              <a:t>‹Nº›</a:t>
             </a:fld>
             <a:endParaRPr lang="es-AR"/>
           </a:p>
@@ -2089,7 +2089,7 @@
             <a:fld id="{00D03AD9-B274-4317-8993-B21EFD32709D}" type="datetimeFigureOut">
               <a:rPr lang="es-AR" smtClean="0"/>
               <a:pPr/>
-              <a:t>26/04/2012</a:t>
+              <a:t>17/05/2012</a:t>
             </a:fld>
             <a:endParaRPr lang="es-AR"/>
           </a:p>
@@ -2132,7 +2132,7 @@
             <a:fld id="{3F2D9CC0-97DE-46BA-A91E-5E70B2C519B4}" type="slidenum">
               <a:rPr lang="es-AR" smtClean="0"/>
               <a:pPr/>
-              <a:t>‹#›</a:t>
+              <a:t>‹Nº›</a:t>
             </a:fld>
             <a:endParaRPr lang="es-AR"/>
           </a:p>
@@ -2379,7 +2379,7 @@
             <a:fld id="{00D03AD9-B274-4317-8993-B21EFD32709D}" type="datetimeFigureOut">
               <a:rPr lang="es-AR" smtClean="0"/>
               <a:pPr/>
-              <a:t>26/04/2012</a:t>
+              <a:t>17/05/2012</a:t>
             </a:fld>
             <a:endParaRPr lang="es-AR"/>
           </a:p>
@@ -2422,7 +2422,7 @@
             <a:fld id="{3F2D9CC0-97DE-46BA-A91E-5E70B2C519B4}" type="slidenum">
               <a:rPr lang="es-AR" smtClean="0"/>
               <a:pPr/>
-              <a:t>‹#›</a:t>
+              <a:t>‹Nº›</a:t>
             </a:fld>
             <a:endParaRPr lang="es-AR"/>
           </a:p>
@@ -2803,7 +2803,7 @@
             <a:fld id="{00D03AD9-B274-4317-8993-B21EFD32709D}" type="datetimeFigureOut">
               <a:rPr lang="es-AR" smtClean="0"/>
               <a:pPr/>
-              <a:t>26/04/2012</a:t>
+              <a:t>17/05/2012</a:t>
             </a:fld>
             <a:endParaRPr lang="es-AR"/>
           </a:p>
@@ -2846,7 +2846,7 @@
             <a:fld id="{3F2D9CC0-97DE-46BA-A91E-5E70B2C519B4}" type="slidenum">
               <a:rPr lang="es-AR" smtClean="0"/>
               <a:pPr/>
-              <a:t>‹#›</a:t>
+              <a:t>‹Nº›</a:t>
             </a:fld>
             <a:endParaRPr lang="es-AR"/>
           </a:p>
@@ -2923,7 +2923,7 @@
             <a:fld id="{00D03AD9-B274-4317-8993-B21EFD32709D}" type="datetimeFigureOut">
               <a:rPr lang="es-AR" smtClean="0"/>
               <a:pPr/>
-              <a:t>26/04/2012</a:t>
+              <a:t>17/05/2012</a:t>
             </a:fld>
             <a:endParaRPr lang="es-AR"/>
           </a:p>
@@ -2966,7 +2966,7 @@
             <a:fld id="{3F2D9CC0-97DE-46BA-A91E-5E70B2C519B4}" type="slidenum">
               <a:rPr lang="es-AR" smtClean="0"/>
               <a:pPr/>
-              <a:t>‹#›</a:t>
+              <a:t>‹Nº›</a:t>
             </a:fld>
             <a:endParaRPr lang="es-AR"/>
           </a:p>
@@ -3020,7 +3020,7 @@
             <a:fld id="{00D03AD9-B274-4317-8993-B21EFD32709D}" type="datetimeFigureOut">
               <a:rPr lang="es-AR" smtClean="0"/>
               <a:pPr/>
-              <a:t>26/04/2012</a:t>
+              <a:t>17/05/2012</a:t>
             </a:fld>
             <a:endParaRPr lang="es-AR"/>
           </a:p>
@@ -3063,7 +3063,7 @@
             <a:fld id="{3F2D9CC0-97DE-46BA-A91E-5E70B2C519B4}" type="slidenum">
               <a:rPr lang="es-AR" smtClean="0"/>
               <a:pPr/>
-              <a:t>‹#›</a:t>
+              <a:t>‹Nº›</a:t>
             </a:fld>
             <a:endParaRPr lang="es-AR"/>
           </a:p>
@@ -3299,7 +3299,7 @@
             <a:fld id="{00D03AD9-B274-4317-8993-B21EFD32709D}" type="datetimeFigureOut">
               <a:rPr lang="es-AR" smtClean="0"/>
               <a:pPr/>
-              <a:t>26/04/2012</a:t>
+              <a:t>17/05/2012</a:t>
             </a:fld>
             <a:endParaRPr lang="es-AR"/>
           </a:p>
@@ -3342,7 +3342,7 @@
             <a:fld id="{3F2D9CC0-97DE-46BA-A91E-5E70B2C519B4}" type="slidenum">
               <a:rPr lang="es-AR" smtClean="0"/>
               <a:pPr/>
-              <a:t>‹#›</a:t>
+              <a:t>‹Nº›</a:t>
             </a:fld>
             <a:endParaRPr lang="es-AR"/>
           </a:p>
@@ -3554,7 +3554,7 @@
             <a:fld id="{00D03AD9-B274-4317-8993-B21EFD32709D}" type="datetimeFigureOut">
               <a:rPr lang="es-AR" smtClean="0"/>
               <a:pPr/>
-              <a:t>26/04/2012</a:t>
+              <a:t>17/05/2012</a:t>
             </a:fld>
             <a:endParaRPr lang="es-AR"/>
           </a:p>
@@ -3597,7 +3597,7 @@
             <a:fld id="{3F2D9CC0-97DE-46BA-A91E-5E70B2C519B4}" type="slidenum">
               <a:rPr lang="es-AR" smtClean="0"/>
               <a:pPr/>
-              <a:t>‹#›</a:t>
+              <a:t>‹Nº›</a:t>
             </a:fld>
             <a:endParaRPr lang="es-AR"/>
           </a:p>
@@ -3778,7 +3778,7 @@
             <a:fld id="{00D03AD9-B274-4317-8993-B21EFD32709D}" type="datetimeFigureOut">
               <a:rPr lang="es-AR" smtClean="0"/>
               <a:pPr/>
-              <a:t>26/04/2012</a:t>
+              <a:t>17/05/2012</a:t>
             </a:fld>
             <a:endParaRPr lang="es-AR"/>
           </a:p>
@@ -3857,7 +3857,7 @@
             <a:fld id="{3F2D9CC0-97DE-46BA-A91E-5E70B2C519B4}" type="slidenum">
               <a:rPr lang="es-AR" smtClean="0"/>
               <a:pPr/>
-              <a:t>‹#›</a:t>
+              <a:t>‹Nº›</a:t>
             </a:fld>
             <a:endParaRPr lang="es-AR"/>
           </a:p>
@@ -4441,7 +4441,7 @@
         </p:nvSpPr>
         <p:spPr>
           <a:xfrm>
-            <a:off x="323528" y="260648"/>
+            <a:off x="35496" y="260648"/>
             <a:ext cx="2736304" cy="288032"/>
           </a:xfrm>
         </p:spPr>
@@ -4452,11 +4452,34 @@
           <a:lstStyle/>
           <a:p>
             <a:r>
-              <a:rPr lang="es-AR" sz="2000" dirty="0" smtClean="0">
+              <a:rPr lang="es-AR" sz="2000" dirty="0" err="1">
+                <a:solidFill>
+                  <a:srgbClr val="C00000"/>
+                </a:solidFill>
                 <a:latin typeface="Aharoni" pitchFamily="2" charset="-79"/>
                 <a:cs typeface="Aharoni" pitchFamily="2" charset="-79"/>
               </a:rPr>
-              <a:t>Seguridad para Todos</a:t>
+              <a:t>Panic</a:t>
+            </a:r>
+            <a:r>
+              <a:rPr lang="es-AR" sz="2000" dirty="0">
+                <a:solidFill>
+                  <a:srgbClr val="C00000"/>
+                </a:solidFill>
+                <a:latin typeface="Aharoni" pitchFamily="2" charset="-79"/>
+                <a:cs typeface="Aharoni" pitchFamily="2" charset="-79"/>
+              </a:rPr>
+              <a:t> Dial </a:t>
+            </a:r>
+            <a:r>
+              <a:rPr lang="es-AR" sz="2000" dirty="0" err="1">
+                <a:solidFill>
+                  <a:srgbClr val="C00000"/>
+                </a:solidFill>
+                <a:latin typeface="Aharoni" pitchFamily="2" charset="-79"/>
+                <a:cs typeface="Aharoni" pitchFamily="2" charset="-79"/>
+              </a:rPr>
+              <a:t>Button</a:t>
             </a:r>
             <a:endParaRPr lang="es-AR" sz="2000" dirty="0">
               <a:latin typeface="Aharoni" pitchFamily="2" charset="-79"/>
@@ -4531,7 +4554,7 @@
         </p:blipFill>
         <p:spPr>
           <a:xfrm>
-            <a:off x="3203848" y="260648"/>
+            <a:off x="2483768" y="279732"/>
             <a:ext cx="468052" cy="277364"/>
           </a:xfrm>
           <a:prstGeom prst="rect">
@@ -4746,42 +4769,6 @@
       </p:grpSpPr>
       <p:sp>
         <p:nvSpPr>
-          <p:cNvPr id="2" name="1 Título"/>
-          <p:cNvSpPr>
-            <a:spLocks noGrp="1"/>
-          </p:cNvSpPr>
-          <p:nvPr>
-            <p:ph type="ctrTitle"/>
-          </p:nvPr>
-        </p:nvSpPr>
-        <p:spPr>
-          <a:xfrm>
-            <a:off x="323528" y="260648"/>
-            <a:ext cx="2736304" cy="288032"/>
-          </a:xfrm>
-        </p:spPr>
-        <p:txBody>
-          <a:bodyPr>
-            <a:normAutofit fontScale="90000"/>
-          </a:bodyPr>
-          <a:lstStyle/>
-          <a:p>
-            <a:r>
-              <a:rPr lang="es-AR" sz="2000" dirty="0" smtClean="0">
-                <a:latin typeface="Aharoni" pitchFamily="2" charset="-79"/>
-                <a:cs typeface="Aharoni" pitchFamily="2" charset="-79"/>
-              </a:rPr>
-              <a:t>Seguridad para Todos</a:t>
-            </a:r>
-            <a:endParaRPr lang="es-AR" sz="2000" dirty="0">
-              <a:latin typeface="Aharoni" pitchFamily="2" charset="-79"/>
-              <a:cs typeface="Aharoni" pitchFamily="2" charset="-79"/>
-            </a:endParaRPr>
-          </a:p>
-        </p:txBody>
-      </p:sp>
-      <p:sp>
-        <p:nvSpPr>
           <p:cNvPr id="3" name="2 Subtítulo"/>
           <p:cNvSpPr>
             <a:spLocks noGrp="1"/>
@@ -4824,9 +4811,276 @@
           </a:p>
         </p:txBody>
       </p:sp>
+      <p:sp>
+        <p:nvSpPr>
+          <p:cNvPr id="8" name="1 Título"/>
+          <p:cNvSpPr txBox="1">
+            <a:spLocks/>
+          </p:cNvSpPr>
+          <p:nvPr/>
+        </p:nvSpPr>
+        <p:spPr>
+          <a:xfrm>
+            <a:off x="1012807" y="836712"/>
+            <a:ext cx="7118386" cy="792088"/>
+          </a:xfrm>
+          <a:prstGeom prst="rect">
+            <a:avLst/>
+          </a:prstGeom>
+        </p:spPr>
+        <p:txBody>
+          <a:bodyPr vert="horz" lIns="91440" tIns="45720" rIns="91440" bIns="45720" rtlCol="0" anchor="ctr">
+            <a:noAutofit/>
+          </a:bodyPr>
+          <a:lstStyle>
+            <a:lvl1pPr algn="ctr" defTabSz="914400" rtl="0" eaLnBrk="1" latinLnBrk="0" hangingPunct="1">
+              <a:spcBef>
+                <a:spcPct val="0"/>
+              </a:spcBef>
+              <a:buNone/>
+              <a:defRPr sz="4400" kern="1200">
+                <a:solidFill>
+                  <a:schemeClr val="tx1"/>
+                </a:solidFill>
+                <a:latin typeface="+mj-lt"/>
+                <a:ea typeface="+mj-ea"/>
+                <a:cs typeface="+mj-cs"/>
+              </a:defRPr>
+            </a:lvl1pPr>
+          </a:lstStyle>
+          <a:p>
+            <a:r>
+              <a:rPr lang="es-AR" sz="4800" b="1" dirty="0" smtClean="0">
+                <a:latin typeface="Trebuchet MS" pitchFamily="34" charset="0"/>
+                <a:cs typeface="Levenim MT" pitchFamily="2" charset="-79"/>
+              </a:rPr>
+              <a:t>Nuestros Objetivos</a:t>
+            </a:r>
+            <a:endParaRPr lang="es-AR" sz="4800" b="1" dirty="0">
+              <a:latin typeface="Trebuchet MS" pitchFamily="34" charset="0"/>
+              <a:cs typeface="Levenim MT" pitchFamily="2" charset="-79"/>
+            </a:endParaRPr>
+          </a:p>
+        </p:txBody>
+      </p:sp>
+      <p:cxnSp>
+        <p:nvCxnSpPr>
+          <p:cNvPr id="5" name="Straight Connector 4"/>
+          <p:cNvCxnSpPr/>
+          <p:nvPr/>
+        </p:nvCxnSpPr>
+        <p:spPr>
+          <a:xfrm>
+            <a:off x="395536" y="692696"/>
+            <a:ext cx="8496944" cy="0"/>
+          </a:xfrm>
+          <a:prstGeom prst="line">
+            <a:avLst/>
+          </a:prstGeom>
+          <a:ln>
+            <a:solidFill>
+              <a:schemeClr val="bg1">
+                <a:lumMod val="65000"/>
+              </a:schemeClr>
+            </a:solidFill>
+          </a:ln>
+        </p:spPr>
+        <p:style>
+          <a:lnRef idx="1">
+            <a:schemeClr val="accent1"/>
+          </a:lnRef>
+          <a:fillRef idx="0">
+            <a:schemeClr val="accent1"/>
+          </a:fillRef>
+          <a:effectRef idx="0">
+            <a:schemeClr val="accent1"/>
+          </a:effectRef>
+          <a:fontRef idx="minor">
+            <a:schemeClr val="tx1"/>
+          </a:fontRef>
+        </p:style>
+      </p:cxnSp>
+      <p:sp>
+        <p:nvSpPr>
+          <p:cNvPr id="7" name="TextBox 6"/>
+          <p:cNvSpPr txBox="1"/>
+          <p:nvPr/>
+        </p:nvSpPr>
+        <p:spPr>
+          <a:xfrm>
+            <a:off x="395536" y="1790814"/>
+            <a:ext cx="8352928" cy="2862322"/>
+          </a:xfrm>
+          <a:prstGeom prst="rect">
+            <a:avLst/>
+          </a:prstGeom>
+          <a:noFill/>
+        </p:spPr>
+        <p:txBody>
+          <a:bodyPr wrap="square" rtlCol="0">
+            <a:spAutoFit/>
+          </a:bodyPr>
+          <a:lstStyle/>
+          <a:p>
+            <a:pPr marL="571500" indent="-571500">
+              <a:buFont typeface="Wingdings" pitchFamily="2" charset="2"/>
+              <a:buChar char="§"/>
+            </a:pPr>
+            <a:r>
+              <a:rPr lang="es-AR" sz="3600" b="1" dirty="0" smtClean="0"/>
+              <a:t>Herramienta de Localización </a:t>
+            </a:r>
+            <a:r>
+              <a:rPr lang="es-AR" sz="3600" dirty="0"/>
+              <a:t>R</a:t>
+            </a:r>
+            <a:r>
+              <a:rPr lang="es-AR" sz="3600" dirty="0" smtClean="0"/>
+              <a:t>ápida y Efectiva.</a:t>
+            </a:r>
+          </a:p>
+          <a:p>
+            <a:pPr marL="571500" indent="-571500">
+              <a:buFont typeface="Wingdings" pitchFamily="2" charset="2"/>
+              <a:buChar char="§"/>
+            </a:pPr>
+            <a:r>
+              <a:rPr lang="es-AR" sz="3600" dirty="0" smtClean="0"/>
+              <a:t>Sincronizada con </a:t>
+            </a:r>
+            <a:r>
+              <a:rPr lang="es-AR" sz="3600" b="1" dirty="0" smtClean="0"/>
+              <a:t>Agentes de Seguridad</a:t>
+            </a:r>
+            <a:r>
+              <a:rPr lang="es-AR" sz="3600" dirty="0" smtClean="0"/>
+              <a:t>.</a:t>
+            </a:r>
+          </a:p>
+          <a:p>
+            <a:pPr marL="571500" indent="-571500">
+              <a:buFont typeface="Wingdings" pitchFamily="2" charset="2"/>
+              <a:buChar char="§"/>
+            </a:pPr>
+            <a:r>
+              <a:rPr lang="es-AR" sz="3600" dirty="0" smtClean="0"/>
+              <a:t>Mejorar </a:t>
+            </a:r>
+            <a:r>
+              <a:rPr lang="es-AR" sz="3600" dirty="0"/>
+              <a:t>la </a:t>
+            </a:r>
+            <a:r>
+              <a:rPr lang="es-AR" sz="3600" b="1" dirty="0" smtClean="0"/>
+              <a:t>Calidad </a:t>
+            </a:r>
+            <a:r>
+              <a:rPr lang="es-AR" sz="3600" b="1" dirty="0"/>
+              <a:t>de </a:t>
+            </a:r>
+            <a:r>
+              <a:rPr lang="es-AR" sz="3600" b="1" dirty="0" smtClean="0"/>
+              <a:t>Vida</a:t>
+            </a:r>
+            <a:r>
+              <a:rPr lang="es-AR" sz="3600" dirty="0" smtClean="0"/>
+              <a:t>.</a:t>
+            </a:r>
+          </a:p>
+          <a:p>
+            <a:pPr marL="571500" indent="-571500">
+              <a:buFont typeface="Wingdings" pitchFamily="2" charset="2"/>
+              <a:buChar char="§"/>
+            </a:pPr>
+            <a:r>
+              <a:rPr lang="es-AR" sz="3600" b="1" dirty="0" smtClean="0"/>
+              <a:t>Reducir</a:t>
+            </a:r>
+            <a:r>
+              <a:rPr lang="es-AR" sz="3600" dirty="0" smtClean="0"/>
+              <a:t> la Criminalidad.</a:t>
+            </a:r>
+          </a:p>
+        </p:txBody>
+      </p:sp>
+      <p:sp>
+        <p:nvSpPr>
+          <p:cNvPr id="11" name="1 Título"/>
+          <p:cNvSpPr txBox="1">
+            <a:spLocks/>
+          </p:cNvSpPr>
+          <p:nvPr/>
+        </p:nvSpPr>
+        <p:spPr>
+          <a:xfrm>
+            <a:off x="35496" y="260648"/>
+            <a:ext cx="2736304" cy="288032"/>
+          </a:xfrm>
+          <a:prstGeom prst="rect">
+            <a:avLst/>
+          </a:prstGeom>
+        </p:spPr>
+        <p:txBody>
+          <a:bodyPr vert="horz" lIns="91440" tIns="45720" rIns="91440" bIns="45720" rtlCol="0" anchor="ctr">
+            <a:noAutofit/>
+          </a:bodyPr>
+          <a:lstStyle>
+            <a:lvl1pPr algn="ctr" defTabSz="914400" rtl="0" eaLnBrk="1" latinLnBrk="0" hangingPunct="1">
+              <a:spcBef>
+                <a:spcPct val="0"/>
+              </a:spcBef>
+              <a:buNone/>
+              <a:defRPr sz="4400" kern="1200">
+                <a:solidFill>
+                  <a:schemeClr val="tx1"/>
+                </a:solidFill>
+                <a:latin typeface="+mj-lt"/>
+                <a:ea typeface="+mj-ea"/>
+                <a:cs typeface="+mj-cs"/>
+              </a:defRPr>
+            </a:lvl1pPr>
+          </a:lstStyle>
+          <a:p>
+            <a:r>
+              <a:rPr lang="es-AR" sz="1800" dirty="0" err="1" smtClean="0">
+                <a:solidFill>
+                  <a:srgbClr val="C00000"/>
+                </a:solidFill>
+                <a:latin typeface="Aharoni" pitchFamily="2" charset="-79"/>
+                <a:cs typeface="Aharoni" pitchFamily="2" charset="-79"/>
+              </a:rPr>
+              <a:t>Panic</a:t>
+            </a:r>
+            <a:r>
+              <a:rPr lang="es-AR" sz="1800" dirty="0" smtClean="0">
+                <a:solidFill>
+                  <a:srgbClr val="C00000"/>
+                </a:solidFill>
+                <a:latin typeface="Aharoni" pitchFamily="2" charset="-79"/>
+                <a:cs typeface="Aharoni" pitchFamily="2" charset="-79"/>
+              </a:rPr>
+              <a:t> Dial </a:t>
+            </a:r>
+            <a:r>
+              <a:rPr lang="es-AR" sz="1800" dirty="0" err="1" smtClean="0">
+                <a:solidFill>
+                  <a:srgbClr val="C00000"/>
+                </a:solidFill>
+                <a:latin typeface="Aharoni" pitchFamily="2" charset="-79"/>
+                <a:cs typeface="Aharoni" pitchFamily="2" charset="-79"/>
+              </a:rPr>
+              <a:t>Button</a:t>
+            </a:r>
+            <a:endParaRPr lang="es-AR" sz="1800" dirty="0">
+              <a:latin typeface="Aharoni" pitchFamily="2" charset="-79"/>
+              <a:cs typeface="Aharoni" pitchFamily="2" charset="-79"/>
+            </a:endParaRPr>
+          </a:p>
+        </p:txBody>
+      </p:sp>
       <p:pic>
         <p:nvPicPr>
-          <p:cNvPr id="6" name="Picture 5"/>
+          <p:cNvPr id="12" name="Picture 5"/>
           <p:cNvPicPr>
             <a:picLocks noChangeAspect="1"/>
           </p:cNvPicPr>
@@ -4846,7 +5100,7 @@
         </p:blipFill>
         <p:spPr>
           <a:xfrm>
-            <a:off x="3203848" y="260648"/>
+            <a:off x="2483768" y="279732"/>
             <a:ext cx="468052" cy="277364"/>
           </a:xfrm>
           <a:prstGeom prst="rect">
@@ -4854,198 +5108,6 @@
           </a:prstGeom>
         </p:spPr>
       </p:pic>
-      <p:sp>
-        <p:nvSpPr>
-          <p:cNvPr id="8" name="1 Título"/>
-          <p:cNvSpPr txBox="1">
-            <a:spLocks/>
-          </p:cNvSpPr>
-          <p:nvPr/>
-        </p:nvSpPr>
-        <p:spPr>
-          <a:xfrm>
-            <a:off x="1012807" y="836712"/>
-            <a:ext cx="7118386" cy="792088"/>
-          </a:xfrm>
-          <a:prstGeom prst="rect">
-            <a:avLst/>
-          </a:prstGeom>
-        </p:spPr>
-        <p:txBody>
-          <a:bodyPr vert="horz" lIns="91440" tIns="45720" rIns="91440" bIns="45720" rtlCol="0" anchor="ctr">
-            <a:noAutofit/>
-          </a:bodyPr>
-          <a:lstStyle>
-            <a:lvl1pPr algn="ctr" defTabSz="914400" rtl="0" eaLnBrk="1" latinLnBrk="0" hangingPunct="1">
-              <a:spcBef>
-                <a:spcPct val="0"/>
-              </a:spcBef>
-              <a:buNone/>
-              <a:defRPr sz="4400" kern="1200">
-                <a:solidFill>
-                  <a:schemeClr val="tx1"/>
-                </a:solidFill>
-                <a:latin typeface="+mj-lt"/>
-                <a:ea typeface="+mj-ea"/>
-                <a:cs typeface="+mj-cs"/>
-              </a:defRPr>
-            </a:lvl1pPr>
-          </a:lstStyle>
-          <a:p>
-            <a:r>
-              <a:rPr lang="es-AR" sz="4800" b="1" dirty="0" smtClean="0">
-                <a:latin typeface="Trebuchet MS" pitchFamily="34" charset="0"/>
-                <a:cs typeface="Levenim MT" pitchFamily="2" charset="-79"/>
-              </a:rPr>
-              <a:t>Nuestros Objetivos</a:t>
-            </a:r>
-            <a:endParaRPr lang="es-AR" sz="4800" b="1" dirty="0">
-              <a:latin typeface="Trebuchet MS" pitchFamily="34" charset="0"/>
-              <a:cs typeface="Levenim MT" pitchFamily="2" charset="-79"/>
-            </a:endParaRPr>
-          </a:p>
-        </p:txBody>
-      </p:sp>
-      <p:cxnSp>
-        <p:nvCxnSpPr>
-          <p:cNvPr id="5" name="Straight Connector 4"/>
-          <p:cNvCxnSpPr/>
-          <p:nvPr/>
-        </p:nvCxnSpPr>
-        <p:spPr>
-          <a:xfrm>
-            <a:off x="395536" y="692696"/>
-            <a:ext cx="8496944" cy="0"/>
-          </a:xfrm>
-          <a:prstGeom prst="line">
-            <a:avLst/>
-          </a:prstGeom>
-          <a:ln>
-            <a:solidFill>
-              <a:schemeClr val="bg1">
-                <a:lumMod val="65000"/>
-              </a:schemeClr>
-            </a:solidFill>
-          </a:ln>
-        </p:spPr>
-        <p:style>
-          <a:lnRef idx="1">
-            <a:schemeClr val="accent1"/>
-          </a:lnRef>
-          <a:fillRef idx="0">
-            <a:schemeClr val="accent1"/>
-          </a:fillRef>
-          <a:effectRef idx="0">
-            <a:schemeClr val="accent1"/>
-          </a:effectRef>
-          <a:fontRef idx="minor">
-            <a:schemeClr val="tx1"/>
-          </a:fontRef>
-        </p:style>
-      </p:cxnSp>
-      <p:sp>
-        <p:nvSpPr>
-          <p:cNvPr id="7" name="TextBox 6"/>
-          <p:cNvSpPr txBox="1"/>
-          <p:nvPr/>
-        </p:nvSpPr>
-        <p:spPr>
-          <a:xfrm>
-            <a:off x="395536" y="1790814"/>
-            <a:ext cx="8352928" cy="2862322"/>
-          </a:xfrm>
-          <a:prstGeom prst="rect">
-            <a:avLst/>
-          </a:prstGeom>
-          <a:noFill/>
-        </p:spPr>
-        <p:txBody>
-          <a:bodyPr wrap="square" rtlCol="0">
-            <a:spAutoFit/>
-          </a:bodyPr>
-          <a:lstStyle/>
-          <a:p>
-            <a:pPr marL="571500" indent="-571500">
-              <a:buFont typeface="Wingdings" pitchFamily="2" charset="2"/>
-              <a:buChar char="§"/>
-            </a:pPr>
-            <a:r>
-              <a:rPr lang="es-AR" sz="3600" b="1" dirty="0" smtClean="0"/>
-              <a:t>Herramienta de Localización </a:t>
-            </a:r>
-            <a:r>
-              <a:rPr lang="es-AR" sz="3600" dirty="0"/>
-              <a:t>R</a:t>
-            </a:r>
-            <a:r>
-              <a:rPr lang="es-AR" sz="3600" dirty="0" smtClean="0"/>
-              <a:t>ápida y Efectiva.</a:t>
-            </a:r>
-          </a:p>
-          <a:p>
-            <a:pPr marL="571500" indent="-571500">
-              <a:buFont typeface="Wingdings" pitchFamily="2" charset="2"/>
-              <a:buChar char="§"/>
-            </a:pPr>
-            <a:r>
-              <a:rPr lang="es-AR" sz="3600" dirty="0" smtClean="0"/>
-              <a:t>Sincronizada con </a:t>
-            </a:r>
-            <a:r>
-              <a:rPr lang="es-AR" sz="3600" b="1" dirty="0" smtClean="0"/>
-              <a:t>Agentes de Seguridad</a:t>
-            </a:r>
-            <a:r>
-              <a:rPr lang="es-AR" sz="3600" dirty="0" smtClean="0"/>
-              <a:t>.</a:t>
-            </a:r>
-          </a:p>
-          <a:p>
-            <a:pPr marL="571500" indent="-571500">
-              <a:buFont typeface="Wingdings" pitchFamily="2" charset="2"/>
-              <a:buChar char="§"/>
-            </a:pPr>
-            <a:r>
-              <a:rPr lang="es-AR" sz="3600" dirty="0" smtClean="0"/>
-              <a:t>Mejorar </a:t>
-            </a:r>
-            <a:r>
-              <a:rPr lang="es-AR" sz="3600" dirty="0"/>
-              <a:t>la </a:t>
-            </a:r>
-            <a:r>
-              <a:rPr lang="es-AR" sz="3600" b="1" dirty="0" smtClean="0"/>
-              <a:t>Calidad </a:t>
-            </a:r>
-            <a:r>
-              <a:rPr lang="es-AR" sz="3600" b="1" dirty="0"/>
-              <a:t>de </a:t>
-            </a:r>
-            <a:r>
-              <a:rPr lang="es-AR" sz="3600" b="1" dirty="0" smtClean="0"/>
-              <a:t>Vida</a:t>
-            </a:r>
-            <a:r>
-              <a:rPr lang="es-AR" sz="3600" dirty="0" smtClean="0"/>
-              <a:t>.</a:t>
-            </a:r>
-          </a:p>
-          <a:p>
-            <a:pPr marL="571500" indent="-571500">
-              <a:buFont typeface="Wingdings" pitchFamily="2" charset="2"/>
-              <a:buChar char="§"/>
-            </a:pPr>
-            <a:r>
-              <a:rPr lang="es-AR" sz="3600" b="1" dirty="0" smtClean="0"/>
-              <a:t>Reducir</a:t>
-            </a:r>
-            <a:r>
-              <a:rPr lang="es-AR" sz="3600" dirty="0" smtClean="0"/>
-              <a:t> la Criminalidad.</a:t>
-            </a:r>
-          </a:p>
-        </p:txBody>
-      </p:sp>
     </p:spTree>
     <p:extLst>
       <p:ext uri="{BB962C8B-B14F-4D97-AF65-F5344CB8AC3E}">
@@ -5085,42 +5147,6 @@
       </p:grpSpPr>
       <p:sp>
         <p:nvSpPr>
-          <p:cNvPr id="2" name="1 Título"/>
-          <p:cNvSpPr>
-            <a:spLocks noGrp="1"/>
-          </p:cNvSpPr>
-          <p:nvPr>
-            <p:ph type="ctrTitle"/>
-          </p:nvPr>
-        </p:nvSpPr>
-        <p:spPr>
-          <a:xfrm>
-            <a:off x="323528" y="260648"/>
-            <a:ext cx="2736304" cy="288032"/>
-          </a:xfrm>
-        </p:spPr>
-        <p:txBody>
-          <a:bodyPr>
-            <a:normAutofit fontScale="90000"/>
-          </a:bodyPr>
-          <a:lstStyle/>
-          <a:p>
-            <a:r>
-              <a:rPr lang="es-AR" sz="2000" dirty="0" smtClean="0">
-                <a:latin typeface="Aharoni" pitchFamily="2" charset="-79"/>
-                <a:cs typeface="Aharoni" pitchFamily="2" charset="-79"/>
-              </a:rPr>
-              <a:t>Seguridad para Todos</a:t>
-            </a:r>
-            <a:endParaRPr lang="es-AR" sz="2000" dirty="0">
-              <a:latin typeface="Aharoni" pitchFamily="2" charset="-79"/>
-              <a:cs typeface="Aharoni" pitchFamily="2" charset="-79"/>
-            </a:endParaRPr>
-          </a:p>
-        </p:txBody>
-      </p:sp>
-      <p:sp>
-        <p:nvSpPr>
           <p:cNvPr id="3" name="2 Subtítulo"/>
           <p:cNvSpPr>
             <a:spLocks noGrp="1"/>
@@ -5163,9 +5189,305 @@
           </a:p>
         </p:txBody>
       </p:sp>
+      <p:sp>
+        <p:nvSpPr>
+          <p:cNvPr id="8" name="1 Título"/>
+          <p:cNvSpPr txBox="1">
+            <a:spLocks/>
+          </p:cNvSpPr>
+          <p:nvPr/>
+        </p:nvSpPr>
+        <p:spPr>
+          <a:xfrm>
+            <a:off x="1012807" y="836712"/>
+            <a:ext cx="7118386" cy="792088"/>
+          </a:xfrm>
+          <a:prstGeom prst="rect">
+            <a:avLst/>
+          </a:prstGeom>
+        </p:spPr>
+        <p:txBody>
+          <a:bodyPr vert="horz" lIns="91440" tIns="45720" rIns="91440" bIns="45720" rtlCol="0" anchor="ctr">
+            <a:noAutofit/>
+          </a:bodyPr>
+          <a:lstStyle>
+            <a:lvl1pPr algn="ctr" defTabSz="914400" rtl="0" eaLnBrk="1" latinLnBrk="0" hangingPunct="1">
+              <a:spcBef>
+                <a:spcPct val="0"/>
+              </a:spcBef>
+              <a:buNone/>
+              <a:defRPr sz="4400" kern="1200">
+                <a:solidFill>
+                  <a:schemeClr val="tx1"/>
+                </a:solidFill>
+                <a:latin typeface="+mj-lt"/>
+                <a:ea typeface="+mj-ea"/>
+                <a:cs typeface="+mj-cs"/>
+              </a:defRPr>
+            </a:lvl1pPr>
+          </a:lstStyle>
+          <a:p>
+            <a:r>
+              <a:rPr lang="es-AR" sz="4800" b="1" dirty="0" smtClean="0">
+                <a:latin typeface="Trebuchet MS" pitchFamily="34" charset="0"/>
+                <a:cs typeface="Levenim MT" pitchFamily="2" charset="-79"/>
+              </a:rPr>
+              <a:t>Tipos de Clientes</a:t>
+            </a:r>
+            <a:endParaRPr lang="es-AR" sz="4800" b="1" dirty="0">
+              <a:latin typeface="Trebuchet MS" pitchFamily="34" charset="0"/>
+              <a:cs typeface="Levenim MT" pitchFamily="2" charset="-79"/>
+            </a:endParaRPr>
+          </a:p>
+        </p:txBody>
+      </p:sp>
+      <p:cxnSp>
+        <p:nvCxnSpPr>
+          <p:cNvPr id="5" name="Straight Connector 4"/>
+          <p:cNvCxnSpPr/>
+          <p:nvPr/>
+        </p:nvCxnSpPr>
+        <p:spPr>
+          <a:xfrm>
+            <a:off x="395536" y="692696"/>
+            <a:ext cx="8496944" cy="0"/>
+          </a:xfrm>
+          <a:prstGeom prst="line">
+            <a:avLst/>
+          </a:prstGeom>
+          <a:ln>
+            <a:solidFill>
+              <a:schemeClr val="bg1">
+                <a:lumMod val="65000"/>
+              </a:schemeClr>
+            </a:solidFill>
+          </a:ln>
+        </p:spPr>
+        <p:style>
+          <a:lnRef idx="1">
+            <a:schemeClr val="accent1"/>
+          </a:lnRef>
+          <a:fillRef idx="0">
+            <a:schemeClr val="accent1"/>
+          </a:fillRef>
+          <a:effectRef idx="0">
+            <a:schemeClr val="accent1"/>
+          </a:effectRef>
+          <a:fontRef idx="minor">
+            <a:schemeClr val="tx1"/>
+          </a:fontRef>
+        </p:style>
+      </p:cxnSp>
+      <p:sp>
+        <p:nvSpPr>
+          <p:cNvPr id="7" name="TextBox 6"/>
+          <p:cNvSpPr txBox="1"/>
+          <p:nvPr/>
+        </p:nvSpPr>
+        <p:spPr>
+          <a:xfrm>
+            <a:off x="395536" y="1700808"/>
+            <a:ext cx="8352928" cy="5078313"/>
+          </a:xfrm>
+          <a:prstGeom prst="rect">
+            <a:avLst/>
+          </a:prstGeom>
+          <a:noFill/>
+        </p:spPr>
+        <p:txBody>
+          <a:bodyPr wrap="square" rtlCol="0">
+            <a:spAutoFit/>
+          </a:bodyPr>
+          <a:lstStyle/>
+          <a:p>
+            <a:r>
+              <a:rPr lang="es-AR" sz="3600" b="1" dirty="0" smtClean="0"/>
+              <a:t>Acceso Masivo:</a:t>
+            </a:r>
+            <a:r>
+              <a:rPr lang="es-AR" sz="3600" dirty="0" smtClean="0"/>
+              <a:t> Ciudadano</a:t>
+            </a:r>
+          </a:p>
+          <a:p>
+            <a:pPr marL="1028700" lvl="1" indent="-571500">
+              <a:buFont typeface="Wingdings" pitchFamily="2" charset="2"/>
+              <a:buChar char="§"/>
+            </a:pPr>
+            <a:r>
+              <a:rPr lang="es-AR" sz="3600" dirty="0" smtClean="0"/>
+              <a:t>Gratuito.</a:t>
+            </a:r>
+          </a:p>
+          <a:p>
+            <a:pPr marL="1028700" lvl="1" indent="-571500">
+              <a:buFont typeface="Wingdings" pitchFamily="2" charset="2"/>
+              <a:buChar char="§"/>
+            </a:pPr>
+            <a:r>
+              <a:rPr lang="es-AR" sz="3600" dirty="0"/>
+              <a:t>Fácil </a:t>
+            </a:r>
+            <a:r>
+              <a:rPr lang="es-AR" sz="3600" dirty="0" smtClean="0"/>
+              <a:t>Acceso.</a:t>
+            </a:r>
+          </a:p>
+          <a:p>
+            <a:r>
+              <a:rPr lang="es-AR" sz="3600" b="1" dirty="0"/>
+              <a:t>Planes según </a:t>
+            </a:r>
+            <a:r>
+              <a:rPr lang="es-AR" sz="3600" b="1" dirty="0" smtClean="0"/>
+              <a:t>Necesidades Específicas:</a:t>
+            </a:r>
+            <a:r>
+              <a:rPr lang="es-AR" sz="3600" dirty="0" smtClean="0"/>
+              <a:t> Empresarial o Familiar</a:t>
+            </a:r>
+          </a:p>
+          <a:p>
+            <a:pPr marL="1028700" lvl="1" indent="-571500">
+              <a:buFont typeface="Wingdings" pitchFamily="2" charset="2"/>
+              <a:buChar char="§"/>
+            </a:pPr>
+            <a:r>
+              <a:rPr lang="es-AR" sz="3600" dirty="0" smtClean="0"/>
+              <a:t>5 $ARS (90.000 usuarios en 36 meses)</a:t>
+            </a:r>
+          </a:p>
+          <a:p>
+            <a:pPr marL="1028700" lvl="1" indent="-571500">
+              <a:buFont typeface="Wingdings" pitchFamily="2" charset="2"/>
+              <a:buChar char="§"/>
+            </a:pPr>
+            <a:r>
+              <a:rPr lang="es-AR" sz="3600" dirty="0" smtClean="0"/>
+              <a:t>Monitoreo Periódico.</a:t>
+            </a:r>
+          </a:p>
+          <a:p>
+            <a:pPr marL="1028700" lvl="1" indent="-571500">
+              <a:buFont typeface="Wingdings" pitchFamily="2" charset="2"/>
+              <a:buChar char="§"/>
+            </a:pPr>
+            <a:r>
+              <a:rPr lang="es-AR" sz="3600" dirty="0"/>
+              <a:t>Alarmas de </a:t>
+            </a:r>
+            <a:r>
+              <a:rPr lang="es-AR" sz="3600" dirty="0" smtClean="0"/>
+              <a:t>Zona </a:t>
+            </a:r>
+            <a:r>
+              <a:rPr lang="es-AR" sz="3600" dirty="0"/>
+              <a:t>P</a:t>
+            </a:r>
+            <a:r>
+              <a:rPr lang="es-AR" sz="3600" dirty="0" smtClean="0"/>
+              <a:t>eligrosa.</a:t>
+            </a:r>
+          </a:p>
+          <a:p>
+            <a:pPr marL="1028700" lvl="1" indent="-571500">
+              <a:buFont typeface="Wingdings" pitchFamily="2" charset="2"/>
+              <a:buChar char="§"/>
+            </a:pPr>
+            <a:r>
+              <a:rPr lang="es-AR" sz="3600" dirty="0"/>
+              <a:t>Esquema de </a:t>
+            </a:r>
+            <a:r>
+              <a:rPr lang="es-AR" sz="3600" dirty="0" err="1" smtClean="0"/>
+              <a:t>Check-Points</a:t>
+            </a:r>
+            <a:r>
+              <a:rPr lang="es-AR" sz="3600" dirty="0" smtClean="0"/>
+              <a:t>.</a:t>
+            </a:r>
+            <a:endParaRPr lang="es-AR" sz="3600" dirty="0"/>
+          </a:p>
+        </p:txBody>
+      </p:sp>
+      <p:sp>
+        <p:nvSpPr>
+          <p:cNvPr id="9" name="1 Título"/>
+          <p:cNvSpPr txBox="1">
+            <a:spLocks/>
+          </p:cNvSpPr>
+          <p:nvPr/>
+        </p:nvSpPr>
+        <p:spPr>
+          <a:xfrm>
+            <a:off x="35496" y="260648"/>
+            <a:ext cx="2736304" cy="288032"/>
+          </a:xfrm>
+          <a:prstGeom prst="rect">
+            <a:avLst/>
+          </a:prstGeom>
+        </p:spPr>
+        <p:txBody>
+          <a:bodyPr vert="horz" lIns="91440" tIns="45720" rIns="91440" bIns="45720" rtlCol="0" anchor="ctr">
+            <a:noAutofit/>
+          </a:bodyPr>
+          <a:lstStyle>
+            <a:lvl1pPr algn="ctr" defTabSz="914400" rtl="0" eaLnBrk="1" latinLnBrk="0" hangingPunct="1">
+              <a:spcBef>
+                <a:spcPct val="0"/>
+              </a:spcBef>
+              <a:buNone/>
+              <a:defRPr sz="4400" kern="1200">
+                <a:solidFill>
+                  <a:schemeClr val="tx1"/>
+                </a:solidFill>
+                <a:latin typeface="+mj-lt"/>
+                <a:ea typeface="+mj-ea"/>
+                <a:cs typeface="+mj-cs"/>
+              </a:defRPr>
+            </a:lvl1pPr>
+          </a:lstStyle>
+          <a:p>
+            <a:r>
+              <a:rPr lang="es-AR" sz="1800" dirty="0" err="1" smtClean="0">
+                <a:solidFill>
+                  <a:srgbClr val="C00000"/>
+                </a:solidFill>
+                <a:latin typeface="Aharoni" pitchFamily="2" charset="-79"/>
+                <a:cs typeface="Aharoni" pitchFamily="2" charset="-79"/>
+              </a:rPr>
+              <a:t>Panic</a:t>
+            </a:r>
+            <a:r>
+              <a:rPr lang="es-AR" sz="1800" dirty="0" smtClean="0">
+                <a:solidFill>
+                  <a:srgbClr val="C00000"/>
+                </a:solidFill>
+                <a:latin typeface="Aharoni" pitchFamily="2" charset="-79"/>
+                <a:cs typeface="Aharoni" pitchFamily="2" charset="-79"/>
+              </a:rPr>
+              <a:t> Dial </a:t>
+            </a:r>
+            <a:r>
+              <a:rPr lang="es-AR" sz="1800" dirty="0" err="1" smtClean="0">
+                <a:solidFill>
+                  <a:srgbClr val="C00000"/>
+                </a:solidFill>
+                <a:latin typeface="Aharoni" pitchFamily="2" charset="-79"/>
+                <a:cs typeface="Aharoni" pitchFamily="2" charset="-79"/>
+              </a:rPr>
+              <a:t>Button</a:t>
+            </a:r>
+            <a:endParaRPr lang="es-AR" sz="1800" dirty="0">
+              <a:latin typeface="Aharoni" pitchFamily="2" charset="-79"/>
+              <a:cs typeface="Aharoni" pitchFamily="2" charset="-79"/>
+            </a:endParaRPr>
+          </a:p>
+        </p:txBody>
+      </p:sp>
       <p:pic>
         <p:nvPicPr>
-          <p:cNvPr id="6" name="Picture 5"/>
+          <p:cNvPr id="10" name="Picture 5"/>
           <p:cNvPicPr>
             <a:picLocks noChangeAspect="1"/>
           </p:cNvPicPr>
@@ -5185,7 +5507,7 @@
         </p:blipFill>
         <p:spPr>
           <a:xfrm>
-            <a:off x="3203848" y="260648"/>
+            <a:off x="2483768" y="279732"/>
             <a:ext cx="468052" cy="277364"/>
           </a:xfrm>
           <a:prstGeom prst="rect">
@@ -5193,227 +5515,6 @@
           </a:prstGeom>
         </p:spPr>
       </p:pic>
-      <p:sp>
-        <p:nvSpPr>
-          <p:cNvPr id="8" name="1 Título"/>
-          <p:cNvSpPr txBox="1">
-            <a:spLocks/>
-          </p:cNvSpPr>
-          <p:nvPr/>
-        </p:nvSpPr>
-        <p:spPr>
-          <a:xfrm>
-            <a:off x="1012807" y="836712"/>
-            <a:ext cx="7118386" cy="792088"/>
-          </a:xfrm>
-          <a:prstGeom prst="rect">
-            <a:avLst/>
-          </a:prstGeom>
-        </p:spPr>
-        <p:txBody>
-          <a:bodyPr vert="horz" lIns="91440" tIns="45720" rIns="91440" bIns="45720" rtlCol="0" anchor="ctr">
-            <a:noAutofit/>
-          </a:bodyPr>
-          <a:lstStyle>
-            <a:lvl1pPr algn="ctr" defTabSz="914400" rtl="0" eaLnBrk="1" latinLnBrk="0" hangingPunct="1">
-              <a:spcBef>
-                <a:spcPct val="0"/>
-              </a:spcBef>
-              <a:buNone/>
-              <a:defRPr sz="4400" kern="1200">
-                <a:solidFill>
-                  <a:schemeClr val="tx1"/>
-                </a:solidFill>
-                <a:latin typeface="+mj-lt"/>
-                <a:ea typeface="+mj-ea"/>
-                <a:cs typeface="+mj-cs"/>
-              </a:defRPr>
-            </a:lvl1pPr>
-          </a:lstStyle>
-          <a:p>
-            <a:r>
-              <a:rPr lang="es-AR" sz="4800" b="1" dirty="0" smtClean="0">
-                <a:latin typeface="Trebuchet MS" pitchFamily="34" charset="0"/>
-                <a:cs typeface="Levenim MT" pitchFamily="2" charset="-79"/>
-              </a:rPr>
-              <a:t>Tipos de Clientes</a:t>
-            </a:r>
-            <a:endParaRPr lang="es-AR" sz="4800" b="1" dirty="0">
-              <a:latin typeface="Trebuchet MS" pitchFamily="34" charset="0"/>
-              <a:cs typeface="Levenim MT" pitchFamily="2" charset="-79"/>
-            </a:endParaRPr>
-          </a:p>
-        </p:txBody>
-      </p:sp>
-      <p:cxnSp>
-        <p:nvCxnSpPr>
-          <p:cNvPr id="5" name="Straight Connector 4"/>
-          <p:cNvCxnSpPr/>
-          <p:nvPr/>
-        </p:nvCxnSpPr>
-        <p:spPr>
-          <a:xfrm>
-            <a:off x="395536" y="692696"/>
-            <a:ext cx="8496944" cy="0"/>
-          </a:xfrm>
-          <a:prstGeom prst="line">
-            <a:avLst/>
-          </a:prstGeom>
-          <a:ln>
-            <a:solidFill>
-              <a:schemeClr val="bg1">
-                <a:lumMod val="65000"/>
-              </a:schemeClr>
-            </a:solidFill>
-          </a:ln>
-        </p:spPr>
-        <p:style>
-          <a:lnRef idx="1">
-            <a:schemeClr val="accent1"/>
-          </a:lnRef>
-          <a:fillRef idx="0">
-            <a:schemeClr val="accent1"/>
-          </a:fillRef>
-          <a:effectRef idx="0">
-            <a:schemeClr val="accent1"/>
-          </a:effectRef>
-          <a:fontRef idx="minor">
-            <a:schemeClr val="tx1"/>
-          </a:fontRef>
-        </p:style>
-      </p:cxnSp>
-      <p:sp>
-        <p:nvSpPr>
-          <p:cNvPr id="7" name="TextBox 6"/>
-          <p:cNvSpPr txBox="1"/>
-          <p:nvPr/>
-        </p:nvSpPr>
-        <p:spPr>
-          <a:xfrm>
-            <a:off x="395536" y="1700808"/>
-            <a:ext cx="8352928" cy="5078313"/>
-          </a:xfrm>
-          <a:prstGeom prst="rect">
-            <a:avLst/>
-          </a:prstGeom>
-          <a:noFill/>
-        </p:spPr>
-        <p:txBody>
-          <a:bodyPr wrap="square" rtlCol="0">
-            <a:spAutoFit/>
-          </a:bodyPr>
-          <a:lstStyle/>
-          <a:p>
-            <a:r>
-              <a:rPr lang="es-AR" sz="3600" b="1" dirty="0" smtClean="0"/>
-              <a:t>Acceso Masivo:</a:t>
-            </a:r>
-            <a:r>
-              <a:rPr lang="es-AR" sz="3600" dirty="0" smtClean="0"/>
-              <a:t> Ciudadano</a:t>
-            </a:r>
-          </a:p>
-          <a:p>
-            <a:pPr marL="1028700" lvl="1" indent="-571500">
-              <a:buFont typeface="Wingdings" pitchFamily="2" charset="2"/>
-              <a:buChar char="§"/>
-            </a:pPr>
-            <a:r>
-              <a:rPr lang="es-AR" sz="3600" dirty="0" smtClean="0"/>
-              <a:t>Gratuito.</a:t>
-            </a:r>
-          </a:p>
-          <a:p>
-            <a:pPr marL="1028700" lvl="1" indent="-571500">
-              <a:buFont typeface="Wingdings" pitchFamily="2" charset="2"/>
-              <a:buChar char="§"/>
-            </a:pPr>
-            <a:r>
-              <a:rPr lang="es-AR" sz="3600" dirty="0"/>
-              <a:t>Fácil </a:t>
-            </a:r>
-            <a:r>
-              <a:rPr lang="es-AR" sz="3600" dirty="0" smtClean="0"/>
-              <a:t>Acceso.</a:t>
-            </a:r>
-          </a:p>
-          <a:p>
-            <a:r>
-              <a:rPr lang="es-AR" sz="3600" b="1" dirty="0"/>
-              <a:t>Planes según </a:t>
-            </a:r>
-            <a:r>
-              <a:rPr lang="es-AR" sz="3600" b="1" dirty="0" smtClean="0"/>
-              <a:t>Necesidades Específicas:</a:t>
-            </a:r>
-            <a:r>
-              <a:rPr lang="es-AR" sz="3600" dirty="0" smtClean="0"/>
-              <a:t> Empresarial o Familiar</a:t>
-            </a:r>
-          </a:p>
-          <a:p>
-            <a:pPr marL="1028700" lvl="1" indent="-571500">
-              <a:buFont typeface="Wingdings" pitchFamily="2" charset="2"/>
-              <a:buChar char="§"/>
-            </a:pPr>
-            <a:r>
-              <a:rPr lang="es-AR" sz="3600" dirty="0" smtClean="0"/>
-              <a:t>5 $ARS (90.000 usuarios en 36 meses)</a:t>
-            </a:r>
-          </a:p>
-          <a:p>
-            <a:pPr marL="1028700" lvl="1" indent="-571500">
-              <a:buFont typeface="Wingdings" pitchFamily="2" charset="2"/>
-              <a:buChar char="§"/>
-            </a:pPr>
-            <a:r>
-              <a:rPr lang="es-AR" sz="3600" dirty="0" smtClean="0"/>
-              <a:t>Monitoreo Periódico.</a:t>
-            </a:r>
-          </a:p>
-          <a:p>
-            <a:pPr marL="1028700" lvl="1" indent="-571500">
-              <a:buFont typeface="Wingdings" pitchFamily="2" charset="2"/>
-              <a:buChar char="§"/>
-            </a:pPr>
-            <a:r>
-              <a:rPr lang="es-AR" sz="3600" dirty="0"/>
-              <a:t>Alarmas de </a:t>
-            </a:r>
-            <a:r>
-              <a:rPr lang="es-AR" sz="3600" dirty="0" smtClean="0"/>
-              <a:t>Zona </a:t>
-            </a:r>
-            <a:r>
-              <a:rPr lang="es-AR" sz="3600" dirty="0"/>
-              <a:t>P</a:t>
-            </a:r>
-            <a:r>
-              <a:rPr lang="es-AR" sz="3600" dirty="0" smtClean="0"/>
-              <a:t>eligrosa.</a:t>
-            </a:r>
-          </a:p>
-          <a:p>
-            <a:pPr marL="1028700" lvl="1" indent="-571500">
-              <a:buFont typeface="Wingdings" pitchFamily="2" charset="2"/>
-              <a:buChar char="§"/>
-            </a:pPr>
-            <a:r>
-              <a:rPr lang="es-AR" sz="3600" dirty="0"/>
-              <a:t>Esquema de </a:t>
-            </a:r>
-            <a:r>
-              <a:rPr lang="es-AR" sz="3600" dirty="0" err="1" smtClean="0"/>
-              <a:t>Check-Points</a:t>
-            </a:r>
-            <a:r>
-              <a:rPr lang="es-AR" sz="3600" dirty="0" smtClean="0"/>
-              <a:t>.</a:t>
-            </a:r>
-            <a:endParaRPr lang="es-AR" sz="3600" dirty="0"/>
-          </a:p>
-        </p:txBody>
-      </p:sp>
     </p:spTree>
     <p:extLst>
       <p:ext uri="{BB962C8B-B14F-4D97-AF65-F5344CB8AC3E}">
@@ -5453,42 +5554,6 @@
       </p:grpSpPr>
       <p:sp>
         <p:nvSpPr>
-          <p:cNvPr id="2" name="1 Título"/>
-          <p:cNvSpPr>
-            <a:spLocks noGrp="1"/>
-          </p:cNvSpPr>
-          <p:nvPr>
-            <p:ph type="ctrTitle"/>
-          </p:nvPr>
-        </p:nvSpPr>
-        <p:spPr>
-          <a:xfrm>
-            <a:off x="323528" y="260648"/>
-            <a:ext cx="2736304" cy="288032"/>
-          </a:xfrm>
-        </p:spPr>
-        <p:txBody>
-          <a:bodyPr>
-            <a:normAutofit fontScale="90000"/>
-          </a:bodyPr>
-          <a:lstStyle/>
-          <a:p>
-            <a:r>
-              <a:rPr lang="es-AR" sz="2000" dirty="0" smtClean="0">
-                <a:latin typeface="Aharoni" pitchFamily="2" charset="-79"/>
-                <a:cs typeface="Aharoni" pitchFamily="2" charset="-79"/>
-              </a:rPr>
-              <a:t>Seguridad para Todos</a:t>
-            </a:r>
-            <a:endParaRPr lang="es-AR" sz="2000" dirty="0">
-              <a:latin typeface="Aharoni" pitchFamily="2" charset="-79"/>
-              <a:cs typeface="Aharoni" pitchFamily="2" charset="-79"/>
-            </a:endParaRPr>
-          </a:p>
-        </p:txBody>
-      </p:sp>
-      <p:sp>
-        <p:nvSpPr>
           <p:cNvPr id="3" name="2 Subtítulo"/>
           <p:cNvSpPr>
             <a:spLocks noGrp="1"/>
@@ -5531,36 +5596,6 @@
           </a:p>
         </p:txBody>
       </p:sp>
-      <p:pic>
-        <p:nvPicPr>
-          <p:cNvPr id="6" name="Picture 5"/>
-          <p:cNvPicPr>
-            <a:picLocks noChangeAspect="1"/>
-          </p:cNvPicPr>
-          <p:nvPr/>
-        </p:nvPicPr>
-        <p:blipFill>
-          <a:blip r:embed="rId2" cstate="print">
-            <a:extLst>
-              <a:ext uri="{28A0092B-C50C-407E-A947-70E740481C1C}">
-                <a14:useLocalDpi xmlns:a14="http://schemas.microsoft.com/office/drawing/2010/main" val="0"/>
-              </a:ext>
-            </a:extLst>
-          </a:blip>
-          <a:stretch>
-            <a:fillRect/>
-          </a:stretch>
-        </p:blipFill>
-        <p:spPr>
-          <a:xfrm>
-            <a:off x="3203848" y="260648"/>
-            <a:ext cx="468052" cy="277364"/>
-          </a:xfrm>
-          <a:prstGeom prst="rect">
-            <a:avLst/>
-          </a:prstGeom>
-        </p:spPr>
-      </p:pic>
       <p:sp>
         <p:nvSpPr>
           <p:cNvPr id="8" name="1 Título"/>
@@ -5675,10 +5710,115 @@
         </p:xfrm>
         <a:graphic>
           <a:graphicData uri="http://schemas.openxmlformats.org/drawingml/2006/chart">
-            <c:chart xmlns:c="http://schemas.openxmlformats.org/drawingml/2006/chart" xmlns:r="http://schemas.openxmlformats.org/officeDocument/2006/relationships" r:id="rId3"/>
+            <c:chart xmlns:c="http://schemas.openxmlformats.org/drawingml/2006/chart" xmlns:r="http://schemas.openxmlformats.org/officeDocument/2006/relationships" r:id="rId2"/>
           </a:graphicData>
         </a:graphic>
       </p:graphicFrame>
+      <p:sp>
+        <p:nvSpPr>
+          <p:cNvPr id="10" name="1 Título"/>
+          <p:cNvSpPr txBox="1">
+            <a:spLocks/>
+          </p:cNvSpPr>
+          <p:nvPr/>
+        </p:nvSpPr>
+        <p:spPr>
+          <a:xfrm>
+            <a:off x="35496" y="260648"/>
+            <a:ext cx="2736304" cy="288032"/>
+          </a:xfrm>
+          <a:prstGeom prst="rect">
+            <a:avLst/>
+          </a:prstGeom>
+        </p:spPr>
+        <p:txBody>
+          <a:bodyPr vert="horz" lIns="91440" tIns="45720" rIns="91440" bIns="45720" rtlCol="0" anchor="ctr">
+            <a:noAutofit/>
+          </a:bodyPr>
+          <a:lstStyle>
+            <a:lvl1pPr algn="ctr" defTabSz="914400" rtl="0" eaLnBrk="1" latinLnBrk="0" hangingPunct="1">
+              <a:spcBef>
+                <a:spcPct val="0"/>
+              </a:spcBef>
+              <a:buNone/>
+              <a:defRPr sz="4400" kern="1200">
+                <a:solidFill>
+                  <a:schemeClr val="tx1"/>
+                </a:solidFill>
+                <a:latin typeface="+mj-lt"/>
+                <a:ea typeface="+mj-ea"/>
+                <a:cs typeface="+mj-cs"/>
+              </a:defRPr>
+            </a:lvl1pPr>
+          </a:lstStyle>
+          <a:p>
+            <a:r>
+              <a:rPr lang="es-AR" sz="1800" dirty="0" err="1" smtClean="0">
+                <a:solidFill>
+                  <a:srgbClr val="C00000"/>
+                </a:solidFill>
+                <a:latin typeface="Aharoni" pitchFamily="2" charset="-79"/>
+                <a:cs typeface="Aharoni" pitchFamily="2" charset="-79"/>
+              </a:rPr>
+              <a:t>Panic</a:t>
+            </a:r>
+            <a:r>
+              <a:rPr lang="es-AR" sz="1800" dirty="0" smtClean="0">
+                <a:solidFill>
+                  <a:srgbClr val="C00000"/>
+                </a:solidFill>
+                <a:latin typeface="Aharoni" pitchFamily="2" charset="-79"/>
+                <a:cs typeface="Aharoni" pitchFamily="2" charset="-79"/>
+              </a:rPr>
+              <a:t> Dial </a:t>
+            </a:r>
+            <a:r>
+              <a:rPr lang="es-AR" sz="1800" dirty="0" err="1" smtClean="0">
+                <a:solidFill>
+                  <a:srgbClr val="C00000"/>
+                </a:solidFill>
+                <a:latin typeface="Aharoni" pitchFamily="2" charset="-79"/>
+                <a:cs typeface="Aharoni" pitchFamily="2" charset="-79"/>
+              </a:rPr>
+              <a:t>Button</a:t>
+            </a:r>
+            <a:endParaRPr lang="es-AR" sz="1800" dirty="0">
+              <a:latin typeface="Aharoni" pitchFamily="2" charset="-79"/>
+              <a:cs typeface="Aharoni" pitchFamily="2" charset="-79"/>
+            </a:endParaRPr>
+          </a:p>
+        </p:txBody>
+      </p:sp>
+      <p:pic>
+        <p:nvPicPr>
+          <p:cNvPr id="11" name="Picture 5"/>
+          <p:cNvPicPr>
+            <a:picLocks noChangeAspect="1"/>
+          </p:cNvPicPr>
+          <p:nvPr/>
+        </p:nvPicPr>
+        <p:blipFill>
+          <a:blip r:embed="rId3" cstate="print">
+            <a:extLst>
+              <a:ext uri="{28A0092B-C50C-407E-A947-70E740481C1C}">
+                <a14:useLocalDpi xmlns:a14="http://schemas.microsoft.com/office/drawing/2010/main" val="0"/>
+              </a:ext>
+            </a:extLst>
+          </a:blip>
+          <a:stretch>
+            <a:fillRect/>
+          </a:stretch>
+        </p:blipFill>
+        <p:spPr>
+          <a:xfrm>
+            <a:off x="2483768" y="279732"/>
+            <a:ext cx="468052" cy="277364"/>
+          </a:xfrm>
+          <a:prstGeom prst="rect">
+            <a:avLst/>
+          </a:prstGeom>
+        </p:spPr>
+      </p:pic>
     </p:spTree>
     <p:extLst>
       <p:ext uri="{BB962C8B-B14F-4D97-AF65-F5344CB8AC3E}">
@@ -5718,42 +5858,6 @@
       </p:grpSpPr>
       <p:sp>
         <p:nvSpPr>
-          <p:cNvPr id="2" name="1 Título"/>
-          <p:cNvSpPr>
-            <a:spLocks noGrp="1"/>
-          </p:cNvSpPr>
-          <p:nvPr>
-            <p:ph type="ctrTitle"/>
-          </p:nvPr>
-        </p:nvSpPr>
-        <p:spPr>
-          <a:xfrm>
-            <a:off x="323528" y="260648"/>
-            <a:ext cx="2736304" cy="288032"/>
-          </a:xfrm>
-        </p:spPr>
-        <p:txBody>
-          <a:bodyPr>
-            <a:normAutofit fontScale="90000"/>
-          </a:bodyPr>
-          <a:lstStyle/>
-          <a:p>
-            <a:r>
-              <a:rPr lang="es-AR" sz="2000" dirty="0" smtClean="0">
-                <a:latin typeface="Aharoni" pitchFamily="2" charset="-79"/>
-                <a:cs typeface="Aharoni" pitchFamily="2" charset="-79"/>
-              </a:rPr>
-              <a:t>Seguridad para Todos</a:t>
-            </a:r>
-            <a:endParaRPr lang="es-AR" sz="2000" dirty="0">
-              <a:latin typeface="Aharoni" pitchFamily="2" charset="-79"/>
-              <a:cs typeface="Aharoni" pitchFamily="2" charset="-79"/>
-            </a:endParaRPr>
-          </a:p>
-        </p:txBody>
-      </p:sp>
-      <p:sp>
-        <p:nvSpPr>
           <p:cNvPr id="3" name="2 Subtítulo"/>
           <p:cNvSpPr>
             <a:spLocks noGrp="1"/>
@@ -5796,36 +5900,6 @@
           </a:p>
         </p:txBody>
       </p:sp>
-      <p:pic>
-        <p:nvPicPr>
-          <p:cNvPr id="6" name="Picture 5"/>
-          <p:cNvPicPr>
-            <a:picLocks noChangeAspect="1"/>
-          </p:cNvPicPr>
-          <p:nvPr/>
-        </p:nvPicPr>
-        <p:blipFill>
-          <a:blip r:embed="rId2" cstate="print">
-            <a:extLst>
-              <a:ext uri="{28A0092B-C50C-407E-A947-70E740481C1C}">
-                <a14:useLocalDpi xmlns:a14="http://schemas.microsoft.com/office/drawing/2010/main" val="0"/>
-              </a:ext>
-            </a:extLst>
-          </a:blip>
-          <a:stretch>
-            <a:fillRect/>
-          </a:stretch>
-        </p:blipFill>
-        <p:spPr>
-          <a:xfrm>
-            <a:off x="3203848" y="260648"/>
-            <a:ext cx="468052" cy="277364"/>
-          </a:xfrm>
-          <a:prstGeom prst="rect">
-            <a:avLst/>
-          </a:prstGeom>
-        </p:spPr>
-      </p:pic>
       <p:sp>
         <p:nvSpPr>
           <p:cNvPr id="8" name="1 Título"/>
@@ -6006,6 +6080,96 @@
       <p:pic>
         <p:nvPicPr>
           <p:cNvPr id="14" name="Picture 13"/>
+          <p:cNvPicPr>
+            <a:picLocks noChangeAspect="1"/>
+          </p:cNvPicPr>
+          <p:nvPr/>
+        </p:nvPicPr>
+        <p:blipFill>
+          <a:blip r:embed="rId2">
+            <a:extLst>
+              <a:ext uri="{28A0092B-C50C-407E-A947-70E740481C1C}">
+                <a14:useLocalDpi xmlns:a14="http://schemas.microsoft.com/office/drawing/2010/main" val="0"/>
+              </a:ext>
+            </a:extLst>
+          </a:blip>
+          <a:stretch>
+            <a:fillRect/>
+          </a:stretch>
+        </p:blipFill>
+        <p:spPr>
+          <a:xfrm>
+            <a:off x="1783701" y="2810213"/>
+            <a:ext cx="762468" cy="956550"/>
+          </a:xfrm>
+          <a:prstGeom prst="rect">
+            <a:avLst/>
+          </a:prstGeom>
+        </p:spPr>
+      </p:pic>
+      <p:sp>
+        <p:nvSpPr>
+          <p:cNvPr id="15" name="TextBox 14"/>
+          <p:cNvSpPr txBox="1"/>
+          <p:nvPr/>
+        </p:nvSpPr>
+        <p:spPr>
+          <a:xfrm>
+            <a:off x="1588871" y="3883114"/>
+            <a:ext cx="1440160" cy="553998"/>
+          </a:xfrm>
+          <a:prstGeom prst="rect">
+            <a:avLst/>
+          </a:prstGeom>
+          <a:noFill/>
+        </p:spPr>
+        <p:txBody>
+          <a:bodyPr wrap="square" rtlCol="0">
+            <a:spAutoFit/>
+          </a:bodyPr>
+          <a:lstStyle/>
+          <a:p>
+            <a:r>
+              <a:rPr lang="es-AR" sz="3000" b="1" dirty="0" smtClean="0"/>
+              <a:t>iPhone</a:t>
+            </a:r>
+            <a:endParaRPr lang="es-AR" sz="3000" b="1" dirty="0"/>
+          </a:p>
+        </p:txBody>
+      </p:sp>
+      <p:sp>
+        <p:nvSpPr>
+          <p:cNvPr id="16" name="TextBox 15"/>
+          <p:cNvSpPr txBox="1"/>
+          <p:nvPr/>
+        </p:nvSpPr>
+        <p:spPr>
+          <a:xfrm>
+            <a:off x="3923928" y="3883114"/>
+            <a:ext cx="1647266" cy="553998"/>
+          </a:xfrm>
+          <a:prstGeom prst="rect">
+            <a:avLst/>
+          </a:prstGeom>
+          <a:noFill/>
+        </p:spPr>
+        <p:txBody>
+          <a:bodyPr wrap="square" rtlCol="0">
+            <a:spAutoFit/>
+          </a:bodyPr>
+          <a:lstStyle/>
+          <a:p>
+            <a:r>
+              <a:rPr lang="es-AR" sz="3000" b="1" dirty="0" err="1" smtClean="0"/>
+              <a:t>Android</a:t>
+            </a:r>
+            <a:endParaRPr lang="es-AR" sz="3000" b="1" dirty="0"/>
+          </a:p>
+        </p:txBody>
+      </p:sp>
+      <p:pic>
+        <p:nvPicPr>
+          <p:cNvPr id="18" name="Picture 17"/>
           <p:cNvPicPr>
             <a:picLocks noChangeAspect="1"/>
           </p:cNvPicPr>
@@ -6025,8 +6189,8 @@
         </p:blipFill>
         <p:spPr>
           <a:xfrm>
-            <a:off x="1783701" y="2810213"/>
-            <a:ext cx="762468" cy="956550"/>
+            <a:off x="4022386" y="2468395"/>
+            <a:ext cx="1282976" cy="1482058"/>
           </a:xfrm>
           <a:prstGeom prst="rect">
             <a:avLst/>
@@ -6035,14 +6199,14 @@
       </p:pic>
       <p:sp>
         <p:nvSpPr>
-          <p:cNvPr id="15" name="TextBox 14"/>
+          <p:cNvPr id="19" name="TextBox 18"/>
           <p:cNvSpPr txBox="1"/>
           <p:nvPr/>
         </p:nvSpPr>
         <p:spPr>
           <a:xfrm>
-            <a:off x="1588871" y="3883114"/>
-            <a:ext cx="1440160" cy="553998"/>
+            <a:off x="6368727" y="3883114"/>
+            <a:ext cx="2019697" cy="553998"/>
           </a:xfrm>
           <a:prstGeom prst="rect">
             <a:avLst/>
@@ -6057,37 +6221,7 @@
           <a:p>
             <a:r>
               <a:rPr lang="es-AR" sz="3000" b="1" dirty="0" smtClean="0"/>
-              <a:t>iPhone</a:t>
-            </a:r>
-            <a:endParaRPr lang="es-AR" sz="3000" b="1" dirty="0"/>
-          </a:p>
-        </p:txBody>
-      </p:sp>
-      <p:sp>
-        <p:nvSpPr>
-          <p:cNvPr id="16" name="TextBox 15"/>
-          <p:cNvSpPr txBox="1"/>
-          <p:nvPr/>
-        </p:nvSpPr>
-        <p:spPr>
-          <a:xfrm>
-            <a:off x="3923928" y="3883114"/>
-            <a:ext cx="1647266" cy="553998"/>
-          </a:xfrm>
-          <a:prstGeom prst="rect">
-            <a:avLst/>
-          </a:prstGeom>
-          <a:noFill/>
-        </p:spPr>
-        <p:txBody>
-          <a:bodyPr wrap="square" rtlCol="0">
-            <a:spAutoFit/>
-          </a:bodyPr>
-          <a:lstStyle/>
-          <a:p>
-            <a:r>
-              <a:rPr lang="es-AR" sz="3000" b="1" dirty="0" err="1" smtClean="0"/>
-              <a:t>Android</a:t>
+              <a:t>BlackBerry</a:t>
             </a:r>
             <a:endParaRPr lang="es-AR" sz="3000" b="1" dirty="0"/>
           </a:p>
@@ -6095,14 +6229,14 @@
       </p:sp>
       <p:pic>
         <p:nvPicPr>
-          <p:cNvPr id="18" name="Picture 17"/>
+          <p:cNvPr id="20" name="Picture 19"/>
           <p:cNvPicPr>
             <a:picLocks noChangeAspect="1"/>
           </p:cNvPicPr>
           <p:nvPr/>
         </p:nvPicPr>
         <p:blipFill>
-          <a:blip r:embed="rId4">
+          <a:blip r:embed="rId4" cstate="print">
             <a:extLst>
               <a:ext uri="{28A0092B-C50C-407E-A947-70E740481C1C}">
                 <a14:useLocalDpi xmlns:a14="http://schemas.microsoft.com/office/drawing/2010/main" val="0"/>
@@ -6115,8 +6249,8 @@
         </p:blipFill>
         <p:spPr>
           <a:xfrm>
-            <a:off x="4022386" y="2468395"/>
-            <a:ext cx="1282976" cy="1482058"/>
+            <a:off x="6740971" y="2807417"/>
+            <a:ext cx="1008112" cy="1008112"/>
           </a:xfrm>
           <a:prstGeom prst="rect">
             <a:avLst/>
@@ -6125,37 +6259,82 @@
       </p:pic>
       <p:sp>
         <p:nvSpPr>
-          <p:cNvPr id="19" name="TextBox 18"/>
-          <p:cNvSpPr txBox="1"/>
+          <p:cNvPr id="17" name="1 Título"/>
+          <p:cNvSpPr txBox="1">
+            <a:spLocks/>
+          </p:cNvSpPr>
           <p:nvPr/>
         </p:nvSpPr>
         <p:spPr>
           <a:xfrm>
-            <a:off x="6368727" y="3883114"/>
-            <a:ext cx="2019697" cy="553998"/>
+            <a:off x="35496" y="260648"/>
+            <a:ext cx="2736304" cy="288032"/>
           </a:xfrm>
           <a:prstGeom prst="rect">
             <a:avLst/>
           </a:prstGeom>
-          <a:noFill/>
-        </p:spPr>
-        <p:txBody>
-          <a:bodyPr wrap="square" rtlCol="0">
-            <a:spAutoFit/>
+        </p:spPr>
+        <p:txBody>
+          <a:bodyPr vert="horz" lIns="91440" tIns="45720" rIns="91440" bIns="45720" rtlCol="0" anchor="ctr">
+            <a:noAutofit/>
           </a:bodyPr>
-          <a:lstStyle/>
-          <a:p>
-            <a:r>
-              <a:rPr lang="es-AR" sz="3000" b="1" dirty="0" smtClean="0"/>
-              <a:t>BlackBerry</a:t>
-            </a:r>
-            <a:endParaRPr lang="es-AR" sz="3000" b="1" dirty="0"/>
+          <a:lstStyle>
+            <a:lvl1pPr algn="ctr" defTabSz="914400" rtl="0" eaLnBrk="1" latinLnBrk="0" hangingPunct="1">
+              <a:spcBef>
+                <a:spcPct val="0"/>
+              </a:spcBef>
+              <a:buNone/>
+              <a:defRPr sz="4400" kern="1200">
+                <a:solidFill>
+                  <a:schemeClr val="tx1"/>
+                </a:solidFill>
+                <a:latin typeface="+mj-lt"/>
+                <a:ea typeface="+mj-ea"/>
+                <a:cs typeface="+mj-cs"/>
+              </a:defRPr>
+            </a:lvl1pPr>
+          </a:lstStyle>
+          <a:p>
+            <a:r>
+              <a:rPr lang="es-AR" sz="1800" dirty="0" err="1" smtClean="0">
+                <a:solidFill>
+                  <a:srgbClr val="C00000"/>
+                </a:solidFill>
+                <a:latin typeface="Aharoni" pitchFamily="2" charset="-79"/>
+                <a:cs typeface="Aharoni" pitchFamily="2" charset="-79"/>
+              </a:rPr>
+              <a:t>Panic</a:t>
+            </a:r>
+            <a:r>
+              <a:rPr lang="es-AR" sz="1800" dirty="0" smtClean="0">
+                <a:solidFill>
+                  <a:srgbClr val="C00000"/>
+                </a:solidFill>
+                <a:latin typeface="Aharoni" pitchFamily="2" charset="-79"/>
+                <a:cs typeface="Aharoni" pitchFamily="2" charset="-79"/>
+              </a:rPr>
+              <a:t> Dial </a:t>
+            </a:r>
+            <a:r>
+              <a:rPr lang="es-AR" sz="1800" dirty="0" err="1" smtClean="0">
+                <a:solidFill>
+                  <a:srgbClr val="C00000"/>
+                </a:solidFill>
+                <a:latin typeface="Aharoni" pitchFamily="2" charset="-79"/>
+                <a:cs typeface="Aharoni" pitchFamily="2" charset="-79"/>
+              </a:rPr>
+              <a:t>Button</a:t>
+            </a:r>
+            <a:endParaRPr lang="es-AR" sz="1800" dirty="0">
+              <a:latin typeface="Aharoni" pitchFamily="2" charset="-79"/>
+              <a:cs typeface="Aharoni" pitchFamily="2" charset="-79"/>
+            </a:endParaRPr>
           </a:p>
         </p:txBody>
       </p:sp>
       <p:pic>
         <p:nvPicPr>
-          <p:cNvPr id="20" name="Picture 19"/>
+          <p:cNvPr id="21" name="Picture 5"/>
           <p:cNvPicPr>
             <a:picLocks noChangeAspect="1"/>
           </p:cNvPicPr>
@@ -6175,8 +6354,8 @@
         </p:blipFill>
         <p:spPr>
           <a:xfrm>
-            <a:off x="6740971" y="2807417"/>
-            <a:ext cx="1008112" cy="1008112"/>
+            <a:off x="2483768" y="279732"/>
+            <a:ext cx="468052" cy="277364"/>
           </a:xfrm>
           <a:prstGeom prst="rect">
             <a:avLst/>
@@ -6222,42 +6401,6 @@
       </p:grpSpPr>
       <p:sp>
         <p:nvSpPr>
-          <p:cNvPr id="2" name="1 Título"/>
-          <p:cNvSpPr>
-            <a:spLocks noGrp="1"/>
-          </p:cNvSpPr>
-          <p:nvPr>
-            <p:ph type="ctrTitle"/>
-          </p:nvPr>
-        </p:nvSpPr>
-        <p:spPr>
-          <a:xfrm>
-            <a:off x="323528" y="260648"/>
-            <a:ext cx="2736304" cy="288032"/>
-          </a:xfrm>
-        </p:spPr>
-        <p:txBody>
-          <a:bodyPr>
-            <a:normAutofit fontScale="90000"/>
-          </a:bodyPr>
-          <a:lstStyle/>
-          <a:p>
-            <a:r>
-              <a:rPr lang="es-AR" sz="2000" dirty="0" smtClean="0">
-                <a:latin typeface="Aharoni" pitchFamily="2" charset="-79"/>
-                <a:cs typeface="Aharoni" pitchFamily="2" charset="-79"/>
-              </a:rPr>
-              <a:t>Seguridad para Todos</a:t>
-            </a:r>
-            <a:endParaRPr lang="es-AR" sz="2000" dirty="0">
-              <a:latin typeface="Aharoni" pitchFamily="2" charset="-79"/>
-              <a:cs typeface="Aharoni" pitchFamily="2" charset="-79"/>
-            </a:endParaRPr>
-          </a:p>
-        </p:txBody>
-      </p:sp>
-      <p:sp>
-        <p:nvSpPr>
           <p:cNvPr id="3" name="2 Subtítulo"/>
           <p:cNvSpPr>
             <a:spLocks noGrp="1"/>
@@ -6300,9 +6443,209 @@
           </a:p>
         </p:txBody>
       </p:sp>
+      <p:sp>
+        <p:nvSpPr>
+          <p:cNvPr id="8" name="1 Título"/>
+          <p:cNvSpPr txBox="1">
+            <a:spLocks/>
+          </p:cNvSpPr>
+          <p:nvPr/>
+        </p:nvSpPr>
+        <p:spPr>
+          <a:xfrm>
+            <a:off x="1907704" y="4149080"/>
+            <a:ext cx="5328592" cy="792088"/>
+          </a:xfrm>
+          <a:prstGeom prst="rect">
+            <a:avLst/>
+          </a:prstGeom>
+        </p:spPr>
+        <p:txBody>
+          <a:bodyPr vert="horz" lIns="91440" tIns="45720" rIns="91440" bIns="45720" rtlCol="0" anchor="ctr">
+            <a:noAutofit/>
+          </a:bodyPr>
+          <a:lstStyle>
+            <a:lvl1pPr algn="ctr" defTabSz="914400" rtl="0" eaLnBrk="1" latinLnBrk="0" hangingPunct="1">
+              <a:spcBef>
+                <a:spcPct val="0"/>
+              </a:spcBef>
+              <a:buNone/>
+              <a:defRPr sz="4400" kern="1200">
+                <a:solidFill>
+                  <a:schemeClr val="tx1"/>
+                </a:solidFill>
+                <a:latin typeface="+mj-lt"/>
+                <a:ea typeface="+mj-ea"/>
+                <a:cs typeface="+mj-cs"/>
+              </a:defRPr>
+            </a:lvl1pPr>
+          </a:lstStyle>
+          <a:p>
+            <a:r>
+              <a:rPr lang="es-AR" sz="4800" b="1" dirty="0" smtClean="0">
+                <a:latin typeface="Trebuchet MS" pitchFamily="34" charset="0"/>
+                <a:cs typeface="Levenim MT" pitchFamily="2" charset="-79"/>
+              </a:rPr>
+              <a:t>¿Preguntas?</a:t>
+            </a:r>
+            <a:endParaRPr lang="es-AR" sz="4800" b="1" dirty="0">
+              <a:latin typeface="Trebuchet MS" pitchFamily="34" charset="0"/>
+              <a:cs typeface="Levenim MT" pitchFamily="2" charset="-79"/>
+            </a:endParaRPr>
+          </a:p>
+        </p:txBody>
+      </p:sp>
+      <p:cxnSp>
+        <p:nvCxnSpPr>
+          <p:cNvPr id="5" name="Straight Connector 4"/>
+          <p:cNvCxnSpPr/>
+          <p:nvPr/>
+        </p:nvCxnSpPr>
+        <p:spPr>
+          <a:xfrm>
+            <a:off x="395536" y="692696"/>
+            <a:ext cx="8496944" cy="0"/>
+          </a:xfrm>
+          <a:prstGeom prst="line">
+            <a:avLst/>
+          </a:prstGeom>
+          <a:ln>
+            <a:solidFill>
+              <a:schemeClr val="bg1">
+                <a:lumMod val="65000"/>
+              </a:schemeClr>
+            </a:solidFill>
+          </a:ln>
+        </p:spPr>
+        <p:style>
+          <a:lnRef idx="1">
+            <a:schemeClr val="accent1"/>
+          </a:lnRef>
+          <a:fillRef idx="0">
+            <a:schemeClr val="accent1"/>
+          </a:fillRef>
+          <a:effectRef idx="0">
+            <a:schemeClr val="accent1"/>
+          </a:effectRef>
+          <a:fontRef idx="minor">
+            <a:schemeClr val="tx1"/>
+          </a:fontRef>
+        </p:style>
+      </p:cxnSp>
+      <p:sp>
+        <p:nvSpPr>
+          <p:cNvPr id="7" name="1 Título"/>
+          <p:cNvSpPr txBox="1">
+            <a:spLocks/>
+          </p:cNvSpPr>
+          <p:nvPr/>
+        </p:nvSpPr>
+        <p:spPr>
+          <a:xfrm>
+            <a:off x="2060104" y="1340768"/>
+            <a:ext cx="5328592" cy="792088"/>
+          </a:xfrm>
+          <a:prstGeom prst="rect">
+            <a:avLst/>
+          </a:prstGeom>
+        </p:spPr>
+        <p:txBody>
+          <a:bodyPr vert="horz" lIns="91440" tIns="45720" rIns="91440" bIns="45720" rtlCol="0" anchor="ctr">
+            <a:noAutofit/>
+          </a:bodyPr>
+          <a:lstStyle>
+            <a:lvl1pPr algn="ctr" defTabSz="914400" rtl="0" eaLnBrk="1" latinLnBrk="0" hangingPunct="1">
+              <a:spcBef>
+                <a:spcPct val="0"/>
+              </a:spcBef>
+              <a:buNone/>
+              <a:defRPr sz="4400" kern="1200">
+                <a:solidFill>
+                  <a:schemeClr val="tx1"/>
+                </a:solidFill>
+                <a:latin typeface="+mj-lt"/>
+                <a:ea typeface="+mj-ea"/>
+                <a:cs typeface="+mj-cs"/>
+              </a:defRPr>
+            </a:lvl1pPr>
+          </a:lstStyle>
+          <a:p>
+            <a:r>
+              <a:rPr lang="es-AR" sz="4800" b="1" dirty="0" smtClean="0">
+                <a:latin typeface="Trebuchet MS" pitchFamily="34" charset="0"/>
+                <a:cs typeface="Levenim MT" pitchFamily="2" charset="-79"/>
+              </a:rPr>
+              <a:t>Muchas gracias</a:t>
+            </a:r>
+            <a:endParaRPr lang="es-AR" sz="4800" b="1" dirty="0">
+              <a:latin typeface="Trebuchet MS" pitchFamily="34" charset="0"/>
+              <a:cs typeface="Levenim MT" pitchFamily="2" charset="-79"/>
+            </a:endParaRPr>
+          </a:p>
+        </p:txBody>
+      </p:sp>
+      <p:sp>
+        <p:nvSpPr>
+          <p:cNvPr id="9" name="1 Título"/>
+          <p:cNvSpPr>
+            <a:spLocks noGrp="1"/>
+          </p:cNvSpPr>
+          <p:nvPr>
+            <p:ph type="ctrTitle"/>
+          </p:nvPr>
+        </p:nvSpPr>
+        <p:spPr>
+          <a:xfrm>
+            <a:off x="35496" y="260648"/>
+            <a:ext cx="2736304" cy="288032"/>
+          </a:xfrm>
+        </p:spPr>
+        <p:txBody>
+          <a:bodyPr>
+            <a:normAutofit fontScale="90000"/>
+          </a:bodyPr>
+          <a:lstStyle/>
+          <a:p>
+            <a:r>
+              <a:rPr lang="es-AR" sz="2000" dirty="0" err="1">
+                <a:solidFill>
+                  <a:srgbClr val="C00000"/>
+                </a:solidFill>
+                <a:latin typeface="Aharoni" pitchFamily="2" charset="-79"/>
+                <a:cs typeface="Aharoni" pitchFamily="2" charset="-79"/>
+              </a:rPr>
+              <a:t>Panic</a:t>
+            </a:r>
+            <a:r>
+              <a:rPr lang="es-AR" sz="2000" dirty="0">
+                <a:solidFill>
+                  <a:srgbClr val="C00000"/>
+                </a:solidFill>
+                <a:latin typeface="Aharoni" pitchFamily="2" charset="-79"/>
+                <a:cs typeface="Aharoni" pitchFamily="2" charset="-79"/>
+              </a:rPr>
+              <a:t> Dial </a:t>
+            </a:r>
+            <a:r>
+              <a:rPr lang="es-AR" sz="2000" dirty="0" err="1">
+                <a:solidFill>
+                  <a:srgbClr val="C00000"/>
+                </a:solidFill>
+                <a:latin typeface="Aharoni" pitchFamily="2" charset="-79"/>
+                <a:cs typeface="Aharoni" pitchFamily="2" charset="-79"/>
+              </a:rPr>
+              <a:t>Button</a:t>
+            </a:r>
+            <a:endParaRPr lang="es-AR" sz="2000" dirty="0">
+              <a:latin typeface="Aharoni" pitchFamily="2" charset="-79"/>
+              <a:cs typeface="Aharoni" pitchFamily="2" charset="-79"/>
+            </a:endParaRPr>
+          </a:p>
+        </p:txBody>
+      </p:sp>
       <p:pic>
         <p:nvPicPr>
-          <p:cNvPr id="6" name="Picture 5"/>
+          <p:cNvPr id="10" name="Picture 5"/>
           <p:cNvPicPr>
             <a:picLocks noChangeAspect="1"/>
           </p:cNvPicPr>
@@ -6322,7 +6665,7 @@
         </p:blipFill>
         <p:spPr>
           <a:xfrm>
-            <a:off x="3203848" y="260648"/>
+            <a:off x="2483768" y="279732"/>
             <a:ext cx="468052" cy="277364"/>
           </a:xfrm>
           <a:prstGeom prst="rect">
@@ -6330,147 +6673,6 @@
           </a:prstGeom>
         </p:spPr>
       </p:pic>
-      <p:sp>
-        <p:nvSpPr>
-          <p:cNvPr id="8" name="1 Título"/>
-          <p:cNvSpPr txBox="1">
-            <a:spLocks/>
-          </p:cNvSpPr>
-          <p:nvPr/>
-        </p:nvSpPr>
-        <p:spPr>
-          <a:xfrm>
-            <a:off x="1907704" y="4149080"/>
-            <a:ext cx="5328592" cy="792088"/>
-          </a:xfrm>
-          <a:prstGeom prst="rect">
-            <a:avLst/>
-          </a:prstGeom>
-        </p:spPr>
-        <p:txBody>
-          <a:bodyPr vert="horz" lIns="91440" tIns="45720" rIns="91440" bIns="45720" rtlCol="0" anchor="ctr">
-            <a:noAutofit/>
-          </a:bodyPr>
-          <a:lstStyle>
-            <a:lvl1pPr algn="ctr" defTabSz="914400" rtl="0" eaLnBrk="1" latinLnBrk="0" hangingPunct="1">
-              <a:spcBef>
-                <a:spcPct val="0"/>
-              </a:spcBef>
-              <a:buNone/>
-              <a:defRPr sz="4400" kern="1200">
-                <a:solidFill>
-                  <a:schemeClr val="tx1"/>
-                </a:solidFill>
-                <a:latin typeface="+mj-lt"/>
-                <a:ea typeface="+mj-ea"/>
-                <a:cs typeface="+mj-cs"/>
-              </a:defRPr>
-            </a:lvl1pPr>
-          </a:lstStyle>
-          <a:p>
-            <a:r>
-              <a:rPr lang="es-AR" sz="4800" b="1" dirty="0" smtClean="0">
-                <a:latin typeface="Trebuchet MS" pitchFamily="34" charset="0"/>
-                <a:cs typeface="Levenim MT" pitchFamily="2" charset="-79"/>
-              </a:rPr>
-              <a:t>¿Preguntas?</a:t>
-            </a:r>
-            <a:endParaRPr lang="es-AR" sz="4800" b="1" dirty="0">
-              <a:latin typeface="Trebuchet MS" pitchFamily="34" charset="0"/>
-              <a:cs typeface="Levenim MT" pitchFamily="2" charset="-79"/>
-            </a:endParaRPr>
-          </a:p>
-        </p:txBody>
-      </p:sp>
-      <p:cxnSp>
-        <p:nvCxnSpPr>
-          <p:cNvPr id="5" name="Straight Connector 4"/>
-          <p:cNvCxnSpPr/>
-          <p:nvPr/>
-        </p:nvCxnSpPr>
-        <p:spPr>
-          <a:xfrm>
-            <a:off x="395536" y="692696"/>
-            <a:ext cx="8496944" cy="0"/>
-          </a:xfrm>
-          <a:prstGeom prst="line">
-            <a:avLst/>
-          </a:prstGeom>
-          <a:ln>
-            <a:solidFill>
-              <a:schemeClr val="bg1">
-                <a:lumMod val="65000"/>
-              </a:schemeClr>
-            </a:solidFill>
-          </a:ln>
-        </p:spPr>
-        <p:style>
-          <a:lnRef idx="1">
-            <a:schemeClr val="accent1"/>
-          </a:lnRef>
-          <a:fillRef idx="0">
-            <a:schemeClr val="accent1"/>
-          </a:fillRef>
-          <a:effectRef idx="0">
-            <a:schemeClr val="accent1"/>
-          </a:effectRef>
-          <a:fontRef idx="minor">
-            <a:schemeClr val="tx1"/>
-          </a:fontRef>
-        </p:style>
-      </p:cxnSp>
-      <p:sp>
-        <p:nvSpPr>
-          <p:cNvPr id="7" name="1 Título"/>
-          <p:cNvSpPr txBox="1">
-            <a:spLocks/>
-          </p:cNvSpPr>
-          <p:nvPr/>
-        </p:nvSpPr>
-        <p:spPr>
-          <a:xfrm>
-            <a:off x="2060104" y="1340768"/>
-            <a:ext cx="5328592" cy="792088"/>
-          </a:xfrm>
-          <a:prstGeom prst="rect">
-            <a:avLst/>
-          </a:prstGeom>
-        </p:spPr>
-        <p:txBody>
-          <a:bodyPr vert="horz" lIns="91440" tIns="45720" rIns="91440" bIns="45720" rtlCol="0" anchor="ctr">
-            <a:noAutofit/>
-          </a:bodyPr>
-          <a:lstStyle>
-            <a:lvl1pPr algn="ctr" defTabSz="914400" rtl="0" eaLnBrk="1" latinLnBrk="0" hangingPunct="1">
-              <a:spcBef>
-                <a:spcPct val="0"/>
-              </a:spcBef>
-              <a:buNone/>
-              <a:defRPr sz="4400" kern="1200">
-                <a:solidFill>
-                  <a:schemeClr val="tx1"/>
-                </a:solidFill>
-                <a:latin typeface="+mj-lt"/>
-                <a:ea typeface="+mj-ea"/>
-                <a:cs typeface="+mj-cs"/>
-              </a:defRPr>
-            </a:lvl1pPr>
-          </a:lstStyle>
-          <a:p>
-            <a:r>
-              <a:rPr lang="es-AR" sz="4800" b="1" dirty="0" smtClean="0">
-                <a:latin typeface="Trebuchet MS" pitchFamily="34" charset="0"/>
-                <a:cs typeface="Levenim MT" pitchFamily="2" charset="-79"/>
-              </a:rPr>
-              <a:t>Muchas gracias</a:t>
-            </a:r>
-            <a:endParaRPr lang="es-AR" sz="4800" b="1" dirty="0">
-              <a:latin typeface="Trebuchet MS" pitchFamily="34" charset="0"/>
-              <a:cs typeface="Levenim MT" pitchFamily="2" charset="-79"/>
-            </a:endParaRPr>
-          </a:p>
-        </p:txBody>
-      </p:sp>
     </p:spTree>
     <p:extLst>
       <p:ext uri="{BB962C8B-B14F-4D97-AF65-F5344CB8AC3E}">

</xml_diff>